<commit_message>
Expanded on the slides
</commit_message>
<xml_diff>
--- a/SCCUR-slides.pptx
+++ b/SCCUR-slides.pptx
@@ -2,17 +2,17 @@
 <file path=ppt/presentation.xml><?xml version="1.0" encoding="utf-8"?>
 <p:presentation xmlns:a="http://schemas.openxmlformats.org/drawingml/2006/main" xmlns:r="http://schemas.openxmlformats.org/officeDocument/2006/relationships" xmlns:p="http://schemas.openxmlformats.org/presentationml/2006/main" autoCompressPictures="0">
   <p:sldMasterIdLst>
-    <p:sldMasterId id="2147483648" r:id="rId1"/>
+    <p:sldMasterId id="2147483777" r:id="rId1"/>
   </p:sldMasterIdLst>
   <p:sldIdLst>
     <p:sldId id="256" r:id="rId2"/>
     <p:sldId id="257" r:id="rId3"/>
     <p:sldId id="258" r:id="rId4"/>
     <p:sldId id="264" r:id="rId5"/>
-    <p:sldId id="262" r:id="rId6"/>
-    <p:sldId id="265" r:id="rId7"/>
-    <p:sldId id="263" r:id="rId8"/>
-    <p:sldId id="259" r:id="rId9"/>
+    <p:sldId id="263" r:id="rId6"/>
+    <p:sldId id="259" r:id="rId7"/>
+    <p:sldId id="262" r:id="rId8"/>
+    <p:sldId id="265" r:id="rId9"/>
     <p:sldId id="260" r:id="rId10"/>
     <p:sldId id="261" r:id="rId11"/>
   </p:sldIdLst>
@@ -113,7 +113,66 @@
       </a:defRPr>
     </a:lvl9pPr>
   </p:defaultTextStyle>
+  <p:extLst>
+    <p:ext uri="{EFAFB233-063F-42B5-8137-9DF3F51BA10A}">
+      <p15:sldGuideLst xmlns:p15="http://schemas.microsoft.com/office/powerpoint/2012/main"/>
+    </p:ext>
+  </p:extLst>
 </p:presentation>
+</file>
+
+<file path=ppt/commentAuthors.xml><?xml version="1.0" encoding="utf-8"?>
+<p:cmAuthorLst xmlns:a="http://schemas.openxmlformats.org/drawingml/2006/main" xmlns:r="http://schemas.openxmlformats.org/officeDocument/2006/relationships" xmlns:p="http://schemas.openxmlformats.org/presentationml/2006/main">
+  <p:cmAuthor id="1" name="Fernando Saca" initials="FS" lastIdx="4" clrIdx="0">
+    <p:extLst>
+      <p:ext uri="{19B8F6BF-5375-455C-9EA6-DF929625EA0E}">
+        <p15:presenceInfo xmlns:p15="http://schemas.microsoft.com/office/powerpoint/2012/main" userId="55b9460f50b835dd" providerId="Windows Live"/>
+      </p:ext>
+    </p:extLst>
+  </p:cmAuthor>
+</p:cmAuthorLst>
+</file>
+
+<file path=ppt/comments/comment1.xml><?xml version="1.0" encoding="utf-8"?>
+<p:cmLst xmlns:a="http://schemas.openxmlformats.org/drawingml/2006/main" xmlns:r="http://schemas.openxmlformats.org/officeDocument/2006/relationships" xmlns:p="http://schemas.openxmlformats.org/presentationml/2006/main">
+  <p:cm authorId="1" dt="2018-10-17T11:30:33.506" idx="2">
+    <p:pos x="10" y="10"/>
+    <p:text>Point of the talk is to present a theorem for case analysis. Introduce theorem at this point; explain what it means (An equation with a variable replaced by true...). Significance will be explained two slides later.</p:text>
+    <p:extLst>
+      <p:ext uri="{C676402C-5697-4E1C-873F-D02D1690AC5C}">
+        <p15:threadingInfo xmlns:p15="http://schemas.microsoft.com/office/powerpoint/2012/main" timeZoneBias="420"/>
+      </p:ext>
+    </p:extLst>
+  </p:cm>
+</p:cmLst>
+</file>
+
+<file path=ppt/comments/comment2.xml><?xml version="1.0" encoding="utf-8"?>
+<p:cmLst xmlns:a="http://schemas.openxmlformats.org/drawingml/2006/main" xmlns:r="http://schemas.openxmlformats.org/officeDocument/2006/relationships" xmlns:p="http://schemas.openxmlformats.org/presentationml/2006/main">
+  <p:cm authorId="1" dt="2018-10-17T11:33:05.687" idx="3">
+    <p:pos x="10" y="10"/>
+    <p:text>Explain that this theorem is applicable both in the realm of computer science and English argumentation. Then, state that the proof calculus used was the equational system, covered in the Gries and Schneider text. Finally, explain that in the end of the presentation, two proofs and a counterexample will be presented, using the equational system.</p:text>
+    <p:extLst>
+      <p:ext uri="{C676402C-5697-4E1C-873F-D02D1690AC5C}">
+        <p15:threadingInfo xmlns:p15="http://schemas.microsoft.com/office/powerpoint/2012/main" timeZoneBias="420"/>
+      </p:ext>
+    </p:extLst>
+  </p:cm>
+</p:cmLst>
+</file>
+
+<file path=ppt/comments/comment3.xml><?xml version="1.0" encoding="utf-8"?>
+<p:cmLst xmlns:a="http://schemas.openxmlformats.org/drawingml/2006/main" xmlns:r="http://schemas.openxmlformats.org/officeDocument/2006/relationships" xmlns:p="http://schemas.openxmlformats.org/presentationml/2006/main">
+  <p:cm authorId="1" dt="2018-10-17T11:36:23.685" idx="4">
+    <p:pos x="10" y="10"/>
+    <p:text>Time won't allow for going through the proofs step-by-step, but it would still be beneficial to solve a snippet of the proof with the audience.</p:text>
+    <p:extLst>
+      <p:ext uri="{C676402C-5697-4E1C-873F-D02D1690AC5C}">
+        <p15:threadingInfo xmlns:p15="http://schemas.microsoft.com/office/powerpoint/2012/main" timeZoneBias="420"/>
+      </p:ext>
+    </p:extLst>
+  </p:cm>
+</p:cmLst>
 </file>
 
 <file path=ppt/slideLayouts/slideLayout1.xml><?xml version="1.0" encoding="utf-8"?>
@@ -144,6 +203,13 @@
         <p:blipFill>
           <a:blip r:embed="rId2">
             <a:alphaModFix amt="30000"/>
+            <a:duotone>
+              <a:prstClr val="black"/>
+              <a:schemeClr val="tx2">
+                <a:tint val="45000"/>
+                <a:satMod val="400000"/>
+              </a:schemeClr>
+            </a:duotone>
             <a:extLst>
               <a:ext uri="{28A0092B-C50C-407E-A947-70E740481C1C}">
                 <a14:useLocalDpi xmlns:a14="http://schemas.microsoft.com/office/drawing/2010/main" val="0"/>
@@ -194,9 +260,8 @@
                 <a:schemeClr val="tx2"/>
               </a:gs>
               <a:gs pos="100000">
-                <a:schemeClr val="bg2">
-                  <a:lumMod val="60000"/>
-                  <a:lumOff val="40000"/>
+                <a:schemeClr val="tx2">
+                  <a:lumMod val="50000"/>
                 </a:schemeClr>
               </a:gs>
             </a:gsLst>
@@ -4391,8 +4456,8 @@
           <a:lstStyle/>
           <a:p>
             <a:fld id="{48A87A34-81AB-432B-8DAE-1953F412C126}" type="datetimeFigureOut">
-              <a:rPr lang="en-US" dirty="0"/>
-              <a:t>10/10/18</a:t>
+              <a:rPr lang="en-US" smtClean="0"/>
+              <a:t>10/16/18</a:t>
             </a:fld>
             <a:endParaRPr lang="en-US" dirty="0"/>
           </a:p>
@@ -4443,7 +4508,7 @@
           <a:lstStyle/>
           <a:p>
             <a:fld id="{6D22F896-40B5-4ADD-8801-0D06FADFA095}" type="slidenum">
-              <a:rPr lang="en-US" dirty="0"/>
+              <a:rPr lang="en-US" smtClean="0"/>
               <a:t>‹#›</a:t>
             </a:fld>
             <a:endParaRPr lang="en-US" dirty="0"/>
@@ -4451,6 +4516,11 @@
         </p:txBody>
       </p:sp>
     </p:spTree>
+    <p:extLst>
+      <p:ext uri="{BB962C8B-B14F-4D97-AF65-F5344CB8AC3E}">
+        <p14:creationId xmlns:p14="http://schemas.microsoft.com/office/powerpoint/2010/main" val="1966359146"/>
+      </p:ext>
+    </p:extLst>
   </p:cSld>
   <p:clrMapOvr>
     <a:masterClrMapping/>
@@ -4653,8 +4723,8 @@
           <a:lstStyle/>
           <a:p>
             <a:fld id="{48A87A34-81AB-432B-8DAE-1953F412C126}" type="datetimeFigureOut">
-              <a:rPr lang="en-US" dirty="0"/>
-              <a:t>10/10/18</a:t>
+              <a:rPr lang="en-US" smtClean="0"/>
+              <a:t>10/16/18</a:t>
             </a:fld>
             <a:endParaRPr lang="en-US" dirty="0"/>
           </a:p>
@@ -4695,7 +4765,7 @@
           <a:lstStyle/>
           <a:p>
             <a:fld id="{6D22F896-40B5-4ADD-8801-0D06FADFA095}" type="slidenum">
-              <a:rPr lang="en-US" dirty="0"/>
+              <a:rPr lang="en-US" smtClean="0"/>
               <a:t>‹#›</a:t>
             </a:fld>
             <a:endParaRPr lang="en-US" dirty="0"/>
@@ -4703,6 +4773,11 @@
         </p:txBody>
       </p:sp>
     </p:spTree>
+    <p:extLst>
+      <p:ext uri="{BB962C8B-B14F-4D97-AF65-F5344CB8AC3E}">
+        <p14:creationId xmlns:p14="http://schemas.microsoft.com/office/powerpoint/2010/main" val="968332560"/>
+      </p:ext>
+    </p:extLst>
   </p:cSld>
   <p:clrMapOvr>
     <a:masterClrMapping/>
@@ -4844,8 +4919,8 @@
           <a:lstStyle/>
           <a:p>
             <a:fld id="{48A87A34-81AB-432B-8DAE-1953F412C126}" type="datetimeFigureOut">
-              <a:rPr lang="en-US" dirty="0"/>
-              <a:t>10/10/18</a:t>
+              <a:rPr lang="en-US" smtClean="0"/>
+              <a:t>10/16/18</a:t>
             </a:fld>
             <a:endParaRPr lang="en-US" dirty="0"/>
           </a:p>
@@ -4886,7 +4961,7 @@
           <a:lstStyle/>
           <a:p>
             <a:fld id="{6D22F896-40B5-4ADD-8801-0D06FADFA095}" type="slidenum">
-              <a:rPr lang="en-US" dirty="0"/>
+              <a:rPr lang="en-US" smtClean="0"/>
               <a:t>‹#›</a:t>
             </a:fld>
             <a:endParaRPr lang="en-US" dirty="0"/>
@@ -4894,6 +4969,11 @@
         </p:txBody>
       </p:sp>
     </p:spTree>
+    <p:extLst>
+      <p:ext uri="{BB962C8B-B14F-4D97-AF65-F5344CB8AC3E}">
+        <p14:creationId xmlns:p14="http://schemas.microsoft.com/office/powerpoint/2010/main" val="638955173"/>
+      </p:ext>
+    </p:extLst>
   </p:cSld>
   <p:clrMapOvr>
     <a:masterClrMapping/>
@@ -5102,8 +5182,8 @@
           <a:lstStyle/>
           <a:p>
             <a:fld id="{48A87A34-81AB-432B-8DAE-1953F412C126}" type="datetimeFigureOut">
-              <a:rPr lang="en-US" dirty="0"/>
-              <a:t>10/10/18</a:t>
+              <a:rPr lang="en-US" smtClean="0"/>
+              <a:t>10/16/18</a:t>
             </a:fld>
             <a:endParaRPr lang="en-US" dirty="0"/>
           </a:p>
@@ -5144,7 +5224,7 @@
           <a:lstStyle/>
           <a:p>
             <a:fld id="{6D22F896-40B5-4ADD-8801-0D06FADFA095}" type="slidenum">
-              <a:rPr lang="en-US" dirty="0"/>
+              <a:rPr lang="en-US" smtClean="0"/>
               <a:t>‹#›</a:t>
             </a:fld>
             <a:endParaRPr lang="en-US" dirty="0"/>
@@ -5390,6 +5470,11 @@
         </p:txBody>
       </p:sp>
     </p:spTree>
+    <p:extLst>
+      <p:ext uri="{BB962C8B-B14F-4D97-AF65-F5344CB8AC3E}">
+        <p14:creationId xmlns:p14="http://schemas.microsoft.com/office/powerpoint/2010/main" val="4045690747"/>
+      </p:ext>
+    </p:extLst>
   </p:cSld>
   <p:clrMapOvr>
     <a:masterClrMapping/>
@@ -5531,8 +5616,8 @@
           <a:lstStyle/>
           <a:p>
             <a:fld id="{48A87A34-81AB-432B-8DAE-1953F412C126}" type="datetimeFigureOut">
-              <a:rPr lang="en-US" dirty="0"/>
-              <a:t>10/10/18</a:t>
+              <a:rPr lang="en-US" smtClean="0"/>
+              <a:t>10/16/18</a:t>
             </a:fld>
             <a:endParaRPr lang="en-US" dirty="0"/>
           </a:p>
@@ -5573,7 +5658,7 @@
           <a:lstStyle/>
           <a:p>
             <a:fld id="{6D22F896-40B5-4ADD-8801-0D06FADFA095}" type="slidenum">
-              <a:rPr lang="en-US" dirty="0"/>
+              <a:rPr lang="en-US" smtClean="0"/>
               <a:t>‹#›</a:t>
             </a:fld>
             <a:endParaRPr lang="en-US" dirty="0"/>
@@ -5581,6 +5666,11 @@
         </p:txBody>
       </p:sp>
     </p:spTree>
+    <p:extLst>
+      <p:ext uri="{BB962C8B-B14F-4D97-AF65-F5344CB8AC3E}">
+        <p14:creationId xmlns:p14="http://schemas.microsoft.com/office/powerpoint/2010/main" val="3616002371"/>
+      </p:ext>
+    </p:extLst>
   </p:cSld>
   <p:clrMapOvr>
     <a:masterClrMapping/>
@@ -6072,8 +6162,8 @@
           <a:lstStyle/>
           <a:p>
             <a:fld id="{48A87A34-81AB-432B-8DAE-1953F412C126}" type="datetimeFigureOut">
-              <a:rPr lang="en-US" dirty="0"/>
-              <a:t>10/10/18</a:t>
+              <a:rPr lang="en-US" smtClean="0"/>
+              <a:t>10/16/18</a:t>
             </a:fld>
             <a:endParaRPr lang="en-US" dirty="0"/>
           </a:p>
@@ -6114,7 +6204,7 @@
           <a:lstStyle/>
           <a:p>
             <a:fld id="{6D22F896-40B5-4ADD-8801-0D06FADFA095}" type="slidenum">
-              <a:rPr lang="en-US" dirty="0"/>
+              <a:rPr lang="en-US" smtClean="0"/>
               <a:t>‹#›</a:t>
             </a:fld>
             <a:endParaRPr lang="en-US" dirty="0"/>
@@ -6122,6 +6212,11 @@
         </p:txBody>
       </p:sp>
     </p:spTree>
+    <p:extLst>
+      <p:ext uri="{BB962C8B-B14F-4D97-AF65-F5344CB8AC3E}">
+        <p14:creationId xmlns:p14="http://schemas.microsoft.com/office/powerpoint/2010/main" val="2053628756"/>
+      </p:ext>
+    </p:extLst>
   </p:cSld>
   <p:clrMapOvr>
     <a:masterClrMapping/>
@@ -6787,8 +6882,8 @@
           <a:lstStyle/>
           <a:p>
             <a:fld id="{48A87A34-81AB-432B-8DAE-1953F412C126}" type="datetimeFigureOut">
-              <a:rPr lang="en-US" dirty="0"/>
-              <a:t>10/10/18</a:t>
+              <a:rPr lang="en-US" smtClean="0"/>
+              <a:t>10/16/18</a:t>
             </a:fld>
             <a:endParaRPr lang="en-US" dirty="0"/>
           </a:p>
@@ -6829,7 +6924,7 @@
           <a:lstStyle/>
           <a:p>
             <a:fld id="{6D22F896-40B5-4ADD-8801-0D06FADFA095}" type="slidenum">
-              <a:rPr lang="en-US" dirty="0"/>
+              <a:rPr lang="en-US" smtClean="0"/>
               <a:t>‹#›</a:t>
             </a:fld>
             <a:endParaRPr lang="en-US" dirty="0"/>
@@ -6837,6 +6932,11 @@
         </p:txBody>
       </p:sp>
     </p:spTree>
+    <p:extLst>
+      <p:ext uri="{BB962C8B-B14F-4D97-AF65-F5344CB8AC3E}">
+        <p14:creationId xmlns:p14="http://schemas.microsoft.com/office/powerpoint/2010/main" val="3296149109"/>
+      </p:ext>
+    </p:extLst>
   </p:cSld>
   <p:clrMapOvr>
     <a:masterClrMapping/>
@@ -6952,8 +7052,8 @@
           <a:lstStyle/>
           <a:p>
             <a:fld id="{48A87A34-81AB-432B-8DAE-1953F412C126}" type="datetimeFigureOut">
-              <a:rPr lang="en-US" dirty="0"/>
-              <a:t>10/10/18</a:t>
+              <a:rPr lang="en-US" smtClean="0"/>
+              <a:t>10/16/18</a:t>
             </a:fld>
             <a:endParaRPr lang="en-US" dirty="0"/>
           </a:p>
@@ -6994,7 +7094,7 @@
           <a:lstStyle/>
           <a:p>
             <a:fld id="{6D22F896-40B5-4ADD-8801-0D06FADFA095}" type="slidenum">
-              <a:rPr lang="en-US" dirty="0"/>
+              <a:rPr lang="en-US" smtClean="0"/>
               <a:t>‹#›</a:t>
             </a:fld>
             <a:endParaRPr lang="en-US" dirty="0"/>
@@ -7002,6 +7102,11 @@
         </p:txBody>
       </p:sp>
     </p:spTree>
+    <p:extLst>
+      <p:ext uri="{BB962C8B-B14F-4D97-AF65-F5344CB8AC3E}">
+        <p14:creationId xmlns:p14="http://schemas.microsoft.com/office/powerpoint/2010/main" val="3725097017"/>
+      </p:ext>
+    </p:extLst>
   </p:cSld>
   <p:clrMapOvr>
     <a:masterClrMapping/>
@@ -7127,8 +7232,8 @@
           <a:lstStyle/>
           <a:p>
             <a:fld id="{48A87A34-81AB-432B-8DAE-1953F412C126}" type="datetimeFigureOut">
-              <a:rPr lang="en-US" dirty="0"/>
-              <a:t>10/10/18</a:t>
+              <a:rPr lang="en-US" smtClean="0"/>
+              <a:t>10/16/18</a:t>
             </a:fld>
             <a:endParaRPr lang="en-US" dirty="0"/>
           </a:p>
@@ -7169,7 +7274,7 @@
           <a:lstStyle/>
           <a:p>
             <a:fld id="{6D22F896-40B5-4ADD-8801-0D06FADFA095}" type="slidenum">
-              <a:rPr lang="en-US" dirty="0"/>
+              <a:rPr lang="en-US" smtClean="0"/>
               <a:t>‹#›</a:t>
             </a:fld>
             <a:endParaRPr lang="en-US" dirty="0"/>
@@ -7177,6 +7282,11 @@
         </p:txBody>
       </p:sp>
     </p:spTree>
+    <p:extLst>
+      <p:ext uri="{BB962C8B-B14F-4D97-AF65-F5344CB8AC3E}">
+        <p14:creationId xmlns:p14="http://schemas.microsoft.com/office/powerpoint/2010/main" val="259248163"/>
+      </p:ext>
+    </p:extLst>
   </p:cSld>
   <p:clrMapOvr>
     <a:masterClrMapping/>
@@ -7292,8 +7402,8 @@
           <a:lstStyle/>
           <a:p>
             <a:fld id="{48A87A34-81AB-432B-8DAE-1953F412C126}" type="datetimeFigureOut">
-              <a:rPr lang="en-US" dirty="0"/>
-              <a:t>10/10/18</a:t>
+              <a:rPr lang="en-US" smtClean="0"/>
+              <a:t>10/16/18</a:t>
             </a:fld>
             <a:endParaRPr lang="en-US" dirty="0"/>
           </a:p>
@@ -7334,7 +7444,7 @@
           <a:lstStyle/>
           <a:p>
             <a:fld id="{6D22F896-40B5-4ADD-8801-0D06FADFA095}" type="slidenum">
-              <a:rPr lang="en-US" dirty="0"/>
+              <a:rPr lang="en-US" smtClean="0"/>
               <a:t>‹#›</a:t>
             </a:fld>
             <a:endParaRPr lang="en-US" dirty="0"/>
@@ -7342,6 +7452,11 @@
         </p:txBody>
       </p:sp>
     </p:spTree>
+    <p:extLst>
+      <p:ext uri="{BB962C8B-B14F-4D97-AF65-F5344CB8AC3E}">
+        <p14:creationId xmlns:p14="http://schemas.microsoft.com/office/powerpoint/2010/main" val="1098618253"/>
+      </p:ext>
+    </p:extLst>
   </p:cSld>
   <p:clrMapOvr>
     <a:masterClrMapping/>
@@ -7537,8 +7652,8 @@
           <a:lstStyle/>
           <a:p>
             <a:fld id="{48A87A34-81AB-432B-8DAE-1953F412C126}" type="datetimeFigureOut">
-              <a:rPr lang="en-US" dirty="0"/>
-              <a:t>10/10/18</a:t>
+              <a:rPr lang="en-US" smtClean="0"/>
+              <a:t>10/16/18</a:t>
             </a:fld>
             <a:endParaRPr lang="en-US" dirty="0"/>
           </a:p>
@@ -7579,7 +7694,7 @@
           <a:lstStyle/>
           <a:p>
             <a:fld id="{6D22F896-40B5-4ADD-8801-0D06FADFA095}" type="slidenum">
-              <a:rPr lang="en-US" dirty="0"/>
+              <a:rPr lang="en-US" smtClean="0"/>
               <a:t>‹#›</a:t>
             </a:fld>
             <a:endParaRPr lang="en-US" dirty="0"/>
@@ -7587,6 +7702,11 @@
         </p:txBody>
       </p:sp>
     </p:spTree>
+    <p:extLst>
+      <p:ext uri="{BB962C8B-B14F-4D97-AF65-F5344CB8AC3E}">
+        <p14:creationId xmlns:p14="http://schemas.microsoft.com/office/powerpoint/2010/main" val="591175516"/>
+      </p:ext>
+    </p:extLst>
   </p:cSld>
   <p:clrMapOvr>
     <a:masterClrMapping/>
@@ -7764,8 +7884,8 @@
           <a:lstStyle/>
           <a:p>
             <a:fld id="{48A87A34-81AB-432B-8DAE-1953F412C126}" type="datetimeFigureOut">
-              <a:rPr lang="en-US" dirty="0"/>
-              <a:t>10/10/18</a:t>
+              <a:rPr lang="en-US" smtClean="0"/>
+              <a:t>10/16/18</a:t>
             </a:fld>
             <a:endParaRPr lang="en-US" dirty="0"/>
           </a:p>
@@ -7806,7 +7926,7 @@
           <a:lstStyle/>
           <a:p>
             <a:fld id="{6D22F896-40B5-4ADD-8801-0D06FADFA095}" type="slidenum">
-              <a:rPr lang="en-US" dirty="0"/>
+              <a:rPr lang="en-US" smtClean="0"/>
               <a:t>‹#›</a:t>
             </a:fld>
             <a:endParaRPr lang="en-US" dirty="0"/>
@@ -7814,6 +7934,11 @@
         </p:txBody>
       </p:sp>
     </p:spTree>
+    <p:extLst>
+      <p:ext uri="{BB962C8B-B14F-4D97-AF65-F5344CB8AC3E}">
+        <p14:creationId xmlns:p14="http://schemas.microsoft.com/office/powerpoint/2010/main" val="1142141047"/>
+      </p:ext>
+    </p:extLst>
   </p:cSld>
   <p:clrMapOvr>
     <a:masterClrMapping/>
@@ -8140,8 +8265,8 @@
           <a:lstStyle/>
           <a:p>
             <a:fld id="{48A87A34-81AB-432B-8DAE-1953F412C126}" type="datetimeFigureOut">
-              <a:rPr lang="en-US" dirty="0"/>
-              <a:t>10/10/18</a:t>
+              <a:rPr lang="en-US" smtClean="0"/>
+              <a:t>10/16/18</a:t>
             </a:fld>
             <a:endParaRPr lang="en-US" dirty="0"/>
           </a:p>
@@ -8182,7 +8307,7 @@
           <a:lstStyle/>
           <a:p>
             <a:fld id="{6D22F896-40B5-4ADD-8801-0D06FADFA095}" type="slidenum">
-              <a:rPr lang="en-US" dirty="0"/>
+              <a:rPr lang="en-US" smtClean="0"/>
               <a:t>‹#›</a:t>
             </a:fld>
             <a:endParaRPr lang="en-US" dirty="0"/>
@@ -8190,6 +8315,11 @@
         </p:txBody>
       </p:sp>
     </p:spTree>
+    <p:extLst>
+      <p:ext uri="{BB962C8B-B14F-4D97-AF65-F5344CB8AC3E}">
+        <p14:creationId xmlns:p14="http://schemas.microsoft.com/office/powerpoint/2010/main" val="2761157210"/>
+      </p:ext>
+    </p:extLst>
   </p:cSld>
   <p:clrMapOvr>
     <a:masterClrMapping/>
@@ -8253,8 +8383,8 @@
           <a:lstStyle/>
           <a:p>
             <a:fld id="{48A87A34-81AB-432B-8DAE-1953F412C126}" type="datetimeFigureOut">
-              <a:rPr lang="en-US" dirty="0"/>
-              <a:t>10/10/18</a:t>
+              <a:rPr lang="en-US" smtClean="0"/>
+              <a:t>10/16/18</a:t>
             </a:fld>
             <a:endParaRPr lang="en-US" dirty="0"/>
           </a:p>
@@ -8295,7 +8425,7 @@
           <a:lstStyle/>
           <a:p>
             <a:fld id="{6D22F896-40B5-4ADD-8801-0D06FADFA095}" type="slidenum">
-              <a:rPr lang="en-US" dirty="0"/>
+              <a:rPr lang="en-US" smtClean="0"/>
               <a:t>‹#›</a:t>
             </a:fld>
             <a:endParaRPr lang="en-US" dirty="0"/>
@@ -8303,6 +8433,11 @@
         </p:txBody>
       </p:sp>
     </p:spTree>
+    <p:extLst>
+      <p:ext uri="{BB962C8B-B14F-4D97-AF65-F5344CB8AC3E}">
+        <p14:creationId xmlns:p14="http://schemas.microsoft.com/office/powerpoint/2010/main" val="3107534809"/>
+      </p:ext>
+    </p:extLst>
   </p:cSld>
   <p:clrMapOvr>
     <a:masterClrMapping/>
@@ -8343,8 +8478,8 @@
           <a:lstStyle/>
           <a:p>
             <a:fld id="{48A87A34-81AB-432B-8DAE-1953F412C126}" type="datetimeFigureOut">
-              <a:rPr lang="en-US" dirty="0"/>
-              <a:t>10/10/18</a:t>
+              <a:rPr lang="en-US" smtClean="0"/>
+              <a:t>10/16/18</a:t>
             </a:fld>
             <a:endParaRPr lang="en-US" dirty="0"/>
           </a:p>
@@ -8385,7 +8520,7 @@
           <a:lstStyle/>
           <a:p>
             <a:fld id="{6D22F896-40B5-4ADD-8801-0D06FADFA095}" type="slidenum">
-              <a:rPr lang="en-US" dirty="0"/>
+              <a:rPr lang="en-US" smtClean="0"/>
               <a:t>‹#›</a:t>
             </a:fld>
             <a:endParaRPr lang="en-US" dirty="0"/>
@@ -8393,6 +8528,11 @@
         </p:txBody>
       </p:sp>
     </p:spTree>
+    <p:extLst>
+      <p:ext uri="{BB962C8B-B14F-4D97-AF65-F5344CB8AC3E}">
+        <p14:creationId xmlns:p14="http://schemas.microsoft.com/office/powerpoint/2010/main" val="2633953492"/>
+      </p:ext>
+    </p:extLst>
   </p:cSld>
   <p:clrMapOvr>
     <a:masterClrMapping/>
@@ -8587,8 +8727,8 @@
           <a:lstStyle/>
           <a:p>
             <a:fld id="{48A87A34-81AB-432B-8DAE-1953F412C126}" type="datetimeFigureOut">
-              <a:rPr lang="en-US" dirty="0"/>
-              <a:t>10/10/18</a:t>
+              <a:rPr lang="en-US" smtClean="0"/>
+              <a:t>10/16/18</a:t>
             </a:fld>
             <a:endParaRPr lang="en-US" dirty="0"/>
           </a:p>
@@ -8629,7 +8769,7 @@
           <a:lstStyle/>
           <a:p>
             <a:fld id="{6D22F896-40B5-4ADD-8801-0D06FADFA095}" type="slidenum">
-              <a:rPr lang="en-US" dirty="0"/>
+              <a:rPr lang="en-US" smtClean="0"/>
               <a:t>‹#›</a:t>
             </a:fld>
             <a:endParaRPr lang="en-US" dirty="0"/>
@@ -8637,6 +8777,11 @@
         </p:txBody>
       </p:sp>
     </p:spTree>
+    <p:extLst>
+      <p:ext uri="{BB962C8B-B14F-4D97-AF65-F5344CB8AC3E}">
+        <p14:creationId xmlns:p14="http://schemas.microsoft.com/office/powerpoint/2010/main" val="565420739"/>
+      </p:ext>
+    </p:extLst>
   </p:cSld>
   <p:clrMapOvr>
     <a:masterClrMapping/>
@@ -8862,8 +9007,8 @@
           <a:lstStyle/>
           <a:p>
             <a:fld id="{48A87A34-81AB-432B-8DAE-1953F412C126}" type="datetimeFigureOut">
-              <a:rPr lang="en-US" dirty="0"/>
-              <a:t>10/10/18</a:t>
+              <a:rPr lang="en-US" smtClean="0"/>
+              <a:t>10/16/18</a:t>
             </a:fld>
             <a:endParaRPr lang="en-US" dirty="0"/>
           </a:p>
@@ -8904,7 +9049,7 @@
           <a:lstStyle/>
           <a:p>
             <a:fld id="{6D22F896-40B5-4ADD-8801-0D06FADFA095}" type="slidenum">
-              <a:rPr lang="en-US" dirty="0"/>
+              <a:rPr lang="en-US" smtClean="0"/>
               <a:t>‹#›</a:t>
             </a:fld>
             <a:endParaRPr lang="en-US" dirty="0"/>
@@ -8912,6 +9057,11 @@
         </p:txBody>
       </p:sp>
     </p:spTree>
+    <p:extLst>
+      <p:ext uri="{BB962C8B-B14F-4D97-AF65-F5344CB8AC3E}">
+        <p14:creationId xmlns:p14="http://schemas.microsoft.com/office/powerpoint/2010/main" val="2989467132"/>
+      </p:ext>
+    </p:extLst>
   </p:cSld>
   <p:clrMapOvr>
     <a:masterClrMapping/>
@@ -8952,6 +9102,13 @@
         <p:blipFill>
           <a:blip r:embed="rId19">
             <a:alphaModFix amt="30000"/>
+            <a:duotone>
+              <a:prstClr val="black"/>
+              <a:schemeClr val="tx2">
+                <a:tint val="45000"/>
+                <a:satMod val="400000"/>
+              </a:schemeClr>
+            </a:duotone>
             <a:extLst>
               <a:ext uri="{28A0092B-C50C-407E-A947-70E740481C1C}">
                 <a14:useLocalDpi xmlns:a14="http://schemas.microsoft.com/office/drawing/2010/main" val="0"/>
@@ -8996,6 +9153,20 @@
             <a:chOff x="-14288" y="0"/>
             <a:chExt cx="12053888" cy="6858001"/>
           </a:xfrm>
+          <a:gradFill flip="none" rotWithShape="1">
+            <a:gsLst>
+              <a:gs pos="0">
+                <a:schemeClr val="tx2"/>
+              </a:gs>
+              <a:gs pos="100000">
+                <a:schemeClr val="tx2">
+                  <a:lumMod val="50000"/>
+                </a:schemeClr>
+              </a:gs>
+            </a:gsLst>
+            <a:lin ang="5400000" scaled="0"/>
+            <a:tileRect/>
+          </a:gradFill>
         </p:grpSpPr>
         <p:grpSp>
           <p:nvGrpSpPr>
@@ -9010,21 +9181,7 @@
               <a:chOff x="-14288" y="0"/>
               <a:chExt cx="1220788" cy="6858001"/>
             </a:xfrm>
-            <a:gradFill flip="none" rotWithShape="1">
-              <a:gsLst>
-                <a:gs pos="0">
-                  <a:schemeClr val="tx2"/>
-                </a:gs>
-                <a:gs pos="100000">
-                  <a:schemeClr val="bg2">
-                    <a:lumMod val="60000"/>
-                    <a:lumOff val="40000"/>
-                  </a:schemeClr>
-                </a:gs>
-              </a:gsLst>
-              <a:lin ang="5400000" scaled="0"/>
-              <a:tileRect/>
-            </a:gradFill>
+            <a:grpFill/>
           </p:grpSpPr>
           <p:sp>
             <p:nvSpPr>
@@ -11013,24 +11170,7 @@
               <a:chOff x="11364912" y="0"/>
               <a:chExt cx="674688" cy="6848476"/>
             </a:xfrm>
-            <a:gradFill flip="none" rotWithShape="1">
-              <a:gsLst>
-                <a:gs pos="0">
-                  <a:schemeClr val="tx2">
-                    <a:alpha val="80000"/>
-                  </a:schemeClr>
-                </a:gs>
-                <a:gs pos="100000">
-                  <a:schemeClr val="bg2">
-                    <a:lumMod val="60000"/>
-                    <a:lumOff val="40000"/>
-                    <a:alpha val="60000"/>
-                  </a:schemeClr>
-                </a:gs>
-              </a:gsLst>
-              <a:lin ang="5400000" scaled="0"/>
-              <a:tileRect/>
-            </a:gradFill>
+            <a:grpFill/>
           </p:grpSpPr>
           <p:sp>
             <p:nvSpPr>
@@ -11934,9 +12074,9 @@
           </a:lstStyle>
           <a:p>
             <a:fld id="{48A87A34-81AB-432B-8DAE-1953F412C126}" type="datetimeFigureOut">
-              <a:rPr lang="en-US" dirty="0"/>
+              <a:rPr lang="en-US" smtClean="0"/>
               <a:pPr/>
-              <a:t>10/10/18</a:t>
+              <a:t>10/16/18</a:t>
             </a:fld>
             <a:endParaRPr lang="en-US" dirty="0"/>
           </a:p>
@@ -12013,7 +12153,7 @@
           </a:lstStyle>
           <a:p>
             <a:fld id="{6D22F896-40B5-4ADD-8801-0D06FADFA095}" type="slidenum">
-              <a:rPr lang="en-US" dirty="0"/>
+              <a:rPr lang="en-US" smtClean="0"/>
               <a:pPr/>
               <a:t>‹#›</a:t>
             </a:fld>
@@ -12022,26 +12162,31 @@
         </p:txBody>
       </p:sp>
     </p:spTree>
+    <p:extLst>
+      <p:ext uri="{BB962C8B-B14F-4D97-AF65-F5344CB8AC3E}">
+        <p14:creationId xmlns:p14="http://schemas.microsoft.com/office/powerpoint/2010/main" val="3520012536"/>
+      </p:ext>
+    </p:extLst>
   </p:cSld>
   <p:clrMap bg1="dk1" tx1="lt1" bg2="dk2" tx2="lt2" accent1="accent1" accent2="accent2" accent3="accent3" accent4="accent4" accent5="accent5" accent6="accent6" hlink="hlink" folHlink="folHlink"/>
   <p:sldLayoutIdLst>
-    <p:sldLayoutId id="2147483649" r:id="rId1"/>
-    <p:sldLayoutId id="2147483650" r:id="rId2"/>
-    <p:sldLayoutId id="2147483651" r:id="rId3"/>
-    <p:sldLayoutId id="2147483652" r:id="rId4"/>
-    <p:sldLayoutId id="2147483653" r:id="rId5"/>
-    <p:sldLayoutId id="2147483654" r:id="rId6"/>
-    <p:sldLayoutId id="2147483655" r:id="rId7"/>
-    <p:sldLayoutId id="2147483656" r:id="rId8"/>
-    <p:sldLayoutId id="2147483657" r:id="rId9"/>
-    <p:sldLayoutId id="2147483660" r:id="rId10"/>
-    <p:sldLayoutId id="2147483661" r:id="rId11"/>
-    <p:sldLayoutId id="2147483666" r:id="rId12"/>
-    <p:sldLayoutId id="2147483663" r:id="rId13"/>
-    <p:sldLayoutId id="2147483667" r:id="rId14"/>
-    <p:sldLayoutId id="2147483668" r:id="rId15"/>
-    <p:sldLayoutId id="2147483658" r:id="rId16"/>
-    <p:sldLayoutId id="2147483659" r:id="rId17"/>
+    <p:sldLayoutId id="2147483778" r:id="rId1"/>
+    <p:sldLayoutId id="2147483779" r:id="rId2"/>
+    <p:sldLayoutId id="2147483780" r:id="rId3"/>
+    <p:sldLayoutId id="2147483781" r:id="rId4"/>
+    <p:sldLayoutId id="2147483782" r:id="rId5"/>
+    <p:sldLayoutId id="2147483783" r:id="rId6"/>
+    <p:sldLayoutId id="2147483784" r:id="rId7"/>
+    <p:sldLayoutId id="2147483785" r:id="rId8"/>
+    <p:sldLayoutId id="2147483786" r:id="rId9"/>
+    <p:sldLayoutId id="2147483787" r:id="rId10"/>
+    <p:sldLayoutId id="2147483788" r:id="rId11"/>
+    <p:sldLayoutId id="2147483789" r:id="rId12"/>
+    <p:sldLayoutId id="2147483790" r:id="rId13"/>
+    <p:sldLayoutId id="2147483791" r:id="rId14"/>
+    <p:sldLayoutId id="2147483792" r:id="rId15"/>
+    <p:sldLayoutId id="2147483793" r:id="rId16"/>
+    <p:sldLayoutId id="2147483794" r:id="rId17"/>
   </p:sldLayoutIdLst>
   <p:txStyles>
     <p:titleStyle>
@@ -12338,6 +12483,14 @@
 <file path=ppt/slides/slide1.xml><?xml version="1.0" encoding="utf-8"?>
 <p:sld xmlns:a="http://schemas.openxmlformats.org/drawingml/2006/main" xmlns:r="http://schemas.openxmlformats.org/officeDocument/2006/relationships" xmlns:p="http://schemas.openxmlformats.org/presentationml/2006/main">
   <p:cSld>
+    <p:bg>
+      <p:bgPr>
+        <a:solidFill>
+          <a:schemeClr val="tx1"/>
+        </a:solidFill>
+        <a:effectLst/>
+      </p:bgPr>
+    </p:bg>
     <p:spTree>
       <p:nvGrpSpPr>
         <p:cNvPr id="1" name=""/>
@@ -12368,14 +12521,25 @@
             <p:ph type="ctrTitle"/>
           </p:nvPr>
         </p:nvSpPr>
-        <p:spPr/>
+        <p:spPr>
+          <a:xfrm>
+            <a:off x="2081214" y="819150"/>
+            <a:ext cx="8662986" cy="1749235"/>
+          </a:xfrm>
+        </p:spPr>
         <p:txBody>
-          <a:bodyPr/>
+          <a:bodyPr>
+            <a:noAutofit/>
+          </a:bodyPr>
           <a:lstStyle/>
           <a:p>
             <a:r>
-              <a:rPr lang="en-US" dirty="0"/>
-              <a:t>A Theorem for case analysis</a:t>
+              <a:rPr lang="en-US" sz="6000" dirty="0">
+                <a:solidFill>
+                  <a:schemeClr val="bg1"/>
+                </a:solidFill>
+              </a:rPr>
+              <a:t>A Theorem for Case Analysis</a:t>
             </a:r>
           </a:p>
         </p:txBody>
@@ -12396,31 +12560,45 @@
             <p:ph type="subTitle" idx="1"/>
           </p:nvPr>
         </p:nvSpPr>
-        <p:spPr/>
+        <p:spPr>
+          <a:xfrm>
+            <a:off x="2417457" y="5181787"/>
+            <a:ext cx="6450318" cy="1676213"/>
+          </a:xfrm>
+        </p:spPr>
         <p:txBody>
-          <a:bodyPr/>
+          <a:bodyPr>
+            <a:noAutofit/>
+          </a:bodyPr>
           <a:lstStyle/>
           <a:p>
             <a:r>
-              <a:rPr lang="en-US" dirty="0"/>
-              <a:t>Fernando </a:t>
+              <a:rPr lang="en-US" sz="2400" dirty="0">
+                <a:solidFill>
+                  <a:schemeClr val="bg1"/>
+                </a:solidFill>
+              </a:rPr>
+              <a:t>Fernando Saca</a:t>
             </a:r>
+          </a:p>
+          <a:p>
             <a:r>
-              <a:rPr lang="en-US" dirty="0" err="1"/>
-              <a:t>Saca</a:t>
+              <a:rPr lang="en-US" sz="2400" dirty="0">
+                <a:solidFill>
+                  <a:schemeClr val="bg1"/>
+                </a:solidFill>
+              </a:rPr>
+              <a:t>Computer Science / Philosophy</a:t>
             </a:r>
-            <a:endParaRPr lang="en-US" dirty="0"/>
           </a:p>
           <a:p>
             <a:r>
-              <a:rPr lang="en-US" dirty="0"/>
-              <a:t>Computer science / philosophy major</a:t>
-            </a:r>
-          </a:p>
-          <a:p>
-            <a:r>
-              <a:rPr lang="en-US" dirty="0"/>
-              <a:t>Pepperdine university</a:t>
+              <a:rPr lang="en-US" sz="2400" dirty="0">
+                <a:solidFill>
+                  <a:schemeClr val="bg1"/>
+                </a:solidFill>
+              </a:rPr>
+              <a:t>Pepperdine University</a:t>
             </a:r>
           </a:p>
         </p:txBody>
@@ -12477,8 +12655,8 @@
         </p:blipFill>
         <p:spPr>
           <a:xfrm>
-            <a:off x="3330033" y="1366844"/>
-            <a:ext cx="4779659" cy="711864"/>
+            <a:off x="3937493" y="3266184"/>
+            <a:ext cx="8176685" cy="1217804"/>
           </a:xfrm>
           <a:prstGeom prst="rect">
             <a:avLst/>
@@ -12501,6 +12679,14 @@
 <file path=ppt/slides/slide10.xml><?xml version="1.0" encoding="utf-8"?>
 <p:sld xmlns:a="http://schemas.openxmlformats.org/drawingml/2006/main" xmlns:r="http://schemas.openxmlformats.org/officeDocument/2006/relationships" xmlns:p="http://schemas.openxmlformats.org/presentationml/2006/main">
   <p:cSld>
+    <p:bg>
+      <p:bgPr>
+        <a:solidFill>
+          <a:schemeClr val="tx1"/>
+        </a:solidFill>
+        <a:effectLst/>
+      </p:bgPr>
+    </p:bg>
     <p:spTree>
       <p:nvGrpSpPr>
         <p:cNvPr id="1" name=""/>
@@ -12537,7 +12723,11 @@
           <a:lstStyle/>
           <a:p>
             <a:r>
-              <a:rPr lang="en-US" dirty="0"/>
+              <a:rPr lang="en-US" dirty="0">
+                <a:solidFill>
+                  <a:schemeClr val="bg1"/>
+                </a:solidFill>
+              </a:rPr>
               <a:t>Conclusion</a:t>
             </a:r>
           </a:p>
@@ -12564,7 +12754,24 @@
           <a:bodyPr/>
           <a:lstStyle/>
           <a:p>
-            <a:endParaRPr lang="en-US"/>
+            <a:r>
+              <a:rPr lang="en-US" dirty="0">
+                <a:solidFill>
+                  <a:schemeClr val="bg1"/>
+                </a:solidFill>
+              </a:rPr>
+              <a:t>Summarize presentation</a:t>
+            </a:r>
+          </a:p>
+          <a:p>
+            <a:r>
+              <a:rPr lang="en-US" dirty="0">
+                <a:solidFill>
+                  <a:schemeClr val="bg1"/>
+                </a:solidFill>
+              </a:rPr>
+              <a:t>Restate significance of work</a:t>
+            </a:r>
           </a:p>
         </p:txBody>
       </p:sp>
@@ -12584,6 +12791,14 @@
 <file path=ppt/slides/slide2.xml><?xml version="1.0" encoding="utf-8"?>
 <p:sld xmlns:a="http://schemas.openxmlformats.org/drawingml/2006/main" xmlns:r="http://schemas.openxmlformats.org/officeDocument/2006/relationships" xmlns:p="http://schemas.openxmlformats.org/presentationml/2006/main">
   <p:cSld>
+    <p:bg>
+      <p:bgPr>
+        <a:solidFill>
+          <a:schemeClr val="tx1"/>
+        </a:solidFill>
+        <a:effectLst/>
+      </p:bgPr>
+    </p:bg>
     <p:spTree>
       <p:nvGrpSpPr>
         <p:cNvPr id="1" name=""/>
@@ -12620,58 +12835,286 @@
           <a:lstStyle/>
           <a:p>
             <a:r>
-              <a:rPr lang="en-US" dirty="0"/>
-              <a:t>An overview</a:t>
+              <a:rPr lang="en-US" dirty="0">
+                <a:solidFill>
+                  <a:schemeClr val="bg1"/>
+                </a:solidFill>
+              </a:rPr>
+              <a:t>An Overview</a:t>
             </a:r>
           </a:p>
         </p:txBody>
       </p:sp>
       <p:sp>
         <p:nvSpPr>
-          <p:cNvPr id="3" name="Content Placeholder 2">
+          <p:cNvPr id="4" name="TextBox 3">
             <a:extLst>
               <a:ext uri="{FF2B5EF4-FFF2-40B4-BE49-F238E27FC236}">
-                <a16:creationId xmlns:a16="http://schemas.microsoft.com/office/drawing/2014/main" id="{8A8889EA-84DA-7B42-B7BD-B522601648B9}"/>
+                <a16:creationId xmlns:a16="http://schemas.microsoft.com/office/drawing/2014/main" id="{2F350B92-F03C-4D72-BCAB-A4E2AC4270E2}"/>
               </a:ext>
             </a:extLst>
           </p:cNvPr>
-          <p:cNvSpPr>
-            <a:spLocks noGrp="1"/>
-          </p:cNvSpPr>
-          <p:nvPr>
-            <p:ph idx="1"/>
-          </p:nvPr>
+          <p:cNvSpPr txBox="1"/>
+          <p:nvPr/>
         </p:nvSpPr>
-        <p:spPr/>
+        <p:spPr>
+          <a:xfrm>
+            <a:off x="1895475" y="5541565"/>
+            <a:ext cx="2129109" cy="861774"/>
+          </a:xfrm>
+          <a:prstGeom prst="rect">
+            <a:avLst/>
+          </a:prstGeom>
+          <a:noFill/>
+        </p:spPr>
         <p:txBody>
-          <a:bodyPr/>
+          <a:bodyPr wrap="none" rtlCol="0">
+            <a:spAutoFit/>
+          </a:bodyPr>
           <a:lstStyle/>
           <a:p>
             <a:r>
-              <a:rPr lang="en-US" dirty="0"/>
+              <a:rPr lang="en-US" sz="3200" dirty="0">
+                <a:solidFill>
+                  <a:schemeClr val="bg1"/>
+                </a:solidFill>
+              </a:rPr>
               <a:t>Significance</a:t>
             </a:r>
           </a:p>
           <a:p>
+            <a:endParaRPr lang="en-US" dirty="0"/>
+          </a:p>
+        </p:txBody>
+      </p:sp>
+      <p:sp>
+        <p:nvSpPr>
+          <p:cNvPr id="6" name="TextBox 5">
+            <a:extLst>
+              <a:ext uri="{FF2B5EF4-FFF2-40B4-BE49-F238E27FC236}">
+                <a16:creationId xmlns:a16="http://schemas.microsoft.com/office/drawing/2014/main" id="{279D513A-307D-4312-BC5F-D54EE4DCACE6}"/>
+              </a:ext>
+            </a:extLst>
+          </p:cNvPr>
+          <p:cNvSpPr txBox="1"/>
+          <p:nvPr/>
+        </p:nvSpPr>
+        <p:spPr>
+          <a:xfrm>
+            <a:off x="9060223" y="5541565"/>
+            <a:ext cx="1235210" cy="1231106"/>
+          </a:xfrm>
+          <a:prstGeom prst="rect">
+            <a:avLst/>
+          </a:prstGeom>
+          <a:noFill/>
+        </p:spPr>
+        <p:txBody>
+          <a:bodyPr wrap="none" rtlCol="0">
+            <a:spAutoFit/>
+          </a:bodyPr>
+          <a:lstStyle/>
+          <a:p>
             <a:r>
-              <a:rPr lang="en-US" dirty="0"/>
+              <a:rPr lang="en-US" sz="3200" dirty="0">
+                <a:solidFill>
+                  <a:schemeClr val="bg1"/>
+                </a:solidFill>
+              </a:rPr>
+              <a:t>Results</a:t>
+            </a:r>
+          </a:p>
+          <a:p>
+            <a:endParaRPr lang="en-US" sz="2400" dirty="0">
+              <a:solidFill>
+                <a:schemeClr val="bg1"/>
+              </a:solidFill>
+            </a:endParaRPr>
+          </a:p>
+          <a:p>
+            <a:endParaRPr lang="en-US" dirty="0"/>
+          </a:p>
+        </p:txBody>
+      </p:sp>
+      <p:sp>
+        <p:nvSpPr>
+          <p:cNvPr id="7" name="TextBox 6">
+            <a:extLst>
+              <a:ext uri="{FF2B5EF4-FFF2-40B4-BE49-F238E27FC236}">
+                <a16:creationId xmlns:a16="http://schemas.microsoft.com/office/drawing/2014/main" id="{8DE4DBBB-448D-4F35-A6BB-8E8CA0CD7703}"/>
+              </a:ext>
+            </a:extLst>
+          </p:cNvPr>
+          <p:cNvSpPr txBox="1"/>
+          <p:nvPr/>
+        </p:nvSpPr>
+        <p:spPr>
+          <a:xfrm>
+            <a:off x="5367338" y="5535612"/>
+            <a:ext cx="2350131" cy="861774"/>
+          </a:xfrm>
+          <a:prstGeom prst="rect">
+            <a:avLst/>
+          </a:prstGeom>
+          <a:noFill/>
+        </p:spPr>
+        <p:txBody>
+          <a:bodyPr wrap="none" rtlCol="0">
+            <a:spAutoFit/>
+          </a:bodyPr>
+          <a:lstStyle/>
+          <a:p>
+            <a:r>
+              <a:rPr lang="en-US" sz="3200" dirty="0">
+                <a:solidFill>
+                  <a:schemeClr val="bg1"/>
+                </a:solidFill>
+              </a:rPr>
               <a:t>Methodology</a:t>
             </a:r>
           </a:p>
           <a:p>
-            <a:r>
-              <a:rPr lang="en-US" dirty="0"/>
-              <a:t>Results</a:t>
-            </a:r>
-          </a:p>
-          <a:p>
-            <a:r>
-              <a:rPr lang="en-US" dirty="0"/>
-              <a:t>Conclusion</a:t>
-            </a:r>
+            <a:endParaRPr lang="en-US" dirty="0"/>
           </a:p>
         </p:txBody>
       </p:sp>
+      <p:pic>
+        <p:nvPicPr>
+          <p:cNvPr id="10" name="Picture 9">
+            <a:extLst>
+              <a:ext uri="{FF2B5EF4-FFF2-40B4-BE49-F238E27FC236}">
+                <a16:creationId xmlns:a16="http://schemas.microsoft.com/office/drawing/2014/main" id="{0490DB04-7A23-4B8E-A735-B2EB1043404C}"/>
+              </a:ext>
+            </a:extLst>
+          </p:cNvPr>
+          <p:cNvPicPr>
+            <a:picLocks noChangeAspect="1"/>
+          </p:cNvPicPr>
+          <p:nvPr/>
+        </p:nvPicPr>
+        <p:blipFill>
+          <a:blip r:embed="rId2"/>
+          <a:stretch>
+            <a:fillRect/>
+          </a:stretch>
+        </p:blipFill>
+        <p:spPr>
+          <a:xfrm>
+            <a:off x="8018727" y="2407168"/>
+            <a:ext cx="3318201" cy="3085187"/>
+          </a:xfrm>
+          <a:prstGeom prst="rect">
+            <a:avLst/>
+          </a:prstGeom>
+        </p:spPr>
+      </p:pic>
+      <p:pic>
+        <p:nvPicPr>
+          <p:cNvPr id="11" name="Picture 10">
+            <a:extLst>
+              <a:ext uri="{FF2B5EF4-FFF2-40B4-BE49-F238E27FC236}">
+                <a16:creationId xmlns:a16="http://schemas.microsoft.com/office/drawing/2014/main" id="{054C80F2-9EAC-4A51-A25D-3A061DA22C5C}"/>
+              </a:ext>
+            </a:extLst>
+          </p:cNvPr>
+          <p:cNvPicPr>
+            <a:picLocks noChangeAspect="1"/>
+          </p:cNvPicPr>
+          <p:nvPr/>
+        </p:nvPicPr>
+        <p:blipFill>
+          <a:blip r:embed="rId3"/>
+          <a:stretch>
+            <a:fillRect/>
+          </a:stretch>
+        </p:blipFill>
+        <p:spPr>
+          <a:xfrm>
+            <a:off x="5422646" y="2097088"/>
+            <a:ext cx="2239514" cy="3395267"/>
+          </a:xfrm>
+          <a:prstGeom prst="rect">
+            <a:avLst/>
+          </a:prstGeom>
+        </p:spPr>
+      </p:pic>
+      <p:pic>
+        <p:nvPicPr>
+          <p:cNvPr id="1026" name="Picture 2" descr="Image result for argument">
+            <a:extLst>
+              <a:ext uri="{FF2B5EF4-FFF2-40B4-BE49-F238E27FC236}">
+                <a16:creationId xmlns:a16="http://schemas.microsoft.com/office/drawing/2014/main" id="{862CEE07-EB2F-4697-8538-BFF67783CBA0}"/>
+              </a:ext>
+            </a:extLst>
+          </p:cNvPr>
+          <p:cNvPicPr>
+            <a:picLocks noChangeAspect="1" noChangeArrowheads="1"/>
+          </p:cNvPicPr>
+          <p:nvPr/>
+        </p:nvPicPr>
+        <p:blipFill>
+          <a:blip r:embed="rId4">
+            <a:extLst>
+              <a:ext uri="{28A0092B-C50C-407E-A947-70E740481C1C}">
+                <a14:useLocalDpi xmlns:a14="http://schemas.microsoft.com/office/drawing/2010/main" val="0"/>
+              </a:ext>
+            </a:extLst>
+          </a:blip>
+          <a:srcRect/>
+          <a:stretch>
+            <a:fillRect/>
+          </a:stretch>
+        </p:blipFill>
+        <p:spPr bwMode="auto">
+          <a:xfrm>
+            <a:off x="2153249" y="4082651"/>
+            <a:ext cx="1613560" cy="1210170"/>
+          </a:xfrm>
+          <a:prstGeom prst="rect">
+            <a:avLst/>
+          </a:prstGeom>
+          <a:noFill/>
+          <a:extLst>
+            <a:ext uri="{909E8E84-426E-40DD-AFC4-6F175D3DCCD1}">
+              <a14:hiddenFill xmlns:a14="http://schemas.microsoft.com/office/drawing/2010/main">
+                <a:solidFill>
+                  <a:srgbClr val="FFFFFF"/>
+                </a:solidFill>
+              </a14:hiddenFill>
+            </a:ext>
+          </a:extLst>
+        </p:spPr>
+      </p:pic>
+      <p:pic>
+        <p:nvPicPr>
+          <p:cNvPr id="13" name="Picture 12">
+            <a:extLst>
+              <a:ext uri="{FF2B5EF4-FFF2-40B4-BE49-F238E27FC236}">
+                <a16:creationId xmlns:a16="http://schemas.microsoft.com/office/drawing/2014/main" id="{96824A77-553E-4BBE-975D-629C9AB7DD21}"/>
+              </a:ext>
+            </a:extLst>
+          </p:cNvPr>
+          <p:cNvPicPr>
+            <a:picLocks noChangeAspect="1"/>
+          </p:cNvPicPr>
+          <p:nvPr/>
+        </p:nvPicPr>
+        <p:blipFill>
+          <a:blip r:embed="rId5"/>
+          <a:stretch>
+            <a:fillRect/>
+          </a:stretch>
+        </p:blipFill>
+        <p:spPr>
+          <a:xfrm>
+            <a:off x="1823334" y="2553969"/>
+            <a:ext cx="2273389" cy="1071800"/>
+          </a:xfrm>
+          <a:prstGeom prst="rect">
+            <a:avLst/>
+          </a:prstGeom>
+        </p:spPr>
+      </p:pic>
     </p:spTree>
     <p:extLst>
       <p:ext uri="{BB962C8B-B14F-4D97-AF65-F5344CB8AC3E}">
@@ -12688,6 +13131,14 @@
 <file path=ppt/slides/slide3.xml><?xml version="1.0" encoding="utf-8"?>
 <p:sld xmlns:a="http://schemas.openxmlformats.org/drawingml/2006/main" xmlns:r="http://schemas.openxmlformats.org/officeDocument/2006/relationships" xmlns:p="http://schemas.openxmlformats.org/presentationml/2006/main">
   <p:cSld>
+    <p:bg>
+      <p:bgPr>
+        <a:solidFill>
+          <a:schemeClr val="tx1"/>
+        </a:solidFill>
+        <a:effectLst/>
+      </p:bgPr>
+    </p:bg>
     <p:spTree>
       <p:nvGrpSpPr>
         <p:cNvPr id="1" name=""/>
@@ -12724,7 +13175,11 @@
           <a:lstStyle/>
           <a:p>
             <a:r>
-              <a:rPr lang="en-US" dirty="0"/>
+              <a:rPr lang="en-US" dirty="0">
+                <a:solidFill>
+                  <a:schemeClr val="bg1"/>
+                </a:solidFill>
+              </a:rPr>
               <a:t>Significance</a:t>
             </a:r>
           </a:p>
@@ -12746,20 +13201,321 @@
             <p:ph idx="1"/>
           </p:nvPr>
         </p:nvSpPr>
-        <p:spPr/>
+        <p:spPr>
+          <a:xfrm>
+            <a:off x="1141413" y="2249487"/>
+            <a:ext cx="4586288" cy="660401"/>
+          </a:xfrm>
+        </p:spPr>
         <p:txBody>
-          <a:bodyPr/>
+          <a:bodyPr>
+            <a:normAutofit/>
+          </a:bodyPr>
           <a:lstStyle/>
           <a:p>
+            <a:pPr marL="0" indent="0">
+              <a:buNone/>
+            </a:pPr>
             <a:r>
-              <a:rPr lang="en-US" dirty="0"/>
-              <a:t>Application to computer science</a:t>
+              <a:rPr lang="en-US" sz="2800" dirty="0">
+                <a:solidFill>
+                  <a:schemeClr val="bg1"/>
+                </a:solidFill>
+              </a:rPr>
+              <a:t>Computer science</a:t>
             </a:r>
           </a:p>
-          <a:p>
+        </p:txBody>
+      </p:sp>
+      <p:pic>
+        <p:nvPicPr>
+          <p:cNvPr id="4" name="Picture 2" descr="Image result for argument">
+            <a:extLst>
+              <a:ext uri="{FF2B5EF4-FFF2-40B4-BE49-F238E27FC236}">
+                <a16:creationId xmlns:a16="http://schemas.microsoft.com/office/drawing/2014/main" id="{6FB01038-16B6-45C7-A683-B53070033B56}"/>
+              </a:ext>
+            </a:extLst>
+          </p:cNvPr>
+          <p:cNvPicPr>
+            <a:picLocks noChangeAspect="1" noChangeArrowheads="1"/>
+          </p:cNvPicPr>
+          <p:nvPr/>
+        </p:nvPicPr>
+        <p:blipFill>
+          <a:blip r:embed="rId2">
+            <a:extLst>
+              <a:ext uri="{28A0092B-C50C-407E-A947-70E740481C1C}">
+                <a14:useLocalDpi xmlns:a14="http://schemas.microsoft.com/office/drawing/2010/main" val="0"/>
+              </a:ext>
+            </a:extLst>
+          </a:blip>
+          <a:srcRect/>
+          <a:stretch>
+            <a:fillRect/>
+          </a:stretch>
+        </p:blipFill>
+        <p:spPr bwMode="auto">
+          <a:xfrm>
+            <a:off x="6814339" y="3062287"/>
+            <a:ext cx="3879851" cy="2909888"/>
+          </a:xfrm>
+          <a:prstGeom prst="rect">
+            <a:avLst/>
+          </a:prstGeom>
+          <a:noFill/>
+          <a:extLst>
+            <a:ext uri="{909E8E84-426E-40DD-AFC4-6F175D3DCCD1}">
+              <a14:hiddenFill xmlns:a14="http://schemas.microsoft.com/office/drawing/2010/main">
+                <a:solidFill>
+                  <a:srgbClr val="FFFFFF"/>
+                </a:solidFill>
+              </a14:hiddenFill>
+            </a:ext>
+          </a:extLst>
+        </p:spPr>
+      </p:pic>
+      <p:pic>
+        <p:nvPicPr>
+          <p:cNvPr id="5" name="Picture 4">
+            <a:extLst>
+              <a:ext uri="{FF2B5EF4-FFF2-40B4-BE49-F238E27FC236}">
+                <a16:creationId xmlns:a16="http://schemas.microsoft.com/office/drawing/2014/main" id="{18A77ACA-F9ED-4985-A4E0-6D9919C936B7}"/>
+              </a:ext>
+            </a:extLst>
+          </p:cNvPr>
+          <p:cNvPicPr>
+            <a:picLocks noChangeAspect="1"/>
+          </p:cNvPicPr>
+          <p:nvPr/>
+        </p:nvPicPr>
+        <p:blipFill>
+          <a:blip r:embed="rId3"/>
+          <a:stretch>
+            <a:fillRect/>
+          </a:stretch>
+        </p:blipFill>
+        <p:spPr>
+          <a:xfrm>
+            <a:off x="1173956" y="3062287"/>
+            <a:ext cx="4586289" cy="2162228"/>
+          </a:xfrm>
+          <a:prstGeom prst="rect">
+            <a:avLst/>
+          </a:prstGeom>
+        </p:spPr>
+      </p:pic>
+      <p:sp>
+        <p:nvSpPr>
+          <p:cNvPr id="6" name="Content Placeholder 2">
+            <a:extLst>
+              <a:ext uri="{FF2B5EF4-FFF2-40B4-BE49-F238E27FC236}">
+                <a16:creationId xmlns:a16="http://schemas.microsoft.com/office/drawing/2014/main" id="{3CA639AA-3261-44A4-A94E-70C93428B7EC}"/>
+              </a:ext>
+            </a:extLst>
+          </p:cNvPr>
+          <p:cNvSpPr txBox="1">
+            <a:spLocks/>
+          </p:cNvSpPr>
+          <p:nvPr/>
+        </p:nvSpPr>
+        <p:spPr>
+          <a:xfrm>
+            <a:off x="6814339" y="2330450"/>
+            <a:ext cx="3879851" cy="579438"/>
+          </a:xfrm>
+          <a:prstGeom prst="rect">
+            <a:avLst/>
+          </a:prstGeom>
+        </p:spPr>
+        <p:txBody>
+          <a:bodyPr vert="horz" lIns="91440" tIns="45720" rIns="91440" bIns="45720" rtlCol="0">
+            <a:noAutofit/>
+          </a:bodyPr>
+          <a:lstStyle>
+            <a:lvl1pPr marL="228600" indent="-228600" algn="l" defTabSz="914400" rtl="0" eaLnBrk="1" latinLnBrk="0" hangingPunct="1">
+              <a:lnSpc>
+                <a:spcPct val="120000"/>
+              </a:lnSpc>
+              <a:spcBef>
+                <a:spcPts val="1000"/>
+              </a:spcBef>
+              <a:buSzPct val="125000"/>
+              <a:buFont typeface="Arial" panose="020B0604020202020204" pitchFamily="34" charset="0"/>
+              <a:buChar char="•"/>
+              <a:defRPr sz="2400" kern="1200">
+                <a:solidFill>
+                  <a:schemeClr val="tx1"/>
+                </a:solidFill>
+                <a:latin typeface="+mn-lt"/>
+                <a:ea typeface="+mn-ea"/>
+                <a:cs typeface="+mn-cs"/>
+              </a:defRPr>
+            </a:lvl1pPr>
+            <a:lvl2pPr marL="685800" indent="-228600" algn="l" defTabSz="914400" rtl="0" eaLnBrk="1" latinLnBrk="0" hangingPunct="1">
+              <a:lnSpc>
+                <a:spcPct val="120000"/>
+              </a:lnSpc>
+              <a:spcBef>
+                <a:spcPts val="500"/>
+              </a:spcBef>
+              <a:buSzPct val="125000"/>
+              <a:buFont typeface="Arial" panose="020B0604020202020204" pitchFamily="34" charset="0"/>
+              <a:buChar char="•"/>
+              <a:defRPr sz="2000" kern="1200">
+                <a:solidFill>
+                  <a:schemeClr val="tx1"/>
+                </a:solidFill>
+                <a:latin typeface="+mn-lt"/>
+                <a:ea typeface="+mn-ea"/>
+                <a:cs typeface="+mn-cs"/>
+              </a:defRPr>
+            </a:lvl2pPr>
+            <a:lvl3pPr marL="1143000" indent="-228600" algn="l" defTabSz="914400" rtl="0" eaLnBrk="1" latinLnBrk="0" hangingPunct="1">
+              <a:lnSpc>
+                <a:spcPct val="120000"/>
+              </a:lnSpc>
+              <a:spcBef>
+                <a:spcPts val="500"/>
+              </a:spcBef>
+              <a:buSzPct val="125000"/>
+              <a:buFont typeface="Arial" panose="020B0604020202020204" pitchFamily="34" charset="0"/>
+              <a:buChar char="•"/>
+              <a:defRPr sz="1800" kern="1200">
+                <a:solidFill>
+                  <a:schemeClr val="tx1"/>
+                </a:solidFill>
+                <a:latin typeface="+mn-lt"/>
+                <a:ea typeface="+mn-ea"/>
+                <a:cs typeface="+mn-cs"/>
+              </a:defRPr>
+            </a:lvl3pPr>
+            <a:lvl4pPr marL="1600200" indent="-228600" algn="l" defTabSz="914400" rtl="0" eaLnBrk="1" latinLnBrk="0" hangingPunct="1">
+              <a:lnSpc>
+                <a:spcPct val="120000"/>
+              </a:lnSpc>
+              <a:spcBef>
+                <a:spcPts val="500"/>
+              </a:spcBef>
+              <a:buSzPct val="125000"/>
+              <a:buFont typeface="Arial" panose="020B0604020202020204" pitchFamily="34" charset="0"/>
+              <a:buChar char="•"/>
+              <a:defRPr sz="1600" kern="1200">
+                <a:solidFill>
+                  <a:schemeClr val="tx1"/>
+                </a:solidFill>
+                <a:latin typeface="+mn-lt"/>
+                <a:ea typeface="+mn-ea"/>
+                <a:cs typeface="+mn-cs"/>
+              </a:defRPr>
+            </a:lvl4pPr>
+            <a:lvl5pPr marL="2057400" indent="-228600" algn="l" defTabSz="914400" rtl="0" eaLnBrk="1" latinLnBrk="0" hangingPunct="1">
+              <a:lnSpc>
+                <a:spcPct val="120000"/>
+              </a:lnSpc>
+              <a:spcBef>
+                <a:spcPts val="500"/>
+              </a:spcBef>
+              <a:buSzPct val="125000"/>
+              <a:buFont typeface="Arial" panose="020B0604020202020204" pitchFamily="34" charset="0"/>
+              <a:buChar char="•"/>
+              <a:defRPr sz="1600" kern="1200">
+                <a:solidFill>
+                  <a:schemeClr val="tx1"/>
+                </a:solidFill>
+                <a:latin typeface="+mn-lt"/>
+                <a:ea typeface="+mn-ea"/>
+                <a:cs typeface="+mn-cs"/>
+              </a:defRPr>
+            </a:lvl5pPr>
+            <a:lvl6pPr marL="2514600" indent="-228600" algn="l" defTabSz="914400" rtl="0" eaLnBrk="1" latinLnBrk="0" hangingPunct="1">
+              <a:lnSpc>
+                <a:spcPct val="120000"/>
+              </a:lnSpc>
+              <a:spcBef>
+                <a:spcPts val="500"/>
+              </a:spcBef>
+              <a:buSzPct val="125000"/>
+              <a:buFont typeface="Arial" panose="020B0604020202020204" pitchFamily="34" charset="0"/>
+              <a:buChar char="•"/>
+              <a:defRPr sz="1400" kern="1200">
+                <a:solidFill>
+                  <a:schemeClr val="tx1"/>
+                </a:solidFill>
+                <a:latin typeface="+mn-lt"/>
+                <a:ea typeface="+mn-ea"/>
+                <a:cs typeface="+mn-cs"/>
+              </a:defRPr>
+            </a:lvl6pPr>
+            <a:lvl7pPr marL="2971800" indent="-228600" algn="l" defTabSz="914400" rtl="0" eaLnBrk="1" latinLnBrk="0" hangingPunct="1">
+              <a:lnSpc>
+                <a:spcPct val="120000"/>
+              </a:lnSpc>
+              <a:spcBef>
+                <a:spcPts val="500"/>
+              </a:spcBef>
+              <a:buSzPct val="125000"/>
+              <a:buFont typeface="Arial" panose="020B0604020202020204" pitchFamily="34" charset="0"/>
+              <a:buChar char="•"/>
+              <a:defRPr sz="1400" kern="1200">
+                <a:solidFill>
+                  <a:schemeClr val="tx1"/>
+                </a:solidFill>
+                <a:latin typeface="+mn-lt"/>
+                <a:ea typeface="+mn-ea"/>
+                <a:cs typeface="+mn-cs"/>
+              </a:defRPr>
+            </a:lvl7pPr>
+            <a:lvl8pPr marL="3429000" indent="-228600" algn="l" defTabSz="914400" rtl="0" eaLnBrk="1" latinLnBrk="0" hangingPunct="1">
+              <a:lnSpc>
+                <a:spcPct val="120000"/>
+              </a:lnSpc>
+              <a:spcBef>
+                <a:spcPts val="500"/>
+              </a:spcBef>
+              <a:buSzPct val="125000"/>
+              <a:buFont typeface="Arial" panose="020B0604020202020204" pitchFamily="34" charset="0"/>
+              <a:buChar char="•"/>
+              <a:defRPr sz="1400" kern="1200">
+                <a:solidFill>
+                  <a:schemeClr val="tx1"/>
+                </a:solidFill>
+                <a:latin typeface="+mn-lt"/>
+                <a:ea typeface="+mn-ea"/>
+                <a:cs typeface="+mn-cs"/>
+              </a:defRPr>
+            </a:lvl8pPr>
+            <a:lvl9pPr marL="3886200" indent="-228600" algn="l" defTabSz="914400" rtl="0" eaLnBrk="1" latinLnBrk="0" hangingPunct="1">
+              <a:lnSpc>
+                <a:spcPct val="120000"/>
+              </a:lnSpc>
+              <a:spcBef>
+                <a:spcPts val="500"/>
+              </a:spcBef>
+              <a:buSzPct val="125000"/>
+              <a:buFont typeface="Arial" panose="020B0604020202020204" pitchFamily="34" charset="0"/>
+              <a:buChar char="•"/>
+              <a:defRPr sz="1400" kern="1200">
+                <a:solidFill>
+                  <a:schemeClr val="tx1"/>
+                </a:solidFill>
+                <a:latin typeface="+mn-lt"/>
+                <a:ea typeface="+mn-ea"/>
+                <a:cs typeface="+mn-cs"/>
+              </a:defRPr>
+            </a:lvl9pPr>
+          </a:lstStyle>
+          <a:p>
+            <a:pPr marL="0" indent="0">
+              <a:buFont typeface="Arial" panose="020B0604020202020204" pitchFamily="34" charset="0"/>
+              <a:buNone/>
+            </a:pPr>
             <a:r>
-              <a:rPr lang="en-US" dirty="0"/>
-              <a:t>Application to English argumentation</a:t>
+              <a:rPr lang="en-US" sz="2800" dirty="0">
+                <a:solidFill>
+                  <a:schemeClr val="bg1"/>
+                </a:solidFill>
+              </a:rPr>
+              <a:t>English argumentation</a:t>
             </a:r>
           </a:p>
         </p:txBody>
@@ -12780,6 +13536,14 @@
 <file path=ppt/slides/slide4.xml><?xml version="1.0" encoding="utf-8"?>
 <p:sld xmlns:a="http://schemas.openxmlformats.org/drawingml/2006/main" xmlns:r="http://schemas.openxmlformats.org/officeDocument/2006/relationships" xmlns:p="http://schemas.openxmlformats.org/presentationml/2006/main">
   <p:cSld>
+    <p:bg>
+      <p:bgPr>
+        <a:solidFill>
+          <a:schemeClr val="tx1"/>
+        </a:solidFill>
+        <a:effectLst/>
+      </p:bgPr>
+    </p:bg>
     <p:spTree>
       <p:nvGrpSpPr>
         <p:cNvPr id="1" name=""/>
@@ -12815,7 +13579,14 @@
           <a:bodyPr/>
           <a:lstStyle/>
           <a:p>
-            <a:endParaRPr lang="en-US" dirty="0"/>
+            <a:r>
+              <a:rPr lang="en-US" dirty="0">
+                <a:solidFill>
+                  <a:schemeClr val="bg1"/>
+                </a:solidFill>
+              </a:rPr>
+              <a:t>Application to Computer Science</a:t>
+            </a:r>
           </a:p>
         </p:txBody>
       </p:sp>
@@ -12835,15 +13606,78 @@
             <p:ph idx="1"/>
           </p:nvPr>
         </p:nvSpPr>
-        <p:spPr/>
+        <p:spPr>
+          <a:xfrm>
+            <a:off x="1141413" y="2249487"/>
+            <a:ext cx="4897438" cy="3541714"/>
+          </a:xfrm>
+        </p:spPr>
         <p:txBody>
           <a:bodyPr/>
           <a:lstStyle/>
           <a:p>
-            <a:endParaRPr lang="en-US"/>
+            <a:r>
+              <a:rPr lang="en-US" dirty="0">
+                <a:solidFill>
+                  <a:schemeClr val="bg1"/>
+                </a:solidFill>
+              </a:rPr>
+              <a:t>Proving program correctness</a:t>
+            </a:r>
+          </a:p>
+          <a:p>
+            <a:pPr lvl="1"/>
+            <a:r>
+              <a:rPr lang="en-US" dirty="0">
+                <a:solidFill>
+                  <a:schemeClr val="bg1"/>
+                </a:solidFill>
+              </a:rPr>
+              <a:t>Specifically, selective and iterative programs</a:t>
+            </a:r>
+          </a:p>
+          <a:p>
+            <a:r>
+              <a:rPr lang="en-US" dirty="0">
+                <a:solidFill>
+                  <a:schemeClr val="bg1"/>
+                </a:solidFill>
+              </a:rPr>
+              <a:t>Pain-free theorem verification</a:t>
+            </a:r>
           </a:p>
         </p:txBody>
       </p:sp>
+      <p:pic>
+        <p:nvPicPr>
+          <p:cNvPr id="4" name="Picture 3">
+            <a:extLst>
+              <a:ext uri="{FF2B5EF4-FFF2-40B4-BE49-F238E27FC236}">
+                <a16:creationId xmlns:a16="http://schemas.microsoft.com/office/drawing/2014/main" id="{66A1C16B-1A11-4226-B3D8-55C2BE6FDF37}"/>
+              </a:ext>
+            </a:extLst>
+          </p:cNvPr>
+          <p:cNvPicPr>
+            <a:picLocks noChangeAspect="1"/>
+          </p:cNvPicPr>
+          <p:nvPr/>
+        </p:nvPicPr>
+        <p:blipFill>
+          <a:blip r:embed="rId2"/>
+          <a:stretch>
+            <a:fillRect/>
+          </a:stretch>
+        </p:blipFill>
+        <p:spPr>
+          <a:xfrm>
+            <a:off x="6461122" y="2939230"/>
+            <a:ext cx="4586289" cy="2162228"/>
+          </a:xfrm>
+          <a:prstGeom prst="rect">
+            <a:avLst/>
+          </a:prstGeom>
+        </p:spPr>
+      </p:pic>
     </p:spTree>
     <p:extLst>
       <p:ext uri="{BB962C8B-B14F-4D97-AF65-F5344CB8AC3E}">
@@ -12858,6 +13692,410 @@
 </file>
 
 <file path=ppt/slides/slide5.xml><?xml version="1.0" encoding="utf-8"?>
+<p:sld xmlns:a="http://schemas.openxmlformats.org/drawingml/2006/main" xmlns:r="http://schemas.openxmlformats.org/officeDocument/2006/relationships" xmlns:p="http://schemas.openxmlformats.org/presentationml/2006/main">
+  <p:cSld>
+    <p:bg>
+      <p:bgPr>
+        <a:solidFill>
+          <a:schemeClr val="tx1"/>
+        </a:solidFill>
+        <a:effectLst/>
+      </p:bgPr>
+    </p:bg>
+    <p:spTree>
+      <p:nvGrpSpPr>
+        <p:cNvPr id="1" name=""/>
+        <p:cNvGrpSpPr/>
+        <p:nvPr/>
+      </p:nvGrpSpPr>
+      <p:grpSpPr>
+        <a:xfrm>
+          <a:off x="0" y="0"/>
+          <a:ext cx="0" cy="0"/>
+          <a:chOff x="0" y="0"/>
+          <a:chExt cx="0" cy="0"/>
+        </a:xfrm>
+      </p:grpSpPr>
+      <p:sp>
+        <p:nvSpPr>
+          <p:cNvPr id="2" name="Title 1">
+            <a:extLst>
+              <a:ext uri="{FF2B5EF4-FFF2-40B4-BE49-F238E27FC236}">
+                <a16:creationId xmlns:a16="http://schemas.microsoft.com/office/drawing/2014/main" id="{2CD4A5CC-8C73-E444-B958-783F0FD3BF8B}"/>
+              </a:ext>
+            </a:extLst>
+          </p:cNvPr>
+          <p:cNvSpPr>
+            <a:spLocks noGrp="1"/>
+          </p:cNvSpPr>
+          <p:nvPr>
+            <p:ph type="title"/>
+          </p:nvPr>
+        </p:nvSpPr>
+        <p:spPr/>
+        <p:txBody>
+          <a:bodyPr/>
+          <a:lstStyle/>
+          <a:p>
+            <a:r>
+              <a:rPr lang="en-US" dirty="0">
+                <a:solidFill>
+                  <a:schemeClr val="bg1"/>
+                </a:solidFill>
+              </a:rPr>
+              <a:t>Application to English Argumentation</a:t>
+            </a:r>
+          </a:p>
+        </p:txBody>
+      </p:sp>
+      <p:sp>
+        <p:nvSpPr>
+          <p:cNvPr id="3" name="Content Placeholder 2">
+            <a:extLst>
+              <a:ext uri="{FF2B5EF4-FFF2-40B4-BE49-F238E27FC236}">
+                <a16:creationId xmlns:a16="http://schemas.microsoft.com/office/drawing/2014/main" id="{C1B84D4F-3EC1-974D-AFC6-A0325DDD6FDF}"/>
+              </a:ext>
+            </a:extLst>
+          </p:cNvPr>
+          <p:cNvSpPr>
+            <a:spLocks noGrp="1"/>
+          </p:cNvSpPr>
+          <p:nvPr>
+            <p:ph idx="1"/>
+          </p:nvPr>
+        </p:nvSpPr>
+        <p:spPr>
+          <a:xfrm>
+            <a:off x="1141412" y="2249487"/>
+            <a:ext cx="9426459" cy="3370263"/>
+          </a:xfrm>
+        </p:spPr>
+        <p:txBody>
+          <a:bodyPr/>
+          <a:lstStyle/>
+          <a:p>
+            <a:pPr marL="0" indent="0">
+              <a:buNone/>
+            </a:pPr>
+            <a:r>
+              <a:rPr lang="en-US" dirty="0">
+                <a:solidFill>
+                  <a:schemeClr val="bg1"/>
+                </a:solidFill>
+              </a:rPr>
+              <a:t>Solving a word problem</a:t>
+            </a:r>
+          </a:p>
+        </p:txBody>
+      </p:sp>
+      <p:pic>
+        <p:nvPicPr>
+          <p:cNvPr id="5" name="Picture 2" descr="Image result for argument">
+            <a:extLst>
+              <a:ext uri="{FF2B5EF4-FFF2-40B4-BE49-F238E27FC236}">
+                <a16:creationId xmlns:a16="http://schemas.microsoft.com/office/drawing/2014/main" id="{7AC66173-29AB-4A12-A39C-10C5B373DE44}"/>
+              </a:ext>
+            </a:extLst>
+          </p:cNvPr>
+          <p:cNvPicPr>
+            <a:picLocks noChangeAspect="1" noChangeArrowheads="1"/>
+          </p:cNvPicPr>
+          <p:nvPr/>
+        </p:nvPicPr>
+        <p:blipFill>
+          <a:blip r:embed="rId2">
+            <a:extLst>
+              <a:ext uri="{28A0092B-C50C-407E-A947-70E740481C1C}">
+                <a14:useLocalDpi xmlns:a14="http://schemas.microsoft.com/office/drawing/2010/main" val="0"/>
+              </a:ext>
+            </a:extLst>
+          </a:blip>
+          <a:srcRect/>
+          <a:stretch>
+            <a:fillRect/>
+          </a:stretch>
+        </p:blipFill>
+        <p:spPr bwMode="auto">
+          <a:xfrm>
+            <a:off x="1141412" y="3062287"/>
+            <a:ext cx="3879851" cy="2909888"/>
+          </a:xfrm>
+          <a:prstGeom prst="rect">
+            <a:avLst/>
+          </a:prstGeom>
+          <a:noFill/>
+          <a:extLst>
+            <a:ext uri="{909E8E84-426E-40DD-AFC4-6F175D3DCCD1}">
+              <a14:hiddenFill xmlns:a14="http://schemas.microsoft.com/office/drawing/2010/main">
+                <a:solidFill>
+                  <a:srgbClr val="FFFFFF"/>
+                </a:solidFill>
+              </a14:hiddenFill>
+            </a:ext>
+          </a:extLst>
+        </p:spPr>
+      </p:pic>
+    </p:spTree>
+    <p:extLst>
+      <p:ext uri="{BB962C8B-B14F-4D97-AF65-F5344CB8AC3E}">
+        <p14:creationId xmlns:p14="http://schemas.microsoft.com/office/powerpoint/2010/main" val="770972409"/>
+      </p:ext>
+    </p:extLst>
+  </p:cSld>
+  <p:clrMapOvr>
+    <a:masterClrMapping/>
+  </p:clrMapOvr>
+</p:sld>
+</file>
+
+<file path=ppt/slides/slide6.xml><?xml version="1.0" encoding="utf-8"?>
+<p:sld xmlns:a="http://schemas.openxmlformats.org/drawingml/2006/main" xmlns:r="http://schemas.openxmlformats.org/officeDocument/2006/relationships" xmlns:p="http://schemas.openxmlformats.org/presentationml/2006/main">
+  <p:cSld>
+    <p:bg>
+      <p:bgPr>
+        <a:solidFill>
+          <a:schemeClr val="tx1"/>
+        </a:solidFill>
+        <a:effectLst/>
+      </p:bgPr>
+    </p:bg>
+    <p:spTree>
+      <p:nvGrpSpPr>
+        <p:cNvPr id="1" name=""/>
+        <p:cNvGrpSpPr/>
+        <p:nvPr/>
+      </p:nvGrpSpPr>
+      <p:grpSpPr>
+        <a:xfrm>
+          <a:off x="0" y="0"/>
+          <a:ext cx="0" cy="0"/>
+          <a:chOff x="0" y="0"/>
+          <a:chExt cx="0" cy="0"/>
+        </a:xfrm>
+      </p:grpSpPr>
+      <p:sp>
+        <p:nvSpPr>
+          <p:cNvPr id="2" name="Title 1">
+            <a:extLst>
+              <a:ext uri="{FF2B5EF4-FFF2-40B4-BE49-F238E27FC236}">
+                <a16:creationId xmlns:a16="http://schemas.microsoft.com/office/drawing/2014/main" id="{A9EA4B56-D166-834F-8E0D-9EB56367FDD4}"/>
+              </a:ext>
+            </a:extLst>
+          </p:cNvPr>
+          <p:cNvSpPr>
+            <a:spLocks noGrp="1"/>
+          </p:cNvSpPr>
+          <p:nvPr>
+            <p:ph type="title"/>
+          </p:nvPr>
+        </p:nvSpPr>
+        <p:spPr/>
+        <p:txBody>
+          <a:bodyPr/>
+          <a:lstStyle/>
+          <a:p>
+            <a:r>
+              <a:rPr lang="en-US" dirty="0">
+                <a:solidFill>
+                  <a:schemeClr val="bg1"/>
+                </a:solidFill>
+              </a:rPr>
+              <a:t>methodology</a:t>
+            </a:r>
+          </a:p>
+        </p:txBody>
+      </p:sp>
+      <p:sp>
+        <p:nvSpPr>
+          <p:cNvPr id="3" name="Content Placeholder 2">
+            <a:extLst>
+              <a:ext uri="{FF2B5EF4-FFF2-40B4-BE49-F238E27FC236}">
+                <a16:creationId xmlns:a16="http://schemas.microsoft.com/office/drawing/2014/main" id="{E90549A8-450F-334F-8285-A26A2A94C0D9}"/>
+              </a:ext>
+            </a:extLst>
+          </p:cNvPr>
+          <p:cNvSpPr>
+            <a:spLocks noGrp="1"/>
+          </p:cNvSpPr>
+          <p:nvPr>
+            <p:ph idx="1"/>
+          </p:nvPr>
+        </p:nvSpPr>
+        <p:spPr/>
+        <p:txBody>
+          <a:bodyPr/>
+          <a:lstStyle/>
+          <a:p>
+            <a:r>
+              <a:rPr lang="en-US" dirty="0">
+                <a:solidFill>
+                  <a:schemeClr val="bg1"/>
+                </a:solidFill>
+              </a:rPr>
+              <a:t>Proof calculi</a:t>
+            </a:r>
+          </a:p>
+          <a:p>
+            <a:pPr lvl="1"/>
+            <a:r>
+              <a:rPr lang="en-US" dirty="0">
+                <a:solidFill>
+                  <a:schemeClr val="bg1"/>
+                </a:solidFill>
+              </a:rPr>
+              <a:t>Hilbert-style</a:t>
+            </a:r>
+          </a:p>
+          <a:p>
+            <a:pPr lvl="1"/>
+            <a:r>
+              <a:rPr lang="en-US" dirty="0">
+                <a:solidFill>
+                  <a:schemeClr val="bg1"/>
+                </a:solidFill>
+              </a:rPr>
+              <a:t>Natural deduction</a:t>
+            </a:r>
+          </a:p>
+          <a:p>
+            <a:pPr lvl="1"/>
+            <a:r>
+              <a:rPr lang="en-US" dirty="0">
+                <a:solidFill>
+                  <a:schemeClr val="bg1"/>
+                </a:solidFill>
+              </a:rPr>
+              <a:t>Equational system</a:t>
+            </a:r>
+          </a:p>
+        </p:txBody>
+      </p:sp>
+      <p:pic>
+        <p:nvPicPr>
+          <p:cNvPr id="4" name="Picture 3">
+            <a:extLst>
+              <a:ext uri="{FF2B5EF4-FFF2-40B4-BE49-F238E27FC236}">
+                <a16:creationId xmlns:a16="http://schemas.microsoft.com/office/drawing/2014/main" id="{693114A8-E9A7-4BA1-88BF-7D3B57B512A6}"/>
+              </a:ext>
+            </a:extLst>
+          </p:cNvPr>
+          <p:cNvPicPr>
+            <a:picLocks noChangeAspect="1"/>
+          </p:cNvPicPr>
+          <p:nvPr/>
+        </p:nvPicPr>
+        <p:blipFill>
+          <a:blip r:embed="rId2"/>
+          <a:stretch>
+            <a:fillRect/>
+          </a:stretch>
+        </p:blipFill>
+        <p:spPr>
+          <a:xfrm>
+            <a:off x="6094411" y="2097088"/>
+            <a:ext cx="4302333" cy="3576638"/>
+          </a:xfrm>
+          <a:prstGeom prst="rect">
+            <a:avLst/>
+          </a:prstGeom>
+        </p:spPr>
+      </p:pic>
+    </p:spTree>
+    <p:extLst>
+      <p:ext uri="{BB962C8B-B14F-4D97-AF65-F5344CB8AC3E}">
+        <p14:creationId xmlns:p14="http://schemas.microsoft.com/office/powerpoint/2010/main" val="1279424676"/>
+      </p:ext>
+    </p:extLst>
+  </p:cSld>
+  <p:clrMapOvr>
+    <a:masterClrMapping/>
+  </p:clrMapOvr>
+  <p:timing>
+    <p:tnLst>
+      <p:par>
+        <p:cTn id="1" dur="indefinite" restart="never" nodeType="tmRoot">
+          <p:childTnLst>
+            <p:seq concurrent="1" nextAc="seek">
+              <p:cTn id="2" dur="indefinite" nodeType="mainSeq">
+                <p:childTnLst>
+                  <p:par>
+                    <p:cTn id="3" fill="hold">
+                      <p:stCondLst>
+                        <p:cond delay="indefinite"/>
+                      </p:stCondLst>
+                      <p:childTnLst>
+                        <p:par>
+                          <p:cTn id="4" fill="hold">
+                            <p:stCondLst>
+                              <p:cond delay="0"/>
+                            </p:stCondLst>
+                            <p:childTnLst>
+                              <p:par>
+                                <p:cTn id="5" presetID="26" presetClass="emph" presetSubtype="0" fill="hold" nodeType="clickEffect">
+                                  <p:stCondLst>
+                                    <p:cond delay="0"/>
+                                  </p:stCondLst>
+                                  <p:childTnLst>
+                                    <p:animEffect transition="out" filter="fade">
+                                      <p:cBhvr>
+                                        <p:cTn id="6" dur="500" tmFilter="0, 0; .2, .5; .8, .5; 1, 0"/>
+                                        <p:tgtEl>
+                                          <p:spTgt spid="3">
+                                            <p:txEl>
+                                              <p:pRg st="3" end="3"/>
+                                            </p:txEl>
+                                          </p:spTgt>
+                                        </p:tgtEl>
+                                      </p:cBhvr>
+                                    </p:animEffect>
+                                    <p:animScale>
+                                      <p:cBhvr>
+                                        <p:cTn id="7" dur="250" autoRev="1" fill="hold"/>
+                                        <p:tgtEl>
+                                          <p:spTgt spid="3">
+                                            <p:txEl>
+                                              <p:pRg st="3" end="3"/>
+                                            </p:txEl>
+                                          </p:spTgt>
+                                        </p:tgtEl>
+                                      </p:cBhvr>
+                                      <p:by x="105000" y="105000"/>
+                                    </p:animScale>
+                                  </p:childTnLst>
+                                </p:cTn>
+                              </p:par>
+                            </p:childTnLst>
+                          </p:cTn>
+                        </p:par>
+                      </p:childTnLst>
+                    </p:cTn>
+                  </p:par>
+                </p:childTnLst>
+              </p:cTn>
+              <p:prevCondLst>
+                <p:cond evt="onPrev" delay="0">
+                  <p:tgtEl>
+                    <p:sldTgt/>
+                  </p:tgtEl>
+                </p:cond>
+              </p:prevCondLst>
+              <p:nextCondLst>
+                <p:cond evt="onNext" delay="0">
+                  <p:tgtEl>
+                    <p:sldTgt/>
+                  </p:tgtEl>
+                </p:cond>
+              </p:nextCondLst>
+            </p:seq>
+          </p:childTnLst>
+        </p:cTn>
+      </p:par>
+    </p:tnLst>
+  </p:timing>
+</p:sld>
+</file>
+
+<file path=ppt/slides/slide7.xml><?xml version="1.0" encoding="utf-8"?>
 <p:sld xmlns:a="http://schemas.openxmlformats.org/drawingml/2006/main" xmlns:r="http://schemas.openxmlformats.org/officeDocument/2006/relationships" xmlns:p="http://schemas.openxmlformats.org/presentationml/2006/main">
   <p:cSld>
     <p:bg>
@@ -12934,7 +14172,7 @@
         </p:blipFill>
         <p:spPr>
           <a:xfrm>
-            <a:off x="6267752" y="3302954"/>
+            <a:off x="6156271" y="3084105"/>
             <a:ext cx="4779659" cy="711864"/>
           </a:xfrm>
           <a:prstGeom prst="rect">
@@ -12942,56 +14180,6 @@
           </a:prstGeom>
         </p:spPr>
       </p:pic>
-      <p:sp>
-        <p:nvSpPr>
-          <p:cNvPr id="7" name="Frame 6">
-            <a:extLst>
-              <a:ext uri="{FF2B5EF4-FFF2-40B4-BE49-F238E27FC236}">
-                <a16:creationId xmlns:a16="http://schemas.microsoft.com/office/drawing/2014/main" id="{F4AF8342-74B2-B642-8500-9A3A8F0BA77E}"/>
-              </a:ext>
-            </a:extLst>
-          </p:cNvPr>
-          <p:cNvSpPr/>
-          <p:nvPr/>
-        </p:nvSpPr>
-        <p:spPr>
-          <a:xfrm>
-            <a:off x="1507524" y="6351373"/>
-            <a:ext cx="1594022" cy="293039"/>
-          </a:xfrm>
-          <a:prstGeom prst="frame">
-            <a:avLst/>
-          </a:prstGeom>
-        </p:spPr>
-        <p:style>
-          <a:lnRef idx="2">
-            <a:schemeClr val="accent3">
-              <a:shade val="50000"/>
-            </a:schemeClr>
-          </a:lnRef>
-          <a:fillRef idx="1">
-            <a:schemeClr val="accent3"/>
-          </a:fillRef>
-          <a:effectRef idx="0">
-            <a:schemeClr val="accent3"/>
-          </a:effectRef>
-          <a:fontRef idx="minor">
-            <a:schemeClr val="lt1"/>
-          </a:fontRef>
-        </p:style>
-        <p:txBody>
-          <a:bodyPr rtlCol="0" anchor="ctr"/>
-          <a:lstStyle/>
-          <a:p>
-            <a:pPr algn="ctr"/>
-            <a:endParaRPr lang="en-US">
-              <a:solidFill>
-                <a:schemeClr val="tx1"/>
-              </a:solidFill>
-            </a:endParaRPr>
-          </a:p>
-        </p:txBody>
-      </p:sp>
       <p:cxnSp>
         <p:nvCxnSpPr>
           <p:cNvPr id="9" name="Straight Arrow Connector 8">
@@ -13008,15 +14196,15 @@
         </p:nvCxnSpPr>
         <p:spPr>
           <a:xfrm flipV="1">
-            <a:off x="3101546" y="3889489"/>
+            <a:off x="2968228" y="3795969"/>
             <a:ext cx="3288225" cy="2608403"/>
           </a:xfrm>
           <a:prstGeom prst="straightConnector1">
             <a:avLst/>
           </a:prstGeom>
-          <a:ln w="85725">
+          <a:ln w="22225">
             <a:solidFill>
-              <a:schemeClr val="accent3"/>
+              <a:srgbClr val="C00000"/>
             </a:solidFill>
             <a:tailEnd type="triangle"/>
           </a:ln>
@@ -13036,6 +14224,58 @@
           </a:fontRef>
         </p:style>
       </p:cxnSp>
+      <p:sp>
+        <p:nvSpPr>
+          <p:cNvPr id="2" name="Rectangle 1">
+            <a:extLst>
+              <a:ext uri="{FF2B5EF4-FFF2-40B4-BE49-F238E27FC236}">
+                <a16:creationId xmlns:a16="http://schemas.microsoft.com/office/drawing/2014/main" id="{EE51A9D0-805F-4945-A946-D70E958D7B9C}"/>
+              </a:ext>
+            </a:extLst>
+          </p:cNvPr>
+          <p:cNvSpPr/>
+          <p:nvPr/>
+        </p:nvSpPr>
+        <p:spPr>
+          <a:xfrm>
+            <a:off x="1562100" y="6404372"/>
+            <a:ext cx="1406128" cy="145256"/>
+          </a:xfrm>
+          <a:prstGeom prst="rect">
+            <a:avLst/>
+          </a:prstGeom>
+          <a:noFill/>
+          <a:ln w="15875">
+            <a:solidFill>
+              <a:srgbClr val="C00000"/>
+            </a:solidFill>
+          </a:ln>
+        </p:spPr>
+        <p:style>
+          <a:lnRef idx="2">
+            <a:schemeClr val="accent1">
+              <a:shade val="50000"/>
+            </a:schemeClr>
+          </a:lnRef>
+          <a:fillRef idx="1">
+            <a:schemeClr val="accent1"/>
+          </a:fillRef>
+          <a:effectRef idx="0">
+            <a:schemeClr val="accent1"/>
+          </a:effectRef>
+          <a:fontRef idx="minor">
+            <a:schemeClr val="lt1"/>
+          </a:fontRef>
+        </p:style>
+        <p:txBody>
+          <a:bodyPr rtlCol="0" anchor="ctr"/>
+          <a:lstStyle/>
+          <a:p>
+            <a:pPr algn="ctr"/>
+            <a:endParaRPr lang="en-US"/>
+          </a:p>
+        </p:txBody>
+      </p:sp>
     </p:spTree>
     <p:extLst>
       <p:ext uri="{BB962C8B-B14F-4D97-AF65-F5344CB8AC3E}">
@@ -13049,9 +14289,17 @@
 </p:sld>
 </file>
 
-<file path=ppt/slides/slide6.xml><?xml version="1.0" encoding="utf-8"?>
+<file path=ppt/slides/slide8.xml><?xml version="1.0" encoding="utf-8"?>
 <p:sld xmlns:a="http://schemas.openxmlformats.org/drawingml/2006/main" xmlns:r="http://schemas.openxmlformats.org/officeDocument/2006/relationships" xmlns:p="http://schemas.openxmlformats.org/presentationml/2006/main">
   <p:cSld>
+    <p:bg>
+      <p:bgPr>
+        <a:solidFill>
+          <a:schemeClr val="tx1"/>
+        </a:solidFill>
+        <a:effectLst/>
+      </p:bgPr>
+    </p:bg>
     <p:spTree>
       <p:nvGrpSpPr>
         <p:cNvPr id="1" name=""/>
@@ -13071,90 +14319,7 @@
           <p:cNvPr id="2" name="Title 1">
             <a:extLst>
               <a:ext uri="{FF2B5EF4-FFF2-40B4-BE49-F238E27FC236}">
-                <a16:creationId xmlns:a16="http://schemas.microsoft.com/office/drawing/2014/main" id="{EF790595-67B3-1F4A-9A49-17001C54A3E5}"/>
-              </a:ext>
-            </a:extLst>
-          </p:cNvPr>
-          <p:cNvSpPr>
-            <a:spLocks noGrp="1"/>
-          </p:cNvSpPr>
-          <p:nvPr>
-            <p:ph type="ctrTitle"/>
-          </p:nvPr>
-        </p:nvSpPr>
-        <p:spPr/>
-        <p:txBody>
-          <a:bodyPr/>
-          <a:lstStyle/>
-          <a:p>
-            <a:r>
-              <a:rPr lang="en-US" dirty="0"/>
-              <a:t>z</a:t>
-            </a:r>
-          </a:p>
-        </p:txBody>
-      </p:sp>
-      <p:sp>
-        <p:nvSpPr>
-          <p:cNvPr id="3" name="Subtitle 2">
-            <a:extLst>
-              <a:ext uri="{FF2B5EF4-FFF2-40B4-BE49-F238E27FC236}">
-                <a16:creationId xmlns:a16="http://schemas.microsoft.com/office/drawing/2014/main" id="{510FF9D6-4F87-E640-8466-A955F95CC197}"/>
-              </a:ext>
-            </a:extLst>
-          </p:cNvPr>
-          <p:cNvSpPr>
-            <a:spLocks noGrp="1"/>
-          </p:cNvSpPr>
-          <p:nvPr>
-            <p:ph type="subTitle" idx="1"/>
-          </p:nvPr>
-        </p:nvSpPr>
-        <p:spPr/>
-        <p:txBody>
-          <a:bodyPr/>
-          <a:lstStyle/>
-          <a:p>
-            <a:endParaRPr lang="en-US"/>
-          </a:p>
-        </p:txBody>
-      </p:sp>
-    </p:spTree>
-    <p:extLst>
-      <p:ext uri="{BB962C8B-B14F-4D97-AF65-F5344CB8AC3E}">
-        <p14:creationId xmlns:p14="http://schemas.microsoft.com/office/powerpoint/2010/main" val="2602983793"/>
-      </p:ext>
-    </p:extLst>
-  </p:cSld>
-  <p:clrMapOvr>
-    <a:masterClrMapping/>
-  </p:clrMapOvr>
-</p:sld>
-</file>
-
-<file path=ppt/slides/slide7.xml><?xml version="1.0" encoding="utf-8"?>
-<p:sld xmlns:a="http://schemas.openxmlformats.org/drawingml/2006/main" xmlns:r="http://schemas.openxmlformats.org/officeDocument/2006/relationships" xmlns:p="http://schemas.openxmlformats.org/presentationml/2006/main">
-  <p:cSld>
-    <p:spTree>
-      <p:nvGrpSpPr>
-        <p:cNvPr id="1" name=""/>
-        <p:cNvGrpSpPr/>
-        <p:nvPr/>
-      </p:nvGrpSpPr>
-      <p:grpSpPr>
-        <a:xfrm>
-          <a:off x="0" y="0"/>
-          <a:ext cx="0" cy="0"/>
-          <a:chOff x="0" y="0"/>
-          <a:chExt cx="0" cy="0"/>
-        </a:xfrm>
-      </p:grpSpPr>
-      <p:sp>
-        <p:nvSpPr>
-          <p:cNvPr id="2" name="Title 1">
-            <a:extLst>
-              <a:ext uri="{FF2B5EF4-FFF2-40B4-BE49-F238E27FC236}">
-                <a16:creationId xmlns:a16="http://schemas.microsoft.com/office/drawing/2014/main" id="{2CD4A5CC-8C73-E444-B958-783F0FD3BF8B}"/>
+                <a16:creationId xmlns:a16="http://schemas.microsoft.com/office/drawing/2014/main" id="{2180634B-5955-4437-A94F-CDBE08DA7117}"/>
               </a:ext>
             </a:extLst>
           </p:cNvPr>
@@ -13171,8 +14336,12 @@
           <a:lstStyle/>
           <a:p>
             <a:r>
-              <a:rPr lang="en-US" dirty="0"/>
-              <a:t>Application to English argumentation</a:t>
+              <a:rPr lang="en-US" dirty="0">
+                <a:solidFill>
+                  <a:schemeClr val="bg1"/>
+                </a:solidFill>
+              </a:rPr>
+              <a:t>The Equational System</a:t>
             </a:r>
           </a:p>
         </p:txBody>
@@ -13182,7 +14351,7 @@
           <p:cNvPr id="3" name="Content Placeholder 2">
             <a:extLst>
               <a:ext uri="{FF2B5EF4-FFF2-40B4-BE49-F238E27FC236}">
-                <a16:creationId xmlns:a16="http://schemas.microsoft.com/office/drawing/2014/main" id="{C1B84D4F-3EC1-974D-AFC6-A0325DDD6FDF}"/>
+                <a16:creationId xmlns:a16="http://schemas.microsoft.com/office/drawing/2014/main" id="{F8A90245-63C8-4EDA-BEB0-6F9A1421CBF1}"/>
               </a:ext>
             </a:extLst>
           </p:cNvPr>
@@ -13193,111 +14362,81 @@
             <p:ph idx="1"/>
           </p:nvPr>
         </p:nvSpPr>
-        <p:spPr/>
+        <p:spPr>
+          <a:xfrm>
+            <a:off x="1141412" y="2249487"/>
+            <a:ext cx="5654421" cy="3541714"/>
+          </a:xfrm>
+        </p:spPr>
         <p:txBody>
           <a:bodyPr/>
           <a:lstStyle/>
           <a:p>
-            <a:endParaRPr lang="en-US"/>
+            <a:r>
+              <a:rPr lang="en-US" dirty="0">
+                <a:solidFill>
+                  <a:schemeClr val="bg1"/>
+                </a:solidFill>
+              </a:rPr>
+              <a:t>Concerning inference rules and axioms, it is a balance between the other two systems</a:t>
+            </a:r>
+          </a:p>
+          <a:p>
+            <a:r>
+              <a:rPr lang="en-US" dirty="0">
+                <a:solidFill>
+                  <a:schemeClr val="bg1"/>
+                </a:solidFill>
+              </a:rPr>
+              <a:t>Cumulative</a:t>
+            </a:r>
+          </a:p>
+          <a:p>
+            <a:r>
+              <a:rPr lang="en-US" dirty="0">
+                <a:solidFill>
+                  <a:schemeClr val="bg1"/>
+                </a:solidFill>
+              </a:rPr>
+              <a:t>Neat feature worth mentioning</a:t>
+            </a:r>
           </a:p>
         </p:txBody>
       </p:sp>
+      <p:pic>
+        <p:nvPicPr>
+          <p:cNvPr id="4" name="Picture 3">
+            <a:extLst>
+              <a:ext uri="{FF2B5EF4-FFF2-40B4-BE49-F238E27FC236}">
+                <a16:creationId xmlns:a16="http://schemas.microsoft.com/office/drawing/2014/main" id="{73690B9A-6399-4D4C-8EB1-2184926C4653}"/>
+              </a:ext>
+            </a:extLst>
+          </p:cNvPr>
+          <p:cNvPicPr>
+            <a:picLocks noChangeAspect="1"/>
+          </p:cNvPicPr>
+          <p:nvPr/>
+        </p:nvPicPr>
+        <p:blipFill>
+          <a:blip r:embed="rId2"/>
+          <a:stretch>
+            <a:fillRect/>
+          </a:stretch>
+        </p:blipFill>
+        <p:spPr>
+          <a:xfrm>
+            <a:off x="7408608" y="1651801"/>
+            <a:ext cx="3026029" cy="4587681"/>
+          </a:xfrm>
+          <a:prstGeom prst="rect">
+            <a:avLst/>
+          </a:prstGeom>
+        </p:spPr>
+      </p:pic>
     </p:spTree>
     <p:extLst>
       <p:ext uri="{BB962C8B-B14F-4D97-AF65-F5344CB8AC3E}">
-        <p14:creationId xmlns:p14="http://schemas.microsoft.com/office/powerpoint/2010/main" val="770972409"/>
-      </p:ext>
-    </p:extLst>
-  </p:cSld>
-  <p:clrMapOvr>
-    <a:masterClrMapping/>
-  </p:clrMapOvr>
-</p:sld>
-</file>
-
-<file path=ppt/slides/slide8.xml><?xml version="1.0" encoding="utf-8"?>
-<p:sld xmlns:a="http://schemas.openxmlformats.org/drawingml/2006/main" xmlns:r="http://schemas.openxmlformats.org/officeDocument/2006/relationships" xmlns:p="http://schemas.openxmlformats.org/presentationml/2006/main">
-  <p:cSld>
-    <p:spTree>
-      <p:nvGrpSpPr>
-        <p:cNvPr id="1" name=""/>
-        <p:cNvGrpSpPr/>
-        <p:nvPr/>
-      </p:nvGrpSpPr>
-      <p:grpSpPr>
-        <a:xfrm>
-          <a:off x="0" y="0"/>
-          <a:ext cx="0" cy="0"/>
-          <a:chOff x="0" y="0"/>
-          <a:chExt cx="0" cy="0"/>
-        </a:xfrm>
-      </p:grpSpPr>
-      <p:sp>
-        <p:nvSpPr>
-          <p:cNvPr id="2" name="Title 1">
-            <a:extLst>
-              <a:ext uri="{FF2B5EF4-FFF2-40B4-BE49-F238E27FC236}">
-                <a16:creationId xmlns:a16="http://schemas.microsoft.com/office/drawing/2014/main" id="{A9EA4B56-D166-834F-8E0D-9EB56367FDD4}"/>
-              </a:ext>
-            </a:extLst>
-          </p:cNvPr>
-          <p:cNvSpPr>
-            <a:spLocks noGrp="1"/>
-          </p:cNvSpPr>
-          <p:nvPr>
-            <p:ph type="title"/>
-          </p:nvPr>
-        </p:nvSpPr>
-        <p:spPr/>
-        <p:txBody>
-          <a:bodyPr/>
-          <a:lstStyle/>
-          <a:p>
-            <a:r>
-              <a:rPr lang="en-US" dirty="0"/>
-              <a:t>methodology</a:t>
-            </a:r>
-          </a:p>
-        </p:txBody>
-      </p:sp>
-      <p:sp>
-        <p:nvSpPr>
-          <p:cNvPr id="3" name="Content Placeholder 2">
-            <a:extLst>
-              <a:ext uri="{FF2B5EF4-FFF2-40B4-BE49-F238E27FC236}">
-                <a16:creationId xmlns:a16="http://schemas.microsoft.com/office/drawing/2014/main" id="{E90549A8-450F-334F-8285-A26A2A94C0D9}"/>
-              </a:ext>
-            </a:extLst>
-          </p:cNvPr>
-          <p:cNvSpPr>
-            <a:spLocks noGrp="1"/>
-          </p:cNvSpPr>
-          <p:nvPr>
-            <p:ph idx="1"/>
-          </p:nvPr>
-        </p:nvSpPr>
-        <p:spPr/>
-        <p:txBody>
-          <a:bodyPr/>
-          <a:lstStyle/>
-          <a:p>
-            <a:r>
-              <a:rPr lang="en-US" dirty="0"/>
-              <a:t>Proof calculi</a:t>
-            </a:r>
-          </a:p>
-          <a:p>
-            <a:pPr marL="0" indent="0">
-              <a:buNone/>
-            </a:pPr>
-            <a:endParaRPr lang="en-US" dirty="0"/>
-          </a:p>
-        </p:txBody>
-      </p:sp>
-    </p:spTree>
-    <p:extLst>
-      <p:ext uri="{BB962C8B-B14F-4D97-AF65-F5344CB8AC3E}">
-        <p14:creationId xmlns:p14="http://schemas.microsoft.com/office/powerpoint/2010/main" val="1279424676"/>
+        <p14:creationId xmlns:p14="http://schemas.microsoft.com/office/powerpoint/2010/main" val="3520722480"/>
       </p:ext>
     </p:extLst>
   </p:cSld>
@@ -13310,6 +14449,14 @@
 <file path=ppt/slides/slide9.xml><?xml version="1.0" encoding="utf-8"?>
 <p:sld xmlns:a="http://schemas.openxmlformats.org/drawingml/2006/main" xmlns:r="http://schemas.openxmlformats.org/officeDocument/2006/relationships" xmlns:p="http://schemas.openxmlformats.org/presentationml/2006/main">
   <p:cSld>
+    <p:bg>
+      <p:bgPr>
+        <a:solidFill>
+          <a:schemeClr val="tx1"/>
+        </a:solidFill>
+        <a:effectLst/>
+      </p:bgPr>
+    </p:bg>
     <p:spTree>
       <p:nvGrpSpPr>
         <p:cNvPr id="1" name=""/>
@@ -13346,7 +14493,11 @@
           <a:lstStyle/>
           <a:p>
             <a:r>
-              <a:rPr lang="en-US" dirty="0"/>
+              <a:rPr lang="en-US" dirty="0">
+                <a:solidFill>
+                  <a:schemeClr val="bg1"/>
+                </a:solidFill>
+              </a:rPr>
               <a:t>Results</a:t>
             </a:r>
           </a:p>
@@ -13354,10 +14505,10 @@
       </p:sp>
       <p:sp>
         <p:nvSpPr>
-          <p:cNvPr id="3" name="Content Placeholder 2">
+          <p:cNvPr id="5" name="Content Placeholder 2">
             <a:extLst>
               <a:ext uri="{FF2B5EF4-FFF2-40B4-BE49-F238E27FC236}">
-                <a16:creationId xmlns:a16="http://schemas.microsoft.com/office/drawing/2014/main" id="{53A55943-9B6E-2049-A41A-0BAF594862E8}"/>
+                <a16:creationId xmlns:a16="http://schemas.microsoft.com/office/drawing/2014/main" id="{C85AA5F1-A225-4DA8-BC21-9B326A52F04E}"/>
               </a:ext>
             </a:extLst>
           </p:cNvPr>
@@ -13368,12 +14519,44 @@
             <p:ph idx="1"/>
           </p:nvPr>
         </p:nvSpPr>
-        <p:spPr/>
+        <p:spPr>
+          <a:xfrm>
+            <a:off x="1141412" y="2249487"/>
+            <a:ext cx="9905999" cy="3541714"/>
+          </a:xfrm>
+        </p:spPr>
         <p:txBody>
           <a:bodyPr/>
           <a:lstStyle/>
           <a:p>
-            <a:endParaRPr lang="en-US"/>
+            <a:r>
+              <a:rPr lang="en-US" dirty="0">
+                <a:solidFill>
+                  <a:schemeClr val="bg1"/>
+                </a:solidFill>
+              </a:rPr>
+              <a:t>Proofs</a:t>
+            </a:r>
+          </a:p>
+          <a:p>
+            <a:r>
+              <a:rPr lang="en-US" dirty="0">
+                <a:solidFill>
+                  <a:schemeClr val="bg1"/>
+                </a:solidFill>
+              </a:rPr>
+              <a:t>Counterexample of the converse</a:t>
+            </a:r>
+          </a:p>
+          <a:p>
+            <a:r>
+              <a:rPr lang="en-US" dirty="0">
+                <a:solidFill>
+                  <a:schemeClr val="bg1"/>
+                </a:solidFill>
+              </a:rPr>
+              <a:t>Implications of these results</a:t>
+            </a:r>
           </a:p>
         </p:txBody>
       </p:sp>
@@ -13401,34 +14584,34 @@
         <a:sysClr val="window" lastClr="FFFFFF"/>
       </a:lt1>
       <a:dk2>
-        <a:srgbClr val="134770"/>
+        <a:srgbClr val="252C36"/>
       </a:dk2>
       <a:lt2>
-        <a:srgbClr val="82FFFF"/>
+        <a:srgbClr val="7C96A3"/>
       </a:lt2>
       <a:accent1>
-        <a:srgbClr val="9ACD4C"/>
+        <a:srgbClr val="4FD093"/>
       </a:accent1>
       <a:accent2>
-        <a:srgbClr val="FAA93A"/>
+        <a:srgbClr val="54BCDF"/>
       </a:accent2>
       <a:accent3>
-        <a:srgbClr val="D35940"/>
+        <a:srgbClr val="A262D0"/>
       </a:accent3>
       <a:accent4>
-        <a:srgbClr val="B258D3"/>
+        <a:srgbClr val="D7537B"/>
       </a:accent4>
       <a:accent5>
-        <a:srgbClr val="63A0CC"/>
+        <a:srgbClr val="E78045"/>
       </a:accent5>
       <a:accent6>
-        <a:srgbClr val="8AC4A7"/>
+        <a:srgbClr val="84C350"/>
       </a:accent6>
       <a:hlink>
-        <a:srgbClr val="B8FA56"/>
+        <a:srgbClr val="22FFFF"/>
       </a:hlink>
       <a:folHlink>
-        <a:srgbClr val="7AF8CC"/>
+        <a:srgbClr val="9BF3FD"/>
       </a:folHlink>
     </a:clrScheme>
     <a:fontScheme name="Circuit">
@@ -13595,7 +14778,7 @@
                 <a:tint val="98000"/>
                 <a:hueMod val="94000"/>
                 <a:satMod val="148000"/>
-                <a:lumMod val="150000"/>
+                <a:lumMod val="140000"/>
               </a:schemeClr>
             </a:gs>
             <a:gs pos="100000">
@@ -13603,7 +14786,7 @@
                 <a:shade val="92000"/>
                 <a:hueMod val="104000"/>
                 <a:satMod val="140000"/>
-                <a:lumMod val="68000"/>
+                <a:lumMod val="48000"/>
               </a:schemeClr>
             </a:gs>
           </a:gsLst>
@@ -13613,16 +14796,16 @@
           <a:blip xmlns:r="http://schemas.openxmlformats.org/officeDocument/2006/relationships" r:embed="rId1">
             <a:duotone>
               <a:schemeClr val="phClr">
-                <a:shade val="88000"/>
+                <a:shade val="48000"/>
                 <a:hueMod val="106000"/>
                 <a:satMod val="140000"/>
-                <a:lumMod val="54000"/>
+                <a:lumMod val="42000"/>
               </a:schemeClr>
               <a:schemeClr val="phClr">
                 <a:tint val="98000"/>
-                <a:hueMod val="90000"/>
-                <a:satMod val="150000"/>
-                <a:lumMod val="160000"/>
+                <a:hueMod val="92000"/>
+                <a:satMod val="220000"/>
+                <a:lumMod val="90000"/>
               </a:schemeClr>
             </a:duotone>
           </a:blip>
@@ -13635,7 +14818,7 @@
   <a:extraClrSchemeLst/>
   <a:extLst>
     <a:ext uri="{05A4C25C-085E-4340-85A3-A5531E510DB2}">
-      <thm15:themeFamily xmlns:thm15="http://schemas.microsoft.com/office/thememl/2012/main" name="Circuit" id="{0AC2F7E7-15F5-431C-B2A2-456FE929F56C}" vid="{0911B802-464C-4241-8DD9-B60FF88E379F}"/>
+      <thm15:themeFamily xmlns:thm15="http://schemas.microsoft.com/office/thememl/2012/main" name="Circuit" id="{0AC2F7E7-15F5-431C-B2A2-456FE929F56C}" vid="{142578CA-DEC9-49C3-80AF-C113973CC9A9}"/>
     </a:ext>
   </a:extLst>
 </a:theme>

</xml_diff>

<commit_message>
Modified some SCCUR slides.
</commit_message>
<xml_diff>
--- a/SCCUR-slides.pptx
+++ b/SCCUR-slides.pptx
@@ -11,10 +11,12 @@
     <p:sldId id="264" r:id="rId5"/>
     <p:sldId id="263" r:id="rId6"/>
     <p:sldId id="259" r:id="rId7"/>
-    <p:sldId id="262" r:id="rId8"/>
-    <p:sldId id="265" r:id="rId9"/>
-    <p:sldId id="260" r:id="rId10"/>
-    <p:sldId id="261" r:id="rId11"/>
+    <p:sldId id="266" r:id="rId8"/>
+    <p:sldId id="267" r:id="rId9"/>
+    <p:sldId id="265" r:id="rId10"/>
+    <p:sldId id="262" r:id="rId11"/>
+    <p:sldId id="260" r:id="rId12"/>
+    <p:sldId id="261" r:id="rId13"/>
   </p:sldIdLst>
   <p:sldSz cx="12192000" cy="6858000"/>
   <p:notesSz cx="6858000" cy="9144000"/>
@@ -232,7 +234,7 @@
           <a:noFill/>
           <a:extLst>
             <a:ext uri="{909E8E84-426E-40dd-AFC4-6F175D3DCCD1}">
-              <a14:hiddenFill xmlns:a14="http://schemas.microsoft.com/office/drawing/2010/main" xmlns="">
+              <a14:hiddenFill xmlns="" xmlns:a14="http://schemas.microsoft.com/office/drawing/2010/main">
                 <a:solidFill>
                   <a:srgbClr val="FFFFFF"/>
                 </a:solidFill>
@@ -291,7 +293,7 @@
             </a:ln>
             <a:extLst>
               <a:ext uri="{91240B29-F687-4f45-9708-019B960494DF}">
-                <a14:hiddenLine xmlns:a14="http://schemas.microsoft.com/office/drawing/2010/main" xmlns="" w="9525">
+                <a14:hiddenLine xmlns="" xmlns:a14="http://schemas.microsoft.com/office/drawing/2010/main" w="9525">
                   <a:solidFill>
                     <a:srgbClr val="000000"/>
                   </a:solidFill>
@@ -381,7 +383,7 @@
             </a:ln>
             <a:extLst>
               <a:ext uri="{91240B29-F687-4f45-9708-019B960494DF}">
-                <a14:hiddenLine xmlns:a14="http://schemas.microsoft.com/office/drawing/2010/main" xmlns="" w="9525">
+                <a14:hiddenLine xmlns="" xmlns:a14="http://schemas.microsoft.com/office/drawing/2010/main" w="9525">
                   <a:solidFill>
                     <a:srgbClr val="000000"/>
                   </a:solidFill>
@@ -471,7 +473,7 @@
             </a:ln>
             <a:extLst>
               <a:ext uri="{91240B29-F687-4f45-9708-019B960494DF}">
-                <a14:hiddenLine xmlns:a14="http://schemas.microsoft.com/office/drawing/2010/main" xmlns="" w="9525">
+                <a14:hiddenLine xmlns="" xmlns:a14="http://schemas.microsoft.com/office/drawing/2010/main" w="9525">
                   <a:solidFill>
                     <a:srgbClr val="000000"/>
                   </a:solidFill>
@@ -505,7 +507,7 @@
             </a:ln>
             <a:extLst>
               <a:ext uri="{91240B29-F687-4f45-9708-019B960494DF}">
-                <a14:hiddenLine xmlns:a14="http://schemas.microsoft.com/office/drawing/2010/main" xmlns="" w="9525">
+                <a14:hiddenLine xmlns="" xmlns:a14="http://schemas.microsoft.com/office/drawing/2010/main" w="9525">
                   <a:solidFill>
                     <a:srgbClr val="000000"/>
                   </a:solidFill>
@@ -595,7 +597,7 @@
             </a:ln>
             <a:extLst>
               <a:ext uri="{91240B29-F687-4f45-9708-019B960494DF}">
-                <a14:hiddenLine xmlns:a14="http://schemas.microsoft.com/office/drawing/2010/main" xmlns="" w="9525">
+                <a14:hiddenLine xmlns="" xmlns:a14="http://schemas.microsoft.com/office/drawing/2010/main" w="9525">
                   <a:solidFill>
                     <a:srgbClr val="000000"/>
                   </a:solidFill>
@@ -657,7 +659,7 @@
             </a:ln>
             <a:extLst>
               <a:ext uri="{91240B29-F687-4f45-9708-019B960494DF}">
-                <a14:hiddenLine xmlns:a14="http://schemas.microsoft.com/office/drawing/2010/main" xmlns="" w="9525">
+                <a14:hiddenLine xmlns="" xmlns:a14="http://schemas.microsoft.com/office/drawing/2010/main" w="9525">
                   <a:solidFill>
                     <a:srgbClr val="000000"/>
                   </a:solidFill>
@@ -719,7 +721,7 @@
             </a:ln>
             <a:extLst>
               <a:ext uri="{91240B29-F687-4f45-9708-019B960494DF}">
-                <a14:hiddenLine xmlns:a14="http://schemas.microsoft.com/office/drawing/2010/main" xmlns="" w="9525">
+                <a14:hiddenLine xmlns="" xmlns:a14="http://schemas.microsoft.com/office/drawing/2010/main" w="9525">
                   <a:solidFill>
                     <a:srgbClr val="000000"/>
                   </a:solidFill>
@@ -809,7 +811,7 @@
             </a:ln>
             <a:extLst>
               <a:ext uri="{91240B29-F687-4f45-9708-019B960494DF}">
-                <a14:hiddenLine xmlns:a14="http://schemas.microsoft.com/office/drawing/2010/main" xmlns="" w="9525">
+                <a14:hiddenLine xmlns="" xmlns:a14="http://schemas.microsoft.com/office/drawing/2010/main" w="9525">
                   <a:solidFill>
                     <a:srgbClr val="000000"/>
                   </a:solidFill>
@@ -871,7 +873,7 @@
             </a:ln>
             <a:extLst>
               <a:ext uri="{91240B29-F687-4f45-9708-019B960494DF}">
-                <a14:hiddenLine xmlns:a14="http://schemas.microsoft.com/office/drawing/2010/main" xmlns="" w="9525">
+                <a14:hiddenLine xmlns="" xmlns:a14="http://schemas.microsoft.com/office/drawing/2010/main" w="9525">
                   <a:solidFill>
                     <a:srgbClr val="000000"/>
                   </a:solidFill>
@@ -933,7 +935,7 @@
             </a:ln>
             <a:extLst>
               <a:ext uri="{91240B29-F687-4f45-9708-019B960494DF}">
-                <a14:hiddenLine xmlns:a14="http://schemas.microsoft.com/office/drawing/2010/main" xmlns="" w="9525">
+                <a14:hiddenLine xmlns="" xmlns:a14="http://schemas.microsoft.com/office/drawing/2010/main" w="9525">
                   <a:solidFill>
                     <a:srgbClr val="000000"/>
                   </a:solidFill>
@@ -1023,7 +1025,7 @@
             </a:ln>
             <a:extLst>
               <a:ext uri="{91240B29-F687-4f45-9708-019B960494DF}">
-                <a14:hiddenLine xmlns:a14="http://schemas.microsoft.com/office/drawing/2010/main" xmlns="" w="9525">
+                <a14:hiddenLine xmlns="" xmlns:a14="http://schemas.microsoft.com/office/drawing/2010/main" w="9525">
                   <a:solidFill>
                     <a:srgbClr val="000000"/>
                   </a:solidFill>
@@ -1113,7 +1115,7 @@
             </a:ln>
             <a:extLst>
               <a:ext uri="{91240B29-F687-4f45-9708-019B960494DF}">
-                <a14:hiddenLine xmlns:a14="http://schemas.microsoft.com/office/drawing/2010/main" xmlns="" w="9525">
+                <a14:hiddenLine xmlns="" xmlns:a14="http://schemas.microsoft.com/office/drawing/2010/main" w="9525">
                   <a:solidFill>
                     <a:srgbClr val="000000"/>
                   </a:solidFill>
@@ -1175,7 +1177,7 @@
             </a:ln>
             <a:extLst>
               <a:ext uri="{91240B29-F687-4f45-9708-019B960494DF}">
-                <a14:hiddenLine xmlns:a14="http://schemas.microsoft.com/office/drawing/2010/main" xmlns="" w="9525">
+                <a14:hiddenLine xmlns="" xmlns:a14="http://schemas.microsoft.com/office/drawing/2010/main" w="9525">
                   <a:solidFill>
                     <a:srgbClr val="000000"/>
                   </a:solidFill>
@@ -1285,7 +1287,7 @@
             </a:ln>
             <a:extLst>
               <a:ext uri="{91240B29-F687-4f45-9708-019B960494DF}">
-                <a14:hiddenLine xmlns:a14="http://schemas.microsoft.com/office/drawing/2010/main" xmlns="" w="9525">
+                <a14:hiddenLine xmlns="" xmlns:a14="http://schemas.microsoft.com/office/drawing/2010/main" w="9525">
                   <a:solidFill>
                     <a:srgbClr val="000000"/>
                   </a:solidFill>
@@ -1347,7 +1349,7 @@
             </a:ln>
             <a:extLst>
               <a:ext uri="{91240B29-F687-4f45-9708-019B960494DF}">
-                <a14:hiddenLine xmlns:a14="http://schemas.microsoft.com/office/drawing/2010/main" xmlns="" w="9525">
+                <a14:hiddenLine xmlns="" xmlns:a14="http://schemas.microsoft.com/office/drawing/2010/main" w="9525">
                   <a:solidFill>
                     <a:srgbClr val="000000"/>
                   </a:solidFill>
@@ -1437,7 +1439,7 @@
             </a:ln>
             <a:extLst>
               <a:ext uri="{91240B29-F687-4f45-9708-019B960494DF}">
-                <a14:hiddenLine xmlns:a14="http://schemas.microsoft.com/office/drawing/2010/main" xmlns="" w="9525">
+                <a14:hiddenLine xmlns="" xmlns:a14="http://schemas.microsoft.com/office/drawing/2010/main" w="9525">
                   <a:solidFill>
                     <a:srgbClr val="000000"/>
                   </a:solidFill>
@@ -1527,7 +1529,7 @@
             </a:ln>
             <a:extLst>
               <a:ext uri="{91240B29-F687-4f45-9708-019B960494DF}">
-                <a14:hiddenLine xmlns:a14="http://schemas.microsoft.com/office/drawing/2010/main" xmlns="" w="9525">
+                <a14:hiddenLine xmlns="" xmlns:a14="http://schemas.microsoft.com/office/drawing/2010/main" w="9525">
                   <a:solidFill>
                     <a:srgbClr val="000000"/>
                   </a:solidFill>
@@ -1589,7 +1591,7 @@
             </a:ln>
             <a:extLst>
               <a:ext uri="{91240B29-F687-4f45-9708-019B960494DF}">
-                <a14:hiddenLine xmlns:a14="http://schemas.microsoft.com/office/drawing/2010/main" xmlns="" w="9525">
+                <a14:hiddenLine xmlns="" xmlns:a14="http://schemas.microsoft.com/office/drawing/2010/main" w="9525">
                   <a:solidFill>
                     <a:srgbClr val="000000"/>
                   </a:solidFill>
@@ -1679,7 +1681,7 @@
             </a:ln>
             <a:extLst>
               <a:ext uri="{91240B29-F687-4f45-9708-019B960494DF}">
-                <a14:hiddenLine xmlns:a14="http://schemas.microsoft.com/office/drawing/2010/main" xmlns="" w="9525">
+                <a14:hiddenLine xmlns="" xmlns:a14="http://schemas.microsoft.com/office/drawing/2010/main" w="9525">
                   <a:solidFill>
                     <a:srgbClr val="000000"/>
                   </a:solidFill>
@@ -1769,7 +1771,7 @@
             </a:ln>
             <a:extLst>
               <a:ext uri="{91240B29-F687-4f45-9708-019B960494DF}">
-                <a14:hiddenLine xmlns:a14="http://schemas.microsoft.com/office/drawing/2010/main" xmlns="" w="9525">
+                <a14:hiddenLine xmlns="" xmlns:a14="http://schemas.microsoft.com/office/drawing/2010/main" w="9525">
                   <a:solidFill>
                     <a:srgbClr val="000000"/>
                   </a:solidFill>
@@ -1825,7 +1827,7 @@
             </a:ln>
             <a:extLst>
               <a:ext uri="{91240B29-F687-4f45-9708-019B960494DF}">
-                <a14:hiddenLine xmlns:a14="http://schemas.microsoft.com/office/drawing/2010/main" xmlns="" w="9525">
+                <a14:hiddenLine xmlns="" xmlns:a14="http://schemas.microsoft.com/office/drawing/2010/main" w="9525">
                   <a:solidFill>
                     <a:srgbClr val="000000"/>
                   </a:solidFill>
@@ -1915,7 +1917,7 @@
             </a:ln>
             <a:extLst>
               <a:ext uri="{91240B29-F687-4f45-9708-019B960494DF}">
-                <a14:hiddenLine xmlns:a14="http://schemas.microsoft.com/office/drawing/2010/main" xmlns="" w="9525">
+                <a14:hiddenLine xmlns="" xmlns:a14="http://schemas.microsoft.com/office/drawing/2010/main" w="9525">
                   <a:solidFill>
                     <a:srgbClr val="000000"/>
                   </a:solidFill>
@@ -1971,7 +1973,7 @@
             </a:ln>
             <a:extLst>
               <a:ext uri="{91240B29-F687-4f45-9708-019B960494DF}">
-                <a14:hiddenLine xmlns:a14="http://schemas.microsoft.com/office/drawing/2010/main" xmlns="" w="9525">
+                <a14:hiddenLine xmlns="" xmlns:a14="http://schemas.microsoft.com/office/drawing/2010/main" w="9525">
                   <a:solidFill>
                     <a:srgbClr val="000000"/>
                   </a:solidFill>
@@ -2061,7 +2063,7 @@
             </a:ln>
             <a:extLst>
               <a:ext uri="{91240B29-F687-4f45-9708-019B960494DF}">
-                <a14:hiddenLine xmlns:a14="http://schemas.microsoft.com/office/drawing/2010/main" xmlns="" w="9525">
+                <a14:hiddenLine xmlns="" xmlns:a14="http://schemas.microsoft.com/office/drawing/2010/main" w="9525">
                   <a:solidFill>
                     <a:srgbClr val="000000"/>
                   </a:solidFill>
@@ -2129,7 +2131,7 @@
             </a:ln>
             <a:extLst>
               <a:ext uri="{91240B29-F687-4f45-9708-019B960494DF}">
-                <a14:hiddenLine xmlns:a14="http://schemas.microsoft.com/office/drawing/2010/main" xmlns="" w="9525">
+                <a14:hiddenLine xmlns="" xmlns:a14="http://schemas.microsoft.com/office/drawing/2010/main" w="9525">
                   <a:solidFill>
                     <a:srgbClr val="000000"/>
                   </a:solidFill>
@@ -2219,7 +2221,7 @@
             </a:ln>
             <a:extLst>
               <a:ext uri="{91240B29-F687-4f45-9708-019B960494DF}">
-                <a14:hiddenLine xmlns:a14="http://schemas.microsoft.com/office/drawing/2010/main" xmlns="" w="9525">
+                <a14:hiddenLine xmlns="" xmlns:a14="http://schemas.microsoft.com/office/drawing/2010/main" w="9525">
                   <a:solidFill>
                     <a:srgbClr val="000000"/>
                   </a:solidFill>
@@ -2287,7 +2289,7 @@
             </a:ln>
             <a:extLst>
               <a:ext uri="{91240B29-F687-4f45-9708-019B960494DF}">
-                <a14:hiddenLine xmlns:a14="http://schemas.microsoft.com/office/drawing/2010/main" xmlns="" w="9525">
+                <a14:hiddenLine xmlns="" xmlns:a14="http://schemas.microsoft.com/office/drawing/2010/main" w="9525">
                   <a:solidFill>
                     <a:srgbClr val="000000"/>
                   </a:solidFill>
@@ -2377,7 +2379,7 @@
             </a:ln>
             <a:extLst>
               <a:ext uri="{91240B29-F687-4f45-9708-019B960494DF}">
-                <a14:hiddenLine xmlns:a14="http://schemas.microsoft.com/office/drawing/2010/main" xmlns="" w="9525">
+                <a14:hiddenLine xmlns="" xmlns:a14="http://schemas.microsoft.com/office/drawing/2010/main" w="9525">
                   <a:solidFill>
                     <a:srgbClr val="000000"/>
                   </a:solidFill>
@@ -2411,7 +2413,7 @@
             </a:ln>
             <a:extLst>
               <a:ext uri="{91240B29-F687-4f45-9708-019B960494DF}">
-                <a14:hiddenLine xmlns:a14="http://schemas.microsoft.com/office/drawing/2010/main" xmlns="" w="9525">
+                <a14:hiddenLine xmlns="" xmlns:a14="http://schemas.microsoft.com/office/drawing/2010/main" w="9525">
                   <a:solidFill>
                     <a:srgbClr val="000000"/>
                   </a:solidFill>
@@ -2501,7 +2503,7 @@
             </a:ln>
             <a:extLst>
               <a:ext uri="{91240B29-F687-4f45-9708-019B960494DF}">
-                <a14:hiddenLine xmlns:a14="http://schemas.microsoft.com/office/drawing/2010/main" xmlns="" w="9525">
+                <a14:hiddenLine xmlns="" xmlns:a14="http://schemas.microsoft.com/office/drawing/2010/main" w="9525">
                   <a:solidFill>
                     <a:srgbClr val="000000"/>
                   </a:solidFill>
@@ -2563,7 +2565,7 @@
             </a:ln>
             <a:extLst>
               <a:ext uri="{91240B29-F687-4f45-9708-019B960494DF}">
-                <a14:hiddenLine xmlns:a14="http://schemas.microsoft.com/office/drawing/2010/main" xmlns="" w="9525">
+                <a14:hiddenLine xmlns="" xmlns:a14="http://schemas.microsoft.com/office/drawing/2010/main" w="9525">
                   <a:solidFill>
                     <a:srgbClr val="000000"/>
                   </a:solidFill>
@@ -2625,7 +2627,7 @@
             </a:ln>
             <a:extLst>
               <a:ext uri="{91240B29-F687-4f45-9708-019B960494DF}">
-                <a14:hiddenLine xmlns:a14="http://schemas.microsoft.com/office/drawing/2010/main" xmlns="" w="9525">
+                <a14:hiddenLine xmlns="" xmlns:a14="http://schemas.microsoft.com/office/drawing/2010/main" w="9525">
                   <a:solidFill>
                     <a:srgbClr val="000000"/>
                   </a:solidFill>
@@ -2715,7 +2717,7 @@
             </a:ln>
             <a:extLst>
               <a:ext uri="{91240B29-F687-4f45-9708-019B960494DF}">
-                <a14:hiddenLine xmlns:a14="http://schemas.microsoft.com/office/drawing/2010/main" xmlns="" w="9525">
+                <a14:hiddenLine xmlns="" xmlns:a14="http://schemas.microsoft.com/office/drawing/2010/main" w="9525">
                   <a:solidFill>
                     <a:srgbClr val="000000"/>
                   </a:solidFill>
@@ -2783,7 +2785,7 @@
             </a:ln>
             <a:extLst>
               <a:ext uri="{91240B29-F687-4f45-9708-019B960494DF}">
-                <a14:hiddenLine xmlns:a14="http://schemas.microsoft.com/office/drawing/2010/main" xmlns="" w="9525">
+                <a14:hiddenLine xmlns="" xmlns:a14="http://schemas.microsoft.com/office/drawing/2010/main" w="9525">
                   <a:solidFill>
                     <a:srgbClr val="000000"/>
                   </a:solidFill>
@@ -2845,7 +2847,7 @@
             </a:ln>
             <a:extLst>
               <a:ext uri="{91240B29-F687-4f45-9708-019B960494DF}">
-                <a14:hiddenLine xmlns:a14="http://schemas.microsoft.com/office/drawing/2010/main" xmlns="" w="9525">
+                <a14:hiddenLine xmlns="" xmlns:a14="http://schemas.microsoft.com/office/drawing/2010/main" w="9525">
                   <a:solidFill>
                     <a:srgbClr val="000000"/>
                   </a:solidFill>
@@ -2935,7 +2937,7 @@
             </a:ln>
             <a:extLst>
               <a:ext uri="{91240B29-F687-4f45-9708-019B960494DF}">
-                <a14:hiddenLine xmlns:a14="http://schemas.microsoft.com/office/drawing/2010/main" xmlns="" w="9525">
+                <a14:hiddenLine xmlns="" xmlns:a14="http://schemas.microsoft.com/office/drawing/2010/main" w="9525">
                   <a:solidFill>
                     <a:srgbClr val="000000"/>
                   </a:solidFill>
@@ -2997,7 +2999,7 @@
             </a:ln>
             <a:extLst>
               <a:ext uri="{91240B29-F687-4f45-9708-019B960494DF}">
-                <a14:hiddenLine xmlns:a14="http://schemas.microsoft.com/office/drawing/2010/main" xmlns="" w="9525">
+                <a14:hiddenLine xmlns="" xmlns:a14="http://schemas.microsoft.com/office/drawing/2010/main" w="9525">
                   <a:solidFill>
                     <a:srgbClr val="000000"/>
                   </a:solidFill>
@@ -3087,7 +3089,7 @@
             </a:ln>
             <a:extLst>
               <a:ext uri="{91240B29-F687-4f45-9708-019B960494DF}">
-                <a14:hiddenLine xmlns:a14="http://schemas.microsoft.com/office/drawing/2010/main" xmlns="" w="9525">
+                <a14:hiddenLine xmlns="" xmlns:a14="http://schemas.microsoft.com/office/drawing/2010/main" w="9525">
                   <a:solidFill>
                     <a:srgbClr val="000000"/>
                   </a:solidFill>
@@ -3149,7 +3151,7 @@
             </a:ln>
             <a:extLst>
               <a:ext uri="{91240B29-F687-4f45-9708-019B960494DF}">
-                <a14:hiddenLine xmlns:a14="http://schemas.microsoft.com/office/drawing/2010/main" xmlns="" w="9525">
+                <a14:hiddenLine xmlns="" xmlns:a14="http://schemas.microsoft.com/office/drawing/2010/main" w="9525">
                   <a:solidFill>
                     <a:srgbClr val="000000"/>
                   </a:solidFill>
@@ -3239,7 +3241,7 @@
             </a:ln>
             <a:extLst>
               <a:ext uri="{91240B29-F687-4f45-9708-019B960494DF}">
-                <a14:hiddenLine xmlns:a14="http://schemas.microsoft.com/office/drawing/2010/main" xmlns="" w="9525">
+                <a14:hiddenLine xmlns="" xmlns:a14="http://schemas.microsoft.com/office/drawing/2010/main" w="9525">
                   <a:solidFill>
                     <a:srgbClr val="000000"/>
                   </a:solidFill>
@@ -3273,7 +3275,7 @@
             </a:ln>
             <a:extLst>
               <a:ext uri="{91240B29-F687-4f45-9708-019B960494DF}">
-                <a14:hiddenLine xmlns:a14="http://schemas.microsoft.com/office/drawing/2010/main" xmlns="" w="9525">
+                <a14:hiddenLine xmlns="" xmlns:a14="http://schemas.microsoft.com/office/drawing/2010/main" w="9525">
                   <a:solidFill>
                     <a:srgbClr val="000000"/>
                   </a:solidFill>
@@ -3338,7 +3340,7 @@
             </a:ln>
             <a:extLst>
               <a:ext uri="{91240B29-F687-4f45-9708-019B960494DF}">
-                <a14:hiddenLine xmlns:a14="http://schemas.microsoft.com/office/drawing/2010/main" xmlns="" w="9525">
+                <a14:hiddenLine xmlns="" xmlns:a14="http://schemas.microsoft.com/office/drawing/2010/main" w="9525">
                   <a:solidFill>
                     <a:srgbClr val="000000"/>
                   </a:solidFill>
@@ -3428,7 +3430,7 @@
             </a:ln>
             <a:extLst>
               <a:ext uri="{91240B29-F687-4f45-9708-019B960494DF}">
-                <a14:hiddenLine xmlns:a14="http://schemas.microsoft.com/office/drawing/2010/main" xmlns="" w="9525">
+                <a14:hiddenLine xmlns="" xmlns:a14="http://schemas.microsoft.com/office/drawing/2010/main" w="9525">
                   <a:solidFill>
                     <a:srgbClr val="000000"/>
                   </a:solidFill>
@@ -3490,7 +3492,7 @@
             </a:ln>
             <a:extLst>
               <a:ext uri="{91240B29-F687-4f45-9708-019B960494DF}">
-                <a14:hiddenLine xmlns:a14="http://schemas.microsoft.com/office/drawing/2010/main" xmlns="" w="9525">
+                <a14:hiddenLine xmlns="" xmlns:a14="http://schemas.microsoft.com/office/drawing/2010/main" w="9525">
                   <a:solidFill>
                     <a:srgbClr val="000000"/>
                   </a:solidFill>
@@ -3580,7 +3582,7 @@
             </a:ln>
             <a:extLst>
               <a:ext uri="{91240B29-F687-4f45-9708-019B960494DF}">
-                <a14:hiddenLine xmlns:a14="http://schemas.microsoft.com/office/drawing/2010/main" xmlns="" w="9525">
+                <a14:hiddenLine xmlns="" xmlns:a14="http://schemas.microsoft.com/office/drawing/2010/main" w="9525">
                   <a:solidFill>
                     <a:srgbClr val="000000"/>
                   </a:solidFill>
@@ -3670,7 +3672,7 @@
             </a:ln>
             <a:extLst>
               <a:ext uri="{91240B29-F687-4f45-9708-019B960494DF}">
-                <a14:hiddenLine xmlns:a14="http://schemas.microsoft.com/office/drawing/2010/main" xmlns="" w="9525">
+                <a14:hiddenLine xmlns="" xmlns:a14="http://schemas.microsoft.com/office/drawing/2010/main" w="9525">
                   <a:solidFill>
                     <a:srgbClr val="000000"/>
                   </a:solidFill>
@@ -3735,7 +3737,7 @@
             </a:ln>
             <a:extLst>
               <a:ext uri="{91240B29-F687-4f45-9708-019B960494DF}">
-                <a14:hiddenLine xmlns:a14="http://schemas.microsoft.com/office/drawing/2010/main" xmlns="" w="9525">
+                <a14:hiddenLine xmlns="" xmlns:a14="http://schemas.microsoft.com/office/drawing/2010/main" w="9525">
                   <a:solidFill>
                     <a:srgbClr val="000000"/>
                   </a:solidFill>
@@ -3797,7 +3799,7 @@
             </a:ln>
             <a:extLst>
               <a:ext uri="{91240B29-F687-4f45-9708-019B960494DF}">
-                <a14:hiddenLine xmlns:a14="http://schemas.microsoft.com/office/drawing/2010/main" xmlns="" w="9525">
+                <a14:hiddenLine xmlns="" xmlns:a14="http://schemas.microsoft.com/office/drawing/2010/main" w="9525">
                   <a:solidFill>
                     <a:srgbClr val="000000"/>
                   </a:solidFill>
@@ -3887,7 +3889,7 @@
             </a:ln>
             <a:extLst>
               <a:ext uri="{91240B29-F687-4f45-9708-019B960494DF}">
-                <a14:hiddenLine xmlns:a14="http://schemas.microsoft.com/office/drawing/2010/main" xmlns="" w="9525">
+                <a14:hiddenLine xmlns="" xmlns:a14="http://schemas.microsoft.com/office/drawing/2010/main" w="9525">
                   <a:solidFill>
                     <a:srgbClr val="000000"/>
                   </a:solidFill>
@@ -3977,7 +3979,7 @@
             </a:ln>
             <a:extLst>
               <a:ext uri="{91240B29-F687-4f45-9708-019B960494DF}">
-                <a14:hiddenLine xmlns:a14="http://schemas.microsoft.com/office/drawing/2010/main" xmlns="" w="9525">
+                <a14:hiddenLine xmlns="" xmlns:a14="http://schemas.microsoft.com/office/drawing/2010/main" w="9525">
                   <a:solidFill>
                     <a:srgbClr val="000000"/>
                   </a:solidFill>
@@ -4039,7 +4041,7 @@
             </a:ln>
             <a:extLst>
               <a:ext uri="{91240B29-F687-4f45-9708-019B960494DF}">
-                <a14:hiddenLine xmlns:a14="http://schemas.microsoft.com/office/drawing/2010/main" xmlns="" w="9525">
+                <a14:hiddenLine xmlns="" xmlns:a14="http://schemas.microsoft.com/office/drawing/2010/main" w="9525">
                   <a:solidFill>
                     <a:srgbClr val="000000"/>
                   </a:solidFill>
@@ -4159,7 +4161,7 @@
             </a:ln>
             <a:extLst>
               <a:ext uri="{91240B29-F687-4f45-9708-019B960494DF}">
-                <a14:hiddenLine xmlns:a14="http://schemas.microsoft.com/office/drawing/2010/main" xmlns="" w="9525">
+                <a14:hiddenLine xmlns="" xmlns:a14="http://schemas.microsoft.com/office/drawing/2010/main" w="9525">
                   <a:solidFill>
                     <a:srgbClr val="000000"/>
                   </a:solidFill>
@@ -4227,7 +4229,7 @@
             </a:ln>
             <a:extLst>
               <a:ext uri="{91240B29-F687-4f45-9708-019B960494DF}">
-                <a14:hiddenLine xmlns:a14="http://schemas.microsoft.com/office/drawing/2010/main" xmlns="" w="9525">
+                <a14:hiddenLine xmlns="" xmlns:a14="http://schemas.microsoft.com/office/drawing/2010/main" w="9525">
                   <a:solidFill>
                     <a:srgbClr val="000000"/>
                   </a:solidFill>
@@ -4317,7 +4319,7 @@
             </a:ln>
             <a:extLst>
               <a:ext uri="{91240B29-F687-4f45-9708-019B960494DF}">
-                <a14:hiddenLine xmlns:a14="http://schemas.microsoft.com/office/drawing/2010/main" xmlns="" w="9525">
+                <a14:hiddenLine xmlns="" xmlns:a14="http://schemas.microsoft.com/office/drawing/2010/main" w="9525">
                   <a:solidFill>
                     <a:srgbClr val="000000"/>
                   </a:solidFill>
@@ -4457,7 +4459,7 @@
           <a:p>
             <a:fld id="{48A87A34-81AB-432B-8DAE-1953F412C126}" type="datetimeFigureOut">
               <a:rPr lang="en-US" smtClean="0"/>
-              <a:t>10/16/18</a:t>
+              <a:t>10/17/18</a:t>
             </a:fld>
             <a:endParaRPr lang="en-US" dirty="0"/>
           </a:p>
@@ -4724,7 +4726,7 @@
           <a:p>
             <a:fld id="{48A87A34-81AB-432B-8DAE-1953F412C126}" type="datetimeFigureOut">
               <a:rPr lang="en-US" smtClean="0"/>
-              <a:t>10/16/18</a:t>
+              <a:t>10/17/18</a:t>
             </a:fld>
             <a:endParaRPr lang="en-US" dirty="0"/>
           </a:p>
@@ -4920,7 +4922,7 @@
           <a:p>
             <a:fld id="{48A87A34-81AB-432B-8DAE-1953F412C126}" type="datetimeFigureOut">
               <a:rPr lang="en-US" smtClean="0"/>
-              <a:t>10/16/18</a:t>
+              <a:t>10/17/18</a:t>
             </a:fld>
             <a:endParaRPr lang="en-US" dirty="0"/>
           </a:p>
@@ -5183,7 +5185,7 @@
           <a:p>
             <a:fld id="{48A87A34-81AB-432B-8DAE-1953F412C126}" type="datetimeFigureOut">
               <a:rPr lang="en-US" smtClean="0"/>
-              <a:t>10/16/18</a:t>
+              <a:t>10/17/18</a:t>
             </a:fld>
             <a:endParaRPr lang="en-US" dirty="0"/>
           </a:p>
@@ -5617,7 +5619,7 @@
           <a:p>
             <a:fld id="{48A87A34-81AB-432B-8DAE-1953F412C126}" type="datetimeFigureOut">
               <a:rPr lang="en-US" smtClean="0"/>
-              <a:t>10/16/18</a:t>
+              <a:t>10/17/18</a:t>
             </a:fld>
             <a:endParaRPr lang="en-US" dirty="0"/>
           </a:p>
@@ -6163,7 +6165,7 @@
           <a:p>
             <a:fld id="{48A87A34-81AB-432B-8DAE-1953F412C126}" type="datetimeFigureOut">
               <a:rPr lang="en-US" smtClean="0"/>
-              <a:t>10/16/18</a:t>
+              <a:t>10/17/18</a:t>
             </a:fld>
             <a:endParaRPr lang="en-US" dirty="0"/>
           </a:p>
@@ -6883,7 +6885,7 @@
           <a:p>
             <a:fld id="{48A87A34-81AB-432B-8DAE-1953F412C126}" type="datetimeFigureOut">
               <a:rPr lang="en-US" smtClean="0"/>
-              <a:t>10/16/18</a:t>
+              <a:t>10/17/18</a:t>
             </a:fld>
             <a:endParaRPr lang="en-US" dirty="0"/>
           </a:p>
@@ -7053,7 +7055,7 @@
           <a:p>
             <a:fld id="{48A87A34-81AB-432B-8DAE-1953F412C126}" type="datetimeFigureOut">
               <a:rPr lang="en-US" smtClean="0"/>
-              <a:t>10/16/18</a:t>
+              <a:t>10/17/18</a:t>
             </a:fld>
             <a:endParaRPr lang="en-US" dirty="0"/>
           </a:p>
@@ -7233,7 +7235,7 @@
           <a:p>
             <a:fld id="{48A87A34-81AB-432B-8DAE-1953F412C126}" type="datetimeFigureOut">
               <a:rPr lang="en-US" smtClean="0"/>
-              <a:t>10/16/18</a:t>
+              <a:t>10/17/18</a:t>
             </a:fld>
             <a:endParaRPr lang="en-US" dirty="0"/>
           </a:p>
@@ -7403,7 +7405,7 @@
           <a:p>
             <a:fld id="{48A87A34-81AB-432B-8DAE-1953F412C126}" type="datetimeFigureOut">
               <a:rPr lang="en-US" smtClean="0"/>
-              <a:t>10/16/18</a:t>
+              <a:t>10/17/18</a:t>
             </a:fld>
             <a:endParaRPr lang="en-US" dirty="0"/>
           </a:p>
@@ -7653,7 +7655,7 @@
           <a:p>
             <a:fld id="{48A87A34-81AB-432B-8DAE-1953F412C126}" type="datetimeFigureOut">
               <a:rPr lang="en-US" smtClean="0"/>
-              <a:t>10/16/18</a:t>
+              <a:t>10/17/18</a:t>
             </a:fld>
             <a:endParaRPr lang="en-US" dirty="0"/>
           </a:p>
@@ -7885,7 +7887,7 @@
           <a:p>
             <a:fld id="{48A87A34-81AB-432B-8DAE-1953F412C126}" type="datetimeFigureOut">
               <a:rPr lang="en-US" smtClean="0"/>
-              <a:t>10/16/18</a:t>
+              <a:t>10/17/18</a:t>
             </a:fld>
             <a:endParaRPr lang="en-US" dirty="0"/>
           </a:p>
@@ -8266,7 +8268,7 @@
           <a:p>
             <a:fld id="{48A87A34-81AB-432B-8DAE-1953F412C126}" type="datetimeFigureOut">
               <a:rPr lang="en-US" smtClean="0"/>
-              <a:t>10/16/18</a:t>
+              <a:t>10/17/18</a:t>
             </a:fld>
             <a:endParaRPr lang="en-US" dirty="0"/>
           </a:p>
@@ -8384,7 +8386,7 @@
           <a:p>
             <a:fld id="{48A87A34-81AB-432B-8DAE-1953F412C126}" type="datetimeFigureOut">
               <a:rPr lang="en-US" smtClean="0"/>
-              <a:t>10/16/18</a:t>
+              <a:t>10/17/18</a:t>
             </a:fld>
             <a:endParaRPr lang="en-US" dirty="0"/>
           </a:p>
@@ -8479,7 +8481,7 @@
           <a:p>
             <a:fld id="{48A87A34-81AB-432B-8DAE-1953F412C126}" type="datetimeFigureOut">
               <a:rPr lang="en-US" smtClean="0"/>
-              <a:t>10/16/18</a:t>
+              <a:t>10/17/18</a:t>
             </a:fld>
             <a:endParaRPr lang="en-US" dirty="0"/>
           </a:p>
@@ -8728,7 +8730,7 @@
           <a:p>
             <a:fld id="{48A87A34-81AB-432B-8DAE-1953F412C126}" type="datetimeFigureOut">
               <a:rPr lang="en-US" smtClean="0"/>
-              <a:t>10/16/18</a:t>
+              <a:t>10/17/18</a:t>
             </a:fld>
             <a:endParaRPr lang="en-US" dirty="0"/>
           </a:p>
@@ -9008,7 +9010,7 @@
           <a:p>
             <a:fld id="{48A87A34-81AB-432B-8DAE-1953F412C126}" type="datetimeFigureOut">
               <a:rPr lang="en-US" smtClean="0"/>
-              <a:t>10/16/18</a:t>
+              <a:t>10/17/18</a:t>
             </a:fld>
             <a:endParaRPr lang="en-US" dirty="0"/>
           </a:p>
@@ -9131,7 +9133,7 @@
           <a:noFill/>
           <a:extLst>
             <a:ext uri="{909E8E84-426E-40dd-AFC4-6F175D3DCCD1}">
-              <a14:hiddenFill xmlns:a14="http://schemas.microsoft.com/office/drawing/2010/main" xmlns="">
+              <a14:hiddenFill xmlns="" xmlns:a14="http://schemas.microsoft.com/office/drawing/2010/main">
                 <a:solidFill>
                   <a:srgbClr val="FFFFFF"/>
                 </a:solidFill>
@@ -9205,7 +9207,7 @@
               </a:ln>
               <a:extLst>
                 <a:ext uri="{91240B29-F687-4f45-9708-019B960494DF}">
-                  <a14:hiddenLine xmlns:a14="http://schemas.microsoft.com/office/drawing/2010/main" xmlns="" w="9525">
+                  <a14:hiddenLine xmlns="" xmlns:a14="http://schemas.microsoft.com/office/drawing/2010/main" w="9525">
                     <a:solidFill>
                       <a:srgbClr val="000000"/>
                     </a:solidFill>
@@ -9295,7 +9297,7 @@
               </a:ln>
               <a:extLst>
                 <a:ext uri="{91240B29-F687-4f45-9708-019B960494DF}">
-                  <a14:hiddenLine xmlns:a14="http://schemas.microsoft.com/office/drawing/2010/main" xmlns="" w="9525">
+                  <a14:hiddenLine xmlns="" xmlns:a14="http://schemas.microsoft.com/office/drawing/2010/main" w="9525">
                     <a:solidFill>
                       <a:srgbClr val="000000"/>
                     </a:solidFill>
@@ -9385,7 +9387,7 @@
               </a:ln>
               <a:extLst>
                 <a:ext uri="{91240B29-F687-4f45-9708-019B960494DF}">
-                  <a14:hiddenLine xmlns:a14="http://schemas.microsoft.com/office/drawing/2010/main" xmlns="" w="9525">
+                  <a14:hiddenLine xmlns="" xmlns:a14="http://schemas.microsoft.com/office/drawing/2010/main" w="9525">
                     <a:solidFill>
                       <a:srgbClr val="000000"/>
                     </a:solidFill>
@@ -9447,7 +9449,7 @@
               </a:ln>
               <a:extLst>
                 <a:ext uri="{91240B29-F687-4f45-9708-019B960494DF}">
-                  <a14:hiddenLine xmlns:a14="http://schemas.microsoft.com/office/drawing/2010/main" xmlns="" w="9525">
+                  <a14:hiddenLine xmlns="" xmlns:a14="http://schemas.microsoft.com/office/drawing/2010/main" w="9525">
                     <a:solidFill>
                       <a:srgbClr val="000000"/>
                     </a:solidFill>
@@ -9537,7 +9539,7 @@
               </a:ln>
               <a:extLst>
                 <a:ext uri="{91240B29-F687-4f45-9708-019B960494DF}">
-                  <a14:hiddenLine xmlns:a14="http://schemas.microsoft.com/office/drawing/2010/main" xmlns="" w="9525">
+                  <a14:hiddenLine xmlns="" xmlns:a14="http://schemas.microsoft.com/office/drawing/2010/main" w="9525">
                     <a:solidFill>
                       <a:srgbClr val="000000"/>
                     </a:solidFill>
@@ -9599,7 +9601,7 @@
               </a:ln>
               <a:extLst>
                 <a:ext uri="{91240B29-F687-4f45-9708-019B960494DF}">
-                  <a14:hiddenLine xmlns:a14="http://schemas.microsoft.com/office/drawing/2010/main" xmlns="" w="9525">
+                  <a14:hiddenLine xmlns="" xmlns:a14="http://schemas.microsoft.com/office/drawing/2010/main" w="9525">
                     <a:solidFill>
                       <a:srgbClr val="000000"/>
                     </a:solidFill>
@@ -9661,7 +9663,7 @@
               </a:ln>
               <a:extLst>
                 <a:ext uri="{91240B29-F687-4f45-9708-019B960494DF}">
-                  <a14:hiddenLine xmlns:a14="http://schemas.microsoft.com/office/drawing/2010/main" xmlns="" w="9525">
+                  <a14:hiddenLine xmlns="" xmlns:a14="http://schemas.microsoft.com/office/drawing/2010/main" w="9525">
                     <a:solidFill>
                       <a:srgbClr val="000000"/>
                     </a:solidFill>
@@ -9751,7 +9753,7 @@
               </a:ln>
               <a:extLst>
                 <a:ext uri="{91240B29-F687-4f45-9708-019B960494DF}">
-                  <a14:hiddenLine xmlns:a14="http://schemas.microsoft.com/office/drawing/2010/main" xmlns="" w="9525">
+                  <a14:hiddenLine xmlns="" xmlns:a14="http://schemas.microsoft.com/office/drawing/2010/main" w="9525">
                     <a:solidFill>
                       <a:srgbClr val="000000"/>
                     </a:solidFill>
@@ -9841,7 +9843,7 @@
               </a:ln>
               <a:extLst>
                 <a:ext uri="{91240B29-F687-4f45-9708-019B960494DF}">
-                  <a14:hiddenLine xmlns:a14="http://schemas.microsoft.com/office/drawing/2010/main" xmlns="" w="9525">
+                  <a14:hiddenLine xmlns="" xmlns:a14="http://schemas.microsoft.com/office/drawing/2010/main" w="9525">
                     <a:solidFill>
                       <a:srgbClr val="000000"/>
                     </a:solidFill>
@@ -9903,7 +9905,7 @@
               </a:ln>
               <a:extLst>
                 <a:ext uri="{91240B29-F687-4f45-9708-019B960494DF}">
-                  <a14:hiddenLine xmlns:a14="http://schemas.microsoft.com/office/drawing/2010/main" xmlns="" w="9525">
+                  <a14:hiddenLine xmlns="" xmlns:a14="http://schemas.microsoft.com/office/drawing/2010/main" w="9525">
                     <a:solidFill>
                       <a:srgbClr val="000000"/>
                     </a:solidFill>
@@ -10013,7 +10015,7 @@
               </a:ln>
               <a:extLst>
                 <a:ext uri="{91240B29-F687-4f45-9708-019B960494DF}">
-                  <a14:hiddenLine xmlns:a14="http://schemas.microsoft.com/office/drawing/2010/main" xmlns="" w="9525">
+                  <a14:hiddenLine xmlns="" xmlns:a14="http://schemas.microsoft.com/office/drawing/2010/main" w="9525">
                     <a:solidFill>
                       <a:srgbClr val="000000"/>
                     </a:solidFill>
@@ -10097,7 +10099,7 @@
               </a:ln>
               <a:extLst>
                 <a:ext uri="{91240B29-F687-4f45-9708-019B960494DF}">
-                  <a14:hiddenLine xmlns:a14="http://schemas.microsoft.com/office/drawing/2010/main" xmlns="" w="9525">
+                  <a14:hiddenLine xmlns="" xmlns:a14="http://schemas.microsoft.com/office/drawing/2010/main" w="9525">
                     <a:solidFill>
                       <a:srgbClr val="000000"/>
                     </a:solidFill>
@@ -10159,7 +10161,7 @@
               </a:ln>
               <a:extLst>
                 <a:ext uri="{91240B29-F687-4f45-9708-019B960494DF}">
-                  <a14:hiddenLine xmlns:a14="http://schemas.microsoft.com/office/drawing/2010/main" xmlns="" w="9525">
+                  <a14:hiddenLine xmlns="" xmlns:a14="http://schemas.microsoft.com/office/drawing/2010/main" w="9525">
                     <a:solidFill>
                       <a:srgbClr val="000000"/>
                     </a:solidFill>
@@ -10221,7 +10223,7 @@
               </a:ln>
               <a:extLst>
                 <a:ext uri="{91240B29-F687-4f45-9708-019B960494DF}">
-                  <a14:hiddenLine xmlns:a14="http://schemas.microsoft.com/office/drawing/2010/main" xmlns="" w="9525">
+                  <a14:hiddenLine xmlns="" xmlns:a14="http://schemas.microsoft.com/office/drawing/2010/main" w="9525">
                     <a:solidFill>
                       <a:srgbClr val="000000"/>
                     </a:solidFill>
@@ -10311,7 +10313,7 @@
               </a:ln>
               <a:extLst>
                 <a:ext uri="{91240B29-F687-4f45-9708-019B960494DF}">
-                  <a14:hiddenLine xmlns:a14="http://schemas.microsoft.com/office/drawing/2010/main" xmlns="" w="9525">
+                  <a14:hiddenLine xmlns="" xmlns:a14="http://schemas.microsoft.com/office/drawing/2010/main" w="9525">
                     <a:solidFill>
                       <a:srgbClr val="000000"/>
                     </a:solidFill>
@@ -10345,7 +10347,7 @@
               </a:ln>
               <a:extLst>
                 <a:ext uri="{91240B29-F687-4f45-9708-019B960494DF}">
-                  <a14:hiddenLine xmlns:a14="http://schemas.microsoft.com/office/drawing/2010/main" xmlns="" w="9525">
+                  <a14:hiddenLine xmlns="" xmlns:a14="http://schemas.microsoft.com/office/drawing/2010/main" w="9525">
                     <a:solidFill>
                       <a:srgbClr val="000000"/>
                     </a:solidFill>
@@ -10410,7 +10412,7 @@
               </a:ln>
               <a:extLst>
                 <a:ext uri="{91240B29-F687-4f45-9708-019B960494DF}">
-                  <a14:hiddenLine xmlns:a14="http://schemas.microsoft.com/office/drawing/2010/main" xmlns="" w="9525">
+                  <a14:hiddenLine xmlns="" xmlns:a14="http://schemas.microsoft.com/office/drawing/2010/main" w="9525">
                     <a:solidFill>
                       <a:srgbClr val="000000"/>
                     </a:solidFill>
@@ -10500,7 +10502,7 @@
               </a:ln>
               <a:extLst>
                 <a:ext uri="{91240B29-F687-4f45-9708-019B960494DF}">
-                  <a14:hiddenLine xmlns:a14="http://schemas.microsoft.com/office/drawing/2010/main" xmlns="" w="9525">
+                  <a14:hiddenLine xmlns="" xmlns:a14="http://schemas.microsoft.com/office/drawing/2010/main" w="9525">
                     <a:solidFill>
                       <a:srgbClr val="000000"/>
                     </a:solidFill>
@@ -10562,7 +10564,7 @@
               </a:ln>
               <a:extLst>
                 <a:ext uri="{91240B29-F687-4f45-9708-019B960494DF}">
-                  <a14:hiddenLine xmlns:a14="http://schemas.microsoft.com/office/drawing/2010/main" xmlns="" w="9525">
+                  <a14:hiddenLine xmlns="" xmlns:a14="http://schemas.microsoft.com/office/drawing/2010/main" w="9525">
                     <a:solidFill>
                       <a:srgbClr val="000000"/>
                     </a:solidFill>
@@ -10652,7 +10654,7 @@
               </a:ln>
               <a:extLst>
                 <a:ext uri="{91240B29-F687-4f45-9708-019B960494DF}">
-                  <a14:hiddenLine xmlns:a14="http://schemas.microsoft.com/office/drawing/2010/main" xmlns="" w="9525">
+                  <a14:hiddenLine xmlns="" xmlns:a14="http://schemas.microsoft.com/office/drawing/2010/main" w="9525">
                     <a:solidFill>
                       <a:srgbClr val="000000"/>
                     </a:solidFill>
@@ -10717,7 +10719,7 @@
               </a:ln>
               <a:extLst>
                 <a:ext uri="{91240B29-F687-4f45-9708-019B960494DF}">
-                  <a14:hiddenLine xmlns:a14="http://schemas.microsoft.com/office/drawing/2010/main" xmlns="" w="9525">
+                  <a14:hiddenLine xmlns="" xmlns:a14="http://schemas.microsoft.com/office/drawing/2010/main" w="9525">
                     <a:solidFill>
                       <a:srgbClr val="000000"/>
                     </a:solidFill>
@@ -10779,7 +10781,7 @@
               </a:ln>
               <a:extLst>
                 <a:ext uri="{91240B29-F687-4f45-9708-019B960494DF}">
-                  <a14:hiddenLine xmlns:a14="http://schemas.microsoft.com/office/drawing/2010/main" xmlns="" w="9525">
+                  <a14:hiddenLine xmlns="" xmlns:a14="http://schemas.microsoft.com/office/drawing/2010/main" w="9525">
                     <a:solidFill>
                       <a:srgbClr val="000000"/>
                     </a:solidFill>
@@ -10869,7 +10871,7 @@
               </a:ln>
               <a:extLst>
                 <a:ext uri="{91240B29-F687-4f45-9708-019B960494DF}">
-                  <a14:hiddenLine xmlns:a14="http://schemas.microsoft.com/office/drawing/2010/main" xmlns="" w="9525">
+                  <a14:hiddenLine xmlns="" xmlns:a14="http://schemas.microsoft.com/office/drawing/2010/main" w="9525">
                     <a:solidFill>
                       <a:srgbClr val="000000"/>
                     </a:solidFill>
@@ -10959,7 +10961,7 @@
               </a:ln>
               <a:extLst>
                 <a:ext uri="{91240B29-F687-4f45-9708-019B960494DF}">
-                  <a14:hiddenLine xmlns:a14="http://schemas.microsoft.com/office/drawing/2010/main" xmlns="" w="9525">
+                  <a14:hiddenLine xmlns="" xmlns:a14="http://schemas.microsoft.com/office/drawing/2010/main" w="9525">
                     <a:solidFill>
                       <a:srgbClr val="000000"/>
                     </a:solidFill>
@@ -11024,7 +11026,7 @@
               </a:ln>
               <a:extLst>
                 <a:ext uri="{91240B29-F687-4f45-9708-019B960494DF}">
-                  <a14:hiddenLine xmlns:a14="http://schemas.microsoft.com/office/drawing/2010/main" xmlns="" w="9525">
+                  <a14:hiddenLine xmlns="" xmlns:a14="http://schemas.microsoft.com/office/drawing/2010/main" w="9525">
                     <a:solidFill>
                       <a:srgbClr val="000000"/>
                     </a:solidFill>
@@ -11144,7 +11146,7 @@
               </a:ln>
               <a:extLst>
                 <a:ext uri="{91240B29-F687-4f45-9708-019B960494DF}">
-                  <a14:hiddenLine xmlns:a14="http://schemas.microsoft.com/office/drawing/2010/main" xmlns="" w="9525">
+                  <a14:hiddenLine xmlns="" xmlns:a14="http://schemas.microsoft.com/office/drawing/2010/main" w="9525">
                     <a:solidFill>
                       <a:srgbClr val="000000"/>
                     </a:solidFill>
@@ -11225,7 +11227,7 @@
               </a:ln>
               <a:extLst>
                 <a:ext uri="{91240B29-F687-4f45-9708-019B960494DF}">
-                  <a14:hiddenLine xmlns:a14="http://schemas.microsoft.com/office/drawing/2010/main" xmlns="" w="9525">
+                  <a14:hiddenLine xmlns="" xmlns:a14="http://schemas.microsoft.com/office/drawing/2010/main" w="9525">
                     <a:solidFill>
                       <a:srgbClr val="000000"/>
                     </a:solidFill>
@@ -11340,7 +11342,7 @@
               </a:ln>
               <a:extLst>
                 <a:ext uri="{91240B29-F687-4f45-9708-019B960494DF}">
-                  <a14:hiddenLine xmlns:a14="http://schemas.microsoft.com/office/drawing/2010/main" xmlns="" w="9525">
+                  <a14:hiddenLine xmlns="" xmlns:a14="http://schemas.microsoft.com/office/drawing/2010/main" w="9525">
                     <a:solidFill>
                       <a:srgbClr val="000000"/>
                     </a:solidFill>
@@ -11430,7 +11432,7 @@
               </a:ln>
               <a:extLst>
                 <a:ext uri="{91240B29-F687-4f45-9708-019B960494DF}">
-                  <a14:hiddenLine xmlns:a14="http://schemas.microsoft.com/office/drawing/2010/main" xmlns="" w="9525">
+                  <a14:hiddenLine xmlns="" xmlns:a14="http://schemas.microsoft.com/office/drawing/2010/main" w="9525">
                     <a:solidFill>
                       <a:srgbClr val="000000"/>
                     </a:solidFill>
@@ -11495,7 +11497,7 @@
               </a:ln>
               <a:extLst>
                 <a:ext uri="{91240B29-F687-4f45-9708-019B960494DF}">
-                  <a14:hiddenLine xmlns:a14="http://schemas.microsoft.com/office/drawing/2010/main" xmlns="" w="9525">
+                  <a14:hiddenLine xmlns="" xmlns:a14="http://schemas.microsoft.com/office/drawing/2010/main" w="9525">
                     <a:solidFill>
                       <a:srgbClr val="000000"/>
                     </a:solidFill>
@@ -11585,7 +11587,7 @@
               </a:ln>
               <a:extLst>
                 <a:ext uri="{91240B29-F687-4f45-9708-019B960494DF}">
-                  <a14:hiddenLine xmlns:a14="http://schemas.microsoft.com/office/drawing/2010/main" xmlns="" w="9525">
+                  <a14:hiddenLine xmlns="" xmlns:a14="http://schemas.microsoft.com/office/drawing/2010/main" w="9525">
                     <a:solidFill>
                       <a:srgbClr val="000000"/>
                     </a:solidFill>
@@ -11653,7 +11655,7 @@
               </a:ln>
               <a:extLst>
                 <a:ext uri="{91240B29-F687-4f45-9708-019B960494DF}">
-                  <a14:hiddenLine xmlns:a14="http://schemas.microsoft.com/office/drawing/2010/main" xmlns="" w="9525">
+                  <a14:hiddenLine xmlns="" xmlns:a14="http://schemas.microsoft.com/office/drawing/2010/main" w="9525">
                     <a:solidFill>
                       <a:srgbClr val="000000"/>
                     </a:solidFill>
@@ -11743,7 +11745,7 @@
               </a:ln>
               <a:extLst>
                 <a:ext uri="{91240B29-F687-4f45-9708-019B960494DF}">
-                  <a14:hiddenLine xmlns:a14="http://schemas.microsoft.com/office/drawing/2010/main" xmlns="" w="9525">
+                  <a14:hiddenLine xmlns="" xmlns:a14="http://schemas.microsoft.com/office/drawing/2010/main" w="9525">
                     <a:solidFill>
                       <a:srgbClr val="000000"/>
                     </a:solidFill>
@@ -11811,7 +11813,7 @@
               </a:ln>
               <a:extLst>
                 <a:ext uri="{91240B29-F687-4f45-9708-019B960494DF}">
-                  <a14:hiddenLine xmlns:a14="http://schemas.microsoft.com/office/drawing/2010/main" xmlns="" w="9525">
+                  <a14:hiddenLine xmlns="" xmlns:a14="http://schemas.microsoft.com/office/drawing/2010/main" w="9525">
                     <a:solidFill>
                       <a:srgbClr val="000000"/>
                     </a:solidFill>
@@ -11901,7 +11903,7 @@
               </a:ln>
               <a:extLst>
                 <a:ext uri="{91240B29-F687-4f45-9708-019B960494DF}">
-                  <a14:hiddenLine xmlns:a14="http://schemas.microsoft.com/office/drawing/2010/main" xmlns="" w="9525">
+                  <a14:hiddenLine xmlns="" xmlns:a14="http://schemas.microsoft.com/office/drawing/2010/main" w="9525">
                     <a:solidFill>
                       <a:srgbClr val="000000"/>
                     </a:solidFill>
@@ -11935,7 +11937,7 @@
               </a:ln>
               <a:extLst>
                 <a:ext uri="{91240B29-F687-4f45-9708-019B960494DF}">
-                  <a14:hiddenLine xmlns:a14="http://schemas.microsoft.com/office/drawing/2010/main" xmlns="" w="9525">
+                  <a14:hiddenLine xmlns="" xmlns:a14="http://schemas.microsoft.com/office/drawing/2010/main" w="9525">
                     <a:solidFill>
                       <a:srgbClr val="000000"/>
                     </a:solidFill>
@@ -12076,7 +12078,7 @@
             <a:fld id="{48A87A34-81AB-432B-8DAE-1953F412C126}" type="datetimeFigureOut">
               <a:rPr lang="en-US" smtClean="0"/>
               <a:pPr/>
-              <a:t>10/16/18</a:t>
+              <a:t>10/17/18</a:t>
             </a:fld>
             <a:endParaRPr lang="en-US" dirty="0"/>
           </a:p>
@@ -12655,7 +12657,7 @@
         </p:blipFill>
         <p:spPr>
           <a:xfrm>
-            <a:off x="3937493" y="3266184"/>
+            <a:off x="3124693" y="3266184"/>
             <a:ext cx="8176685" cy="1217804"/>
           </a:xfrm>
           <a:prstGeom prst="rect">
@@ -12677,6 +12679,327 @@
 </file>
 
 <file path=ppt/slides/slide10.xml><?xml version="1.0" encoding="utf-8"?>
+<p:sld xmlns:a="http://schemas.openxmlformats.org/drawingml/2006/main" xmlns:r="http://schemas.openxmlformats.org/officeDocument/2006/relationships" xmlns:p="http://schemas.openxmlformats.org/presentationml/2006/main">
+  <p:cSld>
+    <p:bg>
+      <p:bgPr>
+        <a:solidFill>
+          <a:schemeClr val="tx1"/>
+        </a:solidFill>
+        <a:effectLst/>
+      </p:bgPr>
+    </p:bg>
+    <p:spTree>
+      <p:nvGrpSpPr>
+        <p:cNvPr id="1" name=""/>
+        <p:cNvGrpSpPr/>
+        <p:nvPr/>
+      </p:nvGrpSpPr>
+      <p:grpSpPr>
+        <a:xfrm>
+          <a:off x="0" y="0"/>
+          <a:ext cx="0" cy="0"/>
+          <a:chOff x="0" y="0"/>
+          <a:chExt cx="0" cy="0"/>
+        </a:xfrm>
+      </p:grpSpPr>
+      <p:pic>
+        <p:nvPicPr>
+          <p:cNvPr id="5" name="Picture 4">
+            <a:extLst>
+              <a:ext uri="{FF2B5EF4-FFF2-40B4-BE49-F238E27FC236}">
+                <a16:creationId xmlns:a16="http://schemas.microsoft.com/office/drawing/2014/main" id="{30319B7A-125E-D449-9FDC-AB62251D03B4}"/>
+              </a:ext>
+            </a:extLst>
+          </p:cNvPr>
+          <p:cNvPicPr>
+            <a:picLocks noChangeAspect="1"/>
+          </p:cNvPicPr>
+          <p:nvPr/>
+        </p:nvPicPr>
+        <p:blipFill>
+          <a:blip r:embed="rId2"/>
+          <a:stretch>
+            <a:fillRect/>
+          </a:stretch>
+        </p:blipFill>
+        <p:spPr>
+          <a:xfrm>
+            <a:off x="1359243" y="111719"/>
+            <a:ext cx="3188043" cy="6532693"/>
+          </a:xfrm>
+          <a:prstGeom prst="rect">
+            <a:avLst/>
+          </a:prstGeom>
+        </p:spPr>
+      </p:pic>
+      <p:pic>
+        <p:nvPicPr>
+          <p:cNvPr id="6" name="Picture 5">
+            <a:extLst>
+              <a:ext uri="{FF2B5EF4-FFF2-40B4-BE49-F238E27FC236}">
+                <a16:creationId xmlns:a16="http://schemas.microsoft.com/office/drawing/2014/main" id="{0DE42DC2-10F7-DB4C-B45C-98CDAD819DDB}"/>
+              </a:ext>
+            </a:extLst>
+          </p:cNvPr>
+          <p:cNvPicPr>
+            <a:picLocks noChangeAspect="1"/>
+          </p:cNvPicPr>
+          <p:nvPr/>
+        </p:nvPicPr>
+        <p:blipFill>
+          <a:blip r:embed="rId3"/>
+          <a:stretch>
+            <a:fillRect/>
+          </a:stretch>
+        </p:blipFill>
+        <p:spPr>
+          <a:xfrm>
+            <a:off x="6156271" y="3084105"/>
+            <a:ext cx="4779659" cy="711864"/>
+          </a:xfrm>
+          <a:prstGeom prst="rect">
+            <a:avLst/>
+          </a:prstGeom>
+        </p:spPr>
+      </p:pic>
+      <p:cxnSp>
+        <p:nvCxnSpPr>
+          <p:cNvPr id="9" name="Straight Arrow Connector 8">
+            <a:extLst>
+              <a:ext uri="{FF2B5EF4-FFF2-40B4-BE49-F238E27FC236}">
+                <a16:creationId xmlns:a16="http://schemas.microsoft.com/office/drawing/2014/main" id="{38B8EBC7-9C67-2640-923E-CAFC48D4E8CC}"/>
+              </a:ext>
+            </a:extLst>
+          </p:cNvPr>
+          <p:cNvCxnSpPr>
+            <a:cxnSpLocks/>
+          </p:cNvCxnSpPr>
+          <p:nvPr/>
+        </p:nvCxnSpPr>
+        <p:spPr>
+          <a:xfrm flipV="1">
+            <a:off x="3022600" y="3795970"/>
+            <a:ext cx="3233853" cy="2560380"/>
+          </a:xfrm>
+          <a:prstGeom prst="straightConnector1">
+            <a:avLst/>
+          </a:prstGeom>
+          <a:ln w="50800">
+            <a:solidFill>
+              <a:srgbClr val="C00000"/>
+            </a:solidFill>
+            <a:tailEnd type="triangle"/>
+          </a:ln>
+        </p:spPr>
+        <p:style>
+          <a:lnRef idx="1">
+            <a:schemeClr val="accent1"/>
+          </a:lnRef>
+          <a:fillRef idx="0">
+            <a:schemeClr val="accent1"/>
+          </a:fillRef>
+          <a:effectRef idx="0">
+            <a:schemeClr val="accent1"/>
+          </a:effectRef>
+          <a:fontRef idx="minor">
+            <a:schemeClr val="tx1"/>
+          </a:fontRef>
+        </p:style>
+      </p:cxnSp>
+      <p:sp>
+        <p:nvSpPr>
+          <p:cNvPr id="2" name="Rectangle 1">
+            <a:extLst>
+              <a:ext uri="{FF2B5EF4-FFF2-40B4-BE49-F238E27FC236}">
+                <a16:creationId xmlns:a16="http://schemas.microsoft.com/office/drawing/2014/main" id="{EE51A9D0-805F-4945-A946-D70E958D7B9C}"/>
+              </a:ext>
+            </a:extLst>
+          </p:cNvPr>
+          <p:cNvSpPr/>
+          <p:nvPr/>
+        </p:nvSpPr>
+        <p:spPr>
+          <a:xfrm>
+            <a:off x="1517650" y="6356350"/>
+            <a:ext cx="1504950" cy="234950"/>
+          </a:xfrm>
+          <a:prstGeom prst="rect">
+            <a:avLst/>
+          </a:prstGeom>
+          <a:noFill/>
+          <a:ln w="50800">
+            <a:solidFill>
+              <a:srgbClr val="C00000"/>
+            </a:solidFill>
+          </a:ln>
+        </p:spPr>
+        <p:style>
+          <a:lnRef idx="2">
+            <a:schemeClr val="accent1">
+              <a:shade val="50000"/>
+            </a:schemeClr>
+          </a:lnRef>
+          <a:fillRef idx="1">
+            <a:schemeClr val="accent1"/>
+          </a:fillRef>
+          <a:effectRef idx="0">
+            <a:schemeClr val="accent1"/>
+          </a:effectRef>
+          <a:fontRef idx="minor">
+            <a:schemeClr val="lt1"/>
+          </a:fontRef>
+        </p:style>
+        <p:txBody>
+          <a:bodyPr rtlCol="0" anchor="ctr"/>
+          <a:lstStyle/>
+          <a:p>
+            <a:pPr algn="ctr"/>
+            <a:endParaRPr lang="en-US"/>
+          </a:p>
+        </p:txBody>
+      </p:sp>
+    </p:spTree>
+    <p:extLst>
+      <p:ext uri="{BB962C8B-B14F-4D97-AF65-F5344CB8AC3E}">
+        <p14:creationId xmlns:p14="http://schemas.microsoft.com/office/powerpoint/2010/main" val="747376768"/>
+      </p:ext>
+    </p:extLst>
+  </p:cSld>
+  <p:clrMapOvr>
+    <a:masterClrMapping/>
+  </p:clrMapOvr>
+</p:sld>
+</file>
+
+<file path=ppt/slides/slide11.xml><?xml version="1.0" encoding="utf-8"?>
+<p:sld xmlns:a="http://schemas.openxmlformats.org/drawingml/2006/main" xmlns:r="http://schemas.openxmlformats.org/officeDocument/2006/relationships" xmlns:p="http://schemas.openxmlformats.org/presentationml/2006/main">
+  <p:cSld>
+    <p:bg>
+      <p:bgPr>
+        <a:solidFill>
+          <a:schemeClr val="tx1"/>
+        </a:solidFill>
+        <a:effectLst/>
+      </p:bgPr>
+    </p:bg>
+    <p:spTree>
+      <p:nvGrpSpPr>
+        <p:cNvPr id="1" name=""/>
+        <p:cNvGrpSpPr/>
+        <p:nvPr/>
+      </p:nvGrpSpPr>
+      <p:grpSpPr>
+        <a:xfrm>
+          <a:off x="0" y="0"/>
+          <a:ext cx="0" cy="0"/>
+          <a:chOff x="0" y="0"/>
+          <a:chExt cx="0" cy="0"/>
+        </a:xfrm>
+      </p:grpSpPr>
+      <p:sp>
+        <p:nvSpPr>
+          <p:cNvPr id="2" name="Title 1">
+            <a:extLst>
+              <a:ext uri="{FF2B5EF4-FFF2-40B4-BE49-F238E27FC236}">
+                <a16:creationId xmlns:a16="http://schemas.microsoft.com/office/drawing/2014/main" id="{9B4F2AFD-FB97-344A-8B10-5D002B15F583}"/>
+              </a:ext>
+            </a:extLst>
+          </p:cNvPr>
+          <p:cNvSpPr>
+            <a:spLocks noGrp="1"/>
+          </p:cNvSpPr>
+          <p:nvPr>
+            <p:ph type="title"/>
+          </p:nvPr>
+        </p:nvSpPr>
+        <p:spPr/>
+        <p:txBody>
+          <a:bodyPr/>
+          <a:lstStyle/>
+          <a:p>
+            <a:r>
+              <a:rPr lang="en-US" dirty="0">
+                <a:solidFill>
+                  <a:schemeClr val="bg1"/>
+                </a:solidFill>
+              </a:rPr>
+              <a:t>Results</a:t>
+            </a:r>
+          </a:p>
+        </p:txBody>
+      </p:sp>
+      <p:sp>
+        <p:nvSpPr>
+          <p:cNvPr id="5" name="Content Placeholder 2">
+            <a:extLst>
+              <a:ext uri="{FF2B5EF4-FFF2-40B4-BE49-F238E27FC236}">
+                <a16:creationId xmlns:a16="http://schemas.microsoft.com/office/drawing/2014/main" id="{C85AA5F1-A225-4DA8-BC21-9B326A52F04E}"/>
+              </a:ext>
+            </a:extLst>
+          </p:cNvPr>
+          <p:cNvSpPr>
+            <a:spLocks noGrp="1"/>
+          </p:cNvSpPr>
+          <p:nvPr>
+            <p:ph idx="1"/>
+          </p:nvPr>
+        </p:nvSpPr>
+        <p:spPr>
+          <a:xfrm>
+            <a:off x="1141412" y="2249487"/>
+            <a:ext cx="9905999" cy="3541714"/>
+          </a:xfrm>
+        </p:spPr>
+        <p:txBody>
+          <a:bodyPr/>
+          <a:lstStyle/>
+          <a:p>
+            <a:r>
+              <a:rPr lang="en-US" dirty="0">
+                <a:solidFill>
+                  <a:schemeClr val="bg1"/>
+                </a:solidFill>
+              </a:rPr>
+              <a:t>Proofs</a:t>
+            </a:r>
+          </a:p>
+          <a:p>
+            <a:r>
+              <a:rPr lang="en-US" dirty="0">
+                <a:solidFill>
+                  <a:schemeClr val="bg1"/>
+                </a:solidFill>
+              </a:rPr>
+              <a:t>Counterexample of the converse</a:t>
+            </a:r>
+          </a:p>
+          <a:p>
+            <a:r>
+              <a:rPr lang="en-US" dirty="0">
+                <a:solidFill>
+                  <a:schemeClr val="bg1"/>
+                </a:solidFill>
+              </a:rPr>
+              <a:t>Implications of these results</a:t>
+            </a:r>
+          </a:p>
+        </p:txBody>
+      </p:sp>
+    </p:spTree>
+    <p:extLst>
+      <p:ext uri="{BB962C8B-B14F-4D97-AF65-F5344CB8AC3E}">
+        <p14:creationId xmlns:p14="http://schemas.microsoft.com/office/powerpoint/2010/main" val="507443131"/>
+      </p:ext>
+    </p:extLst>
+  </p:cSld>
+  <p:clrMapOvr>
+    <a:masterClrMapping/>
+  </p:clrMapOvr>
+</p:sld>
+</file>
+
+<file path=ppt/slides/slide12.xml><?xml version="1.0" encoding="utf-8"?>
 <p:sld xmlns:a="http://schemas.openxmlformats.org/drawingml/2006/main" xmlns:r="http://schemas.openxmlformats.org/officeDocument/2006/relationships" xmlns:p="http://schemas.openxmlformats.org/presentationml/2006/main">
   <p:cSld>
     <p:bg>
@@ -13670,7 +13993,7 @@
         </p:blipFill>
         <p:spPr>
           <a:xfrm>
-            <a:off x="6461122" y="2939230"/>
+            <a:off x="6038851" y="2939230"/>
             <a:ext cx="4586289" cy="2162228"/>
           </a:xfrm>
           <a:prstGeom prst="rect">
@@ -13817,7 +14140,7 @@
         </p:blipFill>
         <p:spPr bwMode="auto">
           <a:xfrm>
-            <a:off x="1141412" y="3062287"/>
+            <a:off x="7167560" y="2862261"/>
             <a:ext cx="3879851" cy="2909888"/>
           </a:xfrm>
           <a:prstGeom prst="rect">
@@ -13946,6 +14269,163 @@
               <a:t>Hilbert-style</a:t>
             </a:r>
           </a:p>
+        </p:txBody>
+      </p:sp>
+      <p:cxnSp>
+        <p:nvCxnSpPr>
+          <p:cNvPr id="5" name="Straight Arrow Connector 4">
+            <a:extLst>
+              <a:ext uri="{FF2B5EF4-FFF2-40B4-BE49-F238E27FC236}">
+                <a16:creationId xmlns:a16="http://schemas.microsoft.com/office/drawing/2014/main" id="{E68424C3-9B9E-6440-99BC-86C7FBD54F42}"/>
+              </a:ext>
+            </a:extLst>
+          </p:cNvPr>
+          <p:cNvCxnSpPr>
+            <a:cxnSpLocks/>
+          </p:cNvCxnSpPr>
+          <p:nvPr/>
+        </p:nvCxnSpPr>
+        <p:spPr>
+          <a:xfrm>
+            <a:off x="3267456" y="3023616"/>
+            <a:ext cx="2157984" cy="0"/>
+          </a:xfrm>
+          <a:prstGeom prst="straightConnector1">
+            <a:avLst/>
+          </a:prstGeom>
+          <a:ln w="50800">
+            <a:solidFill>
+              <a:srgbClr val="C00000"/>
+            </a:solidFill>
+            <a:tailEnd type="triangle"/>
+          </a:ln>
+        </p:spPr>
+        <p:style>
+          <a:lnRef idx="1">
+            <a:schemeClr val="accent1"/>
+          </a:lnRef>
+          <a:fillRef idx="0">
+            <a:schemeClr val="accent1"/>
+          </a:fillRef>
+          <a:effectRef idx="0">
+            <a:schemeClr val="accent1"/>
+          </a:effectRef>
+          <a:fontRef idx="minor">
+            <a:schemeClr val="tx1"/>
+          </a:fontRef>
+        </p:style>
+      </p:cxnSp>
+    </p:spTree>
+    <p:extLst>
+      <p:ext uri="{BB962C8B-B14F-4D97-AF65-F5344CB8AC3E}">
+        <p14:creationId xmlns:p14="http://schemas.microsoft.com/office/powerpoint/2010/main" val="1279424676"/>
+      </p:ext>
+    </p:extLst>
+  </p:cSld>
+  <p:clrMapOvr>
+    <a:masterClrMapping/>
+  </p:clrMapOvr>
+</p:sld>
+</file>
+
+<file path=ppt/slides/slide7.xml><?xml version="1.0" encoding="utf-8"?>
+<p:sld xmlns:a="http://schemas.openxmlformats.org/drawingml/2006/main" xmlns:r="http://schemas.openxmlformats.org/officeDocument/2006/relationships" xmlns:p="http://schemas.openxmlformats.org/presentationml/2006/main">
+  <p:cSld>
+    <p:bg>
+      <p:bgPr>
+        <a:solidFill>
+          <a:schemeClr val="tx1"/>
+        </a:solidFill>
+        <a:effectLst/>
+      </p:bgPr>
+    </p:bg>
+    <p:spTree>
+      <p:nvGrpSpPr>
+        <p:cNvPr id="1" name=""/>
+        <p:cNvGrpSpPr/>
+        <p:nvPr/>
+      </p:nvGrpSpPr>
+      <p:grpSpPr>
+        <a:xfrm>
+          <a:off x="0" y="0"/>
+          <a:ext cx="0" cy="0"/>
+          <a:chOff x="0" y="0"/>
+          <a:chExt cx="0" cy="0"/>
+        </a:xfrm>
+      </p:grpSpPr>
+      <p:sp>
+        <p:nvSpPr>
+          <p:cNvPr id="2" name="Title 1">
+            <a:extLst>
+              <a:ext uri="{FF2B5EF4-FFF2-40B4-BE49-F238E27FC236}">
+                <a16:creationId xmlns:a16="http://schemas.microsoft.com/office/drawing/2014/main" id="{A9EA4B56-D166-834F-8E0D-9EB56367FDD4}"/>
+              </a:ext>
+            </a:extLst>
+          </p:cNvPr>
+          <p:cNvSpPr>
+            <a:spLocks noGrp="1"/>
+          </p:cNvSpPr>
+          <p:nvPr>
+            <p:ph type="title"/>
+          </p:nvPr>
+        </p:nvSpPr>
+        <p:spPr/>
+        <p:txBody>
+          <a:bodyPr/>
+          <a:lstStyle/>
+          <a:p>
+            <a:r>
+              <a:rPr lang="en-US" dirty="0">
+                <a:solidFill>
+                  <a:schemeClr val="bg1"/>
+                </a:solidFill>
+              </a:rPr>
+              <a:t>methodology</a:t>
+            </a:r>
+          </a:p>
+        </p:txBody>
+      </p:sp>
+      <p:sp>
+        <p:nvSpPr>
+          <p:cNvPr id="3" name="Content Placeholder 2">
+            <a:extLst>
+              <a:ext uri="{FF2B5EF4-FFF2-40B4-BE49-F238E27FC236}">
+                <a16:creationId xmlns:a16="http://schemas.microsoft.com/office/drawing/2014/main" id="{E90549A8-450F-334F-8285-A26A2A94C0D9}"/>
+              </a:ext>
+            </a:extLst>
+          </p:cNvPr>
+          <p:cNvSpPr>
+            <a:spLocks noGrp="1"/>
+          </p:cNvSpPr>
+          <p:nvPr>
+            <p:ph idx="1"/>
+          </p:nvPr>
+        </p:nvSpPr>
+        <p:spPr/>
+        <p:txBody>
+          <a:bodyPr/>
+          <a:lstStyle/>
+          <a:p>
+            <a:r>
+              <a:rPr lang="en-US" dirty="0">
+                <a:solidFill>
+                  <a:schemeClr val="bg1"/>
+                </a:solidFill>
+              </a:rPr>
+              <a:t>Proof calculi</a:t>
+            </a:r>
+          </a:p>
+          <a:p>
+            <a:pPr lvl="1"/>
+            <a:r>
+              <a:rPr lang="en-US" dirty="0">
+                <a:solidFill>
+                  <a:schemeClr val="bg1"/>
+                </a:solidFill>
+              </a:rPr>
+              <a:t>Hilbert-style</a:t>
+            </a:r>
+          </a:p>
           <a:p>
             <a:pPr lvl="1"/>
             <a:r>
@@ -13955,17 +14435,6 @@
                 </a:solidFill>
               </a:rPr>
               <a:t>Natural deduction</a:t>
-            </a:r>
-          </a:p>
-          <a:p>
-            <a:pPr lvl="1"/>
-            <a:r>
-              <a:rPr lang="en-US" dirty="0">
-                <a:solidFill>
-                  <a:schemeClr val="bg1"/>
-                </a:solidFill>
-              </a:rPr>
-              <a:t>Equational system</a:t>
             </a:r>
           </a:p>
         </p:txBody>
@@ -14000,10 +14469,233 @@
           </a:prstGeom>
         </p:spPr>
       </p:pic>
+      <p:cxnSp>
+        <p:nvCxnSpPr>
+          <p:cNvPr id="5" name="Straight Arrow Connector 4">
+            <a:extLst>
+              <a:ext uri="{FF2B5EF4-FFF2-40B4-BE49-F238E27FC236}">
+                <a16:creationId xmlns:a16="http://schemas.microsoft.com/office/drawing/2014/main" id="{453DC1EB-99E4-5745-B94D-0DD454F72616}"/>
+              </a:ext>
+            </a:extLst>
+          </p:cNvPr>
+          <p:cNvCxnSpPr>
+            <a:cxnSpLocks/>
+          </p:cNvCxnSpPr>
+          <p:nvPr/>
+        </p:nvCxnSpPr>
+        <p:spPr>
+          <a:xfrm>
+            <a:off x="3840480" y="3438144"/>
+            <a:ext cx="2157984" cy="0"/>
+          </a:xfrm>
+          <a:prstGeom prst="straightConnector1">
+            <a:avLst/>
+          </a:prstGeom>
+          <a:ln w="50800">
+            <a:solidFill>
+              <a:srgbClr val="C00000"/>
+            </a:solidFill>
+            <a:tailEnd type="triangle"/>
+          </a:ln>
+        </p:spPr>
+        <p:style>
+          <a:lnRef idx="1">
+            <a:schemeClr val="accent1"/>
+          </a:lnRef>
+          <a:fillRef idx="0">
+            <a:schemeClr val="accent1"/>
+          </a:fillRef>
+          <a:effectRef idx="0">
+            <a:schemeClr val="accent1"/>
+          </a:effectRef>
+          <a:fontRef idx="minor">
+            <a:schemeClr val="tx1"/>
+          </a:fontRef>
+        </p:style>
+      </p:cxnSp>
     </p:spTree>
     <p:extLst>
       <p:ext uri="{BB962C8B-B14F-4D97-AF65-F5344CB8AC3E}">
-        <p14:creationId xmlns:p14="http://schemas.microsoft.com/office/powerpoint/2010/main" val="1279424676"/>
+        <p14:creationId xmlns:p14="http://schemas.microsoft.com/office/powerpoint/2010/main" val="552688756"/>
+      </p:ext>
+    </p:extLst>
+  </p:cSld>
+  <p:clrMapOvr>
+    <a:masterClrMapping/>
+  </p:clrMapOvr>
+</p:sld>
+</file>
+
+<file path=ppt/slides/slide8.xml><?xml version="1.0" encoding="utf-8"?>
+<p:sld xmlns:a="http://schemas.openxmlformats.org/drawingml/2006/main" xmlns:r="http://schemas.openxmlformats.org/officeDocument/2006/relationships" xmlns:p="http://schemas.openxmlformats.org/presentationml/2006/main">
+  <p:cSld>
+    <p:bg>
+      <p:bgPr>
+        <a:solidFill>
+          <a:schemeClr val="tx1"/>
+        </a:solidFill>
+        <a:effectLst/>
+      </p:bgPr>
+    </p:bg>
+    <p:spTree>
+      <p:nvGrpSpPr>
+        <p:cNvPr id="1" name=""/>
+        <p:cNvGrpSpPr/>
+        <p:nvPr/>
+      </p:nvGrpSpPr>
+      <p:grpSpPr>
+        <a:xfrm>
+          <a:off x="0" y="0"/>
+          <a:ext cx="0" cy="0"/>
+          <a:chOff x="0" y="0"/>
+          <a:chExt cx="0" cy="0"/>
+        </a:xfrm>
+      </p:grpSpPr>
+      <p:sp>
+        <p:nvSpPr>
+          <p:cNvPr id="2" name="Title 1">
+            <a:extLst>
+              <a:ext uri="{FF2B5EF4-FFF2-40B4-BE49-F238E27FC236}">
+                <a16:creationId xmlns:a16="http://schemas.microsoft.com/office/drawing/2014/main" id="{A9EA4B56-D166-834F-8E0D-9EB56367FDD4}"/>
+              </a:ext>
+            </a:extLst>
+          </p:cNvPr>
+          <p:cNvSpPr>
+            <a:spLocks noGrp="1"/>
+          </p:cNvSpPr>
+          <p:nvPr>
+            <p:ph type="title"/>
+          </p:nvPr>
+        </p:nvSpPr>
+        <p:spPr/>
+        <p:txBody>
+          <a:bodyPr/>
+          <a:lstStyle/>
+          <a:p>
+            <a:r>
+              <a:rPr lang="en-US" dirty="0">
+                <a:solidFill>
+                  <a:schemeClr val="bg1"/>
+                </a:solidFill>
+              </a:rPr>
+              <a:t>methodology</a:t>
+            </a:r>
+          </a:p>
+        </p:txBody>
+      </p:sp>
+      <p:sp>
+        <p:nvSpPr>
+          <p:cNvPr id="3" name="Content Placeholder 2">
+            <a:extLst>
+              <a:ext uri="{FF2B5EF4-FFF2-40B4-BE49-F238E27FC236}">
+                <a16:creationId xmlns:a16="http://schemas.microsoft.com/office/drawing/2014/main" id="{E90549A8-450F-334F-8285-A26A2A94C0D9}"/>
+              </a:ext>
+            </a:extLst>
+          </p:cNvPr>
+          <p:cNvSpPr>
+            <a:spLocks noGrp="1"/>
+          </p:cNvSpPr>
+          <p:nvPr>
+            <p:ph idx="1"/>
+          </p:nvPr>
+        </p:nvSpPr>
+        <p:spPr/>
+        <p:txBody>
+          <a:bodyPr/>
+          <a:lstStyle/>
+          <a:p>
+            <a:r>
+              <a:rPr lang="en-US" dirty="0">
+                <a:solidFill>
+                  <a:schemeClr val="bg1"/>
+                </a:solidFill>
+              </a:rPr>
+              <a:t>Proof calculi</a:t>
+            </a:r>
+          </a:p>
+          <a:p>
+            <a:pPr lvl="1"/>
+            <a:r>
+              <a:rPr lang="en-US" dirty="0">
+                <a:solidFill>
+                  <a:schemeClr val="bg1"/>
+                </a:solidFill>
+              </a:rPr>
+              <a:t>Hilbert-style</a:t>
+            </a:r>
+          </a:p>
+          <a:p>
+            <a:pPr lvl="1"/>
+            <a:r>
+              <a:rPr lang="en-US" dirty="0">
+                <a:solidFill>
+                  <a:schemeClr val="bg1"/>
+                </a:solidFill>
+              </a:rPr>
+              <a:t>Natural deduction</a:t>
+            </a:r>
+          </a:p>
+          <a:p>
+            <a:pPr lvl="1"/>
+            <a:r>
+              <a:rPr lang="en-US" dirty="0">
+                <a:solidFill>
+                  <a:schemeClr val="bg1"/>
+                </a:solidFill>
+              </a:rPr>
+              <a:t>Equational system</a:t>
+            </a:r>
+          </a:p>
+        </p:txBody>
+      </p:sp>
+      <p:cxnSp>
+        <p:nvCxnSpPr>
+          <p:cNvPr id="5" name="Straight Arrow Connector 4">
+            <a:extLst>
+              <a:ext uri="{FF2B5EF4-FFF2-40B4-BE49-F238E27FC236}">
+                <a16:creationId xmlns:a16="http://schemas.microsoft.com/office/drawing/2014/main" id="{111684FE-FA8C-6F4C-B3AE-19BE90A503FB}"/>
+              </a:ext>
+            </a:extLst>
+          </p:cNvPr>
+          <p:cNvCxnSpPr>
+            <a:cxnSpLocks/>
+          </p:cNvCxnSpPr>
+          <p:nvPr/>
+        </p:nvCxnSpPr>
+        <p:spPr>
+          <a:xfrm>
+            <a:off x="3756406" y="3868166"/>
+            <a:ext cx="2157984" cy="0"/>
+          </a:xfrm>
+          <a:prstGeom prst="straightConnector1">
+            <a:avLst/>
+          </a:prstGeom>
+          <a:ln w="50800">
+            <a:solidFill>
+              <a:srgbClr val="C00000"/>
+            </a:solidFill>
+            <a:tailEnd type="triangle"/>
+          </a:ln>
+        </p:spPr>
+        <p:style>
+          <a:lnRef idx="1">
+            <a:schemeClr val="accent1"/>
+          </a:lnRef>
+          <a:fillRef idx="0">
+            <a:schemeClr val="accent1"/>
+          </a:fillRef>
+          <a:effectRef idx="0">
+            <a:schemeClr val="accent1"/>
+          </a:effectRef>
+          <a:fontRef idx="minor">
+            <a:schemeClr val="tx1"/>
+          </a:fontRef>
+        </p:style>
+      </p:cxnSp>
+    </p:spTree>
+    <p:extLst>
+      <p:ext uri="{BB962C8B-B14F-4D97-AF65-F5344CB8AC3E}">
+        <p14:creationId xmlns:p14="http://schemas.microsoft.com/office/powerpoint/2010/main" val="384457486"/>
       </p:ext>
     </p:extLst>
   </p:cSld>
@@ -14095,201 +14787,7 @@
 </p:sld>
 </file>
 
-<file path=ppt/slides/slide7.xml><?xml version="1.0" encoding="utf-8"?>
-<p:sld xmlns:a="http://schemas.openxmlformats.org/drawingml/2006/main" xmlns:r="http://schemas.openxmlformats.org/officeDocument/2006/relationships" xmlns:p="http://schemas.openxmlformats.org/presentationml/2006/main">
-  <p:cSld>
-    <p:bg>
-      <p:bgPr>
-        <a:solidFill>
-          <a:schemeClr val="tx1"/>
-        </a:solidFill>
-        <a:effectLst/>
-      </p:bgPr>
-    </p:bg>
-    <p:spTree>
-      <p:nvGrpSpPr>
-        <p:cNvPr id="1" name=""/>
-        <p:cNvGrpSpPr/>
-        <p:nvPr/>
-      </p:nvGrpSpPr>
-      <p:grpSpPr>
-        <a:xfrm>
-          <a:off x="0" y="0"/>
-          <a:ext cx="0" cy="0"/>
-          <a:chOff x="0" y="0"/>
-          <a:chExt cx="0" cy="0"/>
-        </a:xfrm>
-      </p:grpSpPr>
-      <p:pic>
-        <p:nvPicPr>
-          <p:cNvPr id="5" name="Picture 4">
-            <a:extLst>
-              <a:ext uri="{FF2B5EF4-FFF2-40B4-BE49-F238E27FC236}">
-                <a16:creationId xmlns:a16="http://schemas.microsoft.com/office/drawing/2014/main" id="{30319B7A-125E-D449-9FDC-AB62251D03B4}"/>
-              </a:ext>
-            </a:extLst>
-          </p:cNvPr>
-          <p:cNvPicPr>
-            <a:picLocks noChangeAspect="1"/>
-          </p:cNvPicPr>
-          <p:nvPr/>
-        </p:nvPicPr>
-        <p:blipFill>
-          <a:blip r:embed="rId2"/>
-          <a:stretch>
-            <a:fillRect/>
-          </a:stretch>
-        </p:blipFill>
-        <p:spPr>
-          <a:xfrm>
-            <a:off x="1359243" y="111719"/>
-            <a:ext cx="3188043" cy="6532693"/>
-          </a:xfrm>
-          <a:prstGeom prst="rect">
-            <a:avLst/>
-          </a:prstGeom>
-        </p:spPr>
-      </p:pic>
-      <p:pic>
-        <p:nvPicPr>
-          <p:cNvPr id="6" name="Picture 5">
-            <a:extLst>
-              <a:ext uri="{FF2B5EF4-FFF2-40B4-BE49-F238E27FC236}">
-                <a16:creationId xmlns:a16="http://schemas.microsoft.com/office/drawing/2014/main" id="{0DE42DC2-10F7-DB4C-B45C-98CDAD819DDB}"/>
-              </a:ext>
-            </a:extLst>
-          </p:cNvPr>
-          <p:cNvPicPr>
-            <a:picLocks noChangeAspect="1"/>
-          </p:cNvPicPr>
-          <p:nvPr/>
-        </p:nvPicPr>
-        <p:blipFill>
-          <a:blip r:embed="rId3"/>
-          <a:stretch>
-            <a:fillRect/>
-          </a:stretch>
-        </p:blipFill>
-        <p:spPr>
-          <a:xfrm>
-            <a:off x="6156271" y="3084105"/>
-            <a:ext cx="4779659" cy="711864"/>
-          </a:xfrm>
-          <a:prstGeom prst="rect">
-            <a:avLst/>
-          </a:prstGeom>
-        </p:spPr>
-      </p:pic>
-      <p:cxnSp>
-        <p:nvCxnSpPr>
-          <p:cNvPr id="9" name="Straight Arrow Connector 8">
-            <a:extLst>
-              <a:ext uri="{FF2B5EF4-FFF2-40B4-BE49-F238E27FC236}">
-                <a16:creationId xmlns:a16="http://schemas.microsoft.com/office/drawing/2014/main" id="{38B8EBC7-9C67-2640-923E-CAFC48D4E8CC}"/>
-              </a:ext>
-            </a:extLst>
-          </p:cNvPr>
-          <p:cNvCxnSpPr>
-            <a:cxnSpLocks/>
-          </p:cNvCxnSpPr>
-          <p:nvPr/>
-        </p:nvCxnSpPr>
-        <p:spPr>
-          <a:xfrm flipV="1">
-            <a:off x="2968228" y="3795969"/>
-            <a:ext cx="3288225" cy="2608403"/>
-          </a:xfrm>
-          <a:prstGeom prst="straightConnector1">
-            <a:avLst/>
-          </a:prstGeom>
-          <a:ln w="22225">
-            <a:solidFill>
-              <a:srgbClr val="C00000"/>
-            </a:solidFill>
-            <a:tailEnd type="triangle"/>
-          </a:ln>
-        </p:spPr>
-        <p:style>
-          <a:lnRef idx="1">
-            <a:schemeClr val="accent1"/>
-          </a:lnRef>
-          <a:fillRef idx="0">
-            <a:schemeClr val="accent1"/>
-          </a:fillRef>
-          <a:effectRef idx="0">
-            <a:schemeClr val="accent1"/>
-          </a:effectRef>
-          <a:fontRef idx="minor">
-            <a:schemeClr val="tx1"/>
-          </a:fontRef>
-        </p:style>
-      </p:cxnSp>
-      <p:sp>
-        <p:nvSpPr>
-          <p:cNvPr id="2" name="Rectangle 1">
-            <a:extLst>
-              <a:ext uri="{FF2B5EF4-FFF2-40B4-BE49-F238E27FC236}">
-                <a16:creationId xmlns:a16="http://schemas.microsoft.com/office/drawing/2014/main" id="{EE51A9D0-805F-4945-A946-D70E958D7B9C}"/>
-              </a:ext>
-            </a:extLst>
-          </p:cNvPr>
-          <p:cNvSpPr/>
-          <p:nvPr/>
-        </p:nvSpPr>
-        <p:spPr>
-          <a:xfrm>
-            <a:off x="1562100" y="6404372"/>
-            <a:ext cx="1406128" cy="145256"/>
-          </a:xfrm>
-          <a:prstGeom prst="rect">
-            <a:avLst/>
-          </a:prstGeom>
-          <a:noFill/>
-          <a:ln w="15875">
-            <a:solidFill>
-              <a:srgbClr val="C00000"/>
-            </a:solidFill>
-          </a:ln>
-        </p:spPr>
-        <p:style>
-          <a:lnRef idx="2">
-            <a:schemeClr val="accent1">
-              <a:shade val="50000"/>
-            </a:schemeClr>
-          </a:lnRef>
-          <a:fillRef idx="1">
-            <a:schemeClr val="accent1"/>
-          </a:fillRef>
-          <a:effectRef idx="0">
-            <a:schemeClr val="accent1"/>
-          </a:effectRef>
-          <a:fontRef idx="minor">
-            <a:schemeClr val="lt1"/>
-          </a:fontRef>
-        </p:style>
-        <p:txBody>
-          <a:bodyPr rtlCol="0" anchor="ctr"/>
-          <a:lstStyle/>
-          <a:p>
-            <a:pPr algn="ctr"/>
-            <a:endParaRPr lang="en-US"/>
-          </a:p>
-        </p:txBody>
-      </p:sp>
-    </p:spTree>
-    <p:extLst>
-      <p:ext uri="{BB962C8B-B14F-4D97-AF65-F5344CB8AC3E}">
-        <p14:creationId xmlns:p14="http://schemas.microsoft.com/office/powerpoint/2010/main" val="747376768"/>
-      </p:ext>
-    </p:extLst>
-  </p:cSld>
-  <p:clrMapOvr>
-    <a:masterClrMapping/>
-  </p:clrMapOvr>
-</p:sld>
-</file>
-
-<file path=ppt/slides/slide8.xml><?xml version="1.0" encoding="utf-8"?>
+<file path=ppt/slides/slide9.xml><?xml version="1.0" encoding="utf-8"?>
 <p:sld xmlns:a="http://schemas.openxmlformats.org/drawingml/2006/main" xmlns:r="http://schemas.openxmlformats.org/officeDocument/2006/relationships" xmlns:p="http://schemas.openxmlformats.org/presentationml/2006/main">
   <p:cSld>
     <p:bg>
@@ -14437,133 +14935,6 @@
     <p:extLst>
       <p:ext uri="{BB962C8B-B14F-4D97-AF65-F5344CB8AC3E}">
         <p14:creationId xmlns:p14="http://schemas.microsoft.com/office/powerpoint/2010/main" val="3520722480"/>
-      </p:ext>
-    </p:extLst>
-  </p:cSld>
-  <p:clrMapOvr>
-    <a:masterClrMapping/>
-  </p:clrMapOvr>
-</p:sld>
-</file>
-
-<file path=ppt/slides/slide9.xml><?xml version="1.0" encoding="utf-8"?>
-<p:sld xmlns:a="http://schemas.openxmlformats.org/drawingml/2006/main" xmlns:r="http://schemas.openxmlformats.org/officeDocument/2006/relationships" xmlns:p="http://schemas.openxmlformats.org/presentationml/2006/main">
-  <p:cSld>
-    <p:bg>
-      <p:bgPr>
-        <a:solidFill>
-          <a:schemeClr val="tx1"/>
-        </a:solidFill>
-        <a:effectLst/>
-      </p:bgPr>
-    </p:bg>
-    <p:spTree>
-      <p:nvGrpSpPr>
-        <p:cNvPr id="1" name=""/>
-        <p:cNvGrpSpPr/>
-        <p:nvPr/>
-      </p:nvGrpSpPr>
-      <p:grpSpPr>
-        <a:xfrm>
-          <a:off x="0" y="0"/>
-          <a:ext cx="0" cy="0"/>
-          <a:chOff x="0" y="0"/>
-          <a:chExt cx="0" cy="0"/>
-        </a:xfrm>
-      </p:grpSpPr>
-      <p:sp>
-        <p:nvSpPr>
-          <p:cNvPr id="2" name="Title 1">
-            <a:extLst>
-              <a:ext uri="{FF2B5EF4-FFF2-40B4-BE49-F238E27FC236}">
-                <a16:creationId xmlns:a16="http://schemas.microsoft.com/office/drawing/2014/main" id="{9B4F2AFD-FB97-344A-8B10-5D002B15F583}"/>
-              </a:ext>
-            </a:extLst>
-          </p:cNvPr>
-          <p:cNvSpPr>
-            <a:spLocks noGrp="1"/>
-          </p:cNvSpPr>
-          <p:nvPr>
-            <p:ph type="title"/>
-          </p:nvPr>
-        </p:nvSpPr>
-        <p:spPr/>
-        <p:txBody>
-          <a:bodyPr/>
-          <a:lstStyle/>
-          <a:p>
-            <a:r>
-              <a:rPr lang="en-US" dirty="0">
-                <a:solidFill>
-                  <a:schemeClr val="bg1"/>
-                </a:solidFill>
-              </a:rPr>
-              <a:t>Results</a:t>
-            </a:r>
-          </a:p>
-        </p:txBody>
-      </p:sp>
-      <p:sp>
-        <p:nvSpPr>
-          <p:cNvPr id="5" name="Content Placeholder 2">
-            <a:extLst>
-              <a:ext uri="{FF2B5EF4-FFF2-40B4-BE49-F238E27FC236}">
-                <a16:creationId xmlns:a16="http://schemas.microsoft.com/office/drawing/2014/main" id="{C85AA5F1-A225-4DA8-BC21-9B326A52F04E}"/>
-              </a:ext>
-            </a:extLst>
-          </p:cNvPr>
-          <p:cNvSpPr>
-            <a:spLocks noGrp="1"/>
-          </p:cNvSpPr>
-          <p:nvPr>
-            <p:ph idx="1"/>
-          </p:nvPr>
-        </p:nvSpPr>
-        <p:spPr>
-          <a:xfrm>
-            <a:off x="1141412" y="2249487"/>
-            <a:ext cx="9905999" cy="3541714"/>
-          </a:xfrm>
-        </p:spPr>
-        <p:txBody>
-          <a:bodyPr/>
-          <a:lstStyle/>
-          <a:p>
-            <a:r>
-              <a:rPr lang="en-US" dirty="0">
-                <a:solidFill>
-                  <a:schemeClr val="bg1"/>
-                </a:solidFill>
-              </a:rPr>
-              <a:t>Proofs</a:t>
-            </a:r>
-          </a:p>
-          <a:p>
-            <a:r>
-              <a:rPr lang="en-US" dirty="0">
-                <a:solidFill>
-                  <a:schemeClr val="bg1"/>
-                </a:solidFill>
-              </a:rPr>
-              <a:t>Counterexample of the converse</a:t>
-            </a:r>
-          </a:p>
-          <a:p>
-            <a:r>
-              <a:rPr lang="en-US" dirty="0">
-                <a:solidFill>
-                  <a:schemeClr val="bg1"/>
-                </a:solidFill>
-              </a:rPr>
-              <a:t>Implications of these results</a:t>
-            </a:r>
-          </a:p>
-        </p:txBody>
-      </p:sp>
-    </p:spTree>
-    <p:extLst>
-      <p:ext uri="{BB962C8B-B14F-4D97-AF65-F5344CB8AC3E}">
-        <p14:creationId xmlns:p14="http://schemas.microsoft.com/office/powerpoint/2010/main" val="507443131"/>
       </p:ext>
     </p:extLst>
   </p:cSld>

</xml_diff>

<commit_message>
Results section expanded in slides.
</commit_message>
<xml_diff>
--- a/SCCUR-slides.pptx
+++ b/SCCUR-slides.pptx
@@ -11,13 +11,18 @@
     <p:sldId id="264" r:id="rId5"/>
     <p:sldId id="271" r:id="rId6"/>
     <p:sldId id="263" r:id="rId7"/>
-    <p:sldId id="269" r:id="rId8"/>
-    <p:sldId id="259" r:id="rId9"/>
-    <p:sldId id="270" r:id="rId10"/>
-    <p:sldId id="262" r:id="rId11"/>
+    <p:sldId id="272" r:id="rId8"/>
+    <p:sldId id="269" r:id="rId9"/>
+    <p:sldId id="259" r:id="rId10"/>
+    <p:sldId id="270" r:id="rId11"/>
     <p:sldId id="265" r:id="rId12"/>
-    <p:sldId id="260" r:id="rId13"/>
-    <p:sldId id="261" r:id="rId14"/>
+    <p:sldId id="262" r:id="rId13"/>
+    <p:sldId id="260" r:id="rId14"/>
+    <p:sldId id="274" r:id="rId15"/>
+    <p:sldId id="275" r:id="rId16"/>
+    <p:sldId id="279" r:id="rId17"/>
+    <p:sldId id="278" r:id="rId18"/>
+    <p:sldId id="261" r:id="rId19"/>
   </p:sldIdLst>
   <p:sldSz cx="12192000" cy="6858000"/>
   <p:notesSz cx="6858000" cy="9144000"/>
@@ -150,6 +155,34 @@
 </p:cmLst>
 </file>
 
+<file path=ppt/comments/comment10.xml><?xml version="1.0" encoding="utf-8"?>
+<p:cmLst xmlns:a="http://schemas.openxmlformats.org/drawingml/2006/main" xmlns:r="http://schemas.openxmlformats.org/officeDocument/2006/relationships" xmlns:p="http://schemas.openxmlformats.org/presentationml/2006/main">
+  <p:cm authorId="1" dt="2018-10-17T11:36:23.685" idx="4">
+    <p:pos x="10" y="10"/>
+    <p:text>Time won't allow for going through the proofs step-by-step, but it would still be beneficial to solve a snippet of the proof with the audience.</p:text>
+    <p:extLst>
+      <p:ext uri="{C676402C-5697-4E1C-873F-D02D1690AC5C}">
+        <p15:threadingInfo xmlns:p15="http://schemas.microsoft.com/office/powerpoint/2012/main" timeZoneBias="420"/>
+      </p:ext>
+    </p:extLst>
+  </p:cm>
+</p:cmLst>
+</file>
+
+<file path=ppt/comments/comment11.xml><?xml version="1.0" encoding="utf-8"?>
+<p:cmLst xmlns:a="http://schemas.openxmlformats.org/drawingml/2006/main" xmlns:r="http://schemas.openxmlformats.org/officeDocument/2006/relationships" xmlns:p="http://schemas.openxmlformats.org/presentationml/2006/main">
+  <p:cm authorId="1" dt="2018-10-17T11:36:23.685" idx="4">
+    <p:pos x="10" y="10"/>
+    <p:text>Time won't allow for going through the proofs step-by-step, but it would still be beneficial to solve a snippet of the proof with the audience.</p:text>
+    <p:extLst>
+      <p:ext uri="{C676402C-5697-4E1C-873F-D02D1690AC5C}">
+        <p15:threadingInfo xmlns:p15="http://schemas.microsoft.com/office/powerpoint/2012/main" timeZoneBias="420"/>
+      </p:ext>
+    </p:extLst>
+  </p:cm>
+</p:cmLst>
+</file>
+
 <file path=ppt/comments/comment2.xml><?xml version="1.0" encoding="utf-8"?>
 <p:cmLst xmlns:a="http://schemas.openxmlformats.org/drawingml/2006/main" xmlns:r="http://schemas.openxmlformats.org/officeDocument/2006/relationships" xmlns:p="http://schemas.openxmlformats.org/presentationml/2006/main">
   <p:cm authorId="1" dt="2018-10-17T11:33:05.687" idx="3">
@@ -221,6 +254,29 @@
 
 <file path=ppt/comments/comment5.xml><?xml version="1.0" encoding="utf-8"?>
 <p:cmLst xmlns:a="http://schemas.openxmlformats.org/drawingml/2006/main" xmlns:r="http://schemas.openxmlformats.org/officeDocument/2006/relationships" xmlns:p="http://schemas.openxmlformats.org/presentationml/2006/main">
+  <p:cm authorId="1" dt="2018-10-31T00:11:16.368" idx="6">
+    <p:pos x="10" y="10"/>
+    <p:text>Time precludes me from giving a more complex example, so we'll do something that's common sense. We'll show that whatever isn't not, is.</p:text>
+    <p:extLst>
+      <p:ext uri="{C676402C-5697-4E1C-873F-D02D1690AC5C}">
+        <p15:threadingInfo xmlns:p15="http://schemas.microsoft.com/office/powerpoint/2012/main" timeZoneBias="420"/>
+      </p:ext>
+    </p:extLst>
+  </p:cm>
+  <p:cm authorId="1" dt="2018-10-31T00:12:11.105" idx="7">
+    <p:pos x="106" y="106"/>
+    <p:text>Assuming there's no radioactive fallout, it should be false that the sky is green!</p:text>
+    <p:extLst>
+      <p:ext uri="{C676402C-5697-4E1C-873F-D02D1690AC5C}">
+        <p15:threadingInfo xmlns:p15="http://schemas.microsoft.com/office/powerpoint/2012/main" timeZoneBias="420"/>
+      </p:ext>
+    </p:extLst>
+  </p:cm>
+</p:cmLst>
+</file>
+
+<file path=ppt/comments/comment6.xml><?xml version="1.0" encoding="utf-8"?>
+<p:cmLst xmlns:a="http://schemas.openxmlformats.org/drawingml/2006/main" xmlns:r="http://schemas.openxmlformats.org/officeDocument/2006/relationships" xmlns:p="http://schemas.openxmlformats.org/presentationml/2006/main">
   <p:cm authorId="1" dt="2018-10-31T00:37:02.310" idx="9">
     <p:pos x="3257" y="2351"/>
     <p:text>The neat feature is that the proofs can be read both ways</p:text>
@@ -233,7 +289,35 @@
 </p:cmLst>
 </file>
 
-<file path=ppt/comments/comment6.xml><?xml version="1.0" encoding="utf-8"?>
+<file path=ppt/comments/comment7.xml><?xml version="1.0" encoding="utf-8"?>
+<p:cmLst xmlns:a="http://schemas.openxmlformats.org/drawingml/2006/main" xmlns:r="http://schemas.openxmlformats.org/officeDocument/2006/relationships" xmlns:p="http://schemas.openxmlformats.org/presentationml/2006/main">
+  <p:cm authorId="1" dt="2018-10-17T11:36:23.685" idx="4">
+    <p:pos x="10" y="10"/>
+    <p:text>Time won't allow for going through the proofs step-by-step, but it would still be beneficial to solve a snippet of the proof with the audience.</p:text>
+    <p:extLst>
+      <p:ext uri="{C676402C-5697-4E1C-873F-D02D1690AC5C}">
+        <p15:threadingInfo xmlns:p15="http://schemas.microsoft.com/office/powerpoint/2012/main" timeZoneBias="420"/>
+      </p:ext>
+    </p:extLst>
+  </p:cm>
+</p:cmLst>
+</file>
+
+<file path=ppt/comments/comment8.xml><?xml version="1.0" encoding="utf-8"?>
+<p:cmLst xmlns:a="http://schemas.openxmlformats.org/drawingml/2006/main" xmlns:r="http://schemas.openxmlformats.org/officeDocument/2006/relationships" xmlns:p="http://schemas.openxmlformats.org/presentationml/2006/main">
+  <p:cm authorId="1" dt="2018-10-17T11:36:23.685" idx="4">
+    <p:pos x="10" y="10"/>
+    <p:text>Time won't allow for going through the proofs step-by-step, but it would still be beneficial to solve a snippet of the proof with the audience.</p:text>
+    <p:extLst>
+      <p:ext uri="{C676402C-5697-4E1C-873F-D02D1690AC5C}">
+        <p15:threadingInfo xmlns:p15="http://schemas.microsoft.com/office/powerpoint/2012/main" timeZoneBias="420"/>
+      </p:ext>
+    </p:extLst>
+  </p:cm>
+</p:cmLst>
+</file>
+
+<file path=ppt/comments/comment9.xml><?xml version="1.0" encoding="utf-8"?>
 <p:cmLst xmlns:a="http://schemas.openxmlformats.org/drawingml/2006/main" xmlns:r="http://schemas.openxmlformats.org/officeDocument/2006/relationships" xmlns:p="http://schemas.openxmlformats.org/presentationml/2006/main">
   <p:cm authorId="1" dt="2018-10-17T11:36:23.685" idx="4">
     <p:pos x="10" y="10"/>
@@ -304,7 +388,7 @@
           <a:noFill/>
           <a:extLst>
             <a:ext uri="{909E8E84-426E-40dd-AFC4-6F175D3DCCD1}">
-              <a14:hiddenFill xmlns="" xmlns:a14="http://schemas.microsoft.com/office/drawing/2010/main">
+              <a14:hiddenFill xmlns:a14="http://schemas.microsoft.com/office/drawing/2010/main" xmlns="">
                 <a:solidFill>
                   <a:srgbClr val="FFFFFF"/>
                 </a:solidFill>
@@ -363,7 +447,7 @@
             </a:ln>
             <a:extLst>
               <a:ext uri="{91240B29-F687-4f45-9708-019B960494DF}">
-                <a14:hiddenLine xmlns="" xmlns:a14="http://schemas.microsoft.com/office/drawing/2010/main" w="9525">
+                <a14:hiddenLine xmlns:a14="http://schemas.microsoft.com/office/drawing/2010/main" xmlns="" w="9525">
                   <a:solidFill>
                     <a:srgbClr val="000000"/>
                   </a:solidFill>
@@ -453,7 +537,7 @@
             </a:ln>
             <a:extLst>
               <a:ext uri="{91240B29-F687-4f45-9708-019B960494DF}">
-                <a14:hiddenLine xmlns="" xmlns:a14="http://schemas.microsoft.com/office/drawing/2010/main" w="9525">
+                <a14:hiddenLine xmlns:a14="http://schemas.microsoft.com/office/drawing/2010/main" xmlns="" w="9525">
                   <a:solidFill>
                     <a:srgbClr val="000000"/>
                   </a:solidFill>
@@ -543,7 +627,7 @@
             </a:ln>
             <a:extLst>
               <a:ext uri="{91240B29-F687-4f45-9708-019B960494DF}">
-                <a14:hiddenLine xmlns="" xmlns:a14="http://schemas.microsoft.com/office/drawing/2010/main" w="9525">
+                <a14:hiddenLine xmlns:a14="http://schemas.microsoft.com/office/drawing/2010/main" xmlns="" w="9525">
                   <a:solidFill>
                     <a:srgbClr val="000000"/>
                   </a:solidFill>
@@ -577,7 +661,7 @@
             </a:ln>
             <a:extLst>
               <a:ext uri="{91240B29-F687-4f45-9708-019B960494DF}">
-                <a14:hiddenLine xmlns="" xmlns:a14="http://schemas.microsoft.com/office/drawing/2010/main" w="9525">
+                <a14:hiddenLine xmlns:a14="http://schemas.microsoft.com/office/drawing/2010/main" xmlns="" w="9525">
                   <a:solidFill>
                     <a:srgbClr val="000000"/>
                   </a:solidFill>
@@ -667,7 +751,7 @@
             </a:ln>
             <a:extLst>
               <a:ext uri="{91240B29-F687-4f45-9708-019B960494DF}">
-                <a14:hiddenLine xmlns="" xmlns:a14="http://schemas.microsoft.com/office/drawing/2010/main" w="9525">
+                <a14:hiddenLine xmlns:a14="http://schemas.microsoft.com/office/drawing/2010/main" xmlns="" w="9525">
                   <a:solidFill>
                     <a:srgbClr val="000000"/>
                   </a:solidFill>
@@ -729,7 +813,7 @@
             </a:ln>
             <a:extLst>
               <a:ext uri="{91240B29-F687-4f45-9708-019B960494DF}">
-                <a14:hiddenLine xmlns="" xmlns:a14="http://schemas.microsoft.com/office/drawing/2010/main" w="9525">
+                <a14:hiddenLine xmlns:a14="http://schemas.microsoft.com/office/drawing/2010/main" xmlns="" w="9525">
                   <a:solidFill>
                     <a:srgbClr val="000000"/>
                   </a:solidFill>
@@ -791,7 +875,7 @@
             </a:ln>
             <a:extLst>
               <a:ext uri="{91240B29-F687-4f45-9708-019B960494DF}">
-                <a14:hiddenLine xmlns="" xmlns:a14="http://schemas.microsoft.com/office/drawing/2010/main" w="9525">
+                <a14:hiddenLine xmlns:a14="http://schemas.microsoft.com/office/drawing/2010/main" xmlns="" w="9525">
                   <a:solidFill>
                     <a:srgbClr val="000000"/>
                   </a:solidFill>
@@ -881,7 +965,7 @@
             </a:ln>
             <a:extLst>
               <a:ext uri="{91240B29-F687-4f45-9708-019B960494DF}">
-                <a14:hiddenLine xmlns="" xmlns:a14="http://schemas.microsoft.com/office/drawing/2010/main" w="9525">
+                <a14:hiddenLine xmlns:a14="http://schemas.microsoft.com/office/drawing/2010/main" xmlns="" w="9525">
                   <a:solidFill>
                     <a:srgbClr val="000000"/>
                   </a:solidFill>
@@ -943,7 +1027,7 @@
             </a:ln>
             <a:extLst>
               <a:ext uri="{91240B29-F687-4f45-9708-019B960494DF}">
-                <a14:hiddenLine xmlns="" xmlns:a14="http://schemas.microsoft.com/office/drawing/2010/main" w="9525">
+                <a14:hiddenLine xmlns:a14="http://schemas.microsoft.com/office/drawing/2010/main" xmlns="" w="9525">
                   <a:solidFill>
                     <a:srgbClr val="000000"/>
                   </a:solidFill>
@@ -1005,7 +1089,7 @@
             </a:ln>
             <a:extLst>
               <a:ext uri="{91240B29-F687-4f45-9708-019B960494DF}">
-                <a14:hiddenLine xmlns="" xmlns:a14="http://schemas.microsoft.com/office/drawing/2010/main" w="9525">
+                <a14:hiddenLine xmlns:a14="http://schemas.microsoft.com/office/drawing/2010/main" xmlns="" w="9525">
                   <a:solidFill>
                     <a:srgbClr val="000000"/>
                   </a:solidFill>
@@ -1095,7 +1179,7 @@
             </a:ln>
             <a:extLst>
               <a:ext uri="{91240B29-F687-4f45-9708-019B960494DF}">
-                <a14:hiddenLine xmlns="" xmlns:a14="http://schemas.microsoft.com/office/drawing/2010/main" w="9525">
+                <a14:hiddenLine xmlns:a14="http://schemas.microsoft.com/office/drawing/2010/main" xmlns="" w="9525">
                   <a:solidFill>
                     <a:srgbClr val="000000"/>
                   </a:solidFill>
@@ -1185,7 +1269,7 @@
             </a:ln>
             <a:extLst>
               <a:ext uri="{91240B29-F687-4f45-9708-019B960494DF}">
-                <a14:hiddenLine xmlns="" xmlns:a14="http://schemas.microsoft.com/office/drawing/2010/main" w="9525">
+                <a14:hiddenLine xmlns:a14="http://schemas.microsoft.com/office/drawing/2010/main" xmlns="" w="9525">
                   <a:solidFill>
                     <a:srgbClr val="000000"/>
                   </a:solidFill>
@@ -1247,7 +1331,7 @@
             </a:ln>
             <a:extLst>
               <a:ext uri="{91240B29-F687-4f45-9708-019B960494DF}">
-                <a14:hiddenLine xmlns="" xmlns:a14="http://schemas.microsoft.com/office/drawing/2010/main" w="9525">
+                <a14:hiddenLine xmlns:a14="http://schemas.microsoft.com/office/drawing/2010/main" xmlns="" w="9525">
                   <a:solidFill>
                     <a:srgbClr val="000000"/>
                   </a:solidFill>
@@ -1357,7 +1441,7 @@
             </a:ln>
             <a:extLst>
               <a:ext uri="{91240B29-F687-4f45-9708-019B960494DF}">
-                <a14:hiddenLine xmlns="" xmlns:a14="http://schemas.microsoft.com/office/drawing/2010/main" w="9525">
+                <a14:hiddenLine xmlns:a14="http://schemas.microsoft.com/office/drawing/2010/main" xmlns="" w="9525">
                   <a:solidFill>
                     <a:srgbClr val="000000"/>
                   </a:solidFill>
@@ -1419,7 +1503,7 @@
             </a:ln>
             <a:extLst>
               <a:ext uri="{91240B29-F687-4f45-9708-019B960494DF}">
-                <a14:hiddenLine xmlns="" xmlns:a14="http://schemas.microsoft.com/office/drawing/2010/main" w="9525">
+                <a14:hiddenLine xmlns:a14="http://schemas.microsoft.com/office/drawing/2010/main" xmlns="" w="9525">
                   <a:solidFill>
                     <a:srgbClr val="000000"/>
                   </a:solidFill>
@@ -1509,7 +1593,7 @@
             </a:ln>
             <a:extLst>
               <a:ext uri="{91240B29-F687-4f45-9708-019B960494DF}">
-                <a14:hiddenLine xmlns="" xmlns:a14="http://schemas.microsoft.com/office/drawing/2010/main" w="9525">
+                <a14:hiddenLine xmlns:a14="http://schemas.microsoft.com/office/drawing/2010/main" xmlns="" w="9525">
                   <a:solidFill>
                     <a:srgbClr val="000000"/>
                   </a:solidFill>
@@ -1599,7 +1683,7 @@
             </a:ln>
             <a:extLst>
               <a:ext uri="{91240B29-F687-4f45-9708-019B960494DF}">
-                <a14:hiddenLine xmlns="" xmlns:a14="http://schemas.microsoft.com/office/drawing/2010/main" w="9525">
+                <a14:hiddenLine xmlns:a14="http://schemas.microsoft.com/office/drawing/2010/main" xmlns="" w="9525">
                   <a:solidFill>
                     <a:srgbClr val="000000"/>
                   </a:solidFill>
@@ -1661,7 +1745,7 @@
             </a:ln>
             <a:extLst>
               <a:ext uri="{91240B29-F687-4f45-9708-019B960494DF}">
-                <a14:hiddenLine xmlns="" xmlns:a14="http://schemas.microsoft.com/office/drawing/2010/main" w="9525">
+                <a14:hiddenLine xmlns:a14="http://schemas.microsoft.com/office/drawing/2010/main" xmlns="" w="9525">
                   <a:solidFill>
                     <a:srgbClr val="000000"/>
                   </a:solidFill>
@@ -1751,7 +1835,7 @@
             </a:ln>
             <a:extLst>
               <a:ext uri="{91240B29-F687-4f45-9708-019B960494DF}">
-                <a14:hiddenLine xmlns="" xmlns:a14="http://schemas.microsoft.com/office/drawing/2010/main" w="9525">
+                <a14:hiddenLine xmlns:a14="http://schemas.microsoft.com/office/drawing/2010/main" xmlns="" w="9525">
                   <a:solidFill>
                     <a:srgbClr val="000000"/>
                   </a:solidFill>
@@ -1841,7 +1925,7 @@
             </a:ln>
             <a:extLst>
               <a:ext uri="{91240B29-F687-4f45-9708-019B960494DF}">
-                <a14:hiddenLine xmlns="" xmlns:a14="http://schemas.microsoft.com/office/drawing/2010/main" w="9525">
+                <a14:hiddenLine xmlns:a14="http://schemas.microsoft.com/office/drawing/2010/main" xmlns="" w="9525">
                   <a:solidFill>
                     <a:srgbClr val="000000"/>
                   </a:solidFill>
@@ -1897,7 +1981,7 @@
             </a:ln>
             <a:extLst>
               <a:ext uri="{91240B29-F687-4f45-9708-019B960494DF}">
-                <a14:hiddenLine xmlns="" xmlns:a14="http://schemas.microsoft.com/office/drawing/2010/main" w="9525">
+                <a14:hiddenLine xmlns:a14="http://schemas.microsoft.com/office/drawing/2010/main" xmlns="" w="9525">
                   <a:solidFill>
                     <a:srgbClr val="000000"/>
                   </a:solidFill>
@@ -1987,7 +2071,7 @@
             </a:ln>
             <a:extLst>
               <a:ext uri="{91240B29-F687-4f45-9708-019B960494DF}">
-                <a14:hiddenLine xmlns="" xmlns:a14="http://schemas.microsoft.com/office/drawing/2010/main" w="9525">
+                <a14:hiddenLine xmlns:a14="http://schemas.microsoft.com/office/drawing/2010/main" xmlns="" w="9525">
                   <a:solidFill>
                     <a:srgbClr val="000000"/>
                   </a:solidFill>
@@ -2043,7 +2127,7 @@
             </a:ln>
             <a:extLst>
               <a:ext uri="{91240B29-F687-4f45-9708-019B960494DF}">
-                <a14:hiddenLine xmlns="" xmlns:a14="http://schemas.microsoft.com/office/drawing/2010/main" w="9525">
+                <a14:hiddenLine xmlns:a14="http://schemas.microsoft.com/office/drawing/2010/main" xmlns="" w="9525">
                   <a:solidFill>
                     <a:srgbClr val="000000"/>
                   </a:solidFill>
@@ -2133,7 +2217,7 @@
             </a:ln>
             <a:extLst>
               <a:ext uri="{91240B29-F687-4f45-9708-019B960494DF}">
-                <a14:hiddenLine xmlns="" xmlns:a14="http://schemas.microsoft.com/office/drawing/2010/main" w="9525">
+                <a14:hiddenLine xmlns:a14="http://schemas.microsoft.com/office/drawing/2010/main" xmlns="" w="9525">
                   <a:solidFill>
                     <a:srgbClr val="000000"/>
                   </a:solidFill>
@@ -2201,7 +2285,7 @@
             </a:ln>
             <a:extLst>
               <a:ext uri="{91240B29-F687-4f45-9708-019B960494DF}">
-                <a14:hiddenLine xmlns="" xmlns:a14="http://schemas.microsoft.com/office/drawing/2010/main" w="9525">
+                <a14:hiddenLine xmlns:a14="http://schemas.microsoft.com/office/drawing/2010/main" xmlns="" w="9525">
                   <a:solidFill>
                     <a:srgbClr val="000000"/>
                   </a:solidFill>
@@ -2291,7 +2375,7 @@
             </a:ln>
             <a:extLst>
               <a:ext uri="{91240B29-F687-4f45-9708-019B960494DF}">
-                <a14:hiddenLine xmlns="" xmlns:a14="http://schemas.microsoft.com/office/drawing/2010/main" w="9525">
+                <a14:hiddenLine xmlns:a14="http://schemas.microsoft.com/office/drawing/2010/main" xmlns="" w="9525">
                   <a:solidFill>
                     <a:srgbClr val="000000"/>
                   </a:solidFill>
@@ -2359,7 +2443,7 @@
             </a:ln>
             <a:extLst>
               <a:ext uri="{91240B29-F687-4f45-9708-019B960494DF}">
-                <a14:hiddenLine xmlns="" xmlns:a14="http://schemas.microsoft.com/office/drawing/2010/main" w="9525">
+                <a14:hiddenLine xmlns:a14="http://schemas.microsoft.com/office/drawing/2010/main" xmlns="" w="9525">
                   <a:solidFill>
                     <a:srgbClr val="000000"/>
                   </a:solidFill>
@@ -2449,7 +2533,7 @@
             </a:ln>
             <a:extLst>
               <a:ext uri="{91240B29-F687-4f45-9708-019B960494DF}">
-                <a14:hiddenLine xmlns="" xmlns:a14="http://schemas.microsoft.com/office/drawing/2010/main" w="9525">
+                <a14:hiddenLine xmlns:a14="http://schemas.microsoft.com/office/drawing/2010/main" xmlns="" w="9525">
                   <a:solidFill>
                     <a:srgbClr val="000000"/>
                   </a:solidFill>
@@ -2483,7 +2567,7 @@
             </a:ln>
             <a:extLst>
               <a:ext uri="{91240B29-F687-4f45-9708-019B960494DF}">
-                <a14:hiddenLine xmlns="" xmlns:a14="http://schemas.microsoft.com/office/drawing/2010/main" w="9525">
+                <a14:hiddenLine xmlns:a14="http://schemas.microsoft.com/office/drawing/2010/main" xmlns="" w="9525">
                   <a:solidFill>
                     <a:srgbClr val="000000"/>
                   </a:solidFill>
@@ -2573,7 +2657,7 @@
             </a:ln>
             <a:extLst>
               <a:ext uri="{91240B29-F687-4f45-9708-019B960494DF}">
-                <a14:hiddenLine xmlns="" xmlns:a14="http://schemas.microsoft.com/office/drawing/2010/main" w="9525">
+                <a14:hiddenLine xmlns:a14="http://schemas.microsoft.com/office/drawing/2010/main" xmlns="" w="9525">
                   <a:solidFill>
                     <a:srgbClr val="000000"/>
                   </a:solidFill>
@@ -2635,7 +2719,7 @@
             </a:ln>
             <a:extLst>
               <a:ext uri="{91240B29-F687-4f45-9708-019B960494DF}">
-                <a14:hiddenLine xmlns="" xmlns:a14="http://schemas.microsoft.com/office/drawing/2010/main" w="9525">
+                <a14:hiddenLine xmlns:a14="http://schemas.microsoft.com/office/drawing/2010/main" xmlns="" w="9525">
                   <a:solidFill>
                     <a:srgbClr val="000000"/>
                   </a:solidFill>
@@ -2697,7 +2781,7 @@
             </a:ln>
             <a:extLst>
               <a:ext uri="{91240B29-F687-4f45-9708-019B960494DF}">
-                <a14:hiddenLine xmlns="" xmlns:a14="http://schemas.microsoft.com/office/drawing/2010/main" w="9525">
+                <a14:hiddenLine xmlns:a14="http://schemas.microsoft.com/office/drawing/2010/main" xmlns="" w="9525">
                   <a:solidFill>
                     <a:srgbClr val="000000"/>
                   </a:solidFill>
@@ -2787,7 +2871,7 @@
             </a:ln>
             <a:extLst>
               <a:ext uri="{91240B29-F687-4f45-9708-019B960494DF}">
-                <a14:hiddenLine xmlns="" xmlns:a14="http://schemas.microsoft.com/office/drawing/2010/main" w="9525">
+                <a14:hiddenLine xmlns:a14="http://schemas.microsoft.com/office/drawing/2010/main" xmlns="" w="9525">
                   <a:solidFill>
                     <a:srgbClr val="000000"/>
                   </a:solidFill>
@@ -2855,7 +2939,7 @@
             </a:ln>
             <a:extLst>
               <a:ext uri="{91240B29-F687-4f45-9708-019B960494DF}">
-                <a14:hiddenLine xmlns="" xmlns:a14="http://schemas.microsoft.com/office/drawing/2010/main" w="9525">
+                <a14:hiddenLine xmlns:a14="http://schemas.microsoft.com/office/drawing/2010/main" xmlns="" w="9525">
                   <a:solidFill>
                     <a:srgbClr val="000000"/>
                   </a:solidFill>
@@ -2917,7 +3001,7 @@
             </a:ln>
             <a:extLst>
               <a:ext uri="{91240B29-F687-4f45-9708-019B960494DF}">
-                <a14:hiddenLine xmlns="" xmlns:a14="http://schemas.microsoft.com/office/drawing/2010/main" w="9525">
+                <a14:hiddenLine xmlns:a14="http://schemas.microsoft.com/office/drawing/2010/main" xmlns="" w="9525">
                   <a:solidFill>
                     <a:srgbClr val="000000"/>
                   </a:solidFill>
@@ -3007,7 +3091,7 @@
             </a:ln>
             <a:extLst>
               <a:ext uri="{91240B29-F687-4f45-9708-019B960494DF}">
-                <a14:hiddenLine xmlns="" xmlns:a14="http://schemas.microsoft.com/office/drawing/2010/main" w="9525">
+                <a14:hiddenLine xmlns:a14="http://schemas.microsoft.com/office/drawing/2010/main" xmlns="" w="9525">
                   <a:solidFill>
                     <a:srgbClr val="000000"/>
                   </a:solidFill>
@@ -3069,7 +3153,7 @@
             </a:ln>
             <a:extLst>
               <a:ext uri="{91240B29-F687-4f45-9708-019B960494DF}">
-                <a14:hiddenLine xmlns="" xmlns:a14="http://schemas.microsoft.com/office/drawing/2010/main" w="9525">
+                <a14:hiddenLine xmlns:a14="http://schemas.microsoft.com/office/drawing/2010/main" xmlns="" w="9525">
                   <a:solidFill>
                     <a:srgbClr val="000000"/>
                   </a:solidFill>
@@ -3159,7 +3243,7 @@
             </a:ln>
             <a:extLst>
               <a:ext uri="{91240B29-F687-4f45-9708-019B960494DF}">
-                <a14:hiddenLine xmlns="" xmlns:a14="http://schemas.microsoft.com/office/drawing/2010/main" w="9525">
+                <a14:hiddenLine xmlns:a14="http://schemas.microsoft.com/office/drawing/2010/main" xmlns="" w="9525">
                   <a:solidFill>
                     <a:srgbClr val="000000"/>
                   </a:solidFill>
@@ -3221,7 +3305,7 @@
             </a:ln>
             <a:extLst>
               <a:ext uri="{91240B29-F687-4f45-9708-019B960494DF}">
-                <a14:hiddenLine xmlns="" xmlns:a14="http://schemas.microsoft.com/office/drawing/2010/main" w="9525">
+                <a14:hiddenLine xmlns:a14="http://schemas.microsoft.com/office/drawing/2010/main" xmlns="" w="9525">
                   <a:solidFill>
                     <a:srgbClr val="000000"/>
                   </a:solidFill>
@@ -3311,7 +3395,7 @@
             </a:ln>
             <a:extLst>
               <a:ext uri="{91240B29-F687-4f45-9708-019B960494DF}">
-                <a14:hiddenLine xmlns="" xmlns:a14="http://schemas.microsoft.com/office/drawing/2010/main" w="9525">
+                <a14:hiddenLine xmlns:a14="http://schemas.microsoft.com/office/drawing/2010/main" xmlns="" w="9525">
                   <a:solidFill>
                     <a:srgbClr val="000000"/>
                   </a:solidFill>
@@ -3345,7 +3429,7 @@
             </a:ln>
             <a:extLst>
               <a:ext uri="{91240B29-F687-4f45-9708-019B960494DF}">
-                <a14:hiddenLine xmlns="" xmlns:a14="http://schemas.microsoft.com/office/drawing/2010/main" w="9525">
+                <a14:hiddenLine xmlns:a14="http://schemas.microsoft.com/office/drawing/2010/main" xmlns="" w="9525">
                   <a:solidFill>
                     <a:srgbClr val="000000"/>
                   </a:solidFill>
@@ -3410,7 +3494,7 @@
             </a:ln>
             <a:extLst>
               <a:ext uri="{91240B29-F687-4f45-9708-019B960494DF}">
-                <a14:hiddenLine xmlns="" xmlns:a14="http://schemas.microsoft.com/office/drawing/2010/main" w="9525">
+                <a14:hiddenLine xmlns:a14="http://schemas.microsoft.com/office/drawing/2010/main" xmlns="" w="9525">
                   <a:solidFill>
                     <a:srgbClr val="000000"/>
                   </a:solidFill>
@@ -3500,7 +3584,7 @@
             </a:ln>
             <a:extLst>
               <a:ext uri="{91240B29-F687-4f45-9708-019B960494DF}">
-                <a14:hiddenLine xmlns="" xmlns:a14="http://schemas.microsoft.com/office/drawing/2010/main" w="9525">
+                <a14:hiddenLine xmlns:a14="http://schemas.microsoft.com/office/drawing/2010/main" xmlns="" w="9525">
                   <a:solidFill>
                     <a:srgbClr val="000000"/>
                   </a:solidFill>
@@ -3562,7 +3646,7 @@
             </a:ln>
             <a:extLst>
               <a:ext uri="{91240B29-F687-4f45-9708-019B960494DF}">
-                <a14:hiddenLine xmlns="" xmlns:a14="http://schemas.microsoft.com/office/drawing/2010/main" w="9525">
+                <a14:hiddenLine xmlns:a14="http://schemas.microsoft.com/office/drawing/2010/main" xmlns="" w="9525">
                   <a:solidFill>
                     <a:srgbClr val="000000"/>
                   </a:solidFill>
@@ -3652,7 +3736,7 @@
             </a:ln>
             <a:extLst>
               <a:ext uri="{91240B29-F687-4f45-9708-019B960494DF}">
-                <a14:hiddenLine xmlns="" xmlns:a14="http://schemas.microsoft.com/office/drawing/2010/main" w="9525">
+                <a14:hiddenLine xmlns:a14="http://schemas.microsoft.com/office/drawing/2010/main" xmlns="" w="9525">
                   <a:solidFill>
                     <a:srgbClr val="000000"/>
                   </a:solidFill>
@@ -3742,7 +3826,7 @@
             </a:ln>
             <a:extLst>
               <a:ext uri="{91240B29-F687-4f45-9708-019B960494DF}">
-                <a14:hiddenLine xmlns="" xmlns:a14="http://schemas.microsoft.com/office/drawing/2010/main" w="9525">
+                <a14:hiddenLine xmlns:a14="http://schemas.microsoft.com/office/drawing/2010/main" xmlns="" w="9525">
                   <a:solidFill>
                     <a:srgbClr val="000000"/>
                   </a:solidFill>
@@ -3807,7 +3891,7 @@
             </a:ln>
             <a:extLst>
               <a:ext uri="{91240B29-F687-4f45-9708-019B960494DF}">
-                <a14:hiddenLine xmlns="" xmlns:a14="http://schemas.microsoft.com/office/drawing/2010/main" w="9525">
+                <a14:hiddenLine xmlns:a14="http://schemas.microsoft.com/office/drawing/2010/main" xmlns="" w="9525">
                   <a:solidFill>
                     <a:srgbClr val="000000"/>
                   </a:solidFill>
@@ -3869,7 +3953,7 @@
             </a:ln>
             <a:extLst>
               <a:ext uri="{91240B29-F687-4f45-9708-019B960494DF}">
-                <a14:hiddenLine xmlns="" xmlns:a14="http://schemas.microsoft.com/office/drawing/2010/main" w="9525">
+                <a14:hiddenLine xmlns:a14="http://schemas.microsoft.com/office/drawing/2010/main" xmlns="" w="9525">
                   <a:solidFill>
                     <a:srgbClr val="000000"/>
                   </a:solidFill>
@@ -3959,7 +4043,7 @@
             </a:ln>
             <a:extLst>
               <a:ext uri="{91240B29-F687-4f45-9708-019B960494DF}">
-                <a14:hiddenLine xmlns="" xmlns:a14="http://schemas.microsoft.com/office/drawing/2010/main" w="9525">
+                <a14:hiddenLine xmlns:a14="http://schemas.microsoft.com/office/drawing/2010/main" xmlns="" w="9525">
                   <a:solidFill>
                     <a:srgbClr val="000000"/>
                   </a:solidFill>
@@ -4049,7 +4133,7 @@
             </a:ln>
             <a:extLst>
               <a:ext uri="{91240B29-F687-4f45-9708-019B960494DF}">
-                <a14:hiddenLine xmlns="" xmlns:a14="http://schemas.microsoft.com/office/drawing/2010/main" w="9525">
+                <a14:hiddenLine xmlns:a14="http://schemas.microsoft.com/office/drawing/2010/main" xmlns="" w="9525">
                   <a:solidFill>
                     <a:srgbClr val="000000"/>
                   </a:solidFill>
@@ -4111,7 +4195,7 @@
             </a:ln>
             <a:extLst>
               <a:ext uri="{91240B29-F687-4f45-9708-019B960494DF}">
-                <a14:hiddenLine xmlns="" xmlns:a14="http://schemas.microsoft.com/office/drawing/2010/main" w="9525">
+                <a14:hiddenLine xmlns:a14="http://schemas.microsoft.com/office/drawing/2010/main" xmlns="" w="9525">
                   <a:solidFill>
                     <a:srgbClr val="000000"/>
                   </a:solidFill>
@@ -4231,7 +4315,7 @@
             </a:ln>
             <a:extLst>
               <a:ext uri="{91240B29-F687-4f45-9708-019B960494DF}">
-                <a14:hiddenLine xmlns="" xmlns:a14="http://schemas.microsoft.com/office/drawing/2010/main" w="9525">
+                <a14:hiddenLine xmlns:a14="http://schemas.microsoft.com/office/drawing/2010/main" xmlns="" w="9525">
                   <a:solidFill>
                     <a:srgbClr val="000000"/>
                   </a:solidFill>
@@ -4299,7 +4383,7 @@
             </a:ln>
             <a:extLst>
               <a:ext uri="{91240B29-F687-4f45-9708-019B960494DF}">
-                <a14:hiddenLine xmlns="" xmlns:a14="http://schemas.microsoft.com/office/drawing/2010/main" w="9525">
+                <a14:hiddenLine xmlns:a14="http://schemas.microsoft.com/office/drawing/2010/main" xmlns="" w="9525">
                   <a:solidFill>
                     <a:srgbClr val="000000"/>
                   </a:solidFill>
@@ -4389,7 +4473,7 @@
             </a:ln>
             <a:extLst>
               <a:ext uri="{91240B29-F687-4f45-9708-019B960494DF}">
-                <a14:hiddenLine xmlns="" xmlns:a14="http://schemas.microsoft.com/office/drawing/2010/main" w="9525">
+                <a14:hiddenLine xmlns:a14="http://schemas.microsoft.com/office/drawing/2010/main" xmlns="" w="9525">
                   <a:solidFill>
                     <a:srgbClr val="000000"/>
                   </a:solidFill>
@@ -4529,7 +4613,7 @@
           <a:p>
             <a:fld id="{48A87A34-81AB-432B-8DAE-1953F412C126}" type="datetimeFigureOut">
               <a:rPr lang="en-US" smtClean="0"/>
-              <a:t>10/30/18</a:t>
+              <a:t>10/31/18</a:t>
             </a:fld>
             <a:endParaRPr lang="en-US" dirty="0"/>
           </a:p>
@@ -4796,7 +4880,7 @@
           <a:p>
             <a:fld id="{48A87A34-81AB-432B-8DAE-1953F412C126}" type="datetimeFigureOut">
               <a:rPr lang="en-US" smtClean="0"/>
-              <a:t>10/30/18</a:t>
+              <a:t>10/31/18</a:t>
             </a:fld>
             <a:endParaRPr lang="en-US" dirty="0"/>
           </a:p>
@@ -4992,7 +5076,7 @@
           <a:p>
             <a:fld id="{48A87A34-81AB-432B-8DAE-1953F412C126}" type="datetimeFigureOut">
               <a:rPr lang="en-US" smtClean="0"/>
-              <a:t>10/30/18</a:t>
+              <a:t>10/31/18</a:t>
             </a:fld>
             <a:endParaRPr lang="en-US" dirty="0"/>
           </a:p>
@@ -5255,7 +5339,7 @@
           <a:p>
             <a:fld id="{48A87A34-81AB-432B-8DAE-1953F412C126}" type="datetimeFigureOut">
               <a:rPr lang="en-US" smtClean="0"/>
-              <a:t>10/30/18</a:t>
+              <a:t>10/31/18</a:t>
             </a:fld>
             <a:endParaRPr lang="en-US" dirty="0"/>
           </a:p>
@@ -5689,7 +5773,7 @@
           <a:p>
             <a:fld id="{48A87A34-81AB-432B-8DAE-1953F412C126}" type="datetimeFigureOut">
               <a:rPr lang="en-US" smtClean="0"/>
-              <a:t>10/30/18</a:t>
+              <a:t>10/31/18</a:t>
             </a:fld>
             <a:endParaRPr lang="en-US" dirty="0"/>
           </a:p>
@@ -6235,7 +6319,7 @@
           <a:p>
             <a:fld id="{48A87A34-81AB-432B-8DAE-1953F412C126}" type="datetimeFigureOut">
               <a:rPr lang="en-US" smtClean="0"/>
-              <a:t>10/30/18</a:t>
+              <a:t>10/31/18</a:t>
             </a:fld>
             <a:endParaRPr lang="en-US" dirty="0"/>
           </a:p>
@@ -6955,7 +7039,7 @@
           <a:p>
             <a:fld id="{48A87A34-81AB-432B-8DAE-1953F412C126}" type="datetimeFigureOut">
               <a:rPr lang="en-US" smtClean="0"/>
-              <a:t>10/30/18</a:t>
+              <a:t>10/31/18</a:t>
             </a:fld>
             <a:endParaRPr lang="en-US" dirty="0"/>
           </a:p>
@@ -7125,7 +7209,7 @@
           <a:p>
             <a:fld id="{48A87A34-81AB-432B-8DAE-1953F412C126}" type="datetimeFigureOut">
               <a:rPr lang="en-US" smtClean="0"/>
-              <a:t>10/30/18</a:t>
+              <a:t>10/31/18</a:t>
             </a:fld>
             <a:endParaRPr lang="en-US" dirty="0"/>
           </a:p>
@@ -7305,7 +7389,7 @@
           <a:p>
             <a:fld id="{48A87A34-81AB-432B-8DAE-1953F412C126}" type="datetimeFigureOut">
               <a:rPr lang="en-US" smtClean="0"/>
-              <a:t>10/30/18</a:t>
+              <a:t>10/31/18</a:t>
             </a:fld>
             <a:endParaRPr lang="en-US" dirty="0"/>
           </a:p>
@@ -7475,7 +7559,7 @@
           <a:p>
             <a:fld id="{48A87A34-81AB-432B-8DAE-1953F412C126}" type="datetimeFigureOut">
               <a:rPr lang="en-US" smtClean="0"/>
-              <a:t>10/30/18</a:t>
+              <a:t>10/31/18</a:t>
             </a:fld>
             <a:endParaRPr lang="en-US" dirty="0"/>
           </a:p>
@@ -7725,7 +7809,7 @@
           <a:p>
             <a:fld id="{48A87A34-81AB-432B-8DAE-1953F412C126}" type="datetimeFigureOut">
               <a:rPr lang="en-US" smtClean="0"/>
-              <a:t>10/30/18</a:t>
+              <a:t>10/31/18</a:t>
             </a:fld>
             <a:endParaRPr lang="en-US" dirty="0"/>
           </a:p>
@@ -7957,7 +8041,7 @@
           <a:p>
             <a:fld id="{48A87A34-81AB-432B-8DAE-1953F412C126}" type="datetimeFigureOut">
               <a:rPr lang="en-US" smtClean="0"/>
-              <a:t>10/30/18</a:t>
+              <a:t>10/31/18</a:t>
             </a:fld>
             <a:endParaRPr lang="en-US" dirty="0"/>
           </a:p>
@@ -8338,7 +8422,7 @@
           <a:p>
             <a:fld id="{48A87A34-81AB-432B-8DAE-1953F412C126}" type="datetimeFigureOut">
               <a:rPr lang="en-US" smtClean="0"/>
-              <a:t>10/30/18</a:t>
+              <a:t>10/31/18</a:t>
             </a:fld>
             <a:endParaRPr lang="en-US" dirty="0"/>
           </a:p>
@@ -8456,7 +8540,7 @@
           <a:p>
             <a:fld id="{48A87A34-81AB-432B-8DAE-1953F412C126}" type="datetimeFigureOut">
               <a:rPr lang="en-US" smtClean="0"/>
-              <a:t>10/30/18</a:t>
+              <a:t>10/31/18</a:t>
             </a:fld>
             <a:endParaRPr lang="en-US" dirty="0"/>
           </a:p>
@@ -8551,7 +8635,7 @@
           <a:p>
             <a:fld id="{48A87A34-81AB-432B-8DAE-1953F412C126}" type="datetimeFigureOut">
               <a:rPr lang="en-US" smtClean="0"/>
-              <a:t>10/30/18</a:t>
+              <a:t>10/31/18</a:t>
             </a:fld>
             <a:endParaRPr lang="en-US" dirty="0"/>
           </a:p>
@@ -8800,7 +8884,7 @@
           <a:p>
             <a:fld id="{48A87A34-81AB-432B-8DAE-1953F412C126}" type="datetimeFigureOut">
               <a:rPr lang="en-US" smtClean="0"/>
-              <a:t>10/30/18</a:t>
+              <a:t>10/31/18</a:t>
             </a:fld>
             <a:endParaRPr lang="en-US" dirty="0"/>
           </a:p>
@@ -9080,7 +9164,7 @@
           <a:p>
             <a:fld id="{48A87A34-81AB-432B-8DAE-1953F412C126}" type="datetimeFigureOut">
               <a:rPr lang="en-US" smtClean="0"/>
-              <a:t>10/30/18</a:t>
+              <a:t>10/31/18</a:t>
             </a:fld>
             <a:endParaRPr lang="en-US" dirty="0"/>
           </a:p>
@@ -9203,7 +9287,7 @@
           <a:noFill/>
           <a:extLst>
             <a:ext uri="{909E8E84-426E-40dd-AFC4-6F175D3DCCD1}">
-              <a14:hiddenFill xmlns="" xmlns:a14="http://schemas.microsoft.com/office/drawing/2010/main">
+              <a14:hiddenFill xmlns:a14="http://schemas.microsoft.com/office/drawing/2010/main" xmlns="">
                 <a:solidFill>
                   <a:srgbClr val="FFFFFF"/>
                 </a:solidFill>
@@ -9277,7 +9361,7 @@
               </a:ln>
               <a:extLst>
                 <a:ext uri="{91240B29-F687-4f45-9708-019B960494DF}">
-                  <a14:hiddenLine xmlns="" xmlns:a14="http://schemas.microsoft.com/office/drawing/2010/main" w="9525">
+                  <a14:hiddenLine xmlns:a14="http://schemas.microsoft.com/office/drawing/2010/main" xmlns="" w="9525">
                     <a:solidFill>
                       <a:srgbClr val="000000"/>
                     </a:solidFill>
@@ -9367,7 +9451,7 @@
               </a:ln>
               <a:extLst>
                 <a:ext uri="{91240B29-F687-4f45-9708-019B960494DF}">
-                  <a14:hiddenLine xmlns="" xmlns:a14="http://schemas.microsoft.com/office/drawing/2010/main" w="9525">
+                  <a14:hiddenLine xmlns:a14="http://schemas.microsoft.com/office/drawing/2010/main" xmlns="" w="9525">
                     <a:solidFill>
                       <a:srgbClr val="000000"/>
                     </a:solidFill>
@@ -9457,7 +9541,7 @@
               </a:ln>
               <a:extLst>
                 <a:ext uri="{91240B29-F687-4f45-9708-019B960494DF}">
-                  <a14:hiddenLine xmlns="" xmlns:a14="http://schemas.microsoft.com/office/drawing/2010/main" w="9525">
+                  <a14:hiddenLine xmlns:a14="http://schemas.microsoft.com/office/drawing/2010/main" xmlns="" w="9525">
                     <a:solidFill>
                       <a:srgbClr val="000000"/>
                     </a:solidFill>
@@ -9519,7 +9603,7 @@
               </a:ln>
               <a:extLst>
                 <a:ext uri="{91240B29-F687-4f45-9708-019B960494DF}">
-                  <a14:hiddenLine xmlns="" xmlns:a14="http://schemas.microsoft.com/office/drawing/2010/main" w="9525">
+                  <a14:hiddenLine xmlns:a14="http://schemas.microsoft.com/office/drawing/2010/main" xmlns="" w="9525">
                     <a:solidFill>
                       <a:srgbClr val="000000"/>
                     </a:solidFill>
@@ -9609,7 +9693,7 @@
               </a:ln>
               <a:extLst>
                 <a:ext uri="{91240B29-F687-4f45-9708-019B960494DF}">
-                  <a14:hiddenLine xmlns="" xmlns:a14="http://schemas.microsoft.com/office/drawing/2010/main" w="9525">
+                  <a14:hiddenLine xmlns:a14="http://schemas.microsoft.com/office/drawing/2010/main" xmlns="" w="9525">
                     <a:solidFill>
                       <a:srgbClr val="000000"/>
                     </a:solidFill>
@@ -9671,7 +9755,7 @@
               </a:ln>
               <a:extLst>
                 <a:ext uri="{91240B29-F687-4f45-9708-019B960494DF}">
-                  <a14:hiddenLine xmlns="" xmlns:a14="http://schemas.microsoft.com/office/drawing/2010/main" w="9525">
+                  <a14:hiddenLine xmlns:a14="http://schemas.microsoft.com/office/drawing/2010/main" xmlns="" w="9525">
                     <a:solidFill>
                       <a:srgbClr val="000000"/>
                     </a:solidFill>
@@ -9733,7 +9817,7 @@
               </a:ln>
               <a:extLst>
                 <a:ext uri="{91240B29-F687-4f45-9708-019B960494DF}">
-                  <a14:hiddenLine xmlns="" xmlns:a14="http://schemas.microsoft.com/office/drawing/2010/main" w="9525">
+                  <a14:hiddenLine xmlns:a14="http://schemas.microsoft.com/office/drawing/2010/main" xmlns="" w="9525">
                     <a:solidFill>
                       <a:srgbClr val="000000"/>
                     </a:solidFill>
@@ -9823,7 +9907,7 @@
               </a:ln>
               <a:extLst>
                 <a:ext uri="{91240B29-F687-4f45-9708-019B960494DF}">
-                  <a14:hiddenLine xmlns="" xmlns:a14="http://schemas.microsoft.com/office/drawing/2010/main" w="9525">
+                  <a14:hiddenLine xmlns:a14="http://schemas.microsoft.com/office/drawing/2010/main" xmlns="" w="9525">
                     <a:solidFill>
                       <a:srgbClr val="000000"/>
                     </a:solidFill>
@@ -9913,7 +9997,7 @@
               </a:ln>
               <a:extLst>
                 <a:ext uri="{91240B29-F687-4f45-9708-019B960494DF}">
-                  <a14:hiddenLine xmlns="" xmlns:a14="http://schemas.microsoft.com/office/drawing/2010/main" w="9525">
+                  <a14:hiddenLine xmlns:a14="http://schemas.microsoft.com/office/drawing/2010/main" xmlns="" w="9525">
                     <a:solidFill>
                       <a:srgbClr val="000000"/>
                     </a:solidFill>
@@ -9975,7 +10059,7 @@
               </a:ln>
               <a:extLst>
                 <a:ext uri="{91240B29-F687-4f45-9708-019B960494DF}">
-                  <a14:hiddenLine xmlns="" xmlns:a14="http://schemas.microsoft.com/office/drawing/2010/main" w="9525">
+                  <a14:hiddenLine xmlns:a14="http://schemas.microsoft.com/office/drawing/2010/main" xmlns="" w="9525">
                     <a:solidFill>
                       <a:srgbClr val="000000"/>
                     </a:solidFill>
@@ -10085,7 +10169,7 @@
               </a:ln>
               <a:extLst>
                 <a:ext uri="{91240B29-F687-4f45-9708-019B960494DF}">
-                  <a14:hiddenLine xmlns="" xmlns:a14="http://schemas.microsoft.com/office/drawing/2010/main" w="9525">
+                  <a14:hiddenLine xmlns:a14="http://schemas.microsoft.com/office/drawing/2010/main" xmlns="" w="9525">
                     <a:solidFill>
                       <a:srgbClr val="000000"/>
                     </a:solidFill>
@@ -10169,7 +10253,7 @@
               </a:ln>
               <a:extLst>
                 <a:ext uri="{91240B29-F687-4f45-9708-019B960494DF}">
-                  <a14:hiddenLine xmlns="" xmlns:a14="http://schemas.microsoft.com/office/drawing/2010/main" w="9525">
+                  <a14:hiddenLine xmlns:a14="http://schemas.microsoft.com/office/drawing/2010/main" xmlns="" w="9525">
                     <a:solidFill>
                       <a:srgbClr val="000000"/>
                     </a:solidFill>
@@ -10231,7 +10315,7 @@
               </a:ln>
               <a:extLst>
                 <a:ext uri="{91240B29-F687-4f45-9708-019B960494DF}">
-                  <a14:hiddenLine xmlns="" xmlns:a14="http://schemas.microsoft.com/office/drawing/2010/main" w="9525">
+                  <a14:hiddenLine xmlns:a14="http://schemas.microsoft.com/office/drawing/2010/main" xmlns="" w="9525">
                     <a:solidFill>
                       <a:srgbClr val="000000"/>
                     </a:solidFill>
@@ -10293,7 +10377,7 @@
               </a:ln>
               <a:extLst>
                 <a:ext uri="{91240B29-F687-4f45-9708-019B960494DF}">
-                  <a14:hiddenLine xmlns="" xmlns:a14="http://schemas.microsoft.com/office/drawing/2010/main" w="9525">
+                  <a14:hiddenLine xmlns:a14="http://schemas.microsoft.com/office/drawing/2010/main" xmlns="" w="9525">
                     <a:solidFill>
                       <a:srgbClr val="000000"/>
                     </a:solidFill>
@@ -10383,7 +10467,7 @@
               </a:ln>
               <a:extLst>
                 <a:ext uri="{91240B29-F687-4f45-9708-019B960494DF}">
-                  <a14:hiddenLine xmlns="" xmlns:a14="http://schemas.microsoft.com/office/drawing/2010/main" w="9525">
+                  <a14:hiddenLine xmlns:a14="http://schemas.microsoft.com/office/drawing/2010/main" xmlns="" w="9525">
                     <a:solidFill>
                       <a:srgbClr val="000000"/>
                     </a:solidFill>
@@ -10417,7 +10501,7 @@
               </a:ln>
               <a:extLst>
                 <a:ext uri="{91240B29-F687-4f45-9708-019B960494DF}">
-                  <a14:hiddenLine xmlns="" xmlns:a14="http://schemas.microsoft.com/office/drawing/2010/main" w="9525">
+                  <a14:hiddenLine xmlns:a14="http://schemas.microsoft.com/office/drawing/2010/main" xmlns="" w="9525">
                     <a:solidFill>
                       <a:srgbClr val="000000"/>
                     </a:solidFill>
@@ -10482,7 +10566,7 @@
               </a:ln>
               <a:extLst>
                 <a:ext uri="{91240B29-F687-4f45-9708-019B960494DF}">
-                  <a14:hiddenLine xmlns="" xmlns:a14="http://schemas.microsoft.com/office/drawing/2010/main" w="9525">
+                  <a14:hiddenLine xmlns:a14="http://schemas.microsoft.com/office/drawing/2010/main" xmlns="" w="9525">
                     <a:solidFill>
                       <a:srgbClr val="000000"/>
                     </a:solidFill>
@@ -10572,7 +10656,7 @@
               </a:ln>
               <a:extLst>
                 <a:ext uri="{91240B29-F687-4f45-9708-019B960494DF}">
-                  <a14:hiddenLine xmlns="" xmlns:a14="http://schemas.microsoft.com/office/drawing/2010/main" w="9525">
+                  <a14:hiddenLine xmlns:a14="http://schemas.microsoft.com/office/drawing/2010/main" xmlns="" w="9525">
                     <a:solidFill>
                       <a:srgbClr val="000000"/>
                     </a:solidFill>
@@ -10634,7 +10718,7 @@
               </a:ln>
               <a:extLst>
                 <a:ext uri="{91240B29-F687-4f45-9708-019B960494DF}">
-                  <a14:hiddenLine xmlns="" xmlns:a14="http://schemas.microsoft.com/office/drawing/2010/main" w="9525">
+                  <a14:hiddenLine xmlns:a14="http://schemas.microsoft.com/office/drawing/2010/main" xmlns="" w="9525">
                     <a:solidFill>
                       <a:srgbClr val="000000"/>
                     </a:solidFill>
@@ -10724,7 +10808,7 @@
               </a:ln>
               <a:extLst>
                 <a:ext uri="{91240B29-F687-4f45-9708-019B960494DF}">
-                  <a14:hiddenLine xmlns="" xmlns:a14="http://schemas.microsoft.com/office/drawing/2010/main" w="9525">
+                  <a14:hiddenLine xmlns:a14="http://schemas.microsoft.com/office/drawing/2010/main" xmlns="" w="9525">
                     <a:solidFill>
                       <a:srgbClr val="000000"/>
                     </a:solidFill>
@@ -10789,7 +10873,7 @@
               </a:ln>
               <a:extLst>
                 <a:ext uri="{91240B29-F687-4f45-9708-019B960494DF}">
-                  <a14:hiddenLine xmlns="" xmlns:a14="http://schemas.microsoft.com/office/drawing/2010/main" w="9525">
+                  <a14:hiddenLine xmlns:a14="http://schemas.microsoft.com/office/drawing/2010/main" xmlns="" w="9525">
                     <a:solidFill>
                       <a:srgbClr val="000000"/>
                     </a:solidFill>
@@ -10851,7 +10935,7 @@
               </a:ln>
               <a:extLst>
                 <a:ext uri="{91240B29-F687-4f45-9708-019B960494DF}">
-                  <a14:hiddenLine xmlns="" xmlns:a14="http://schemas.microsoft.com/office/drawing/2010/main" w="9525">
+                  <a14:hiddenLine xmlns:a14="http://schemas.microsoft.com/office/drawing/2010/main" xmlns="" w="9525">
                     <a:solidFill>
                       <a:srgbClr val="000000"/>
                     </a:solidFill>
@@ -10941,7 +11025,7 @@
               </a:ln>
               <a:extLst>
                 <a:ext uri="{91240B29-F687-4f45-9708-019B960494DF}">
-                  <a14:hiddenLine xmlns="" xmlns:a14="http://schemas.microsoft.com/office/drawing/2010/main" w="9525">
+                  <a14:hiddenLine xmlns:a14="http://schemas.microsoft.com/office/drawing/2010/main" xmlns="" w="9525">
                     <a:solidFill>
                       <a:srgbClr val="000000"/>
                     </a:solidFill>
@@ -11031,7 +11115,7 @@
               </a:ln>
               <a:extLst>
                 <a:ext uri="{91240B29-F687-4f45-9708-019B960494DF}">
-                  <a14:hiddenLine xmlns="" xmlns:a14="http://schemas.microsoft.com/office/drawing/2010/main" w="9525">
+                  <a14:hiddenLine xmlns:a14="http://schemas.microsoft.com/office/drawing/2010/main" xmlns="" w="9525">
                     <a:solidFill>
                       <a:srgbClr val="000000"/>
                     </a:solidFill>
@@ -11096,7 +11180,7 @@
               </a:ln>
               <a:extLst>
                 <a:ext uri="{91240B29-F687-4f45-9708-019B960494DF}">
-                  <a14:hiddenLine xmlns="" xmlns:a14="http://schemas.microsoft.com/office/drawing/2010/main" w="9525">
+                  <a14:hiddenLine xmlns:a14="http://schemas.microsoft.com/office/drawing/2010/main" xmlns="" w="9525">
                     <a:solidFill>
                       <a:srgbClr val="000000"/>
                     </a:solidFill>
@@ -11216,7 +11300,7 @@
               </a:ln>
               <a:extLst>
                 <a:ext uri="{91240B29-F687-4f45-9708-019B960494DF}">
-                  <a14:hiddenLine xmlns="" xmlns:a14="http://schemas.microsoft.com/office/drawing/2010/main" w="9525">
+                  <a14:hiddenLine xmlns:a14="http://schemas.microsoft.com/office/drawing/2010/main" xmlns="" w="9525">
                     <a:solidFill>
                       <a:srgbClr val="000000"/>
                     </a:solidFill>
@@ -11297,7 +11381,7 @@
               </a:ln>
               <a:extLst>
                 <a:ext uri="{91240B29-F687-4f45-9708-019B960494DF}">
-                  <a14:hiddenLine xmlns="" xmlns:a14="http://schemas.microsoft.com/office/drawing/2010/main" w="9525">
+                  <a14:hiddenLine xmlns:a14="http://schemas.microsoft.com/office/drawing/2010/main" xmlns="" w="9525">
                     <a:solidFill>
                       <a:srgbClr val="000000"/>
                     </a:solidFill>
@@ -11412,7 +11496,7 @@
               </a:ln>
               <a:extLst>
                 <a:ext uri="{91240B29-F687-4f45-9708-019B960494DF}">
-                  <a14:hiddenLine xmlns="" xmlns:a14="http://schemas.microsoft.com/office/drawing/2010/main" w="9525">
+                  <a14:hiddenLine xmlns:a14="http://schemas.microsoft.com/office/drawing/2010/main" xmlns="" w="9525">
                     <a:solidFill>
                       <a:srgbClr val="000000"/>
                     </a:solidFill>
@@ -11502,7 +11586,7 @@
               </a:ln>
               <a:extLst>
                 <a:ext uri="{91240B29-F687-4f45-9708-019B960494DF}">
-                  <a14:hiddenLine xmlns="" xmlns:a14="http://schemas.microsoft.com/office/drawing/2010/main" w="9525">
+                  <a14:hiddenLine xmlns:a14="http://schemas.microsoft.com/office/drawing/2010/main" xmlns="" w="9525">
                     <a:solidFill>
                       <a:srgbClr val="000000"/>
                     </a:solidFill>
@@ -11567,7 +11651,7 @@
               </a:ln>
               <a:extLst>
                 <a:ext uri="{91240B29-F687-4f45-9708-019B960494DF}">
-                  <a14:hiddenLine xmlns="" xmlns:a14="http://schemas.microsoft.com/office/drawing/2010/main" w="9525">
+                  <a14:hiddenLine xmlns:a14="http://schemas.microsoft.com/office/drawing/2010/main" xmlns="" w="9525">
                     <a:solidFill>
                       <a:srgbClr val="000000"/>
                     </a:solidFill>
@@ -11657,7 +11741,7 @@
               </a:ln>
               <a:extLst>
                 <a:ext uri="{91240B29-F687-4f45-9708-019B960494DF}">
-                  <a14:hiddenLine xmlns="" xmlns:a14="http://schemas.microsoft.com/office/drawing/2010/main" w="9525">
+                  <a14:hiddenLine xmlns:a14="http://schemas.microsoft.com/office/drawing/2010/main" xmlns="" w="9525">
                     <a:solidFill>
                       <a:srgbClr val="000000"/>
                     </a:solidFill>
@@ -11725,7 +11809,7 @@
               </a:ln>
               <a:extLst>
                 <a:ext uri="{91240B29-F687-4f45-9708-019B960494DF}">
-                  <a14:hiddenLine xmlns="" xmlns:a14="http://schemas.microsoft.com/office/drawing/2010/main" w="9525">
+                  <a14:hiddenLine xmlns:a14="http://schemas.microsoft.com/office/drawing/2010/main" xmlns="" w="9525">
                     <a:solidFill>
                       <a:srgbClr val="000000"/>
                     </a:solidFill>
@@ -11815,7 +11899,7 @@
               </a:ln>
               <a:extLst>
                 <a:ext uri="{91240B29-F687-4f45-9708-019B960494DF}">
-                  <a14:hiddenLine xmlns="" xmlns:a14="http://schemas.microsoft.com/office/drawing/2010/main" w="9525">
+                  <a14:hiddenLine xmlns:a14="http://schemas.microsoft.com/office/drawing/2010/main" xmlns="" w="9525">
                     <a:solidFill>
                       <a:srgbClr val="000000"/>
                     </a:solidFill>
@@ -11883,7 +11967,7 @@
               </a:ln>
               <a:extLst>
                 <a:ext uri="{91240B29-F687-4f45-9708-019B960494DF}">
-                  <a14:hiddenLine xmlns="" xmlns:a14="http://schemas.microsoft.com/office/drawing/2010/main" w="9525">
+                  <a14:hiddenLine xmlns:a14="http://schemas.microsoft.com/office/drawing/2010/main" xmlns="" w="9525">
                     <a:solidFill>
                       <a:srgbClr val="000000"/>
                     </a:solidFill>
@@ -11973,7 +12057,7 @@
               </a:ln>
               <a:extLst>
                 <a:ext uri="{91240B29-F687-4f45-9708-019B960494DF}">
-                  <a14:hiddenLine xmlns="" xmlns:a14="http://schemas.microsoft.com/office/drawing/2010/main" w="9525">
+                  <a14:hiddenLine xmlns:a14="http://schemas.microsoft.com/office/drawing/2010/main" xmlns="" w="9525">
                     <a:solidFill>
                       <a:srgbClr val="000000"/>
                     </a:solidFill>
@@ -12007,7 +12091,7 @@
               </a:ln>
               <a:extLst>
                 <a:ext uri="{91240B29-F687-4f45-9708-019B960494DF}">
-                  <a14:hiddenLine xmlns="" xmlns:a14="http://schemas.microsoft.com/office/drawing/2010/main" w="9525">
+                  <a14:hiddenLine xmlns:a14="http://schemas.microsoft.com/office/drawing/2010/main" xmlns="" w="9525">
                     <a:solidFill>
                       <a:srgbClr val="000000"/>
                     </a:solidFill>
@@ -12148,7 +12232,7 @@
             <a:fld id="{48A87A34-81AB-432B-8DAE-1953F412C126}" type="datetimeFigureOut">
               <a:rPr lang="en-US" smtClean="0"/>
               <a:pPr/>
-              <a:t>10/30/18</a:t>
+              <a:t>10/31/18</a:t>
             </a:fld>
             <a:endParaRPr lang="en-US" dirty="0"/>
           </a:p>
@@ -12727,7 +12811,7 @@
         </p:blipFill>
         <p:spPr>
           <a:xfrm>
-            <a:off x="3937493" y="3266184"/>
+            <a:off x="2836646" y="3171008"/>
             <a:ext cx="8176685" cy="1217804"/>
           </a:xfrm>
           <a:prstGeom prst="rect">
@@ -12749,6 +12833,424 @@
 </file>
 
 <file path=ppt/slides/slide10.xml><?xml version="1.0" encoding="utf-8"?>
+<p:sld xmlns:a="http://schemas.openxmlformats.org/drawingml/2006/main" xmlns:r="http://schemas.openxmlformats.org/officeDocument/2006/relationships" xmlns:p="http://schemas.openxmlformats.org/presentationml/2006/main">
+  <p:cSld>
+    <p:bg>
+      <p:bgPr>
+        <a:solidFill>
+          <a:schemeClr val="tx1"/>
+        </a:solidFill>
+        <a:effectLst/>
+      </p:bgPr>
+    </p:bg>
+    <p:spTree>
+      <p:nvGrpSpPr>
+        <p:cNvPr id="1" name=""/>
+        <p:cNvGrpSpPr/>
+        <p:nvPr/>
+      </p:nvGrpSpPr>
+      <p:grpSpPr>
+        <a:xfrm>
+          <a:off x="0" y="0"/>
+          <a:ext cx="0" cy="0"/>
+          <a:chOff x="0" y="0"/>
+          <a:chExt cx="0" cy="0"/>
+        </a:xfrm>
+      </p:grpSpPr>
+      <p:sp>
+        <p:nvSpPr>
+          <p:cNvPr id="2" name="Title 1">
+            <a:extLst>
+              <a:ext uri="{FF2B5EF4-FFF2-40B4-BE49-F238E27FC236}">
+                <a16:creationId xmlns:a16="http://schemas.microsoft.com/office/drawing/2014/main" id="{A9EA4B56-D166-834F-8E0D-9EB56367FDD4}"/>
+              </a:ext>
+            </a:extLst>
+          </p:cNvPr>
+          <p:cNvSpPr>
+            <a:spLocks noGrp="1"/>
+          </p:cNvSpPr>
+          <p:nvPr>
+            <p:ph type="title"/>
+          </p:nvPr>
+        </p:nvSpPr>
+        <p:spPr/>
+        <p:txBody>
+          <a:bodyPr/>
+          <a:lstStyle/>
+          <a:p>
+            <a:r>
+              <a:rPr lang="en-US" dirty="0">
+                <a:solidFill>
+                  <a:schemeClr val="bg1"/>
+                </a:solidFill>
+              </a:rPr>
+              <a:t>methodology</a:t>
+            </a:r>
+          </a:p>
+        </p:txBody>
+      </p:sp>
+      <p:sp>
+        <p:nvSpPr>
+          <p:cNvPr id="3" name="Content Placeholder 2">
+            <a:extLst>
+              <a:ext uri="{FF2B5EF4-FFF2-40B4-BE49-F238E27FC236}">
+                <a16:creationId xmlns:a16="http://schemas.microsoft.com/office/drawing/2014/main" id="{E90549A8-450F-334F-8285-A26A2A94C0D9}"/>
+              </a:ext>
+            </a:extLst>
+          </p:cNvPr>
+          <p:cNvSpPr>
+            <a:spLocks noGrp="1"/>
+          </p:cNvSpPr>
+          <p:nvPr>
+            <p:ph idx="1"/>
+          </p:nvPr>
+        </p:nvSpPr>
+        <p:spPr/>
+        <p:txBody>
+          <a:bodyPr/>
+          <a:lstStyle/>
+          <a:p>
+            <a:r>
+              <a:rPr lang="en-US" dirty="0">
+                <a:solidFill>
+                  <a:schemeClr val="bg1"/>
+                </a:solidFill>
+              </a:rPr>
+              <a:t>Proof calculi</a:t>
+            </a:r>
+          </a:p>
+          <a:p>
+            <a:pPr lvl="1"/>
+            <a:r>
+              <a:rPr lang="en-US" dirty="0">
+                <a:solidFill>
+                  <a:schemeClr val="bg1"/>
+                </a:solidFill>
+              </a:rPr>
+              <a:t>Hilbert-style</a:t>
+            </a:r>
+          </a:p>
+          <a:p>
+            <a:pPr lvl="1"/>
+            <a:r>
+              <a:rPr lang="en-US" dirty="0">
+                <a:solidFill>
+                  <a:schemeClr val="bg1"/>
+                </a:solidFill>
+              </a:rPr>
+              <a:t>Natural deduction</a:t>
+            </a:r>
+          </a:p>
+          <a:p>
+            <a:pPr lvl="1"/>
+            <a:r>
+              <a:rPr lang="en-US" dirty="0">
+                <a:solidFill>
+                  <a:schemeClr val="bg1"/>
+                </a:solidFill>
+              </a:rPr>
+              <a:t>Equational system</a:t>
+            </a:r>
+          </a:p>
+        </p:txBody>
+      </p:sp>
+      <p:cxnSp>
+        <p:nvCxnSpPr>
+          <p:cNvPr id="5" name="Straight Arrow Connector 4">
+            <a:extLst>
+              <a:ext uri="{FF2B5EF4-FFF2-40B4-BE49-F238E27FC236}">
+                <a16:creationId xmlns:a16="http://schemas.microsoft.com/office/drawing/2014/main" id="{E3537BBD-9AF1-4E6E-A7A4-667361B0017C}"/>
+              </a:ext>
+            </a:extLst>
+          </p:cNvPr>
+          <p:cNvCxnSpPr>
+            <a:cxnSpLocks/>
+          </p:cNvCxnSpPr>
+          <p:nvPr/>
+        </p:nvCxnSpPr>
+        <p:spPr>
+          <a:xfrm>
+            <a:off x="3802115" y="3869779"/>
+            <a:ext cx="1966081" cy="0"/>
+          </a:xfrm>
+          <a:prstGeom prst="straightConnector1">
+            <a:avLst/>
+          </a:prstGeom>
+          <a:ln w="38100">
+            <a:solidFill>
+              <a:srgbClr val="C00000"/>
+            </a:solidFill>
+            <a:tailEnd type="triangle"/>
+          </a:ln>
+        </p:spPr>
+        <p:style>
+          <a:lnRef idx="1">
+            <a:schemeClr val="accent1"/>
+          </a:lnRef>
+          <a:fillRef idx="0">
+            <a:schemeClr val="accent1"/>
+          </a:fillRef>
+          <a:effectRef idx="0">
+            <a:schemeClr val="accent1"/>
+          </a:effectRef>
+          <a:fontRef idx="minor">
+            <a:schemeClr val="tx1"/>
+          </a:fontRef>
+        </p:style>
+      </p:cxnSp>
+    </p:spTree>
+    <p:extLst>
+      <p:ext uri="{BB962C8B-B14F-4D97-AF65-F5344CB8AC3E}">
+        <p14:creationId xmlns:p14="http://schemas.microsoft.com/office/powerpoint/2010/main" val="1039459532"/>
+      </p:ext>
+    </p:extLst>
+  </p:cSld>
+  <p:clrMapOvr>
+    <a:masterClrMapping/>
+  </p:clrMapOvr>
+  <p:timing>
+    <p:tnLst>
+      <p:par>
+        <p:cTn id="1" dur="indefinite" restart="never" nodeType="tmRoot">
+          <p:childTnLst>
+            <p:seq concurrent="1" nextAc="seek">
+              <p:cTn id="2" dur="indefinite" nodeType="mainSeq">
+                <p:childTnLst>
+                  <p:par>
+                    <p:cTn id="3" fill="hold">
+                      <p:stCondLst>
+                        <p:cond delay="indefinite"/>
+                      </p:stCondLst>
+                      <p:childTnLst>
+                        <p:par>
+                          <p:cTn id="4" fill="hold">
+                            <p:stCondLst>
+                              <p:cond delay="0"/>
+                            </p:stCondLst>
+                            <p:childTnLst>
+                              <p:par>
+                                <p:cTn id="5" presetID="26" presetClass="emph" presetSubtype="0" fill="hold" nodeType="clickEffect">
+                                  <p:stCondLst>
+                                    <p:cond delay="0"/>
+                                  </p:stCondLst>
+                                  <p:childTnLst>
+                                    <p:animEffect transition="out" filter="fade">
+                                      <p:cBhvr>
+                                        <p:cTn id="6" dur="500" tmFilter="0, 0; .2, .5; .8, .5; 1, 0"/>
+                                        <p:tgtEl>
+                                          <p:spTgt spid="3">
+                                            <p:txEl>
+                                              <p:pRg st="3" end="3"/>
+                                            </p:txEl>
+                                          </p:spTgt>
+                                        </p:tgtEl>
+                                      </p:cBhvr>
+                                    </p:animEffect>
+                                    <p:animScale>
+                                      <p:cBhvr>
+                                        <p:cTn id="7" dur="250" autoRev="1" fill="hold"/>
+                                        <p:tgtEl>
+                                          <p:spTgt spid="3">
+                                            <p:txEl>
+                                              <p:pRg st="3" end="3"/>
+                                            </p:txEl>
+                                          </p:spTgt>
+                                        </p:tgtEl>
+                                      </p:cBhvr>
+                                      <p:by x="105000" y="105000"/>
+                                    </p:animScale>
+                                  </p:childTnLst>
+                                </p:cTn>
+                              </p:par>
+                            </p:childTnLst>
+                          </p:cTn>
+                        </p:par>
+                      </p:childTnLst>
+                    </p:cTn>
+                  </p:par>
+                </p:childTnLst>
+              </p:cTn>
+              <p:prevCondLst>
+                <p:cond evt="onPrev" delay="0">
+                  <p:tgtEl>
+                    <p:sldTgt/>
+                  </p:tgtEl>
+                </p:cond>
+              </p:prevCondLst>
+              <p:nextCondLst>
+                <p:cond evt="onNext" delay="0">
+                  <p:tgtEl>
+                    <p:sldTgt/>
+                  </p:tgtEl>
+                </p:cond>
+              </p:nextCondLst>
+            </p:seq>
+          </p:childTnLst>
+        </p:cTn>
+      </p:par>
+    </p:tnLst>
+  </p:timing>
+</p:sld>
+</file>
+
+<file path=ppt/slides/slide11.xml><?xml version="1.0" encoding="utf-8"?>
+<p:sld xmlns:a="http://schemas.openxmlformats.org/drawingml/2006/main" xmlns:r="http://schemas.openxmlformats.org/officeDocument/2006/relationships" xmlns:p="http://schemas.openxmlformats.org/presentationml/2006/main">
+  <p:cSld>
+    <p:bg>
+      <p:bgPr>
+        <a:solidFill>
+          <a:schemeClr val="tx1"/>
+        </a:solidFill>
+        <a:effectLst/>
+      </p:bgPr>
+    </p:bg>
+    <p:spTree>
+      <p:nvGrpSpPr>
+        <p:cNvPr id="1" name=""/>
+        <p:cNvGrpSpPr/>
+        <p:nvPr/>
+      </p:nvGrpSpPr>
+      <p:grpSpPr>
+        <a:xfrm>
+          <a:off x="0" y="0"/>
+          <a:ext cx="0" cy="0"/>
+          <a:chOff x="0" y="0"/>
+          <a:chExt cx="0" cy="0"/>
+        </a:xfrm>
+      </p:grpSpPr>
+      <p:sp>
+        <p:nvSpPr>
+          <p:cNvPr id="2" name="Title 1">
+            <a:extLst>
+              <a:ext uri="{FF2B5EF4-FFF2-40B4-BE49-F238E27FC236}">
+                <a16:creationId xmlns:a16="http://schemas.microsoft.com/office/drawing/2014/main" id="{2180634B-5955-4437-A94F-CDBE08DA7117}"/>
+              </a:ext>
+            </a:extLst>
+          </p:cNvPr>
+          <p:cNvSpPr>
+            <a:spLocks noGrp="1"/>
+          </p:cNvSpPr>
+          <p:nvPr>
+            <p:ph type="title"/>
+          </p:nvPr>
+        </p:nvSpPr>
+        <p:spPr/>
+        <p:txBody>
+          <a:bodyPr/>
+          <a:lstStyle/>
+          <a:p>
+            <a:r>
+              <a:rPr lang="en-US" dirty="0">
+                <a:solidFill>
+                  <a:schemeClr val="bg1"/>
+                </a:solidFill>
+              </a:rPr>
+              <a:t>The Equational System</a:t>
+            </a:r>
+          </a:p>
+        </p:txBody>
+      </p:sp>
+      <p:sp>
+        <p:nvSpPr>
+          <p:cNvPr id="3" name="Content Placeholder 2">
+            <a:extLst>
+              <a:ext uri="{FF2B5EF4-FFF2-40B4-BE49-F238E27FC236}">
+                <a16:creationId xmlns:a16="http://schemas.microsoft.com/office/drawing/2014/main" id="{F8A90245-63C8-4EDA-BEB0-6F9A1421CBF1}"/>
+              </a:ext>
+            </a:extLst>
+          </p:cNvPr>
+          <p:cNvSpPr>
+            <a:spLocks noGrp="1"/>
+          </p:cNvSpPr>
+          <p:nvPr>
+            <p:ph idx="1"/>
+          </p:nvPr>
+        </p:nvSpPr>
+        <p:spPr>
+          <a:xfrm>
+            <a:off x="1141412" y="2249487"/>
+            <a:ext cx="5654421" cy="3541714"/>
+          </a:xfrm>
+        </p:spPr>
+        <p:txBody>
+          <a:bodyPr/>
+          <a:lstStyle/>
+          <a:p>
+            <a:r>
+              <a:rPr lang="en-US" dirty="0">
+                <a:solidFill>
+                  <a:schemeClr val="bg1"/>
+                </a:solidFill>
+              </a:rPr>
+              <a:t>Concerning inference rules and axioms, it is a balance between the other two systems</a:t>
+            </a:r>
+          </a:p>
+          <a:p>
+            <a:r>
+              <a:rPr lang="en-US" dirty="0">
+                <a:solidFill>
+                  <a:schemeClr val="bg1"/>
+                </a:solidFill>
+              </a:rPr>
+              <a:t>Cumulative</a:t>
+            </a:r>
+          </a:p>
+          <a:p>
+            <a:r>
+              <a:rPr lang="en-US" dirty="0">
+                <a:solidFill>
+                  <a:schemeClr val="bg1"/>
+                </a:solidFill>
+              </a:rPr>
+              <a:t>Neat feature worth mentioning</a:t>
+            </a:r>
+          </a:p>
+        </p:txBody>
+      </p:sp>
+      <p:pic>
+        <p:nvPicPr>
+          <p:cNvPr id="4" name="Picture 3">
+            <a:extLst>
+              <a:ext uri="{FF2B5EF4-FFF2-40B4-BE49-F238E27FC236}">
+                <a16:creationId xmlns:a16="http://schemas.microsoft.com/office/drawing/2014/main" id="{73690B9A-6399-4D4C-8EB1-2184926C4653}"/>
+              </a:ext>
+            </a:extLst>
+          </p:cNvPr>
+          <p:cNvPicPr>
+            <a:picLocks noChangeAspect="1"/>
+          </p:cNvPicPr>
+          <p:nvPr/>
+        </p:nvPicPr>
+        <p:blipFill>
+          <a:blip r:embed="rId2"/>
+          <a:stretch>
+            <a:fillRect/>
+          </a:stretch>
+        </p:blipFill>
+        <p:spPr>
+          <a:xfrm>
+            <a:off x="7408608" y="1651801"/>
+            <a:ext cx="3026029" cy="4587681"/>
+          </a:xfrm>
+          <a:prstGeom prst="rect">
+            <a:avLst/>
+          </a:prstGeom>
+        </p:spPr>
+      </p:pic>
+    </p:spTree>
+    <p:extLst>
+      <p:ext uri="{BB962C8B-B14F-4D97-AF65-F5344CB8AC3E}">
+        <p14:creationId xmlns:p14="http://schemas.microsoft.com/office/powerpoint/2010/main" val="3520722480"/>
+      </p:ext>
+    </p:extLst>
+  </p:cSld>
+  <p:clrMapOvr>
+    <a:masterClrMapping/>
+  </p:clrMapOvr>
+</p:sld>
+</file>
+
+<file path=ppt/slides/slide12.xml><?xml version="1.0" encoding="utf-8"?>
 <p:sld xmlns:a="http://schemas.openxmlformats.org/drawingml/2006/main" xmlns:r="http://schemas.openxmlformats.org/officeDocument/2006/relationships" xmlns:p="http://schemas.openxmlformats.org/presentationml/2006/main">
   <p:cSld>
     <p:bg>
@@ -12855,7 +13357,7 @@
           <a:prstGeom prst="straightConnector1">
             <a:avLst/>
           </a:prstGeom>
-          <a:ln w="22225">
+          <a:ln w="38100">
             <a:solidFill>
               <a:srgbClr val="C00000"/>
             </a:solidFill>
@@ -12898,7 +13400,7 @@
             <a:avLst/>
           </a:prstGeom>
           <a:noFill/>
-          <a:ln w="15875">
+          <a:ln w="31750">
             <a:solidFill>
               <a:srgbClr val="C00000"/>
             </a:solidFill>
@@ -12942,164 +13444,7 @@
 </p:sld>
 </file>
 
-<file path=ppt/slides/slide11.xml><?xml version="1.0" encoding="utf-8"?>
-<p:sld xmlns:a="http://schemas.openxmlformats.org/drawingml/2006/main" xmlns:r="http://schemas.openxmlformats.org/officeDocument/2006/relationships" xmlns:p="http://schemas.openxmlformats.org/presentationml/2006/main">
-  <p:cSld>
-    <p:bg>
-      <p:bgPr>
-        <a:solidFill>
-          <a:schemeClr val="tx1"/>
-        </a:solidFill>
-        <a:effectLst/>
-      </p:bgPr>
-    </p:bg>
-    <p:spTree>
-      <p:nvGrpSpPr>
-        <p:cNvPr id="1" name=""/>
-        <p:cNvGrpSpPr/>
-        <p:nvPr/>
-      </p:nvGrpSpPr>
-      <p:grpSpPr>
-        <a:xfrm>
-          <a:off x="0" y="0"/>
-          <a:ext cx="0" cy="0"/>
-          <a:chOff x="0" y="0"/>
-          <a:chExt cx="0" cy="0"/>
-        </a:xfrm>
-      </p:grpSpPr>
-      <p:sp>
-        <p:nvSpPr>
-          <p:cNvPr id="2" name="Title 1">
-            <a:extLst>
-              <a:ext uri="{FF2B5EF4-FFF2-40B4-BE49-F238E27FC236}">
-                <a16:creationId xmlns:a16="http://schemas.microsoft.com/office/drawing/2014/main" id="{2180634B-5955-4437-A94F-CDBE08DA7117}"/>
-              </a:ext>
-            </a:extLst>
-          </p:cNvPr>
-          <p:cNvSpPr>
-            <a:spLocks noGrp="1"/>
-          </p:cNvSpPr>
-          <p:nvPr>
-            <p:ph type="title"/>
-          </p:nvPr>
-        </p:nvSpPr>
-        <p:spPr/>
-        <p:txBody>
-          <a:bodyPr/>
-          <a:lstStyle/>
-          <a:p>
-            <a:r>
-              <a:rPr lang="en-US" dirty="0">
-                <a:solidFill>
-                  <a:schemeClr val="bg1"/>
-                </a:solidFill>
-              </a:rPr>
-              <a:t>The Equational System</a:t>
-            </a:r>
-          </a:p>
-        </p:txBody>
-      </p:sp>
-      <p:sp>
-        <p:nvSpPr>
-          <p:cNvPr id="3" name="Content Placeholder 2">
-            <a:extLst>
-              <a:ext uri="{FF2B5EF4-FFF2-40B4-BE49-F238E27FC236}">
-                <a16:creationId xmlns:a16="http://schemas.microsoft.com/office/drawing/2014/main" id="{F8A90245-63C8-4EDA-BEB0-6F9A1421CBF1}"/>
-              </a:ext>
-            </a:extLst>
-          </p:cNvPr>
-          <p:cNvSpPr>
-            <a:spLocks noGrp="1"/>
-          </p:cNvSpPr>
-          <p:nvPr>
-            <p:ph idx="1"/>
-          </p:nvPr>
-        </p:nvSpPr>
-        <p:spPr>
-          <a:xfrm>
-            <a:off x="1141412" y="2249487"/>
-            <a:ext cx="5654421" cy="3541714"/>
-          </a:xfrm>
-        </p:spPr>
-        <p:txBody>
-          <a:bodyPr/>
-          <a:lstStyle/>
-          <a:p>
-            <a:r>
-              <a:rPr lang="en-US" dirty="0">
-                <a:solidFill>
-                  <a:schemeClr val="bg1"/>
-                </a:solidFill>
-              </a:rPr>
-              <a:t>Concerning inference rules and axioms, it is a balance between the other two systems</a:t>
-            </a:r>
-          </a:p>
-          <a:p>
-            <a:r>
-              <a:rPr lang="en-US" dirty="0">
-                <a:solidFill>
-                  <a:schemeClr val="bg1"/>
-                </a:solidFill>
-              </a:rPr>
-              <a:t>Cumulative</a:t>
-            </a:r>
-          </a:p>
-          <a:p>
-            <a:r>
-              <a:rPr lang="en-US" dirty="0">
-                <a:solidFill>
-                  <a:schemeClr val="bg1"/>
-                </a:solidFill>
-              </a:rPr>
-              <a:t>Neat feature worth mentioning</a:t>
-            </a:r>
-          </a:p>
-        </p:txBody>
-      </p:sp>
-      <p:pic>
-        <p:nvPicPr>
-          <p:cNvPr id="4" name="Picture 3">
-            <a:extLst>
-              <a:ext uri="{FF2B5EF4-FFF2-40B4-BE49-F238E27FC236}">
-                <a16:creationId xmlns:a16="http://schemas.microsoft.com/office/drawing/2014/main" id="{73690B9A-6399-4D4C-8EB1-2184926C4653}"/>
-              </a:ext>
-            </a:extLst>
-          </p:cNvPr>
-          <p:cNvPicPr>
-            <a:picLocks noChangeAspect="1"/>
-          </p:cNvPicPr>
-          <p:nvPr/>
-        </p:nvPicPr>
-        <p:blipFill>
-          <a:blip r:embed="rId2"/>
-          <a:stretch>
-            <a:fillRect/>
-          </a:stretch>
-        </p:blipFill>
-        <p:spPr>
-          <a:xfrm>
-            <a:off x="7408608" y="1651801"/>
-            <a:ext cx="3026029" cy="4587681"/>
-          </a:xfrm>
-          <a:prstGeom prst="rect">
-            <a:avLst/>
-          </a:prstGeom>
-        </p:spPr>
-      </p:pic>
-    </p:spTree>
-    <p:extLst>
-      <p:ext uri="{BB962C8B-B14F-4D97-AF65-F5344CB8AC3E}">
-        <p14:creationId xmlns:p14="http://schemas.microsoft.com/office/powerpoint/2010/main" val="3520722480"/>
-      </p:ext>
-    </p:extLst>
-  </p:cSld>
-  <p:clrMapOvr>
-    <a:masterClrMapping/>
-  </p:clrMapOvr>
-</p:sld>
-</file>
-
-<file path=ppt/slides/slide12.xml><?xml version="1.0" encoding="utf-8"?>
+<file path=ppt/slides/slide13.xml><?xml version="1.0" encoding="utf-8"?>
 <p:sld xmlns:a="http://schemas.openxmlformats.org/drawingml/2006/main" xmlns:r="http://schemas.openxmlformats.org/officeDocument/2006/relationships" xmlns:p="http://schemas.openxmlformats.org/presentationml/2006/main">
   <p:cSld>
     <p:bg>
@@ -13158,28 +13503,30 @@
       </p:sp>
       <p:sp>
         <p:nvSpPr>
-          <p:cNvPr id="5" name="Content Placeholder 2">
+          <p:cNvPr id="3" name="TextBox 2">
             <a:extLst>
               <a:ext uri="{FF2B5EF4-FFF2-40B4-BE49-F238E27FC236}">
-                <a16:creationId xmlns:a16="http://schemas.microsoft.com/office/drawing/2014/main" id="{C85AA5F1-A225-4DA8-BC21-9B326A52F04E}"/>
+                <a16:creationId xmlns:a16="http://schemas.microsoft.com/office/drawing/2014/main" id="{36797005-6DC6-CD4D-B403-3E362141179A}"/>
               </a:ext>
             </a:extLst>
           </p:cNvPr>
-          <p:cNvSpPr>
-            <a:spLocks noGrp="1"/>
-          </p:cNvSpPr>
-          <p:nvPr>
-            <p:ph idx="1"/>
-          </p:nvPr>
+          <p:cNvSpPr txBox="1"/>
+          <p:nvPr/>
         </p:nvSpPr>
         <p:spPr>
           <a:xfrm>
-            <a:off x="1141413" y="2249487"/>
-            <a:ext cx="4701546" cy="3541714"/>
+            <a:off x="1179967" y="1803400"/>
+            <a:ext cx="1945404" cy="369332"/>
           </a:xfrm>
+          <a:prstGeom prst="rect">
+            <a:avLst/>
+          </a:prstGeom>
+          <a:noFill/>
         </p:spPr>
         <p:txBody>
-          <a:bodyPr/>
+          <a:bodyPr wrap="none" rtlCol="0">
+            <a:spAutoFit/>
+          </a:bodyPr>
           <a:lstStyle/>
           <a:p>
             <a:r>
@@ -13188,9 +13535,38 @@
                   <a:schemeClr val="bg1"/>
                 </a:solidFill>
               </a:rPr>
-              <a:t>Proofs</a:t>
-            </a:r>
-          </a:p>
+              <a:t>Proof with Shannon</a:t>
+            </a:r>
+          </a:p>
+        </p:txBody>
+      </p:sp>
+      <p:sp>
+        <p:nvSpPr>
+          <p:cNvPr id="7" name="TextBox 6">
+            <a:extLst>
+              <a:ext uri="{FF2B5EF4-FFF2-40B4-BE49-F238E27FC236}">
+                <a16:creationId xmlns:a16="http://schemas.microsoft.com/office/drawing/2014/main" id="{FE8B4696-9B5C-D94A-855B-FBD76CE6012E}"/>
+              </a:ext>
+            </a:extLst>
+          </p:cNvPr>
+          <p:cNvSpPr txBox="1"/>
+          <p:nvPr/>
+        </p:nvSpPr>
+        <p:spPr>
+          <a:xfrm>
+            <a:off x="7981448" y="1803400"/>
+            <a:ext cx="2807372" cy="369332"/>
+          </a:xfrm>
+          <a:prstGeom prst="rect">
+            <a:avLst/>
+          </a:prstGeom>
+          <a:noFill/>
+        </p:spPr>
+        <p:txBody>
+          <a:bodyPr wrap="none" rtlCol="0">
+            <a:spAutoFit/>
+          </a:bodyPr>
+          <a:lstStyle/>
           <a:p>
             <a:r>
               <a:rPr lang="en-US" dirty="0">
@@ -13198,9 +13574,38 @@
                   <a:schemeClr val="bg1"/>
                 </a:solidFill>
               </a:rPr>
-              <a:t>Counterexample of the converse</a:t>
-            </a:r>
-          </a:p>
+              <a:t>Counterexample of converse</a:t>
+            </a:r>
+          </a:p>
+        </p:txBody>
+      </p:sp>
+      <p:sp>
+        <p:nvSpPr>
+          <p:cNvPr id="8" name="TextBox 7">
+            <a:extLst>
+              <a:ext uri="{FF2B5EF4-FFF2-40B4-BE49-F238E27FC236}">
+                <a16:creationId xmlns:a16="http://schemas.microsoft.com/office/drawing/2014/main" id="{41A84C5F-61D8-BF42-A918-CFCF69577DE9}"/>
+              </a:ext>
+            </a:extLst>
+          </p:cNvPr>
+          <p:cNvSpPr txBox="1"/>
+          <p:nvPr/>
+        </p:nvSpPr>
+        <p:spPr>
+          <a:xfrm>
+            <a:off x="4651089" y="1803400"/>
+            <a:ext cx="2224327" cy="369332"/>
+          </a:xfrm>
+          <a:prstGeom prst="rect">
+            <a:avLst/>
+          </a:prstGeom>
+          <a:noFill/>
+        </p:spPr>
+        <p:txBody>
+          <a:bodyPr wrap="none" rtlCol="0">
+            <a:spAutoFit/>
+          </a:bodyPr>
+          <a:lstStyle/>
           <a:p>
             <a:r>
               <a:rPr lang="en-US" dirty="0">
@@ -13208,22 +13613,101 @@
                   <a:schemeClr val="bg1"/>
                 </a:solidFill>
               </a:rPr>
-              <a:t>Implications of these results</a:t>
-            </a:r>
-          </a:p>
-          <a:p>
-            <a:pPr lvl="1"/>
-            <a:r>
-              <a:rPr lang="en-US" dirty="0">
-                <a:solidFill>
-                  <a:schemeClr val="bg1"/>
-                </a:solidFill>
-              </a:rPr>
-              <a:t>Specifically, how they provide a logical basis for case analysis proof techniques</a:t>
+              <a:t>Proof without Shannon</a:t>
             </a:r>
           </a:p>
         </p:txBody>
       </p:sp>
+      <p:pic>
+        <p:nvPicPr>
+          <p:cNvPr id="11" name="Picture 10">
+            <a:extLst>
+              <a:ext uri="{FF2B5EF4-FFF2-40B4-BE49-F238E27FC236}">
+                <a16:creationId xmlns:a16="http://schemas.microsoft.com/office/drawing/2014/main" id="{E23A4F65-73AA-1347-91C7-F1200B2C5FCC}"/>
+              </a:ext>
+            </a:extLst>
+          </p:cNvPr>
+          <p:cNvPicPr>
+            <a:picLocks noChangeAspect="1"/>
+          </p:cNvPicPr>
+          <p:nvPr/>
+        </p:nvPicPr>
+        <p:blipFill>
+          <a:blip r:embed="rId2"/>
+          <a:stretch>
+            <a:fillRect/>
+          </a:stretch>
+        </p:blipFill>
+        <p:spPr>
+          <a:xfrm>
+            <a:off x="4055533" y="2472402"/>
+            <a:ext cx="3454400" cy="3212963"/>
+          </a:xfrm>
+          <a:prstGeom prst="rect">
+            <a:avLst/>
+          </a:prstGeom>
+        </p:spPr>
+      </p:pic>
+      <p:pic>
+        <p:nvPicPr>
+          <p:cNvPr id="12" name="Picture 11">
+            <a:extLst>
+              <a:ext uri="{FF2B5EF4-FFF2-40B4-BE49-F238E27FC236}">
+                <a16:creationId xmlns:a16="http://schemas.microsoft.com/office/drawing/2014/main" id="{28FE4A37-9CFA-8447-9E37-FFC2B8E220AA}"/>
+              </a:ext>
+            </a:extLst>
+          </p:cNvPr>
+          <p:cNvPicPr>
+            <a:picLocks noChangeAspect="1"/>
+          </p:cNvPicPr>
+          <p:nvPr/>
+        </p:nvPicPr>
+        <p:blipFill>
+          <a:blip r:embed="rId3"/>
+          <a:stretch>
+            <a:fillRect/>
+          </a:stretch>
+        </p:blipFill>
+        <p:spPr>
+          <a:xfrm>
+            <a:off x="731800" y="2356716"/>
+            <a:ext cx="3230599" cy="3265151"/>
+          </a:xfrm>
+          <a:prstGeom prst="rect">
+            <a:avLst/>
+          </a:prstGeom>
+        </p:spPr>
+      </p:pic>
+      <p:pic>
+        <p:nvPicPr>
+          <p:cNvPr id="13" name="Picture 12">
+            <a:extLst>
+              <a:ext uri="{FF2B5EF4-FFF2-40B4-BE49-F238E27FC236}">
+                <a16:creationId xmlns:a16="http://schemas.microsoft.com/office/drawing/2014/main" id="{5B5924C5-911F-F742-B7C6-C826786E1813}"/>
+              </a:ext>
+            </a:extLst>
+          </p:cNvPr>
+          <p:cNvPicPr>
+            <a:picLocks noChangeAspect="1"/>
+          </p:cNvPicPr>
+          <p:nvPr/>
+        </p:nvPicPr>
+        <p:blipFill>
+          <a:blip r:embed="rId4"/>
+          <a:stretch>
+            <a:fillRect/>
+          </a:stretch>
+        </p:blipFill>
+        <p:spPr>
+          <a:xfrm>
+            <a:off x="7732499" y="2582333"/>
+            <a:ext cx="4387174" cy="2235200"/>
+          </a:xfrm>
+          <a:prstGeom prst="rect">
+            <a:avLst/>
+          </a:prstGeom>
+        </p:spPr>
+      </p:pic>
     </p:spTree>
     <p:extLst>
       <p:ext uri="{BB962C8B-B14F-4D97-AF65-F5344CB8AC3E}">
@@ -13237,7 +13721,1053 @@
 </p:sld>
 </file>
 
-<file path=ppt/slides/slide13.xml><?xml version="1.0" encoding="utf-8"?>
+<file path=ppt/slides/slide14.xml><?xml version="1.0" encoding="utf-8"?>
+<p:sld xmlns:a="http://schemas.openxmlformats.org/drawingml/2006/main" xmlns:r="http://schemas.openxmlformats.org/officeDocument/2006/relationships" xmlns:p="http://schemas.openxmlformats.org/presentationml/2006/main">
+  <p:cSld>
+    <p:bg>
+      <p:bgPr>
+        <a:solidFill>
+          <a:schemeClr val="tx1"/>
+        </a:solidFill>
+        <a:effectLst/>
+      </p:bgPr>
+    </p:bg>
+    <p:spTree>
+      <p:nvGrpSpPr>
+        <p:cNvPr id="1" name=""/>
+        <p:cNvGrpSpPr/>
+        <p:nvPr/>
+      </p:nvGrpSpPr>
+      <p:grpSpPr>
+        <a:xfrm>
+          <a:off x="0" y="0"/>
+          <a:ext cx="0" cy="0"/>
+          <a:chOff x="0" y="0"/>
+          <a:chExt cx="0" cy="0"/>
+        </a:xfrm>
+      </p:grpSpPr>
+      <p:sp>
+        <p:nvSpPr>
+          <p:cNvPr id="2" name="Title 1">
+            <a:extLst>
+              <a:ext uri="{FF2B5EF4-FFF2-40B4-BE49-F238E27FC236}">
+                <a16:creationId xmlns:a16="http://schemas.microsoft.com/office/drawing/2014/main" id="{9B4F2AFD-FB97-344A-8B10-5D002B15F583}"/>
+              </a:ext>
+            </a:extLst>
+          </p:cNvPr>
+          <p:cNvSpPr>
+            <a:spLocks noGrp="1"/>
+          </p:cNvSpPr>
+          <p:nvPr>
+            <p:ph type="title"/>
+          </p:nvPr>
+        </p:nvSpPr>
+        <p:spPr/>
+        <p:txBody>
+          <a:bodyPr/>
+          <a:lstStyle/>
+          <a:p>
+            <a:r>
+              <a:rPr lang="en-US" dirty="0">
+                <a:solidFill>
+                  <a:schemeClr val="bg1"/>
+                </a:solidFill>
+              </a:rPr>
+              <a:t>Results</a:t>
+            </a:r>
+          </a:p>
+        </p:txBody>
+      </p:sp>
+      <p:sp>
+        <p:nvSpPr>
+          <p:cNvPr id="3" name="TextBox 2">
+            <a:extLst>
+              <a:ext uri="{FF2B5EF4-FFF2-40B4-BE49-F238E27FC236}">
+                <a16:creationId xmlns:a16="http://schemas.microsoft.com/office/drawing/2014/main" id="{36797005-6DC6-CD4D-B403-3E362141179A}"/>
+              </a:ext>
+            </a:extLst>
+          </p:cNvPr>
+          <p:cNvSpPr txBox="1"/>
+          <p:nvPr/>
+        </p:nvSpPr>
+        <p:spPr>
+          <a:xfrm>
+            <a:off x="1179967" y="1803400"/>
+            <a:ext cx="1945404" cy="369332"/>
+          </a:xfrm>
+          <a:prstGeom prst="rect">
+            <a:avLst/>
+          </a:prstGeom>
+          <a:noFill/>
+        </p:spPr>
+        <p:txBody>
+          <a:bodyPr wrap="none" rtlCol="0">
+            <a:spAutoFit/>
+          </a:bodyPr>
+          <a:lstStyle/>
+          <a:p>
+            <a:r>
+              <a:rPr lang="en-US" dirty="0">
+                <a:solidFill>
+                  <a:schemeClr val="bg1"/>
+                </a:solidFill>
+              </a:rPr>
+              <a:t>Proof with Shannon</a:t>
+            </a:r>
+          </a:p>
+        </p:txBody>
+      </p:sp>
+      <p:pic>
+        <p:nvPicPr>
+          <p:cNvPr id="12" name="Picture 11">
+            <a:extLst>
+              <a:ext uri="{FF2B5EF4-FFF2-40B4-BE49-F238E27FC236}">
+                <a16:creationId xmlns:a16="http://schemas.microsoft.com/office/drawing/2014/main" id="{28FE4A37-9CFA-8447-9E37-FFC2B8E220AA}"/>
+              </a:ext>
+            </a:extLst>
+          </p:cNvPr>
+          <p:cNvPicPr>
+            <a:picLocks noChangeAspect="1"/>
+          </p:cNvPicPr>
+          <p:nvPr/>
+        </p:nvPicPr>
+        <p:blipFill>
+          <a:blip r:embed="rId2"/>
+          <a:stretch>
+            <a:fillRect/>
+          </a:stretch>
+        </p:blipFill>
+        <p:spPr>
+          <a:xfrm>
+            <a:off x="731800" y="2356716"/>
+            <a:ext cx="3230599" cy="3265151"/>
+          </a:xfrm>
+          <a:prstGeom prst="rect">
+            <a:avLst/>
+          </a:prstGeom>
+        </p:spPr>
+      </p:pic>
+      <p:sp>
+        <p:nvSpPr>
+          <p:cNvPr id="9" name="Rectangle 8">
+            <a:extLst>
+              <a:ext uri="{FF2B5EF4-FFF2-40B4-BE49-F238E27FC236}">
+                <a16:creationId xmlns:a16="http://schemas.microsoft.com/office/drawing/2014/main" id="{16049376-7648-5F43-8834-E64AF9F0E0A2}"/>
+              </a:ext>
+            </a:extLst>
+          </p:cNvPr>
+          <p:cNvSpPr/>
+          <p:nvPr/>
+        </p:nvSpPr>
+        <p:spPr>
+          <a:xfrm>
+            <a:off x="706399" y="5176704"/>
+            <a:ext cx="1376400" cy="483260"/>
+          </a:xfrm>
+          <a:prstGeom prst="rect">
+            <a:avLst/>
+          </a:prstGeom>
+          <a:noFill/>
+          <a:ln w="31750">
+            <a:solidFill>
+              <a:srgbClr val="C00000"/>
+            </a:solidFill>
+          </a:ln>
+        </p:spPr>
+        <p:style>
+          <a:lnRef idx="2">
+            <a:schemeClr val="accent1">
+              <a:shade val="50000"/>
+            </a:schemeClr>
+          </a:lnRef>
+          <a:fillRef idx="1">
+            <a:schemeClr val="accent1"/>
+          </a:fillRef>
+          <a:effectRef idx="0">
+            <a:schemeClr val="accent1"/>
+          </a:effectRef>
+          <a:fontRef idx="minor">
+            <a:schemeClr val="lt1"/>
+          </a:fontRef>
+        </p:style>
+        <p:txBody>
+          <a:bodyPr rtlCol="0" anchor="ctr"/>
+          <a:lstStyle/>
+          <a:p>
+            <a:pPr algn="ctr"/>
+            <a:endParaRPr lang="en-US"/>
+          </a:p>
+        </p:txBody>
+      </p:sp>
+    </p:spTree>
+    <p:extLst>
+      <p:ext uri="{BB962C8B-B14F-4D97-AF65-F5344CB8AC3E}">
+        <p14:creationId xmlns:p14="http://schemas.microsoft.com/office/powerpoint/2010/main" val="3628501894"/>
+      </p:ext>
+    </p:extLst>
+  </p:cSld>
+  <p:clrMapOvr>
+    <a:masterClrMapping/>
+  </p:clrMapOvr>
+</p:sld>
+</file>
+
+<file path=ppt/slides/slide15.xml><?xml version="1.0" encoding="utf-8"?>
+<p:sld xmlns:a="http://schemas.openxmlformats.org/drawingml/2006/main" xmlns:r="http://schemas.openxmlformats.org/officeDocument/2006/relationships" xmlns:p="http://schemas.openxmlformats.org/presentationml/2006/main">
+  <p:cSld>
+    <p:bg>
+      <p:bgPr>
+        <a:solidFill>
+          <a:schemeClr val="tx1"/>
+        </a:solidFill>
+        <a:effectLst/>
+      </p:bgPr>
+    </p:bg>
+    <p:spTree>
+      <p:nvGrpSpPr>
+        <p:cNvPr id="1" name=""/>
+        <p:cNvGrpSpPr/>
+        <p:nvPr/>
+      </p:nvGrpSpPr>
+      <p:grpSpPr>
+        <a:xfrm>
+          <a:off x="0" y="0"/>
+          <a:ext cx="0" cy="0"/>
+          <a:chOff x="0" y="0"/>
+          <a:chExt cx="0" cy="0"/>
+        </a:xfrm>
+      </p:grpSpPr>
+      <p:sp>
+        <p:nvSpPr>
+          <p:cNvPr id="2" name="Title 1">
+            <a:extLst>
+              <a:ext uri="{FF2B5EF4-FFF2-40B4-BE49-F238E27FC236}">
+                <a16:creationId xmlns:a16="http://schemas.microsoft.com/office/drawing/2014/main" id="{9B4F2AFD-FB97-344A-8B10-5D002B15F583}"/>
+              </a:ext>
+            </a:extLst>
+          </p:cNvPr>
+          <p:cNvSpPr>
+            <a:spLocks noGrp="1"/>
+          </p:cNvSpPr>
+          <p:nvPr>
+            <p:ph type="title"/>
+          </p:nvPr>
+        </p:nvSpPr>
+        <p:spPr/>
+        <p:txBody>
+          <a:bodyPr/>
+          <a:lstStyle/>
+          <a:p>
+            <a:r>
+              <a:rPr lang="en-US" dirty="0">
+                <a:solidFill>
+                  <a:schemeClr val="bg1"/>
+                </a:solidFill>
+              </a:rPr>
+              <a:t>Results</a:t>
+            </a:r>
+          </a:p>
+        </p:txBody>
+      </p:sp>
+      <p:sp>
+        <p:nvSpPr>
+          <p:cNvPr id="3" name="TextBox 2">
+            <a:extLst>
+              <a:ext uri="{FF2B5EF4-FFF2-40B4-BE49-F238E27FC236}">
+                <a16:creationId xmlns:a16="http://schemas.microsoft.com/office/drawing/2014/main" id="{36797005-6DC6-CD4D-B403-3E362141179A}"/>
+              </a:ext>
+            </a:extLst>
+          </p:cNvPr>
+          <p:cNvSpPr txBox="1"/>
+          <p:nvPr/>
+        </p:nvSpPr>
+        <p:spPr>
+          <a:xfrm>
+            <a:off x="1179967" y="1803400"/>
+            <a:ext cx="1945404" cy="369332"/>
+          </a:xfrm>
+          <a:prstGeom prst="rect">
+            <a:avLst/>
+          </a:prstGeom>
+          <a:noFill/>
+        </p:spPr>
+        <p:txBody>
+          <a:bodyPr wrap="none" rtlCol="0">
+            <a:spAutoFit/>
+          </a:bodyPr>
+          <a:lstStyle/>
+          <a:p>
+            <a:r>
+              <a:rPr lang="en-US" dirty="0">
+                <a:solidFill>
+                  <a:schemeClr val="bg1"/>
+                </a:solidFill>
+              </a:rPr>
+              <a:t>Proof with Shannon</a:t>
+            </a:r>
+          </a:p>
+        </p:txBody>
+      </p:sp>
+      <p:pic>
+        <p:nvPicPr>
+          <p:cNvPr id="12" name="Picture 11">
+            <a:extLst>
+              <a:ext uri="{FF2B5EF4-FFF2-40B4-BE49-F238E27FC236}">
+                <a16:creationId xmlns:a16="http://schemas.microsoft.com/office/drawing/2014/main" id="{28FE4A37-9CFA-8447-9E37-FFC2B8E220AA}"/>
+              </a:ext>
+            </a:extLst>
+          </p:cNvPr>
+          <p:cNvPicPr>
+            <a:picLocks noChangeAspect="1"/>
+          </p:cNvPicPr>
+          <p:nvPr/>
+        </p:nvPicPr>
+        <p:blipFill>
+          <a:blip r:embed="rId2"/>
+          <a:stretch>
+            <a:fillRect/>
+          </a:stretch>
+        </p:blipFill>
+        <p:spPr>
+          <a:xfrm>
+            <a:off x="731800" y="2356716"/>
+            <a:ext cx="3230599" cy="3265151"/>
+          </a:xfrm>
+          <a:prstGeom prst="rect">
+            <a:avLst/>
+          </a:prstGeom>
+        </p:spPr>
+      </p:pic>
+      <p:sp>
+        <p:nvSpPr>
+          <p:cNvPr id="9" name="Rectangle 8">
+            <a:extLst>
+              <a:ext uri="{FF2B5EF4-FFF2-40B4-BE49-F238E27FC236}">
+                <a16:creationId xmlns:a16="http://schemas.microsoft.com/office/drawing/2014/main" id="{16049376-7648-5F43-8834-E64AF9F0E0A2}"/>
+              </a:ext>
+            </a:extLst>
+          </p:cNvPr>
+          <p:cNvSpPr/>
+          <p:nvPr/>
+        </p:nvSpPr>
+        <p:spPr>
+          <a:xfrm>
+            <a:off x="706399" y="5176704"/>
+            <a:ext cx="1376400" cy="483260"/>
+          </a:xfrm>
+          <a:prstGeom prst="rect">
+            <a:avLst/>
+          </a:prstGeom>
+          <a:noFill/>
+          <a:ln w="31750">
+            <a:solidFill>
+              <a:srgbClr val="C00000"/>
+            </a:solidFill>
+          </a:ln>
+        </p:spPr>
+        <p:style>
+          <a:lnRef idx="2">
+            <a:schemeClr val="accent1">
+              <a:shade val="50000"/>
+            </a:schemeClr>
+          </a:lnRef>
+          <a:fillRef idx="1">
+            <a:schemeClr val="accent1"/>
+          </a:fillRef>
+          <a:effectRef idx="0">
+            <a:schemeClr val="accent1"/>
+          </a:effectRef>
+          <a:fontRef idx="minor">
+            <a:schemeClr val="lt1"/>
+          </a:fontRef>
+        </p:style>
+        <p:txBody>
+          <a:bodyPr rtlCol="0" anchor="ctr"/>
+          <a:lstStyle/>
+          <a:p>
+            <a:pPr algn="ctr"/>
+            <a:endParaRPr lang="en-US"/>
+          </a:p>
+        </p:txBody>
+      </p:sp>
+      <p:cxnSp>
+        <p:nvCxnSpPr>
+          <p:cNvPr id="10" name="Straight Arrow Connector 9">
+            <a:extLst>
+              <a:ext uri="{FF2B5EF4-FFF2-40B4-BE49-F238E27FC236}">
+                <a16:creationId xmlns:a16="http://schemas.microsoft.com/office/drawing/2014/main" id="{43468496-5138-6F43-B0D9-9F850D40A327}"/>
+              </a:ext>
+            </a:extLst>
+          </p:cNvPr>
+          <p:cNvCxnSpPr>
+            <a:cxnSpLocks/>
+          </p:cNvCxnSpPr>
+          <p:nvPr/>
+        </p:nvCxnSpPr>
+        <p:spPr>
+          <a:xfrm flipV="1">
+            <a:off x="2082799" y="2568301"/>
+            <a:ext cx="3288225" cy="2608403"/>
+          </a:xfrm>
+          <a:prstGeom prst="straightConnector1">
+            <a:avLst/>
+          </a:prstGeom>
+          <a:ln w="38100">
+            <a:solidFill>
+              <a:srgbClr val="C00000"/>
+            </a:solidFill>
+            <a:tailEnd type="triangle"/>
+          </a:ln>
+        </p:spPr>
+        <p:style>
+          <a:lnRef idx="1">
+            <a:schemeClr val="accent1"/>
+          </a:lnRef>
+          <a:fillRef idx="0">
+            <a:schemeClr val="accent1"/>
+          </a:fillRef>
+          <a:effectRef idx="0">
+            <a:schemeClr val="accent1"/>
+          </a:effectRef>
+          <a:fontRef idx="minor">
+            <a:schemeClr val="tx1"/>
+          </a:fontRef>
+        </p:style>
+      </p:cxnSp>
+      <p:pic>
+        <p:nvPicPr>
+          <p:cNvPr id="4" name="Picture 3">
+            <a:extLst>
+              <a:ext uri="{FF2B5EF4-FFF2-40B4-BE49-F238E27FC236}">
+                <a16:creationId xmlns:a16="http://schemas.microsoft.com/office/drawing/2014/main" id="{37D2A5D0-8404-3C46-83FF-C8397A0AA4BB}"/>
+              </a:ext>
+            </a:extLst>
+          </p:cNvPr>
+          <p:cNvPicPr>
+            <a:picLocks noChangeAspect="1"/>
+          </p:cNvPicPr>
+          <p:nvPr/>
+        </p:nvPicPr>
+        <p:blipFill>
+          <a:blip r:embed="rId3"/>
+          <a:stretch>
+            <a:fillRect/>
+          </a:stretch>
+        </p:blipFill>
+        <p:spPr>
+          <a:xfrm>
+            <a:off x="5609165" y="1803400"/>
+            <a:ext cx="4322105" cy="1552601"/>
+          </a:xfrm>
+          <a:prstGeom prst="rect">
+            <a:avLst/>
+          </a:prstGeom>
+        </p:spPr>
+      </p:pic>
+      <p:pic>
+        <p:nvPicPr>
+          <p:cNvPr id="7" name="Picture 6">
+            <a:extLst>
+              <a:ext uri="{FF2B5EF4-FFF2-40B4-BE49-F238E27FC236}">
+                <a16:creationId xmlns:a16="http://schemas.microsoft.com/office/drawing/2014/main" id="{D4BA9689-81DA-7247-A76F-C877AD7483DA}"/>
+              </a:ext>
+            </a:extLst>
+          </p:cNvPr>
+          <p:cNvPicPr>
+            <a:picLocks noChangeAspect="1"/>
+          </p:cNvPicPr>
+          <p:nvPr/>
+        </p:nvPicPr>
+        <p:blipFill>
+          <a:blip r:embed="rId4"/>
+          <a:stretch>
+            <a:fillRect/>
+          </a:stretch>
+        </p:blipFill>
+        <p:spPr>
+          <a:xfrm>
+            <a:off x="5609165" y="2322848"/>
+            <a:ext cx="6324600" cy="2070100"/>
+          </a:xfrm>
+          <a:prstGeom prst="rect">
+            <a:avLst/>
+          </a:prstGeom>
+        </p:spPr>
+      </p:pic>
+    </p:spTree>
+    <p:extLst>
+      <p:ext uri="{BB962C8B-B14F-4D97-AF65-F5344CB8AC3E}">
+        <p14:creationId xmlns:p14="http://schemas.microsoft.com/office/powerpoint/2010/main" val="4030377222"/>
+      </p:ext>
+    </p:extLst>
+  </p:cSld>
+  <p:clrMapOvr>
+    <a:masterClrMapping/>
+  </p:clrMapOvr>
+</p:sld>
+</file>
+
+<file path=ppt/slides/slide16.xml><?xml version="1.0" encoding="utf-8"?>
+<p:sld xmlns:a="http://schemas.openxmlformats.org/drawingml/2006/main" xmlns:r="http://schemas.openxmlformats.org/officeDocument/2006/relationships" xmlns:p="http://schemas.openxmlformats.org/presentationml/2006/main">
+  <p:cSld>
+    <p:bg>
+      <p:bgPr>
+        <a:solidFill>
+          <a:schemeClr val="tx1"/>
+        </a:solidFill>
+        <a:effectLst/>
+      </p:bgPr>
+    </p:bg>
+    <p:spTree>
+      <p:nvGrpSpPr>
+        <p:cNvPr id="1" name=""/>
+        <p:cNvGrpSpPr/>
+        <p:nvPr/>
+      </p:nvGrpSpPr>
+      <p:grpSpPr>
+        <a:xfrm>
+          <a:off x="0" y="0"/>
+          <a:ext cx="0" cy="0"/>
+          <a:chOff x="0" y="0"/>
+          <a:chExt cx="0" cy="0"/>
+        </a:xfrm>
+      </p:grpSpPr>
+      <p:sp>
+        <p:nvSpPr>
+          <p:cNvPr id="2" name="Title 1">
+            <a:extLst>
+              <a:ext uri="{FF2B5EF4-FFF2-40B4-BE49-F238E27FC236}">
+                <a16:creationId xmlns:a16="http://schemas.microsoft.com/office/drawing/2014/main" id="{9B4F2AFD-FB97-344A-8B10-5D002B15F583}"/>
+              </a:ext>
+            </a:extLst>
+          </p:cNvPr>
+          <p:cNvSpPr>
+            <a:spLocks noGrp="1"/>
+          </p:cNvSpPr>
+          <p:nvPr>
+            <p:ph type="title"/>
+          </p:nvPr>
+        </p:nvSpPr>
+        <p:spPr/>
+        <p:txBody>
+          <a:bodyPr/>
+          <a:lstStyle/>
+          <a:p>
+            <a:r>
+              <a:rPr lang="en-US" dirty="0">
+                <a:solidFill>
+                  <a:schemeClr val="bg1"/>
+                </a:solidFill>
+              </a:rPr>
+              <a:t>Results</a:t>
+            </a:r>
+          </a:p>
+        </p:txBody>
+      </p:sp>
+      <p:sp>
+        <p:nvSpPr>
+          <p:cNvPr id="3" name="TextBox 2">
+            <a:extLst>
+              <a:ext uri="{FF2B5EF4-FFF2-40B4-BE49-F238E27FC236}">
+                <a16:creationId xmlns:a16="http://schemas.microsoft.com/office/drawing/2014/main" id="{36797005-6DC6-CD4D-B403-3E362141179A}"/>
+              </a:ext>
+            </a:extLst>
+          </p:cNvPr>
+          <p:cNvSpPr txBox="1"/>
+          <p:nvPr/>
+        </p:nvSpPr>
+        <p:spPr>
+          <a:xfrm>
+            <a:off x="1179967" y="1803400"/>
+            <a:ext cx="1945404" cy="369332"/>
+          </a:xfrm>
+          <a:prstGeom prst="rect">
+            <a:avLst/>
+          </a:prstGeom>
+          <a:noFill/>
+        </p:spPr>
+        <p:txBody>
+          <a:bodyPr wrap="none" rtlCol="0">
+            <a:spAutoFit/>
+          </a:bodyPr>
+          <a:lstStyle/>
+          <a:p>
+            <a:r>
+              <a:rPr lang="en-US" dirty="0">
+                <a:solidFill>
+                  <a:schemeClr val="bg1"/>
+                </a:solidFill>
+              </a:rPr>
+              <a:t>Proof with Shannon</a:t>
+            </a:r>
+          </a:p>
+        </p:txBody>
+      </p:sp>
+      <p:pic>
+        <p:nvPicPr>
+          <p:cNvPr id="12" name="Picture 11">
+            <a:extLst>
+              <a:ext uri="{FF2B5EF4-FFF2-40B4-BE49-F238E27FC236}">
+                <a16:creationId xmlns:a16="http://schemas.microsoft.com/office/drawing/2014/main" id="{28FE4A37-9CFA-8447-9E37-FFC2B8E220AA}"/>
+              </a:ext>
+            </a:extLst>
+          </p:cNvPr>
+          <p:cNvPicPr>
+            <a:picLocks noChangeAspect="1"/>
+          </p:cNvPicPr>
+          <p:nvPr/>
+        </p:nvPicPr>
+        <p:blipFill>
+          <a:blip r:embed="rId2"/>
+          <a:stretch>
+            <a:fillRect/>
+          </a:stretch>
+        </p:blipFill>
+        <p:spPr>
+          <a:xfrm>
+            <a:off x="731800" y="2356716"/>
+            <a:ext cx="3230599" cy="3265151"/>
+          </a:xfrm>
+          <a:prstGeom prst="rect">
+            <a:avLst/>
+          </a:prstGeom>
+        </p:spPr>
+      </p:pic>
+      <p:sp>
+        <p:nvSpPr>
+          <p:cNvPr id="9" name="Rectangle 8">
+            <a:extLst>
+              <a:ext uri="{FF2B5EF4-FFF2-40B4-BE49-F238E27FC236}">
+                <a16:creationId xmlns:a16="http://schemas.microsoft.com/office/drawing/2014/main" id="{16049376-7648-5F43-8834-E64AF9F0E0A2}"/>
+              </a:ext>
+            </a:extLst>
+          </p:cNvPr>
+          <p:cNvSpPr/>
+          <p:nvPr/>
+        </p:nvSpPr>
+        <p:spPr>
+          <a:xfrm>
+            <a:off x="706399" y="5176704"/>
+            <a:ext cx="1376400" cy="483260"/>
+          </a:xfrm>
+          <a:prstGeom prst="rect">
+            <a:avLst/>
+          </a:prstGeom>
+          <a:noFill/>
+          <a:ln w="31750">
+            <a:solidFill>
+              <a:srgbClr val="C00000"/>
+            </a:solidFill>
+          </a:ln>
+        </p:spPr>
+        <p:style>
+          <a:lnRef idx="2">
+            <a:schemeClr val="accent1">
+              <a:shade val="50000"/>
+            </a:schemeClr>
+          </a:lnRef>
+          <a:fillRef idx="1">
+            <a:schemeClr val="accent1"/>
+          </a:fillRef>
+          <a:effectRef idx="0">
+            <a:schemeClr val="accent1"/>
+          </a:effectRef>
+          <a:fontRef idx="minor">
+            <a:schemeClr val="lt1"/>
+          </a:fontRef>
+        </p:style>
+        <p:txBody>
+          <a:bodyPr rtlCol="0" anchor="ctr"/>
+          <a:lstStyle/>
+          <a:p>
+            <a:pPr algn="ctr"/>
+            <a:endParaRPr lang="en-US"/>
+          </a:p>
+        </p:txBody>
+      </p:sp>
+      <p:cxnSp>
+        <p:nvCxnSpPr>
+          <p:cNvPr id="10" name="Straight Arrow Connector 9">
+            <a:extLst>
+              <a:ext uri="{FF2B5EF4-FFF2-40B4-BE49-F238E27FC236}">
+                <a16:creationId xmlns:a16="http://schemas.microsoft.com/office/drawing/2014/main" id="{43468496-5138-6F43-B0D9-9F850D40A327}"/>
+              </a:ext>
+            </a:extLst>
+          </p:cNvPr>
+          <p:cNvCxnSpPr>
+            <a:cxnSpLocks/>
+          </p:cNvCxnSpPr>
+          <p:nvPr/>
+        </p:nvCxnSpPr>
+        <p:spPr>
+          <a:xfrm flipV="1">
+            <a:off x="2082799" y="2568301"/>
+            <a:ext cx="3288225" cy="2608403"/>
+          </a:xfrm>
+          <a:prstGeom prst="straightConnector1">
+            <a:avLst/>
+          </a:prstGeom>
+          <a:ln w="38100">
+            <a:solidFill>
+              <a:srgbClr val="C00000"/>
+            </a:solidFill>
+            <a:tailEnd type="triangle"/>
+          </a:ln>
+        </p:spPr>
+        <p:style>
+          <a:lnRef idx="1">
+            <a:schemeClr val="accent1"/>
+          </a:lnRef>
+          <a:fillRef idx="0">
+            <a:schemeClr val="accent1"/>
+          </a:fillRef>
+          <a:effectRef idx="0">
+            <a:schemeClr val="accent1"/>
+          </a:effectRef>
+          <a:fontRef idx="minor">
+            <a:schemeClr val="tx1"/>
+          </a:fontRef>
+        </p:style>
+      </p:cxnSp>
+      <p:pic>
+        <p:nvPicPr>
+          <p:cNvPr id="4" name="Picture 3">
+            <a:extLst>
+              <a:ext uri="{FF2B5EF4-FFF2-40B4-BE49-F238E27FC236}">
+                <a16:creationId xmlns:a16="http://schemas.microsoft.com/office/drawing/2014/main" id="{37D2A5D0-8404-3C46-83FF-C8397A0AA4BB}"/>
+              </a:ext>
+            </a:extLst>
+          </p:cNvPr>
+          <p:cNvPicPr>
+            <a:picLocks noChangeAspect="1"/>
+          </p:cNvPicPr>
+          <p:nvPr/>
+        </p:nvPicPr>
+        <p:blipFill>
+          <a:blip r:embed="rId3"/>
+          <a:stretch>
+            <a:fillRect/>
+          </a:stretch>
+        </p:blipFill>
+        <p:spPr>
+          <a:xfrm>
+            <a:off x="5609165" y="1803400"/>
+            <a:ext cx="4322105" cy="1552601"/>
+          </a:xfrm>
+          <a:prstGeom prst="rect">
+            <a:avLst/>
+          </a:prstGeom>
+        </p:spPr>
+      </p:pic>
+      <p:pic>
+        <p:nvPicPr>
+          <p:cNvPr id="7" name="Picture 6">
+            <a:extLst>
+              <a:ext uri="{FF2B5EF4-FFF2-40B4-BE49-F238E27FC236}">
+                <a16:creationId xmlns:a16="http://schemas.microsoft.com/office/drawing/2014/main" id="{D4BA9689-81DA-7247-A76F-C877AD7483DA}"/>
+              </a:ext>
+            </a:extLst>
+          </p:cNvPr>
+          <p:cNvPicPr>
+            <a:picLocks noChangeAspect="1"/>
+          </p:cNvPicPr>
+          <p:nvPr/>
+        </p:nvPicPr>
+        <p:blipFill>
+          <a:blip r:embed="rId4"/>
+          <a:stretch>
+            <a:fillRect/>
+          </a:stretch>
+        </p:blipFill>
+        <p:spPr>
+          <a:xfrm>
+            <a:off x="5541432" y="2771582"/>
+            <a:ext cx="6324600" cy="2070100"/>
+          </a:xfrm>
+          <a:prstGeom prst="rect">
+            <a:avLst/>
+          </a:prstGeom>
+        </p:spPr>
+      </p:pic>
+    </p:spTree>
+    <p:extLst>
+      <p:ext uri="{BB962C8B-B14F-4D97-AF65-F5344CB8AC3E}">
+        <p14:creationId xmlns:p14="http://schemas.microsoft.com/office/powerpoint/2010/main" val="4120177522"/>
+      </p:ext>
+    </p:extLst>
+  </p:cSld>
+  <p:clrMapOvr>
+    <a:masterClrMapping/>
+  </p:clrMapOvr>
+</p:sld>
+</file>
+
+<file path=ppt/slides/slide17.xml><?xml version="1.0" encoding="utf-8"?>
+<p:sld xmlns:a="http://schemas.openxmlformats.org/drawingml/2006/main" xmlns:r="http://schemas.openxmlformats.org/officeDocument/2006/relationships" xmlns:p="http://schemas.openxmlformats.org/presentationml/2006/main">
+  <p:cSld>
+    <p:bg>
+      <p:bgPr>
+        <a:solidFill>
+          <a:schemeClr val="tx1"/>
+        </a:solidFill>
+        <a:effectLst/>
+      </p:bgPr>
+    </p:bg>
+    <p:spTree>
+      <p:nvGrpSpPr>
+        <p:cNvPr id="1" name=""/>
+        <p:cNvGrpSpPr/>
+        <p:nvPr/>
+      </p:nvGrpSpPr>
+      <p:grpSpPr>
+        <a:xfrm>
+          <a:off x="0" y="0"/>
+          <a:ext cx="0" cy="0"/>
+          <a:chOff x="0" y="0"/>
+          <a:chExt cx="0" cy="0"/>
+        </a:xfrm>
+      </p:grpSpPr>
+      <p:sp>
+        <p:nvSpPr>
+          <p:cNvPr id="2" name="Title 1">
+            <a:extLst>
+              <a:ext uri="{FF2B5EF4-FFF2-40B4-BE49-F238E27FC236}">
+                <a16:creationId xmlns:a16="http://schemas.microsoft.com/office/drawing/2014/main" id="{9B4F2AFD-FB97-344A-8B10-5D002B15F583}"/>
+              </a:ext>
+            </a:extLst>
+          </p:cNvPr>
+          <p:cNvSpPr>
+            <a:spLocks noGrp="1"/>
+          </p:cNvSpPr>
+          <p:nvPr>
+            <p:ph type="title"/>
+          </p:nvPr>
+        </p:nvSpPr>
+        <p:spPr/>
+        <p:txBody>
+          <a:bodyPr/>
+          <a:lstStyle/>
+          <a:p>
+            <a:r>
+              <a:rPr lang="en-US" dirty="0">
+                <a:solidFill>
+                  <a:schemeClr val="bg1"/>
+                </a:solidFill>
+              </a:rPr>
+              <a:t>Results</a:t>
+            </a:r>
+          </a:p>
+        </p:txBody>
+      </p:sp>
+      <p:sp>
+        <p:nvSpPr>
+          <p:cNvPr id="3" name="TextBox 2">
+            <a:extLst>
+              <a:ext uri="{FF2B5EF4-FFF2-40B4-BE49-F238E27FC236}">
+                <a16:creationId xmlns:a16="http://schemas.microsoft.com/office/drawing/2014/main" id="{36797005-6DC6-CD4D-B403-3E362141179A}"/>
+              </a:ext>
+            </a:extLst>
+          </p:cNvPr>
+          <p:cNvSpPr txBox="1"/>
+          <p:nvPr/>
+        </p:nvSpPr>
+        <p:spPr>
+          <a:xfrm>
+            <a:off x="1179967" y="1803400"/>
+            <a:ext cx="1945404" cy="369332"/>
+          </a:xfrm>
+          <a:prstGeom prst="rect">
+            <a:avLst/>
+          </a:prstGeom>
+          <a:noFill/>
+        </p:spPr>
+        <p:txBody>
+          <a:bodyPr wrap="none" rtlCol="0">
+            <a:spAutoFit/>
+          </a:bodyPr>
+          <a:lstStyle/>
+          <a:p>
+            <a:r>
+              <a:rPr lang="en-US" dirty="0">
+                <a:solidFill>
+                  <a:schemeClr val="bg1"/>
+                </a:solidFill>
+              </a:rPr>
+              <a:t>Proof with Shannon</a:t>
+            </a:r>
+          </a:p>
+        </p:txBody>
+      </p:sp>
+      <p:pic>
+        <p:nvPicPr>
+          <p:cNvPr id="12" name="Picture 11">
+            <a:extLst>
+              <a:ext uri="{FF2B5EF4-FFF2-40B4-BE49-F238E27FC236}">
+                <a16:creationId xmlns:a16="http://schemas.microsoft.com/office/drawing/2014/main" id="{28FE4A37-9CFA-8447-9E37-FFC2B8E220AA}"/>
+              </a:ext>
+            </a:extLst>
+          </p:cNvPr>
+          <p:cNvPicPr>
+            <a:picLocks noChangeAspect="1"/>
+          </p:cNvPicPr>
+          <p:nvPr/>
+        </p:nvPicPr>
+        <p:blipFill>
+          <a:blip r:embed="rId2"/>
+          <a:stretch>
+            <a:fillRect/>
+          </a:stretch>
+        </p:blipFill>
+        <p:spPr>
+          <a:xfrm>
+            <a:off x="731800" y="2356716"/>
+            <a:ext cx="3230599" cy="3265151"/>
+          </a:xfrm>
+          <a:prstGeom prst="rect">
+            <a:avLst/>
+          </a:prstGeom>
+        </p:spPr>
+      </p:pic>
+      <p:sp>
+        <p:nvSpPr>
+          <p:cNvPr id="9" name="Rectangle 8">
+            <a:extLst>
+              <a:ext uri="{FF2B5EF4-FFF2-40B4-BE49-F238E27FC236}">
+                <a16:creationId xmlns:a16="http://schemas.microsoft.com/office/drawing/2014/main" id="{16049376-7648-5F43-8834-E64AF9F0E0A2}"/>
+              </a:ext>
+            </a:extLst>
+          </p:cNvPr>
+          <p:cNvSpPr/>
+          <p:nvPr/>
+        </p:nvSpPr>
+        <p:spPr>
+          <a:xfrm>
+            <a:off x="706399" y="5176704"/>
+            <a:ext cx="1376400" cy="483260"/>
+          </a:xfrm>
+          <a:prstGeom prst="rect">
+            <a:avLst/>
+          </a:prstGeom>
+          <a:noFill/>
+          <a:ln w="31750">
+            <a:solidFill>
+              <a:srgbClr val="C00000"/>
+            </a:solidFill>
+          </a:ln>
+        </p:spPr>
+        <p:style>
+          <a:lnRef idx="2">
+            <a:schemeClr val="accent1">
+              <a:shade val="50000"/>
+            </a:schemeClr>
+          </a:lnRef>
+          <a:fillRef idx="1">
+            <a:schemeClr val="accent1"/>
+          </a:fillRef>
+          <a:effectRef idx="0">
+            <a:schemeClr val="accent1"/>
+          </a:effectRef>
+          <a:fontRef idx="minor">
+            <a:schemeClr val="lt1"/>
+          </a:fontRef>
+        </p:style>
+        <p:txBody>
+          <a:bodyPr rtlCol="0" anchor="ctr"/>
+          <a:lstStyle/>
+          <a:p>
+            <a:pPr algn="ctr"/>
+            <a:endParaRPr lang="en-US"/>
+          </a:p>
+        </p:txBody>
+      </p:sp>
+      <p:cxnSp>
+        <p:nvCxnSpPr>
+          <p:cNvPr id="10" name="Straight Arrow Connector 9">
+            <a:extLst>
+              <a:ext uri="{FF2B5EF4-FFF2-40B4-BE49-F238E27FC236}">
+                <a16:creationId xmlns:a16="http://schemas.microsoft.com/office/drawing/2014/main" id="{43468496-5138-6F43-B0D9-9F850D40A327}"/>
+              </a:ext>
+            </a:extLst>
+          </p:cNvPr>
+          <p:cNvCxnSpPr>
+            <a:cxnSpLocks/>
+          </p:cNvCxnSpPr>
+          <p:nvPr/>
+        </p:nvCxnSpPr>
+        <p:spPr>
+          <a:xfrm flipV="1">
+            <a:off x="2082799" y="2568301"/>
+            <a:ext cx="3288225" cy="2608403"/>
+          </a:xfrm>
+          <a:prstGeom prst="straightConnector1">
+            <a:avLst/>
+          </a:prstGeom>
+          <a:ln w="38100">
+            <a:solidFill>
+              <a:srgbClr val="C00000"/>
+            </a:solidFill>
+            <a:tailEnd type="triangle"/>
+          </a:ln>
+        </p:spPr>
+        <p:style>
+          <a:lnRef idx="1">
+            <a:schemeClr val="accent1"/>
+          </a:lnRef>
+          <a:fillRef idx="0">
+            <a:schemeClr val="accent1"/>
+          </a:fillRef>
+          <a:effectRef idx="0">
+            <a:schemeClr val="accent1"/>
+          </a:effectRef>
+          <a:fontRef idx="minor">
+            <a:schemeClr val="tx1"/>
+          </a:fontRef>
+        </p:style>
+      </p:cxnSp>
+      <p:pic>
+        <p:nvPicPr>
+          <p:cNvPr id="4" name="Picture 3">
+            <a:extLst>
+              <a:ext uri="{FF2B5EF4-FFF2-40B4-BE49-F238E27FC236}">
+                <a16:creationId xmlns:a16="http://schemas.microsoft.com/office/drawing/2014/main" id="{37D2A5D0-8404-3C46-83FF-C8397A0AA4BB}"/>
+              </a:ext>
+            </a:extLst>
+          </p:cNvPr>
+          <p:cNvPicPr>
+            <a:picLocks noChangeAspect="1"/>
+          </p:cNvPicPr>
+          <p:nvPr/>
+        </p:nvPicPr>
+        <p:blipFill>
+          <a:blip r:embed="rId3"/>
+          <a:stretch>
+            <a:fillRect/>
+          </a:stretch>
+        </p:blipFill>
+        <p:spPr>
+          <a:xfrm>
+            <a:off x="5609165" y="1803400"/>
+            <a:ext cx="4322105" cy="1552601"/>
+          </a:xfrm>
+          <a:prstGeom prst="rect">
+            <a:avLst/>
+          </a:prstGeom>
+        </p:spPr>
+      </p:pic>
+    </p:spTree>
+    <p:extLst>
+      <p:ext uri="{BB962C8B-B14F-4D97-AF65-F5344CB8AC3E}">
+        <p14:creationId xmlns:p14="http://schemas.microsoft.com/office/powerpoint/2010/main" val="2625597659"/>
+      </p:ext>
+    </p:extLst>
+  </p:cSld>
+  <p:clrMapOvr>
+    <a:masterClrMapping/>
+  </p:clrMapOvr>
+</p:sld>
+</file>
+
+<file path=ppt/slides/slide18.xml><?xml version="1.0" encoding="utf-8"?>
 <p:sld xmlns:a="http://schemas.openxmlformats.org/drawingml/2006/main" xmlns:r="http://schemas.openxmlformats.org/officeDocument/2006/relationships" xmlns:p="http://schemas.openxmlformats.org/presentationml/2006/main">
   <p:cSld>
     <p:bg>
@@ -13541,36 +15071,6 @@
       </p:sp>
       <p:pic>
         <p:nvPicPr>
-          <p:cNvPr id="10" name="Picture 9">
-            <a:extLst>
-              <a:ext uri="{FF2B5EF4-FFF2-40B4-BE49-F238E27FC236}">
-                <a16:creationId xmlns:a16="http://schemas.microsoft.com/office/drawing/2014/main" id="{0490DB04-7A23-4B8E-A735-B2EB1043404C}"/>
-              </a:ext>
-            </a:extLst>
-          </p:cNvPr>
-          <p:cNvPicPr>
-            <a:picLocks noChangeAspect="1"/>
-          </p:cNvPicPr>
-          <p:nvPr/>
-        </p:nvPicPr>
-        <p:blipFill>
-          <a:blip r:embed="rId2"/>
-          <a:stretch>
-            <a:fillRect/>
-          </a:stretch>
-        </p:blipFill>
-        <p:spPr>
-          <a:xfrm>
-            <a:off x="8018727" y="2407168"/>
-            <a:ext cx="3318201" cy="3085187"/>
-          </a:xfrm>
-          <a:prstGeom prst="rect">
-            <a:avLst/>
-          </a:prstGeom>
-        </p:spPr>
-      </p:pic>
-      <p:pic>
-        <p:nvPicPr>
           <p:cNvPr id="11" name="Picture 10">
             <a:extLst>
               <a:ext uri="{FF2B5EF4-FFF2-40B4-BE49-F238E27FC236}">
@@ -13584,7 +15084,7 @@
           <p:nvPr/>
         </p:nvPicPr>
         <p:blipFill>
-          <a:blip r:embed="rId3"/>
+          <a:blip r:embed="rId2"/>
           <a:stretch>
             <a:fillRect/>
           </a:stretch>
@@ -13614,7 +15114,7 @@
           <p:nvPr/>
         </p:nvPicPr>
         <p:blipFill>
-          <a:blip r:embed="rId4"/>
+          <a:blip r:embed="rId3"/>
           <a:stretch>
             <a:fillRect/>
           </a:stretch>
@@ -13644,7 +15144,7 @@
           <p:nvPr/>
         </p:nvPicPr>
         <p:blipFill>
-          <a:blip r:embed="rId5">
+          <a:blip r:embed="rId4">
             <a:extLst>
               <a:ext uri="{28A0092B-C50C-407E-A947-70E740481C1C}">
                 <a14:useLocalDpi xmlns:a14="http://schemas.microsoft.com/office/drawing/2010/main" val="0"/>
@@ -13674,6 +15174,36 @@
               </a14:hiddenFill>
             </a:ext>
           </a:extLst>
+        </p:spPr>
+      </p:pic>
+      <p:pic>
+        <p:nvPicPr>
+          <p:cNvPr id="5" name="Picture 4">
+            <a:extLst>
+              <a:ext uri="{FF2B5EF4-FFF2-40B4-BE49-F238E27FC236}">
+                <a16:creationId xmlns:a16="http://schemas.microsoft.com/office/drawing/2014/main" id="{BFB3FA8E-AE72-4F4D-9FE9-7785E1C80537}"/>
+              </a:ext>
+            </a:extLst>
+          </p:cNvPr>
+          <p:cNvPicPr>
+            <a:picLocks noChangeAspect="1"/>
+          </p:cNvPicPr>
+          <p:nvPr/>
+        </p:nvPicPr>
+        <p:blipFill>
+          <a:blip r:embed="rId5"/>
+          <a:stretch>
+            <a:fillRect/>
+          </a:stretch>
+        </p:blipFill>
+        <p:spPr>
+          <a:xfrm>
+            <a:off x="8015637" y="2097087"/>
+            <a:ext cx="3650403" cy="3395267"/>
+          </a:xfrm>
+          <a:prstGeom prst="rect">
+            <a:avLst/>
+          </a:prstGeom>
         </p:spPr>
       </p:pic>
     </p:spTree>
@@ -14470,7 +16000,23 @@
                   <a:schemeClr val="bg1"/>
                 </a:solidFill>
               </a:rPr>
-              <a:t>E: ¬¬z ≡ z</a:t>
+              <a:t>E: ¬¬z </a:t>
+            </a:r>
+            <a:r>
+              <a:rPr lang="en-US" sz="3200" dirty="0">
+                <a:solidFill>
+                  <a:schemeClr val="bg1"/>
+                </a:solidFill>
+              </a:rPr>
+              <a:t>≡</a:t>
+            </a:r>
+            <a:r>
+              <a:rPr lang="en-US" sz="3200" i="1" dirty="0">
+                <a:solidFill>
+                  <a:schemeClr val="bg1"/>
+                </a:solidFill>
+              </a:rPr>
+              <a:t> z</a:t>
             </a:r>
           </a:p>
         </p:txBody>
@@ -14592,7 +16138,7 @@
               <a:t>		  </a:t>
             </a:r>
             <a:r>
-              <a:rPr lang="en-US" sz="3200" i="1" dirty="0">
+              <a:rPr lang="en-US" sz="3200" dirty="0">
                 <a:solidFill>
                   <a:schemeClr val="bg1"/>
                 </a:solidFill>
@@ -14729,7 +16275,7 @@
               <a:t>		</a:t>
             </a:r>
             <a:r>
-              <a:rPr lang="en-US" sz="3200" i="1" dirty="0">
+              <a:rPr lang="en-US" sz="3200" dirty="0">
                 <a:solidFill>
                   <a:schemeClr val="bg1"/>
                 </a:solidFill>
@@ -14807,99 +16353,27 @@
                   <a:schemeClr val="bg1"/>
                 </a:solidFill>
               </a:rPr>
-              <a:t>: ¬¬p ≡ p</a:t>
+              <a:t>: ¬¬p </a:t>
+            </a:r>
+            <a:r>
+              <a:rPr lang="en-US" sz="3200" dirty="0">
+                <a:solidFill>
+                  <a:schemeClr val="bg1"/>
+                </a:solidFill>
+              </a:rPr>
+              <a:t>≡</a:t>
+            </a:r>
+            <a:r>
+              <a:rPr lang="en-US" sz="3200" i="1" dirty="0">
+                <a:solidFill>
+                  <a:schemeClr val="bg1"/>
+                </a:solidFill>
+              </a:rPr>
+              <a:t> p</a:t>
             </a:r>
           </a:p>
         </p:txBody>
       </p:sp>
-      <p:cxnSp>
-        <p:nvCxnSpPr>
-          <p:cNvPr id="15" name="Straight Arrow Connector 14">
-            <a:extLst>
-              <a:ext uri="{FF2B5EF4-FFF2-40B4-BE49-F238E27FC236}">
-                <a16:creationId xmlns:a16="http://schemas.microsoft.com/office/drawing/2014/main" id="{D80FD9E5-83EA-4AF1-B6E9-99F2D3BF3979}"/>
-              </a:ext>
-            </a:extLst>
-          </p:cNvPr>
-          <p:cNvCxnSpPr>
-            <a:cxnSpLocks/>
-          </p:cNvCxnSpPr>
-          <p:nvPr/>
-        </p:nvCxnSpPr>
-        <p:spPr>
-          <a:xfrm>
-            <a:off x="3664093" y="4022471"/>
-            <a:ext cx="1764798" cy="1524466"/>
-          </a:xfrm>
-          <a:prstGeom prst="straightConnector1">
-            <a:avLst/>
-          </a:prstGeom>
-          <a:ln w="22225">
-            <a:solidFill>
-              <a:srgbClr val="C00000"/>
-            </a:solidFill>
-            <a:tailEnd type="triangle"/>
-          </a:ln>
-        </p:spPr>
-        <p:style>
-          <a:lnRef idx="1">
-            <a:schemeClr val="accent1"/>
-          </a:lnRef>
-          <a:fillRef idx="0">
-            <a:schemeClr val="accent1"/>
-          </a:fillRef>
-          <a:effectRef idx="0">
-            <a:schemeClr val="accent1"/>
-          </a:effectRef>
-          <a:fontRef idx="minor">
-            <a:schemeClr val="tx1"/>
-          </a:fontRef>
-        </p:style>
-      </p:cxnSp>
-      <p:cxnSp>
-        <p:nvCxnSpPr>
-          <p:cNvPr id="19" name="Straight Arrow Connector 18">
-            <a:extLst>
-              <a:ext uri="{FF2B5EF4-FFF2-40B4-BE49-F238E27FC236}">
-                <a16:creationId xmlns:a16="http://schemas.microsoft.com/office/drawing/2014/main" id="{0910B422-451C-4C45-873D-049502F86C83}"/>
-              </a:ext>
-            </a:extLst>
-          </p:cNvPr>
-          <p:cNvCxnSpPr>
-            <a:cxnSpLocks/>
-          </p:cNvCxnSpPr>
-          <p:nvPr/>
-        </p:nvCxnSpPr>
-        <p:spPr>
-          <a:xfrm flipH="1">
-            <a:off x="6159151" y="4022471"/>
-            <a:ext cx="1575868" cy="1524466"/>
-          </a:xfrm>
-          <a:prstGeom prst="straightConnector1">
-            <a:avLst/>
-          </a:prstGeom>
-          <a:ln w="22225">
-            <a:solidFill>
-              <a:srgbClr val="C00000"/>
-            </a:solidFill>
-            <a:tailEnd type="triangle"/>
-          </a:ln>
-        </p:spPr>
-        <p:style>
-          <a:lnRef idx="1">
-            <a:schemeClr val="accent1"/>
-          </a:lnRef>
-          <a:fillRef idx="0">
-            <a:schemeClr val="accent1"/>
-          </a:fillRef>
-          <a:effectRef idx="0">
-            <a:schemeClr val="accent1"/>
-          </a:effectRef>
-          <a:fontRef idx="minor">
-            <a:schemeClr val="tx1"/>
-          </a:fontRef>
-        </p:style>
-      </p:cxnSp>
     </p:spTree>
     <p:extLst>
       <p:ext uri="{BB962C8B-B14F-4D97-AF65-F5344CB8AC3E}">
@@ -14943,7 +16417,7 @@
           <p:cNvPr id="2" name="Title 1">
             <a:extLst>
               <a:ext uri="{FF2B5EF4-FFF2-40B4-BE49-F238E27FC236}">
-                <a16:creationId xmlns:a16="http://schemas.microsoft.com/office/drawing/2014/main" id="{A9EA4B56-D166-834F-8E0D-9EB56367FDD4}"/>
+                <a16:creationId xmlns:a16="http://schemas.microsoft.com/office/drawing/2014/main" id="{2CD4A5CC-8C73-E444-B958-783F0FD3BF8B}"/>
               </a:ext>
             </a:extLst>
           </p:cNvPr>
@@ -14965,60 +16439,425 @@
                   <a:schemeClr val="bg1"/>
                 </a:solidFill>
               </a:rPr>
-              <a:t>methodology</a:t>
+              <a:t>Example in English</a:t>
             </a:r>
           </a:p>
         </p:txBody>
       </p:sp>
       <p:sp>
         <p:nvSpPr>
-          <p:cNvPr id="3" name="Content Placeholder 2">
+          <p:cNvPr id="7" name="TextBox 6">
             <a:extLst>
               <a:ext uri="{FF2B5EF4-FFF2-40B4-BE49-F238E27FC236}">
-                <a16:creationId xmlns:a16="http://schemas.microsoft.com/office/drawing/2014/main" id="{E90549A8-450F-334F-8285-A26A2A94C0D9}"/>
+                <a16:creationId xmlns:a16="http://schemas.microsoft.com/office/drawing/2014/main" id="{38F6CFF9-BB74-4896-9715-E057062C4426}"/>
               </a:ext>
             </a:extLst>
           </p:cNvPr>
-          <p:cNvSpPr>
-            <a:spLocks noGrp="1"/>
-          </p:cNvSpPr>
-          <p:nvPr>
-            <p:ph idx="1"/>
-          </p:nvPr>
+          <p:cNvSpPr txBox="1"/>
+          <p:nvPr/>
         </p:nvSpPr>
-        <p:spPr/>
+        <p:spPr>
+          <a:xfrm>
+            <a:off x="4777446" y="1873711"/>
+            <a:ext cx="2633932" cy="584775"/>
+          </a:xfrm>
+          <a:prstGeom prst="rect">
+            <a:avLst/>
+          </a:prstGeom>
+          <a:noFill/>
+        </p:spPr>
         <p:txBody>
-          <a:bodyPr/>
+          <a:bodyPr wrap="square" rtlCol="0">
+            <a:spAutoFit/>
+          </a:bodyPr>
           <a:lstStyle/>
           <a:p>
             <a:r>
-              <a:rPr lang="en-US" dirty="0">
+              <a:rPr lang="en-US" sz="3200" i="1" dirty="0">
                 <a:solidFill>
                   <a:schemeClr val="bg1"/>
                 </a:solidFill>
               </a:rPr>
-              <a:t>Proof calculi</a:t>
-            </a:r>
-          </a:p>
-          <a:p>
-            <a:pPr lvl="1"/>
-            <a:r>
-              <a:rPr lang="en-US" dirty="0">
+              <a:t>E: ¬¬z </a:t>
+            </a:r>
+            <a:r>
+              <a:rPr lang="en-US" sz="3200" dirty="0">
                 <a:solidFill>
                   <a:schemeClr val="bg1"/>
                 </a:solidFill>
               </a:rPr>
-              <a:t>Hilbert-style</a:t>
+              <a:t>≡</a:t>
+            </a:r>
+            <a:r>
+              <a:rPr lang="en-US" sz="3200" i="1" dirty="0">
+                <a:solidFill>
+                  <a:schemeClr val="bg1"/>
+                </a:solidFill>
+              </a:rPr>
+              <a:t> z</a:t>
+            </a:r>
+          </a:p>
+        </p:txBody>
+      </p:sp>
+      <p:sp>
+        <p:nvSpPr>
+          <p:cNvPr id="9" name="TextBox 8">
+            <a:extLst>
+              <a:ext uri="{FF2B5EF4-FFF2-40B4-BE49-F238E27FC236}">
+                <a16:creationId xmlns:a16="http://schemas.microsoft.com/office/drawing/2014/main" id="{BEBEA34C-2E70-4C5B-AA49-0D24488E921E}"/>
+              </a:ext>
+            </a:extLst>
+          </p:cNvPr>
+          <p:cNvSpPr txBox="1"/>
+          <p:nvPr/>
+        </p:nvSpPr>
+        <p:spPr>
+          <a:xfrm>
+            <a:off x="8264257" y="2828368"/>
+            <a:ext cx="2633932" cy="3703578"/>
+          </a:xfrm>
+          <a:prstGeom prst="rect">
+            <a:avLst/>
+          </a:prstGeom>
+          <a:noFill/>
+        </p:spPr>
+        <p:txBody>
+          <a:bodyPr wrap="square" rtlCol="0">
+            <a:spAutoFit/>
+          </a:bodyPr>
+          <a:lstStyle/>
+          <a:p>
+            <a:r>
+              <a:rPr lang="en-US" sz="3200" i="1" dirty="0" err="1">
+                <a:solidFill>
+                  <a:schemeClr val="bg1"/>
+                </a:solidFill>
+              </a:rPr>
+              <a:t>E</a:t>
+            </a:r>
+            <a:r>
+              <a:rPr lang="en-US" sz="3200" i="1" baseline="30000" dirty="0" err="1">
+                <a:solidFill>
+                  <a:schemeClr val="bg1"/>
+                </a:solidFill>
+              </a:rPr>
+              <a:t>z</a:t>
+            </a:r>
+            <a:r>
+              <a:rPr lang="en-US" sz="3200" i="1" baseline="-25000" dirty="0" err="1">
+                <a:solidFill>
+                  <a:schemeClr val="bg1"/>
+                </a:solidFill>
+              </a:rPr>
+              <a:t>false</a:t>
+            </a:r>
+            <a:endParaRPr lang="en-US" sz="3200" i="1" baseline="-25000" dirty="0">
+              <a:solidFill>
+                <a:schemeClr val="bg1"/>
+              </a:solidFill>
+            </a:endParaRPr>
+          </a:p>
+          <a:p>
+            <a:endParaRPr lang="en-US" sz="3200" baseline="-25000" dirty="0">
+              <a:solidFill>
+                <a:schemeClr val="bg1"/>
+              </a:solidFill>
+            </a:endParaRPr>
+          </a:p>
+          <a:p>
+            <a:r>
+              <a:rPr lang="en-US" sz="3200" i="1" baseline="-25000" dirty="0">
+                <a:solidFill>
+                  <a:schemeClr val="bg1"/>
+                </a:solidFill>
+              </a:rPr>
+              <a:t>z</a:t>
+            </a:r>
+            <a:r>
+              <a:rPr lang="en-US" sz="3200" baseline="-25000" dirty="0">
+                <a:solidFill>
+                  <a:schemeClr val="bg1"/>
+                </a:solidFill>
+              </a:rPr>
+              <a:t>: “The sky is green”</a:t>
+            </a:r>
+          </a:p>
+          <a:p>
+            <a:endParaRPr lang="en-US" sz="3200" baseline="-25000" dirty="0">
+              <a:solidFill>
+                <a:schemeClr val="bg1"/>
+              </a:solidFill>
+            </a:endParaRPr>
+          </a:p>
+          <a:p>
+            <a:r>
+              <a:rPr lang="en-US" sz="3200" baseline="-25000" dirty="0">
+                <a:solidFill>
+                  <a:schemeClr val="bg1"/>
+                </a:solidFill>
+              </a:rPr>
+              <a:t>“It is not the case that the sky is not green.”</a:t>
+            </a:r>
+          </a:p>
+          <a:p>
+            <a:endParaRPr lang="en-US" sz="3200" baseline="-25000" dirty="0">
+              <a:solidFill>
+                <a:schemeClr val="bg1"/>
+              </a:solidFill>
+            </a:endParaRPr>
+          </a:p>
+          <a:p>
+            <a:r>
+              <a:rPr lang="en-US" sz="3200" baseline="-25000" dirty="0">
+                <a:solidFill>
+                  <a:schemeClr val="bg1"/>
+                </a:solidFill>
+              </a:rPr>
+              <a:t>		  </a:t>
+            </a:r>
+            <a:r>
+              <a:rPr lang="en-US" sz="3200" dirty="0">
+                <a:solidFill>
+                  <a:schemeClr val="bg1"/>
+                </a:solidFill>
+              </a:rPr>
+              <a:t>≡</a:t>
+            </a:r>
+          </a:p>
+          <a:p>
+            <a:r>
+              <a:rPr lang="en-US" sz="3200" baseline="-25000" dirty="0">
+                <a:solidFill>
+                  <a:schemeClr val="bg1"/>
+                </a:solidFill>
+              </a:rPr>
+              <a:t>“It is the case that the sky is green.”</a:t>
+            </a:r>
+          </a:p>
+        </p:txBody>
+      </p:sp>
+      <p:sp>
+        <p:nvSpPr>
+          <p:cNvPr id="11" name="TextBox 10">
+            <a:extLst>
+              <a:ext uri="{FF2B5EF4-FFF2-40B4-BE49-F238E27FC236}">
+                <a16:creationId xmlns:a16="http://schemas.microsoft.com/office/drawing/2014/main" id="{4AF8B82F-40AD-435B-AC99-66D6F6E24E0F}"/>
+              </a:ext>
+            </a:extLst>
+          </p:cNvPr>
+          <p:cNvSpPr txBox="1"/>
+          <p:nvPr/>
+        </p:nvSpPr>
+        <p:spPr>
+          <a:xfrm>
+            <a:off x="1293813" y="2827272"/>
+            <a:ext cx="2633932" cy="3703578"/>
+          </a:xfrm>
+          <a:prstGeom prst="rect">
+            <a:avLst/>
+          </a:prstGeom>
+          <a:noFill/>
+        </p:spPr>
+        <p:txBody>
+          <a:bodyPr wrap="square" rtlCol="0">
+            <a:spAutoFit/>
+          </a:bodyPr>
+          <a:lstStyle/>
+          <a:p>
+            <a:r>
+              <a:rPr lang="en-US" sz="3200" i="1" dirty="0" err="1">
+                <a:solidFill>
+                  <a:schemeClr val="bg1"/>
+                </a:solidFill>
+              </a:rPr>
+              <a:t>E</a:t>
+            </a:r>
+            <a:r>
+              <a:rPr lang="en-US" sz="3200" i="1" baseline="30000" dirty="0" err="1">
+                <a:solidFill>
+                  <a:schemeClr val="bg1"/>
+                </a:solidFill>
+              </a:rPr>
+              <a:t>z</a:t>
+            </a:r>
+            <a:r>
+              <a:rPr lang="en-US" sz="3200" i="1" baseline="-25000" dirty="0" err="1">
+                <a:solidFill>
+                  <a:schemeClr val="bg1"/>
+                </a:solidFill>
+              </a:rPr>
+              <a:t>true</a:t>
+            </a:r>
+            <a:endParaRPr lang="en-US" sz="3200" i="1" baseline="-25000" dirty="0">
+              <a:solidFill>
+                <a:schemeClr val="bg1"/>
+              </a:solidFill>
+            </a:endParaRPr>
+          </a:p>
+          <a:p>
+            <a:endParaRPr lang="en-US" sz="3200" baseline="-25000" dirty="0">
+              <a:solidFill>
+                <a:schemeClr val="bg1"/>
+              </a:solidFill>
+            </a:endParaRPr>
+          </a:p>
+          <a:p>
+            <a:r>
+              <a:rPr lang="en-US" sz="3200" i="1" baseline="-25000" dirty="0">
+                <a:solidFill>
+                  <a:schemeClr val="bg1"/>
+                </a:solidFill>
+              </a:rPr>
+              <a:t>z</a:t>
+            </a:r>
+            <a:r>
+              <a:rPr lang="en-US" sz="3200" baseline="-25000" dirty="0">
+                <a:solidFill>
+                  <a:schemeClr val="bg1"/>
+                </a:solidFill>
+              </a:rPr>
+              <a:t>: “The sky is blue”</a:t>
+            </a:r>
+          </a:p>
+          <a:p>
+            <a:endParaRPr lang="en-US" sz="3200" baseline="-25000" dirty="0">
+              <a:solidFill>
+                <a:schemeClr val="bg1"/>
+              </a:solidFill>
+            </a:endParaRPr>
+          </a:p>
+          <a:p>
+            <a:r>
+              <a:rPr lang="en-US" sz="3200" baseline="-25000" dirty="0">
+                <a:solidFill>
+                  <a:schemeClr val="bg1"/>
+                </a:solidFill>
+              </a:rPr>
+              <a:t>“It is not the case that the sky is not blue.”</a:t>
+            </a:r>
+          </a:p>
+          <a:p>
+            <a:endParaRPr lang="en-US" sz="3200" baseline="-25000" dirty="0">
+              <a:solidFill>
+                <a:schemeClr val="bg1"/>
+              </a:solidFill>
+            </a:endParaRPr>
+          </a:p>
+          <a:p>
+            <a:r>
+              <a:rPr lang="en-US" sz="3200" baseline="-25000" dirty="0">
+                <a:solidFill>
+                  <a:schemeClr val="bg1"/>
+                </a:solidFill>
+              </a:rPr>
+              <a:t>		</a:t>
+            </a:r>
+            <a:r>
+              <a:rPr lang="en-US" sz="3200" dirty="0">
+                <a:solidFill>
+                  <a:schemeClr val="bg1"/>
+                </a:solidFill>
+              </a:rPr>
+              <a:t>≡</a:t>
+            </a:r>
+          </a:p>
+          <a:p>
+            <a:r>
+              <a:rPr lang="en-US" sz="3200" baseline="-25000" dirty="0">
+                <a:solidFill>
+                  <a:schemeClr val="bg1"/>
+                </a:solidFill>
+              </a:rPr>
+              <a:t>“It is the case that the sky is blue.”</a:t>
+            </a:r>
+          </a:p>
+        </p:txBody>
+      </p:sp>
+      <p:sp>
+        <p:nvSpPr>
+          <p:cNvPr id="12" name="TextBox 11">
+            <a:extLst>
+              <a:ext uri="{FF2B5EF4-FFF2-40B4-BE49-F238E27FC236}">
+                <a16:creationId xmlns:a16="http://schemas.microsoft.com/office/drawing/2014/main" id="{33863992-D12C-4FF0-944E-89A9F015632F}"/>
+              </a:ext>
+            </a:extLst>
+          </p:cNvPr>
+          <p:cNvSpPr txBox="1"/>
+          <p:nvPr/>
+        </p:nvSpPr>
+        <p:spPr>
+          <a:xfrm>
+            <a:off x="4705559" y="5654707"/>
+            <a:ext cx="2633932" cy="584775"/>
+          </a:xfrm>
+          <a:prstGeom prst="rect">
+            <a:avLst/>
+          </a:prstGeom>
+          <a:noFill/>
+        </p:spPr>
+        <p:txBody>
+          <a:bodyPr wrap="square" rtlCol="0">
+            <a:spAutoFit/>
+          </a:bodyPr>
+          <a:lstStyle/>
+          <a:p>
+            <a:r>
+              <a:rPr lang="en-US" sz="3200" i="1" dirty="0" err="1">
+                <a:solidFill>
+                  <a:schemeClr val="bg1"/>
+                </a:solidFill>
+              </a:rPr>
+              <a:t>E</a:t>
+            </a:r>
+            <a:r>
+              <a:rPr lang="en-US" sz="3200" i="1" baseline="30000" dirty="0" err="1">
+                <a:solidFill>
+                  <a:schemeClr val="bg1"/>
+                </a:solidFill>
+              </a:rPr>
+              <a:t>z</a:t>
+            </a:r>
+            <a:r>
+              <a:rPr lang="en-US" sz="3200" i="1" baseline="-25000" dirty="0" err="1">
+                <a:solidFill>
+                  <a:schemeClr val="bg1"/>
+                </a:solidFill>
+              </a:rPr>
+              <a:t>p</a:t>
+            </a:r>
+            <a:r>
+              <a:rPr lang="en-US" sz="3200" i="1" dirty="0">
+                <a:solidFill>
+                  <a:schemeClr val="bg1"/>
+                </a:solidFill>
+              </a:rPr>
+              <a:t>: ¬¬p </a:t>
+            </a:r>
+            <a:r>
+              <a:rPr lang="en-US" sz="3200" dirty="0">
+                <a:solidFill>
+                  <a:schemeClr val="bg1"/>
+                </a:solidFill>
+              </a:rPr>
+              <a:t>≡</a:t>
+            </a:r>
+            <a:r>
+              <a:rPr lang="en-US" sz="3200" i="1" dirty="0">
+                <a:solidFill>
+                  <a:schemeClr val="bg1"/>
+                </a:solidFill>
+              </a:rPr>
+              <a:t> p</a:t>
             </a:r>
           </a:p>
         </p:txBody>
       </p:sp>
       <p:cxnSp>
         <p:nvCxnSpPr>
-          <p:cNvPr id="5" name="Straight Arrow Connector 4">
+          <p:cNvPr id="15" name="Straight Arrow Connector 14">
             <a:extLst>
               <a:ext uri="{FF2B5EF4-FFF2-40B4-BE49-F238E27FC236}">
-                <a16:creationId xmlns:a16="http://schemas.microsoft.com/office/drawing/2014/main" id="{A46AFBEB-7935-49E3-B11D-0B59F669594C}"/>
+                <a16:creationId xmlns:a16="http://schemas.microsoft.com/office/drawing/2014/main" id="{D80FD9E5-83EA-4AF1-B6E9-99F2D3BF3979}"/>
               </a:ext>
             </a:extLst>
           </p:cNvPr>
@@ -15029,13 +16868,140 @@
         </p:nvCxnSpPr>
         <p:spPr>
           <a:xfrm>
-            <a:off x="3290281" y="2985091"/>
-            <a:ext cx="3168028" cy="0"/>
+            <a:off x="2071991" y="3124384"/>
+            <a:ext cx="3151942" cy="0"/>
           </a:xfrm>
           <a:prstGeom prst="straightConnector1">
             <a:avLst/>
           </a:prstGeom>
-          <a:ln w="22225">
+          <a:ln w="38100">
+            <a:solidFill>
+              <a:srgbClr val="C00000"/>
+            </a:solidFill>
+            <a:tailEnd type="triangle"/>
+          </a:ln>
+        </p:spPr>
+        <p:style>
+          <a:lnRef idx="1">
+            <a:schemeClr val="accent1"/>
+          </a:lnRef>
+          <a:fillRef idx="0">
+            <a:schemeClr val="accent1"/>
+          </a:fillRef>
+          <a:effectRef idx="0">
+            <a:schemeClr val="accent1"/>
+          </a:effectRef>
+          <a:fontRef idx="minor">
+            <a:schemeClr val="tx1"/>
+          </a:fontRef>
+        </p:style>
+      </p:cxnSp>
+      <p:cxnSp>
+        <p:nvCxnSpPr>
+          <p:cNvPr id="19" name="Straight Arrow Connector 18">
+            <a:extLst>
+              <a:ext uri="{FF2B5EF4-FFF2-40B4-BE49-F238E27FC236}">
+                <a16:creationId xmlns:a16="http://schemas.microsoft.com/office/drawing/2014/main" id="{0910B422-451C-4C45-873D-049502F86C83}"/>
+              </a:ext>
+            </a:extLst>
+          </p:cNvPr>
+          <p:cNvCxnSpPr>
+            <a:cxnSpLocks/>
+          </p:cNvCxnSpPr>
+          <p:nvPr/>
+        </p:nvCxnSpPr>
+        <p:spPr>
+          <a:xfrm flipH="1">
+            <a:off x="6265333" y="3124384"/>
+            <a:ext cx="1998924" cy="0"/>
+          </a:xfrm>
+          <a:prstGeom prst="straightConnector1">
+            <a:avLst/>
+          </a:prstGeom>
+          <a:ln w="38100">
+            <a:solidFill>
+              <a:srgbClr val="C00000"/>
+            </a:solidFill>
+            <a:tailEnd type="triangle"/>
+          </a:ln>
+        </p:spPr>
+        <p:style>
+          <a:lnRef idx="1">
+            <a:schemeClr val="accent1"/>
+          </a:lnRef>
+          <a:fillRef idx="0">
+            <a:schemeClr val="accent1"/>
+          </a:fillRef>
+          <a:effectRef idx="0">
+            <a:schemeClr val="accent1"/>
+          </a:effectRef>
+          <a:fontRef idx="minor">
+            <a:schemeClr val="tx1"/>
+          </a:fontRef>
+        </p:style>
+      </p:cxnSp>
+      <p:sp>
+        <p:nvSpPr>
+          <p:cNvPr id="5" name="TextBox 4">
+            <a:extLst>
+              <a:ext uri="{FF2B5EF4-FFF2-40B4-BE49-F238E27FC236}">
+                <a16:creationId xmlns:a16="http://schemas.microsoft.com/office/drawing/2014/main" id="{940835EE-E04D-E34A-AFA6-24096A4D5EE1}"/>
+              </a:ext>
+            </a:extLst>
+          </p:cNvPr>
+          <p:cNvSpPr txBox="1"/>
+          <p:nvPr/>
+        </p:nvSpPr>
+        <p:spPr>
+          <a:xfrm>
+            <a:off x="5497418" y="2866052"/>
+            <a:ext cx="611065" cy="1015663"/>
+          </a:xfrm>
+          <a:prstGeom prst="rect">
+            <a:avLst/>
+          </a:prstGeom>
+          <a:noFill/>
+        </p:spPr>
+        <p:txBody>
+          <a:bodyPr wrap="none" rtlCol="0">
+            <a:spAutoFit/>
+          </a:bodyPr>
+          <a:lstStyle/>
+          <a:p>
+            <a:r>
+              <a:rPr lang="en-US" sz="6000" dirty="0">
+                <a:solidFill>
+                  <a:schemeClr val="bg1"/>
+                </a:solidFill>
+              </a:rPr>
+              <a:t>⌃</a:t>
+            </a:r>
+          </a:p>
+        </p:txBody>
+      </p:sp>
+      <p:cxnSp>
+        <p:nvCxnSpPr>
+          <p:cNvPr id="14" name="Straight Arrow Connector 13">
+            <a:extLst>
+              <a:ext uri="{FF2B5EF4-FFF2-40B4-BE49-F238E27FC236}">
+                <a16:creationId xmlns:a16="http://schemas.microsoft.com/office/drawing/2014/main" id="{D684373F-C735-CD4D-AC73-06E17E4250E6}"/>
+              </a:ext>
+            </a:extLst>
+          </p:cNvPr>
+          <p:cNvCxnSpPr>
+            <a:cxnSpLocks/>
+          </p:cNvCxnSpPr>
+          <p:nvPr/>
+        </p:nvCxnSpPr>
+        <p:spPr>
+          <a:xfrm flipH="1">
+            <a:off x="5223933" y="3581584"/>
+            <a:ext cx="579017" cy="2073123"/>
+          </a:xfrm>
+          <a:prstGeom prst="straightConnector1">
+            <a:avLst/>
+          </a:prstGeom>
+          <a:ln w="38100">
             <a:solidFill>
               <a:srgbClr val="C00000"/>
             </a:solidFill>
@@ -15060,7 +17026,7 @@
     </p:spTree>
     <p:extLst>
       <p:ext uri="{BB962C8B-B14F-4D97-AF65-F5344CB8AC3E}">
-        <p14:creationId xmlns:p14="http://schemas.microsoft.com/office/powerpoint/2010/main" val="1069921170"/>
+        <p14:creationId xmlns:p14="http://schemas.microsoft.com/office/powerpoint/2010/main" val="457367645"/>
       </p:ext>
     </p:extLst>
   </p:cSld>
@@ -15168,6 +17134,163 @@
               <a:t>Hilbert-style</a:t>
             </a:r>
           </a:p>
+        </p:txBody>
+      </p:sp>
+      <p:cxnSp>
+        <p:nvCxnSpPr>
+          <p:cNvPr id="5" name="Straight Arrow Connector 4">
+            <a:extLst>
+              <a:ext uri="{FF2B5EF4-FFF2-40B4-BE49-F238E27FC236}">
+                <a16:creationId xmlns:a16="http://schemas.microsoft.com/office/drawing/2014/main" id="{A46AFBEB-7935-49E3-B11D-0B59F669594C}"/>
+              </a:ext>
+            </a:extLst>
+          </p:cNvPr>
+          <p:cNvCxnSpPr>
+            <a:cxnSpLocks/>
+          </p:cNvCxnSpPr>
+          <p:nvPr/>
+        </p:nvCxnSpPr>
+        <p:spPr>
+          <a:xfrm>
+            <a:off x="3290281" y="2985091"/>
+            <a:ext cx="3168028" cy="0"/>
+          </a:xfrm>
+          <a:prstGeom prst="straightConnector1">
+            <a:avLst/>
+          </a:prstGeom>
+          <a:ln w="38100">
+            <a:solidFill>
+              <a:srgbClr val="C00000"/>
+            </a:solidFill>
+            <a:tailEnd type="triangle"/>
+          </a:ln>
+        </p:spPr>
+        <p:style>
+          <a:lnRef idx="1">
+            <a:schemeClr val="accent1"/>
+          </a:lnRef>
+          <a:fillRef idx="0">
+            <a:schemeClr val="accent1"/>
+          </a:fillRef>
+          <a:effectRef idx="0">
+            <a:schemeClr val="accent1"/>
+          </a:effectRef>
+          <a:fontRef idx="minor">
+            <a:schemeClr val="tx1"/>
+          </a:fontRef>
+        </p:style>
+      </p:cxnSp>
+    </p:spTree>
+    <p:extLst>
+      <p:ext uri="{BB962C8B-B14F-4D97-AF65-F5344CB8AC3E}">
+        <p14:creationId xmlns:p14="http://schemas.microsoft.com/office/powerpoint/2010/main" val="1069921170"/>
+      </p:ext>
+    </p:extLst>
+  </p:cSld>
+  <p:clrMapOvr>
+    <a:masterClrMapping/>
+  </p:clrMapOvr>
+</p:sld>
+</file>
+
+<file path=ppt/slides/slide9.xml><?xml version="1.0" encoding="utf-8"?>
+<p:sld xmlns:a="http://schemas.openxmlformats.org/drawingml/2006/main" xmlns:r="http://schemas.openxmlformats.org/officeDocument/2006/relationships" xmlns:p="http://schemas.openxmlformats.org/presentationml/2006/main">
+  <p:cSld>
+    <p:bg>
+      <p:bgPr>
+        <a:solidFill>
+          <a:schemeClr val="tx1"/>
+        </a:solidFill>
+        <a:effectLst/>
+      </p:bgPr>
+    </p:bg>
+    <p:spTree>
+      <p:nvGrpSpPr>
+        <p:cNvPr id="1" name=""/>
+        <p:cNvGrpSpPr/>
+        <p:nvPr/>
+      </p:nvGrpSpPr>
+      <p:grpSpPr>
+        <a:xfrm>
+          <a:off x="0" y="0"/>
+          <a:ext cx="0" cy="0"/>
+          <a:chOff x="0" y="0"/>
+          <a:chExt cx="0" cy="0"/>
+        </a:xfrm>
+      </p:grpSpPr>
+      <p:sp>
+        <p:nvSpPr>
+          <p:cNvPr id="2" name="Title 1">
+            <a:extLst>
+              <a:ext uri="{FF2B5EF4-FFF2-40B4-BE49-F238E27FC236}">
+                <a16:creationId xmlns:a16="http://schemas.microsoft.com/office/drawing/2014/main" id="{A9EA4B56-D166-834F-8E0D-9EB56367FDD4}"/>
+              </a:ext>
+            </a:extLst>
+          </p:cNvPr>
+          <p:cNvSpPr>
+            <a:spLocks noGrp="1"/>
+          </p:cNvSpPr>
+          <p:nvPr>
+            <p:ph type="title"/>
+          </p:nvPr>
+        </p:nvSpPr>
+        <p:spPr/>
+        <p:txBody>
+          <a:bodyPr/>
+          <a:lstStyle/>
+          <a:p>
+            <a:r>
+              <a:rPr lang="en-US" dirty="0">
+                <a:solidFill>
+                  <a:schemeClr val="bg1"/>
+                </a:solidFill>
+              </a:rPr>
+              <a:t>methodology</a:t>
+            </a:r>
+          </a:p>
+        </p:txBody>
+      </p:sp>
+      <p:sp>
+        <p:nvSpPr>
+          <p:cNvPr id="3" name="Content Placeholder 2">
+            <a:extLst>
+              <a:ext uri="{FF2B5EF4-FFF2-40B4-BE49-F238E27FC236}">
+                <a16:creationId xmlns:a16="http://schemas.microsoft.com/office/drawing/2014/main" id="{E90549A8-450F-334F-8285-A26A2A94C0D9}"/>
+              </a:ext>
+            </a:extLst>
+          </p:cNvPr>
+          <p:cNvSpPr>
+            <a:spLocks noGrp="1"/>
+          </p:cNvSpPr>
+          <p:nvPr>
+            <p:ph idx="1"/>
+          </p:nvPr>
+        </p:nvSpPr>
+        <p:spPr/>
+        <p:txBody>
+          <a:bodyPr/>
+          <a:lstStyle/>
+          <a:p>
+            <a:r>
+              <a:rPr lang="en-US" dirty="0">
+                <a:solidFill>
+                  <a:schemeClr val="bg1"/>
+                </a:solidFill>
+              </a:rPr>
+              <a:t>Proof calculi</a:t>
+            </a:r>
+          </a:p>
+          <a:p>
+            <a:pPr lvl="1"/>
+            <a:r>
+              <a:rPr lang="en-US" dirty="0">
+                <a:solidFill>
+                  <a:schemeClr val="bg1"/>
+                </a:solidFill>
+              </a:rPr>
+              <a:t>Hilbert-style</a:t>
+            </a:r>
+          </a:p>
           <a:p>
             <a:pPr lvl="1"/>
             <a:r>
@@ -15233,7 +17356,7 @@
           <a:prstGeom prst="straightConnector1">
             <a:avLst/>
           </a:prstGeom>
-          <a:ln w="22225">
+          <a:ln w="38100">
             <a:solidFill>
               <a:srgbClr val="C00000"/>
             </a:solidFill>
@@ -15265,267 +17388,6 @@
   <p:clrMapOvr>
     <a:masterClrMapping/>
   </p:clrMapOvr>
-</p:sld>
-</file>
-
-<file path=ppt/slides/slide9.xml><?xml version="1.0" encoding="utf-8"?>
-<p:sld xmlns:a="http://schemas.openxmlformats.org/drawingml/2006/main" xmlns:r="http://schemas.openxmlformats.org/officeDocument/2006/relationships" xmlns:p="http://schemas.openxmlformats.org/presentationml/2006/main">
-  <p:cSld>
-    <p:bg>
-      <p:bgPr>
-        <a:solidFill>
-          <a:schemeClr val="tx1"/>
-        </a:solidFill>
-        <a:effectLst/>
-      </p:bgPr>
-    </p:bg>
-    <p:spTree>
-      <p:nvGrpSpPr>
-        <p:cNvPr id="1" name=""/>
-        <p:cNvGrpSpPr/>
-        <p:nvPr/>
-      </p:nvGrpSpPr>
-      <p:grpSpPr>
-        <a:xfrm>
-          <a:off x="0" y="0"/>
-          <a:ext cx="0" cy="0"/>
-          <a:chOff x="0" y="0"/>
-          <a:chExt cx="0" cy="0"/>
-        </a:xfrm>
-      </p:grpSpPr>
-      <p:sp>
-        <p:nvSpPr>
-          <p:cNvPr id="2" name="Title 1">
-            <a:extLst>
-              <a:ext uri="{FF2B5EF4-FFF2-40B4-BE49-F238E27FC236}">
-                <a16:creationId xmlns:a16="http://schemas.microsoft.com/office/drawing/2014/main" id="{A9EA4B56-D166-834F-8E0D-9EB56367FDD4}"/>
-              </a:ext>
-            </a:extLst>
-          </p:cNvPr>
-          <p:cNvSpPr>
-            <a:spLocks noGrp="1"/>
-          </p:cNvSpPr>
-          <p:nvPr>
-            <p:ph type="title"/>
-          </p:nvPr>
-        </p:nvSpPr>
-        <p:spPr/>
-        <p:txBody>
-          <a:bodyPr/>
-          <a:lstStyle/>
-          <a:p>
-            <a:r>
-              <a:rPr lang="en-US" dirty="0">
-                <a:solidFill>
-                  <a:schemeClr val="bg1"/>
-                </a:solidFill>
-              </a:rPr>
-              <a:t>methodology</a:t>
-            </a:r>
-          </a:p>
-        </p:txBody>
-      </p:sp>
-      <p:sp>
-        <p:nvSpPr>
-          <p:cNvPr id="3" name="Content Placeholder 2">
-            <a:extLst>
-              <a:ext uri="{FF2B5EF4-FFF2-40B4-BE49-F238E27FC236}">
-                <a16:creationId xmlns:a16="http://schemas.microsoft.com/office/drawing/2014/main" id="{E90549A8-450F-334F-8285-A26A2A94C0D9}"/>
-              </a:ext>
-            </a:extLst>
-          </p:cNvPr>
-          <p:cNvSpPr>
-            <a:spLocks noGrp="1"/>
-          </p:cNvSpPr>
-          <p:nvPr>
-            <p:ph idx="1"/>
-          </p:nvPr>
-        </p:nvSpPr>
-        <p:spPr/>
-        <p:txBody>
-          <a:bodyPr/>
-          <a:lstStyle/>
-          <a:p>
-            <a:r>
-              <a:rPr lang="en-US" dirty="0">
-                <a:solidFill>
-                  <a:schemeClr val="bg1"/>
-                </a:solidFill>
-              </a:rPr>
-              <a:t>Proof calculi</a:t>
-            </a:r>
-          </a:p>
-          <a:p>
-            <a:pPr lvl="1"/>
-            <a:r>
-              <a:rPr lang="en-US" dirty="0">
-                <a:solidFill>
-                  <a:schemeClr val="bg1"/>
-                </a:solidFill>
-              </a:rPr>
-              <a:t>Hilbert-style</a:t>
-            </a:r>
-          </a:p>
-          <a:p>
-            <a:pPr lvl="1"/>
-            <a:r>
-              <a:rPr lang="en-US" dirty="0">
-                <a:solidFill>
-                  <a:schemeClr val="bg1"/>
-                </a:solidFill>
-              </a:rPr>
-              <a:t>Natural deduction</a:t>
-            </a:r>
-          </a:p>
-          <a:p>
-            <a:pPr lvl="1"/>
-            <a:r>
-              <a:rPr lang="en-US" dirty="0">
-                <a:solidFill>
-                  <a:schemeClr val="bg1"/>
-                </a:solidFill>
-              </a:rPr>
-              <a:t>Equational system</a:t>
-            </a:r>
-          </a:p>
-        </p:txBody>
-      </p:sp>
-      <p:cxnSp>
-        <p:nvCxnSpPr>
-          <p:cNvPr id="5" name="Straight Arrow Connector 4">
-            <a:extLst>
-              <a:ext uri="{FF2B5EF4-FFF2-40B4-BE49-F238E27FC236}">
-                <a16:creationId xmlns:a16="http://schemas.microsoft.com/office/drawing/2014/main" id="{E3537BBD-9AF1-4E6E-A7A4-667361B0017C}"/>
-              </a:ext>
-            </a:extLst>
-          </p:cNvPr>
-          <p:cNvCxnSpPr>
-            <a:cxnSpLocks/>
-          </p:cNvCxnSpPr>
-          <p:nvPr/>
-        </p:nvCxnSpPr>
-        <p:spPr>
-          <a:xfrm>
-            <a:off x="3802115" y="3818977"/>
-            <a:ext cx="1966081" cy="0"/>
-          </a:xfrm>
-          <a:prstGeom prst="straightConnector1">
-            <a:avLst/>
-          </a:prstGeom>
-          <a:ln w="22225">
-            <a:solidFill>
-              <a:srgbClr val="C00000"/>
-            </a:solidFill>
-            <a:tailEnd type="triangle"/>
-          </a:ln>
-        </p:spPr>
-        <p:style>
-          <a:lnRef idx="1">
-            <a:schemeClr val="accent1"/>
-          </a:lnRef>
-          <a:fillRef idx="0">
-            <a:schemeClr val="accent1"/>
-          </a:fillRef>
-          <a:effectRef idx="0">
-            <a:schemeClr val="accent1"/>
-          </a:effectRef>
-          <a:fontRef idx="minor">
-            <a:schemeClr val="tx1"/>
-          </a:fontRef>
-        </p:style>
-      </p:cxnSp>
-    </p:spTree>
-    <p:extLst>
-      <p:ext uri="{BB962C8B-B14F-4D97-AF65-F5344CB8AC3E}">
-        <p14:creationId xmlns:p14="http://schemas.microsoft.com/office/powerpoint/2010/main" val="1039459532"/>
-      </p:ext>
-    </p:extLst>
-  </p:cSld>
-  <p:clrMapOvr>
-    <a:masterClrMapping/>
-  </p:clrMapOvr>
-  <p:timing>
-    <p:tnLst>
-      <p:par>
-        <p:cTn id="1" dur="indefinite" restart="never" nodeType="tmRoot">
-          <p:childTnLst>
-            <p:seq concurrent="1" nextAc="seek">
-              <p:cTn id="2" dur="indefinite" nodeType="mainSeq">
-                <p:childTnLst>
-                  <p:par>
-                    <p:cTn id="3" fill="hold">
-                      <p:stCondLst>
-                        <p:cond delay="indefinite"/>
-                      </p:stCondLst>
-                      <p:childTnLst>
-                        <p:par>
-                          <p:cTn id="4" fill="hold">
-                            <p:stCondLst>
-                              <p:cond delay="0"/>
-                            </p:stCondLst>
-                            <p:childTnLst>
-                              <p:par>
-                                <p:cTn id="5" presetID="26" presetClass="emph" presetSubtype="0" fill="hold" nodeType="clickEffect">
-                                  <p:stCondLst>
-                                    <p:cond delay="0"/>
-                                  </p:stCondLst>
-                                  <p:childTnLst>
-                                    <p:animEffect transition="out" filter="fade">
-                                      <p:cBhvr>
-                                        <p:cTn id="6" dur="500" tmFilter="0, 0; .2, .5; .8, .5; 1, 0"/>
-                                        <p:tgtEl>
-                                          <p:spTgt spid="3">
-                                            <p:txEl>
-                                              <p:pRg st="3" end="3"/>
-                                            </p:txEl>
-                                          </p:spTgt>
-                                        </p:tgtEl>
-                                      </p:cBhvr>
-                                    </p:animEffect>
-                                    <p:animScale>
-                                      <p:cBhvr>
-                                        <p:cTn id="7" dur="250" autoRev="1" fill="hold"/>
-                                        <p:tgtEl>
-                                          <p:spTgt spid="3">
-                                            <p:txEl>
-                                              <p:pRg st="3" end="3"/>
-                                            </p:txEl>
-                                          </p:spTgt>
-                                        </p:tgtEl>
-                                      </p:cBhvr>
-                                      <p:by x="105000" y="105000"/>
-                                    </p:animScale>
-                                  </p:childTnLst>
-                                </p:cTn>
-                              </p:par>
-                            </p:childTnLst>
-                          </p:cTn>
-                        </p:par>
-                      </p:childTnLst>
-                    </p:cTn>
-                  </p:par>
-                </p:childTnLst>
-              </p:cTn>
-              <p:prevCondLst>
-                <p:cond evt="onPrev" delay="0">
-                  <p:tgtEl>
-                    <p:sldTgt/>
-                  </p:tgtEl>
-                </p:cond>
-              </p:prevCondLst>
-              <p:nextCondLst>
-                <p:cond evt="onNext" delay="0">
-                  <p:tgtEl>
-                    <p:sldTgt/>
-                  </p:tgtEl>
-                </p:cond>
-              </p:nextCondLst>
-            </p:seq>
-          </p:childTnLst>
-        </p:cTn>
-      </p:par>
-    </p:tnLst>
-  </p:timing>
 </p:sld>
 </file>
 

</xml_diff>